<commit_message>
Minor tweaks to pipeline illustrations for Chris' post.
</commit_message>
<xml_diff>
--- a/src/DevOps/Illustrations.pptx
+++ b/src/DevOps/Illustrations.pptx
@@ -206,7 +206,7 @@
           <a:p>
             <a:fld id="{EB1108B4-53EF-4F9E-9491-F5ABDE6A4EA7}" type="datetimeFigureOut">
               <a:rPr lang="en-CA" smtClean="0"/>
-              <a:t>2017-04-12</a:t>
+              <a:t>2017-04-17</a:t>
             </a:fld>
             <a:endParaRPr lang="en-CA"/>
           </a:p>
@@ -605,7 +605,7 @@
           <a:p>
             <a:fld id="{F71EBF1D-DE49-4C53-B029-DA93D2E44EE4}" type="datetimeFigureOut">
               <a:rPr lang="en-CA" smtClean="0"/>
-              <a:t>2017-04-12</a:t>
+              <a:t>2017-04-17</a:t>
             </a:fld>
             <a:endParaRPr lang="en-CA"/>
           </a:p>
@@ -775,7 +775,7 @@
           <a:p>
             <a:fld id="{F71EBF1D-DE49-4C53-B029-DA93D2E44EE4}" type="datetimeFigureOut">
               <a:rPr lang="en-CA" smtClean="0"/>
-              <a:t>2017-04-12</a:t>
+              <a:t>2017-04-17</a:t>
             </a:fld>
             <a:endParaRPr lang="en-CA"/>
           </a:p>
@@ -955,7 +955,7 @@
           <a:p>
             <a:fld id="{F71EBF1D-DE49-4C53-B029-DA93D2E44EE4}" type="datetimeFigureOut">
               <a:rPr lang="en-CA" smtClean="0"/>
-              <a:t>2017-04-12</a:t>
+              <a:t>2017-04-17</a:t>
             </a:fld>
             <a:endParaRPr lang="en-CA"/>
           </a:p>
@@ -1125,7 +1125,7 @@
           <a:p>
             <a:fld id="{F71EBF1D-DE49-4C53-B029-DA93D2E44EE4}" type="datetimeFigureOut">
               <a:rPr lang="en-CA" smtClean="0"/>
-              <a:t>2017-04-12</a:t>
+              <a:t>2017-04-17</a:t>
             </a:fld>
             <a:endParaRPr lang="en-CA"/>
           </a:p>
@@ -1371,7 +1371,7 @@
           <a:p>
             <a:fld id="{F71EBF1D-DE49-4C53-B029-DA93D2E44EE4}" type="datetimeFigureOut">
               <a:rPr lang="en-CA" smtClean="0"/>
-              <a:t>2017-04-12</a:t>
+              <a:t>2017-04-17</a:t>
             </a:fld>
             <a:endParaRPr lang="en-CA"/>
           </a:p>
@@ -1603,7 +1603,7 @@
           <a:p>
             <a:fld id="{F71EBF1D-DE49-4C53-B029-DA93D2E44EE4}" type="datetimeFigureOut">
               <a:rPr lang="en-CA" smtClean="0"/>
-              <a:t>2017-04-12</a:t>
+              <a:t>2017-04-17</a:t>
             </a:fld>
             <a:endParaRPr lang="en-CA"/>
           </a:p>
@@ -1970,7 +1970,7 @@
           <a:p>
             <a:fld id="{F71EBF1D-DE49-4C53-B029-DA93D2E44EE4}" type="datetimeFigureOut">
               <a:rPr lang="en-CA" smtClean="0"/>
-              <a:t>2017-04-12</a:t>
+              <a:t>2017-04-17</a:t>
             </a:fld>
             <a:endParaRPr lang="en-CA"/>
           </a:p>
@@ -2107,7 +2107,7 @@
           <a:p>
             <a:fld id="{F71EBF1D-DE49-4C53-B029-DA93D2E44EE4}" type="datetimeFigureOut">
               <a:rPr lang="en-CA" smtClean="0"/>
-              <a:t>2017-04-12</a:t>
+              <a:t>2017-04-17</a:t>
             </a:fld>
             <a:endParaRPr lang="en-CA"/>
           </a:p>
@@ -2202,7 +2202,7 @@
           <a:p>
             <a:fld id="{F71EBF1D-DE49-4C53-B029-DA93D2E44EE4}" type="datetimeFigureOut">
               <a:rPr lang="en-CA" smtClean="0"/>
-              <a:t>2017-04-12</a:t>
+              <a:t>2017-04-17</a:t>
             </a:fld>
             <a:endParaRPr lang="en-CA"/>
           </a:p>
@@ -2479,7 +2479,7 @@
           <a:p>
             <a:fld id="{F71EBF1D-DE49-4C53-B029-DA93D2E44EE4}" type="datetimeFigureOut">
               <a:rPr lang="en-CA" smtClean="0"/>
-              <a:t>2017-04-12</a:t>
+              <a:t>2017-04-17</a:t>
             </a:fld>
             <a:endParaRPr lang="en-CA"/>
           </a:p>
@@ -2732,7 +2732,7 @@
           <a:p>
             <a:fld id="{F71EBF1D-DE49-4C53-B029-DA93D2E44EE4}" type="datetimeFigureOut">
               <a:rPr lang="en-CA" smtClean="0"/>
-              <a:t>2017-04-12</a:t>
+              <a:t>2017-04-17</a:t>
             </a:fld>
             <a:endParaRPr lang="en-CA"/>
           </a:p>
@@ -2945,7 +2945,7 @@
           <a:p>
             <a:fld id="{F71EBF1D-DE49-4C53-B029-DA93D2E44EE4}" type="datetimeFigureOut">
               <a:rPr lang="en-CA" smtClean="0"/>
-              <a:t>2017-04-12</a:t>
+              <a:t>2017-04-17</a:t>
             </a:fld>
             <a:endParaRPr lang="en-CA"/>
           </a:p>
@@ -10248,8 +10248,8 @@
         </p:nvSpPr>
         <p:spPr>
           <a:xfrm>
-            <a:off x="2856985" y="5165821"/>
-            <a:ext cx="655949" cy="369332"/>
+            <a:off x="2549994" y="5147292"/>
+            <a:ext cx="1350113" cy="369332"/>
           </a:xfrm>
           <a:prstGeom prst="rect">
             <a:avLst/>
@@ -10268,7 +10268,7 @@
                   <a:schemeClr val="accent5"/>
                 </a:solidFill>
               </a:rPr>
-              <a:t>build</a:t>
+              <a:t>deploy code</a:t>
             </a:r>
             <a:endParaRPr lang="en-CA" dirty="0">
               <a:solidFill>
@@ -11141,8 +11141,8 @@
         </p:nvSpPr>
         <p:spPr>
           <a:xfrm rot="16200000">
-            <a:off x="1632865" y="700852"/>
-            <a:ext cx="1371600" cy="3257735"/>
+            <a:off x="1861465" y="929452"/>
+            <a:ext cx="914400" cy="3257735"/>
           </a:xfrm>
           <a:prstGeom prst="can">
             <a:avLst/>
@@ -11219,8 +11219,8 @@
         </p:nvSpPr>
         <p:spPr>
           <a:xfrm>
-            <a:off x="1059147" y="1943776"/>
-            <a:ext cx="2665436" cy="830997"/>
+            <a:off x="1093670" y="2347465"/>
+            <a:ext cx="2665436" cy="369332"/>
           </a:xfrm>
           <a:prstGeom prst="rect">
             <a:avLst/>
@@ -11235,14 +11235,14 @@
           <a:p>
             <a:pPr algn="ctr"/>
             <a:r>
-              <a:rPr lang="en-US" sz="2400" dirty="0">
+              <a:rPr lang="en-US" dirty="0">
                 <a:solidFill>
                   <a:schemeClr val="accent5"/>
                 </a:solidFill>
               </a:rPr>
               <a:t>User Interface (UI) CI Build</a:t>
             </a:r>
-            <a:endParaRPr lang="en-CA" sz="2400" dirty="0">
+            <a:endParaRPr lang="en-CA" dirty="0">
               <a:solidFill>
                 <a:schemeClr val="accent5"/>
               </a:solidFill>
@@ -11264,8 +11264,8 @@
         </p:nvSpPr>
         <p:spPr>
           <a:xfrm rot="16200000">
-            <a:off x="5393691" y="700853"/>
-            <a:ext cx="1371600" cy="3257735"/>
+            <a:off x="5622292" y="899024"/>
+            <a:ext cx="914400" cy="3257735"/>
           </a:xfrm>
           <a:prstGeom prst="can">
             <a:avLst/>
@@ -11308,8 +11308,8 @@
         </p:nvSpPr>
         <p:spPr>
           <a:xfrm>
-            <a:off x="4966373" y="1759109"/>
-            <a:ext cx="2372637" cy="1200329"/>
+            <a:off x="4972078" y="2235153"/>
+            <a:ext cx="2372637" cy="646331"/>
           </a:xfrm>
           <a:prstGeom prst="rect">
             <a:avLst/>
@@ -11324,7 +11324,7 @@
           <a:p>
             <a:pPr algn="ctr"/>
             <a:r>
-              <a:rPr lang="en-US" sz="2400" dirty="0">
+              <a:rPr lang="en-US" dirty="0">
                 <a:solidFill>
                   <a:schemeClr val="accent5"/>
                 </a:solidFill>
@@ -11332,21 +11332,21 @@
               <a:t>Mocked Dependencies </a:t>
             </a:r>
             <a:br>
-              <a:rPr lang="en-US" sz="2400" dirty="0">
+              <a:rPr lang="en-US" dirty="0">
                 <a:solidFill>
                   <a:schemeClr val="accent5"/>
                 </a:solidFill>
               </a:rPr>
             </a:br>
             <a:r>
-              <a:rPr lang="en-US" sz="2400" dirty="0">
+              <a:rPr lang="en-US" dirty="0">
                 <a:solidFill>
                   <a:schemeClr val="accent5"/>
                 </a:solidFill>
               </a:rPr>
               <a:t>CI Build</a:t>
             </a:r>
-            <a:endParaRPr lang="en-CA" sz="2400" dirty="0">
+            <a:endParaRPr lang="en-CA" dirty="0">
               <a:solidFill>
                 <a:schemeClr val="accent5"/>
               </a:solidFill>
@@ -11368,8 +11368,8 @@
         </p:nvSpPr>
         <p:spPr>
           <a:xfrm rot="16200000">
-            <a:off x="1632866" y="2501157"/>
-            <a:ext cx="1371600" cy="3257735"/>
+            <a:off x="1861466" y="2520754"/>
+            <a:ext cx="914400" cy="3257735"/>
           </a:xfrm>
           <a:prstGeom prst="can">
             <a:avLst/>
@@ -11412,8 +11412,8 @@
         </p:nvSpPr>
         <p:spPr>
           <a:xfrm>
-            <a:off x="1109458" y="3750395"/>
-            <a:ext cx="2665436" cy="830997"/>
+            <a:off x="1030552" y="3945359"/>
+            <a:ext cx="2665436" cy="369332"/>
           </a:xfrm>
           <a:prstGeom prst="rect">
             <a:avLst/>
@@ -11428,29 +11428,14 @@
           <a:p>
             <a:pPr algn="ctr"/>
             <a:r>
-              <a:rPr lang="en-US" sz="2400" dirty="0">
+              <a:rPr lang="en-US" dirty="0">
                 <a:solidFill>
                   <a:schemeClr val="accent5"/>
                 </a:solidFill>
               </a:rPr>
-              <a:t>Back-end</a:t>
-            </a:r>
-            <a:br>
-              <a:rPr lang="en-US" sz="2400" dirty="0">
-                <a:solidFill>
-                  <a:schemeClr val="accent5"/>
-                </a:solidFill>
-              </a:rPr>
-            </a:br>
-            <a:r>
-              <a:rPr lang="en-US" sz="2400" dirty="0">
-                <a:solidFill>
-                  <a:schemeClr val="accent5"/>
-                </a:solidFill>
-              </a:rPr>
-              <a:t>CI Build</a:t>
-            </a:r>
-            <a:endParaRPr lang="en-CA" sz="2400" dirty="0">
+              <a:t>Back-end CI Build</a:t>
+            </a:r>
+            <a:endParaRPr lang="en-CA" dirty="0">
               <a:solidFill>
                 <a:schemeClr val="accent5"/>
               </a:solidFill>
@@ -11472,8 +11457,8 @@
         </p:nvSpPr>
         <p:spPr>
           <a:xfrm rot="16200000">
-            <a:off x="5393692" y="2501158"/>
-            <a:ext cx="1371600" cy="3257735"/>
+            <a:off x="5622292" y="2501157"/>
+            <a:ext cx="914400" cy="3257735"/>
           </a:xfrm>
           <a:prstGeom prst="can">
             <a:avLst/>
@@ -11516,8 +11501,8 @@
         </p:nvSpPr>
         <p:spPr>
           <a:xfrm>
-            <a:off x="4898880" y="3565730"/>
-            <a:ext cx="2519036" cy="1200329"/>
+            <a:off x="4898878" y="3826455"/>
+            <a:ext cx="2519036" cy="646331"/>
           </a:xfrm>
           <a:prstGeom prst="rect">
             <a:avLst/>
@@ -11532,7 +11517,7 @@
           <a:p>
             <a:pPr algn="ctr"/>
             <a:r>
-              <a:rPr lang="en-US" sz="2400" dirty="0">
+              <a:rPr lang="en-US" dirty="0">
                 <a:solidFill>
                   <a:schemeClr val="accent5"/>
                 </a:solidFill>
@@ -11540,21 +11525,21 @@
               <a:t>Mocked Dependencies </a:t>
             </a:r>
             <a:br>
-              <a:rPr lang="en-US" sz="2400" dirty="0">
+              <a:rPr lang="en-US" dirty="0">
                 <a:solidFill>
                   <a:schemeClr val="accent5"/>
                 </a:solidFill>
               </a:rPr>
             </a:br>
             <a:r>
-              <a:rPr lang="en-US" sz="2400" dirty="0">
+              <a:rPr lang="en-US" dirty="0">
                 <a:solidFill>
                   <a:schemeClr val="accent5"/>
                 </a:solidFill>
               </a:rPr>
               <a:t>CI Build</a:t>
             </a:r>
-            <a:endParaRPr lang="en-CA" sz="2400" dirty="0">
+            <a:endParaRPr lang="en-CA" dirty="0">
               <a:solidFill>
                 <a:schemeClr val="accent5"/>
               </a:solidFill>
@@ -11576,8 +11561,8 @@
         </p:nvSpPr>
         <p:spPr>
           <a:xfrm rot="16200000">
-            <a:off x="9460172" y="1521361"/>
-            <a:ext cx="1371600" cy="3257735"/>
+            <a:off x="9688772" y="1749961"/>
+            <a:ext cx="914400" cy="3257735"/>
           </a:xfrm>
           <a:prstGeom prst="can">
             <a:avLst/>
@@ -11620,8 +11605,8 @@
         </p:nvSpPr>
         <p:spPr>
           <a:xfrm>
-            <a:off x="9020193" y="2550066"/>
-            <a:ext cx="2665436" cy="1200329"/>
+            <a:off x="8875836" y="3055662"/>
+            <a:ext cx="2665436" cy="646331"/>
           </a:xfrm>
           <a:prstGeom prst="rect">
             <a:avLst/>
@@ -11636,44 +11621,29 @@
           <a:p>
             <a:pPr algn="ctr"/>
             <a:r>
-              <a:rPr lang="en-US" sz="2400" dirty="0">
+              <a:rPr lang="en-US" dirty="0">
                 <a:solidFill>
                   <a:schemeClr val="accent5"/>
                 </a:solidFill>
               </a:rPr>
-              <a:t>Integration</a:t>
+              <a:t>Integration CI Build</a:t>
             </a:r>
             <a:br>
-              <a:rPr lang="en-US" sz="2400" dirty="0">
+              <a:rPr lang="en-US" dirty="0">
                 <a:solidFill>
                   <a:schemeClr val="accent5"/>
                 </a:solidFill>
               </a:rPr>
             </a:br>
             <a:r>
-              <a:rPr lang="en-US" sz="2400" dirty="0">
-                <a:solidFill>
-                  <a:schemeClr val="accent5"/>
-                </a:solidFill>
-              </a:rPr>
-              <a:t>CI Build</a:t>
-            </a:r>
-            <a:br>
-              <a:rPr lang="en-US" sz="2400" dirty="0">
-                <a:solidFill>
-                  <a:schemeClr val="accent5"/>
-                </a:solidFill>
-              </a:rPr>
-            </a:br>
-            <a:r>
-              <a:rPr lang="en-US" sz="2400" dirty="0">
+              <a:rPr lang="en-US" dirty="0">
                 <a:solidFill>
                   <a:schemeClr val="accent5"/>
                 </a:solidFill>
               </a:rPr>
               <a:t>(UI + Back-end)</a:t>
             </a:r>
-            <a:endParaRPr lang="en-CA" sz="2400" dirty="0">
+            <a:endParaRPr lang="en-CA" dirty="0">
               <a:solidFill>
                 <a:schemeClr val="accent5"/>
               </a:solidFill>
@@ -11697,51 +11667,7 @@
         </p:nvCxnSpPr>
         <p:spPr>
           <a:xfrm>
-            <a:off x="3947533" y="2329719"/>
-            <a:ext cx="691374" cy="0"/>
-          </a:xfrm>
-          <a:prstGeom prst="straightConnector1">
-            <a:avLst/>
-          </a:prstGeom>
-          <a:ln w="38100">
-            <a:solidFill>
-              <a:schemeClr val="accent5"/>
-            </a:solidFill>
-            <a:tailEnd type="triangle" w="lg" len="sm"/>
-          </a:ln>
-        </p:spPr>
-        <p:style>
-          <a:lnRef idx="1">
-            <a:schemeClr val="accent1"/>
-          </a:lnRef>
-          <a:fillRef idx="0">
-            <a:schemeClr val="accent1"/>
-          </a:fillRef>
-          <a:effectRef idx="0">
-            <a:schemeClr val="accent1"/>
-          </a:effectRef>
-          <a:fontRef idx="minor">
-            <a:schemeClr val="tx1"/>
-          </a:fontRef>
-        </p:style>
-      </p:cxnSp>
-      <p:cxnSp>
-        <p:nvCxnSpPr>
-          <p:cNvPr id="43" name="Straight Arrow Connector 42">
-            <a:extLst>
-              <a:ext uri="{FF2B5EF4-FFF2-40B4-BE49-F238E27FC236}">
-                <a16:creationId xmlns:a16="http://schemas.microsoft.com/office/drawing/2014/main" id="{9D140DD3-DBFD-4361-8E68-9A58EFEEC31B}"/>
-              </a:ext>
-            </a:extLst>
-          </p:cNvPr>
-          <p:cNvCxnSpPr>
-            <a:cxnSpLocks/>
-          </p:cNvCxnSpPr>
-          <p:nvPr/>
-        </p:nvCxnSpPr>
-        <p:spPr>
-          <a:xfrm>
-            <a:off x="3947533" y="4151409"/>
+            <a:off x="3947533" y="2527891"/>
             <a:ext cx="691374" cy="0"/>
           </a:xfrm>
           <a:prstGeom prst="straightConnector1">
@@ -11787,8 +11713,8 @@
         </p:nvCxnSpPr>
         <p:spPr>
           <a:xfrm>
-            <a:off x="7708359" y="2329721"/>
-            <a:ext cx="966076" cy="820509"/>
+            <a:off x="7708360" y="2527892"/>
+            <a:ext cx="933909" cy="851284"/>
           </a:xfrm>
           <a:prstGeom prst="bentConnector3">
             <a:avLst>
@@ -11831,7 +11757,7 @@
         </p:nvSpPr>
         <p:spPr>
           <a:xfrm>
-            <a:off x="8674435" y="3035487"/>
+            <a:off x="8642269" y="3264433"/>
             <a:ext cx="188427" cy="229485"/>
           </a:xfrm>
           <a:prstGeom prst="flowChartConnector">
@@ -11885,13 +11811,57 @@
         </p:nvCxnSpPr>
         <p:spPr>
           <a:xfrm flipV="1">
-            <a:off x="7708360" y="3150230"/>
-            <a:ext cx="966075" cy="979795"/>
+            <a:off x="7708360" y="3379176"/>
+            <a:ext cx="933909" cy="750848"/>
           </a:xfrm>
           <a:prstGeom prst="bentConnector3">
             <a:avLst>
               <a:gd name="adj1" fmla="val 50000"/>
             </a:avLst>
+          </a:prstGeom>
+          <a:ln w="38100">
+            <a:solidFill>
+              <a:schemeClr val="accent5"/>
+            </a:solidFill>
+            <a:tailEnd type="triangle" w="lg" len="sm"/>
+          </a:ln>
+        </p:spPr>
+        <p:style>
+          <a:lnRef idx="1">
+            <a:schemeClr val="accent1"/>
+          </a:lnRef>
+          <a:fillRef idx="0">
+            <a:schemeClr val="accent1"/>
+          </a:fillRef>
+          <a:effectRef idx="0">
+            <a:schemeClr val="accent1"/>
+          </a:effectRef>
+          <a:fontRef idx="minor">
+            <a:schemeClr val="tx1"/>
+          </a:fontRef>
+        </p:style>
+      </p:cxnSp>
+      <p:cxnSp>
+        <p:nvCxnSpPr>
+          <p:cNvPr id="22" name="Straight Arrow Connector 21">
+            <a:extLst>
+              <a:ext uri="{FF2B5EF4-FFF2-40B4-BE49-F238E27FC236}">
+                <a16:creationId xmlns:a16="http://schemas.microsoft.com/office/drawing/2014/main" id="{E9A0597D-B741-4488-92C7-2C81CC3BB9BD}"/>
+              </a:ext>
+            </a:extLst>
+          </p:cNvPr>
+          <p:cNvCxnSpPr>
+            <a:cxnSpLocks/>
+          </p:cNvCxnSpPr>
+          <p:nvPr/>
+        </p:nvCxnSpPr>
+        <p:spPr>
+          <a:xfrm>
+            <a:off x="3947533" y="4149825"/>
+            <a:ext cx="691374" cy="0"/>
+          </a:xfrm>
+          <a:prstGeom prst="straightConnector1">
+            <a:avLst/>
           </a:prstGeom>
           <a:ln w="38100">
             <a:solidFill>

</xml_diff>

<commit_message>
Add Manage database upgrades image
</commit_message>
<xml_diff>
--- a/src/DevOps/Illustrations.pptx
+++ b/src/DevOps/Illustrations.pptx
@@ -5,7 +5,7 @@
     <p:sldMasterId id="2147483648" r:id="rId1"/>
   </p:sldMasterIdLst>
   <p:notesMasterIdLst>
-    <p:notesMasterId r:id="rId8"/>
+    <p:notesMasterId r:id="rId9"/>
   </p:notesMasterIdLst>
   <p:sldIdLst>
     <p:sldId id="327" r:id="rId2"/>
@@ -14,6 +14,7 @@
     <p:sldId id="338" r:id="rId5"/>
     <p:sldId id="339" r:id="rId6"/>
     <p:sldId id="340" r:id="rId7"/>
+    <p:sldId id="341" r:id="rId8"/>
   </p:sldIdLst>
   <p:sldSz cx="12192000" cy="6858000"/>
   <p:notesSz cx="6858000" cy="9144000"/>
@@ -206,7 +207,7 @@
           <a:p>
             <a:fld id="{EB1108B4-53EF-4F9E-9491-F5ABDE6A4EA7}" type="datetimeFigureOut">
               <a:rPr lang="en-CA" smtClean="0"/>
-              <a:t>2017-04-17</a:t>
+              <a:t>2017-05-06</a:t>
             </a:fld>
             <a:endParaRPr lang="en-CA"/>
           </a:p>
@@ -605,7 +606,7 @@
           <a:p>
             <a:fld id="{F71EBF1D-DE49-4C53-B029-DA93D2E44EE4}" type="datetimeFigureOut">
               <a:rPr lang="en-CA" smtClean="0"/>
-              <a:t>2017-04-17</a:t>
+              <a:t>2017-05-06</a:t>
             </a:fld>
             <a:endParaRPr lang="en-CA"/>
           </a:p>
@@ -775,7 +776,7 @@
           <a:p>
             <a:fld id="{F71EBF1D-DE49-4C53-B029-DA93D2E44EE4}" type="datetimeFigureOut">
               <a:rPr lang="en-CA" smtClean="0"/>
-              <a:t>2017-04-17</a:t>
+              <a:t>2017-05-06</a:t>
             </a:fld>
             <a:endParaRPr lang="en-CA"/>
           </a:p>
@@ -955,7 +956,7 @@
           <a:p>
             <a:fld id="{F71EBF1D-DE49-4C53-B029-DA93D2E44EE4}" type="datetimeFigureOut">
               <a:rPr lang="en-CA" smtClean="0"/>
-              <a:t>2017-04-17</a:t>
+              <a:t>2017-05-06</a:t>
             </a:fld>
             <a:endParaRPr lang="en-CA"/>
           </a:p>
@@ -1125,7 +1126,7 @@
           <a:p>
             <a:fld id="{F71EBF1D-DE49-4C53-B029-DA93D2E44EE4}" type="datetimeFigureOut">
               <a:rPr lang="en-CA" smtClean="0"/>
-              <a:t>2017-04-17</a:t>
+              <a:t>2017-05-06</a:t>
             </a:fld>
             <a:endParaRPr lang="en-CA"/>
           </a:p>
@@ -1371,7 +1372,7 @@
           <a:p>
             <a:fld id="{F71EBF1D-DE49-4C53-B029-DA93D2E44EE4}" type="datetimeFigureOut">
               <a:rPr lang="en-CA" smtClean="0"/>
-              <a:t>2017-04-17</a:t>
+              <a:t>2017-05-06</a:t>
             </a:fld>
             <a:endParaRPr lang="en-CA"/>
           </a:p>
@@ -1603,7 +1604,7 @@
           <a:p>
             <a:fld id="{F71EBF1D-DE49-4C53-B029-DA93D2E44EE4}" type="datetimeFigureOut">
               <a:rPr lang="en-CA" smtClean="0"/>
-              <a:t>2017-04-17</a:t>
+              <a:t>2017-05-06</a:t>
             </a:fld>
             <a:endParaRPr lang="en-CA"/>
           </a:p>
@@ -1970,7 +1971,7 @@
           <a:p>
             <a:fld id="{F71EBF1D-DE49-4C53-B029-DA93D2E44EE4}" type="datetimeFigureOut">
               <a:rPr lang="en-CA" smtClean="0"/>
-              <a:t>2017-04-17</a:t>
+              <a:t>2017-05-06</a:t>
             </a:fld>
             <a:endParaRPr lang="en-CA"/>
           </a:p>
@@ -2107,7 +2108,7 @@
           <a:p>
             <a:fld id="{F71EBF1D-DE49-4C53-B029-DA93D2E44EE4}" type="datetimeFigureOut">
               <a:rPr lang="en-CA" smtClean="0"/>
-              <a:t>2017-04-17</a:t>
+              <a:t>2017-05-06</a:t>
             </a:fld>
             <a:endParaRPr lang="en-CA"/>
           </a:p>
@@ -2202,7 +2203,7 @@
           <a:p>
             <a:fld id="{F71EBF1D-DE49-4C53-B029-DA93D2E44EE4}" type="datetimeFigureOut">
               <a:rPr lang="en-CA" smtClean="0"/>
-              <a:t>2017-04-17</a:t>
+              <a:t>2017-05-06</a:t>
             </a:fld>
             <a:endParaRPr lang="en-CA"/>
           </a:p>
@@ -2479,7 +2480,7 @@
           <a:p>
             <a:fld id="{F71EBF1D-DE49-4C53-B029-DA93D2E44EE4}" type="datetimeFigureOut">
               <a:rPr lang="en-CA" smtClean="0"/>
-              <a:t>2017-04-17</a:t>
+              <a:t>2017-05-06</a:t>
             </a:fld>
             <a:endParaRPr lang="en-CA"/>
           </a:p>
@@ -2732,7 +2733,7 @@
           <a:p>
             <a:fld id="{F71EBF1D-DE49-4C53-B029-DA93D2E44EE4}" type="datetimeFigureOut">
               <a:rPr lang="en-CA" smtClean="0"/>
-              <a:t>2017-04-17</a:t>
+              <a:t>2017-05-06</a:t>
             </a:fld>
             <a:endParaRPr lang="en-CA"/>
           </a:p>
@@ -2945,7 +2946,7 @@
           <a:p>
             <a:fld id="{F71EBF1D-DE49-4C53-B029-DA93D2E44EE4}" type="datetimeFigureOut">
               <a:rPr lang="en-CA" smtClean="0"/>
-              <a:t>2017-04-17</a:t>
+              <a:t>2017-05-06</a:t>
             </a:fld>
             <a:endParaRPr lang="en-CA"/>
           </a:p>
@@ -11889,6 +11890,1360 @@
     <p:extLst>
       <p:ext uri="{BB962C8B-B14F-4D97-AF65-F5344CB8AC3E}">
         <p14:creationId xmlns:p14="http://schemas.microsoft.com/office/powerpoint/2010/main" val="3499536321"/>
+      </p:ext>
+    </p:extLst>
+  </p:cSld>
+  <p:clrMapOvr>
+    <a:masterClrMapping/>
+  </p:clrMapOvr>
+</p:sld>
+</file>
+
+<file path=ppt/slides/slide7.xml><?xml version="1.0" encoding="utf-8"?>
+<p:sld xmlns:a="http://schemas.openxmlformats.org/drawingml/2006/main" xmlns:r="http://schemas.openxmlformats.org/officeDocument/2006/relationships" xmlns:p="http://schemas.openxmlformats.org/presentationml/2006/main">
+  <p:cSld>
+    <p:spTree>
+      <p:nvGrpSpPr>
+        <p:cNvPr id="1" name=""/>
+        <p:cNvGrpSpPr/>
+        <p:nvPr/>
+      </p:nvGrpSpPr>
+      <p:grpSpPr>
+        <a:xfrm>
+          <a:off x="0" y="0"/>
+          <a:ext cx="0" cy="0"/>
+          <a:chOff x="0" y="0"/>
+          <a:chExt cx="0" cy="0"/>
+        </a:xfrm>
+      </p:grpSpPr>
+      <p:sp>
+        <p:nvSpPr>
+          <p:cNvPr id="73" name="Cylinder 72">
+            <a:extLst>
+              <a:ext uri="{FF2B5EF4-FFF2-40B4-BE49-F238E27FC236}">
+                <a16:creationId xmlns:a16="http://schemas.microsoft.com/office/drawing/2014/main" id="{4ED5EA49-6261-417A-90A2-02AF3C4B50DF}"/>
+              </a:ext>
+            </a:extLst>
+          </p:cNvPr>
+          <p:cNvSpPr/>
+          <p:nvPr/>
+        </p:nvSpPr>
+        <p:spPr>
+          <a:xfrm rot="16200000">
+            <a:off x="4751734" y="-2760069"/>
+            <a:ext cx="1713652" cy="9837526"/>
+          </a:xfrm>
+          <a:prstGeom prst="can">
+            <a:avLst/>
+          </a:prstGeom>
+        </p:spPr>
+        <p:style>
+          <a:lnRef idx="2">
+            <a:schemeClr val="accent5"/>
+          </a:lnRef>
+          <a:fillRef idx="1">
+            <a:schemeClr val="lt1"/>
+          </a:fillRef>
+          <a:effectRef idx="0">
+            <a:schemeClr val="accent5"/>
+          </a:effectRef>
+          <a:fontRef idx="minor">
+            <a:schemeClr val="dk1"/>
+          </a:fontRef>
+        </p:style>
+        <p:txBody>
+          <a:bodyPr rtlCol="0" anchor="ctr"/>
+          <a:lstStyle/>
+          <a:p>
+            <a:pPr algn="ctr"/>
+            <a:endParaRPr lang="en-CA"/>
+          </a:p>
+        </p:txBody>
+      </p:sp>
+      <p:sp>
+        <p:nvSpPr>
+          <p:cNvPr id="2" name="Title 1">
+            <a:extLst>
+              <a:ext uri="{FF2B5EF4-FFF2-40B4-BE49-F238E27FC236}">
+                <a16:creationId xmlns:a16="http://schemas.microsoft.com/office/drawing/2014/main" id="{CEAF62CB-986D-4422-AD92-7948472BBB85}"/>
+              </a:ext>
+            </a:extLst>
+          </p:cNvPr>
+          <p:cNvSpPr>
+            <a:spLocks noGrp="1"/>
+          </p:cNvSpPr>
+          <p:nvPr>
+            <p:ph type="title"/>
+          </p:nvPr>
+        </p:nvSpPr>
+        <p:spPr>
+          <a:xfrm>
+            <a:off x="0" y="1"/>
+            <a:ext cx="12192000" cy="615636"/>
+          </a:xfrm>
+        </p:spPr>
+        <p:txBody>
+          <a:bodyPr/>
+          <a:lstStyle/>
+          <a:p>
+            <a:r>
+              <a:rPr lang="en-US" sz="3200" dirty="0"/>
+              <a:t>Manage database upgrades</a:t>
+            </a:r>
+            <a:endParaRPr lang="en-CA" sz="3200" dirty="0"/>
+          </a:p>
+        </p:txBody>
+      </p:sp>
+      <p:pic>
+        <p:nvPicPr>
+          <p:cNvPr id="4" name="Graphic 3" descr="Gears">
+            <a:extLst>
+              <a:ext uri="{FF2B5EF4-FFF2-40B4-BE49-F238E27FC236}">
+                <a16:creationId xmlns:a16="http://schemas.microsoft.com/office/drawing/2014/main" id="{6CE2A62B-CD7E-4252-B334-F4147CD33518}"/>
+              </a:ext>
+            </a:extLst>
+          </p:cNvPr>
+          <p:cNvPicPr>
+            <a:picLocks noChangeAspect="1"/>
+          </p:cNvPicPr>
+          <p:nvPr/>
+        </p:nvPicPr>
+        <p:blipFill>
+          <a:blip r:embed="rId2">
+            <a:extLst>
+              <a:ext uri="{28A0092B-C50C-407E-A947-70E740481C1C}">
+                <a14:useLocalDpi xmlns:a14="http://schemas.microsoft.com/office/drawing/2010/main" val="0"/>
+              </a:ext>
+              <a:ext uri="{96DAC541-7B7A-43D3-8B79-37D633B846F1}">
+                <asvg:svgBlip xmlns:asvg="http://schemas.microsoft.com/office/drawing/2016/SVG/main" r:embed="rId3"/>
+              </a:ext>
+            </a:extLst>
+          </a:blip>
+          <a:stretch>
+            <a:fillRect/>
+          </a:stretch>
+        </p:blipFill>
+        <p:spPr>
+          <a:xfrm>
+            <a:off x="3209492" y="1967671"/>
+            <a:ext cx="914400" cy="914400"/>
+          </a:xfrm>
+          <a:prstGeom prst="rect">
+            <a:avLst/>
+          </a:prstGeom>
+        </p:spPr>
+      </p:pic>
+      <p:pic>
+        <p:nvPicPr>
+          <p:cNvPr id="6" name="Graphic 5" descr="Computer">
+            <a:extLst>
+              <a:ext uri="{FF2B5EF4-FFF2-40B4-BE49-F238E27FC236}">
+                <a16:creationId xmlns:a16="http://schemas.microsoft.com/office/drawing/2014/main" id="{42247EB7-625F-4E22-8D37-B42F0E49E146}"/>
+              </a:ext>
+            </a:extLst>
+          </p:cNvPr>
+          <p:cNvPicPr>
+            <a:picLocks noChangeAspect="1"/>
+          </p:cNvPicPr>
+          <p:nvPr/>
+        </p:nvPicPr>
+        <p:blipFill>
+          <a:blip r:embed="rId4">
+            <a:extLst>
+              <a:ext uri="{28A0092B-C50C-407E-A947-70E740481C1C}">
+                <a14:useLocalDpi xmlns:a14="http://schemas.microsoft.com/office/drawing/2010/main" val="0"/>
+              </a:ext>
+              <a:ext uri="{96DAC541-7B7A-43D3-8B79-37D633B846F1}">
+                <asvg:svgBlip xmlns:asvg="http://schemas.microsoft.com/office/drawing/2016/SVG/main" r:embed="rId5"/>
+              </a:ext>
+            </a:extLst>
+          </a:blip>
+          <a:stretch>
+            <a:fillRect/>
+          </a:stretch>
+        </p:blipFill>
+        <p:spPr>
+          <a:xfrm>
+            <a:off x="1313409" y="1967671"/>
+            <a:ext cx="914400" cy="914400"/>
+          </a:xfrm>
+          <a:prstGeom prst="rect">
+            <a:avLst/>
+          </a:prstGeom>
+        </p:spPr>
+      </p:pic>
+      <p:pic>
+        <p:nvPicPr>
+          <p:cNvPr id="10" name="Graphic 9" descr="Box">
+            <a:extLst>
+              <a:ext uri="{FF2B5EF4-FFF2-40B4-BE49-F238E27FC236}">
+                <a16:creationId xmlns:a16="http://schemas.microsoft.com/office/drawing/2014/main" id="{30853494-58A6-468A-A259-3F1D9A1B56A0}"/>
+              </a:ext>
+            </a:extLst>
+          </p:cNvPr>
+          <p:cNvPicPr>
+            <a:picLocks noChangeAspect="1"/>
+          </p:cNvPicPr>
+          <p:nvPr/>
+        </p:nvPicPr>
+        <p:blipFill>
+          <a:blip r:embed="rId6">
+            <a:extLst>
+              <a:ext uri="{28A0092B-C50C-407E-A947-70E740481C1C}">
+                <a14:useLocalDpi xmlns:a14="http://schemas.microsoft.com/office/drawing/2010/main" val="0"/>
+              </a:ext>
+              <a:ext uri="{96DAC541-7B7A-43D3-8B79-37D633B846F1}">
+                <asvg:svgBlip xmlns:asvg="http://schemas.microsoft.com/office/drawing/2016/SVG/main" r:embed="rId7"/>
+              </a:ext>
+            </a:extLst>
+          </a:blip>
+          <a:stretch>
+            <a:fillRect/>
+          </a:stretch>
+        </p:blipFill>
+        <p:spPr>
+          <a:xfrm>
+            <a:off x="5191209" y="1967671"/>
+            <a:ext cx="914400" cy="914400"/>
+          </a:xfrm>
+          <a:prstGeom prst="rect">
+            <a:avLst/>
+          </a:prstGeom>
+        </p:spPr>
+      </p:pic>
+      <p:pic>
+        <p:nvPicPr>
+          <p:cNvPr id="12" name="Graphic 11" descr="Box trolley">
+            <a:extLst>
+              <a:ext uri="{FF2B5EF4-FFF2-40B4-BE49-F238E27FC236}">
+                <a16:creationId xmlns:a16="http://schemas.microsoft.com/office/drawing/2014/main" id="{FE598C15-12F9-4167-A8EF-182D2F021827}"/>
+              </a:ext>
+            </a:extLst>
+          </p:cNvPr>
+          <p:cNvPicPr>
+            <a:picLocks noChangeAspect="1"/>
+          </p:cNvPicPr>
+          <p:nvPr/>
+        </p:nvPicPr>
+        <p:blipFill>
+          <a:blip r:embed="rId8">
+            <a:extLst>
+              <a:ext uri="{28A0092B-C50C-407E-A947-70E740481C1C}">
+                <a14:useLocalDpi xmlns:a14="http://schemas.microsoft.com/office/drawing/2010/main" val="0"/>
+              </a:ext>
+              <a:ext uri="{96DAC541-7B7A-43D3-8B79-37D633B846F1}">
+                <asvg:svgBlip xmlns:asvg="http://schemas.microsoft.com/office/drawing/2016/SVG/main" r:embed="rId9"/>
+              </a:ext>
+            </a:extLst>
+          </a:blip>
+          <a:stretch>
+            <a:fillRect/>
+          </a:stretch>
+        </p:blipFill>
+        <p:spPr>
+          <a:xfrm>
+            <a:off x="9264999" y="1967671"/>
+            <a:ext cx="914400" cy="914400"/>
+          </a:xfrm>
+          <a:prstGeom prst="rect">
+            <a:avLst/>
+          </a:prstGeom>
+        </p:spPr>
+      </p:pic>
+      <p:pic>
+        <p:nvPicPr>
+          <p:cNvPr id="13" name="Graphic 12" descr="Box">
+            <a:extLst>
+              <a:ext uri="{FF2B5EF4-FFF2-40B4-BE49-F238E27FC236}">
+                <a16:creationId xmlns:a16="http://schemas.microsoft.com/office/drawing/2014/main" id="{9CD2C510-9B55-422E-B301-D8CE180E97C6}"/>
+              </a:ext>
+            </a:extLst>
+          </p:cNvPr>
+          <p:cNvPicPr>
+            <a:picLocks noChangeAspect="1"/>
+          </p:cNvPicPr>
+          <p:nvPr/>
+        </p:nvPicPr>
+        <p:blipFill>
+          <a:blip r:embed="rId6">
+            <a:extLst>
+              <a:ext uri="{28A0092B-C50C-407E-A947-70E740481C1C}">
+                <a14:useLocalDpi xmlns:a14="http://schemas.microsoft.com/office/drawing/2010/main" val="0"/>
+              </a:ext>
+              <a:ext uri="{96DAC541-7B7A-43D3-8B79-37D633B846F1}">
+                <asvg:svgBlip xmlns:asvg="http://schemas.microsoft.com/office/drawing/2016/SVG/main" r:embed="rId7"/>
+              </a:ext>
+            </a:extLst>
+          </a:blip>
+          <a:stretch>
+            <a:fillRect/>
+          </a:stretch>
+        </p:blipFill>
+        <p:spPr>
+          <a:xfrm>
+            <a:off x="7230466" y="1967671"/>
+            <a:ext cx="914400" cy="914400"/>
+          </a:xfrm>
+          <a:prstGeom prst="rect">
+            <a:avLst/>
+          </a:prstGeom>
+        </p:spPr>
+      </p:pic>
+      <p:cxnSp>
+        <p:nvCxnSpPr>
+          <p:cNvPr id="15" name="Straight Arrow Connector 14">
+            <a:extLst>
+              <a:ext uri="{FF2B5EF4-FFF2-40B4-BE49-F238E27FC236}">
+                <a16:creationId xmlns:a16="http://schemas.microsoft.com/office/drawing/2014/main" id="{16EFD71A-C902-48ED-8100-A97B5D91BE17}"/>
+              </a:ext>
+            </a:extLst>
+          </p:cNvPr>
+          <p:cNvCxnSpPr>
+            <a:stCxn id="6" idx="3"/>
+            <a:endCxn id="4" idx="1"/>
+          </p:cNvCxnSpPr>
+          <p:nvPr/>
+        </p:nvCxnSpPr>
+        <p:spPr>
+          <a:xfrm>
+            <a:off x="2227809" y="2424871"/>
+            <a:ext cx="981683" cy="0"/>
+          </a:xfrm>
+          <a:prstGeom prst="straightConnector1">
+            <a:avLst/>
+          </a:prstGeom>
+          <a:ln w="38100">
+            <a:solidFill>
+              <a:schemeClr val="accent5"/>
+            </a:solidFill>
+            <a:tailEnd type="triangle" w="lg" len="sm"/>
+          </a:ln>
+        </p:spPr>
+        <p:style>
+          <a:lnRef idx="1">
+            <a:schemeClr val="accent1"/>
+          </a:lnRef>
+          <a:fillRef idx="0">
+            <a:schemeClr val="accent1"/>
+          </a:fillRef>
+          <a:effectRef idx="0">
+            <a:schemeClr val="accent1"/>
+          </a:effectRef>
+          <a:fontRef idx="minor">
+            <a:schemeClr val="tx1"/>
+          </a:fontRef>
+        </p:style>
+      </p:cxnSp>
+      <p:cxnSp>
+        <p:nvCxnSpPr>
+          <p:cNvPr id="16" name="Straight Arrow Connector 15">
+            <a:extLst>
+              <a:ext uri="{FF2B5EF4-FFF2-40B4-BE49-F238E27FC236}">
+                <a16:creationId xmlns:a16="http://schemas.microsoft.com/office/drawing/2014/main" id="{6EF96954-50C6-4AE3-AA3F-77B20AB4E43C}"/>
+              </a:ext>
+            </a:extLst>
+          </p:cNvPr>
+          <p:cNvCxnSpPr>
+            <a:cxnSpLocks/>
+            <a:stCxn id="4" idx="3"/>
+            <a:endCxn id="10" idx="1"/>
+          </p:cNvCxnSpPr>
+          <p:nvPr/>
+        </p:nvCxnSpPr>
+        <p:spPr>
+          <a:xfrm>
+            <a:off x="4123892" y="2424871"/>
+            <a:ext cx="1067317" cy="0"/>
+          </a:xfrm>
+          <a:prstGeom prst="straightConnector1">
+            <a:avLst/>
+          </a:prstGeom>
+          <a:ln w="38100">
+            <a:solidFill>
+              <a:schemeClr val="accent5"/>
+            </a:solidFill>
+            <a:tailEnd type="triangle" w="lg" len="sm"/>
+          </a:ln>
+        </p:spPr>
+        <p:style>
+          <a:lnRef idx="1">
+            <a:schemeClr val="accent1"/>
+          </a:lnRef>
+          <a:fillRef idx="0">
+            <a:schemeClr val="accent1"/>
+          </a:fillRef>
+          <a:effectRef idx="0">
+            <a:schemeClr val="accent1"/>
+          </a:effectRef>
+          <a:fontRef idx="minor">
+            <a:schemeClr val="tx1"/>
+          </a:fontRef>
+        </p:style>
+      </p:cxnSp>
+      <p:cxnSp>
+        <p:nvCxnSpPr>
+          <p:cNvPr id="19" name="Straight Arrow Connector 18">
+            <a:extLst>
+              <a:ext uri="{FF2B5EF4-FFF2-40B4-BE49-F238E27FC236}">
+                <a16:creationId xmlns:a16="http://schemas.microsoft.com/office/drawing/2014/main" id="{D63647E5-C3EF-4852-AA98-37D36098606A}"/>
+              </a:ext>
+            </a:extLst>
+          </p:cNvPr>
+          <p:cNvCxnSpPr>
+            <a:cxnSpLocks/>
+            <a:stCxn id="10" idx="3"/>
+            <a:endCxn id="13" idx="1"/>
+          </p:cNvCxnSpPr>
+          <p:nvPr/>
+        </p:nvCxnSpPr>
+        <p:spPr>
+          <a:xfrm>
+            <a:off x="6105609" y="2424871"/>
+            <a:ext cx="1124857" cy="0"/>
+          </a:xfrm>
+          <a:prstGeom prst="straightConnector1">
+            <a:avLst/>
+          </a:prstGeom>
+          <a:ln w="38100">
+            <a:solidFill>
+              <a:schemeClr val="accent5"/>
+            </a:solidFill>
+            <a:tailEnd type="triangle" w="lg" len="sm"/>
+          </a:ln>
+        </p:spPr>
+        <p:style>
+          <a:lnRef idx="1">
+            <a:schemeClr val="accent1"/>
+          </a:lnRef>
+          <a:fillRef idx="0">
+            <a:schemeClr val="accent1"/>
+          </a:fillRef>
+          <a:effectRef idx="0">
+            <a:schemeClr val="accent1"/>
+          </a:effectRef>
+          <a:fontRef idx="minor">
+            <a:schemeClr val="tx1"/>
+          </a:fontRef>
+        </p:style>
+      </p:cxnSp>
+      <p:cxnSp>
+        <p:nvCxnSpPr>
+          <p:cNvPr id="22" name="Straight Arrow Connector 21">
+            <a:extLst>
+              <a:ext uri="{FF2B5EF4-FFF2-40B4-BE49-F238E27FC236}">
+                <a16:creationId xmlns:a16="http://schemas.microsoft.com/office/drawing/2014/main" id="{88311723-73D1-4020-95F3-8FB4E1EED231}"/>
+              </a:ext>
+            </a:extLst>
+          </p:cNvPr>
+          <p:cNvCxnSpPr>
+            <a:cxnSpLocks/>
+            <a:stCxn id="13" idx="3"/>
+            <a:endCxn id="12" idx="1"/>
+          </p:cNvCxnSpPr>
+          <p:nvPr/>
+        </p:nvCxnSpPr>
+        <p:spPr>
+          <a:xfrm>
+            <a:off x="8144866" y="2424871"/>
+            <a:ext cx="1120133" cy="0"/>
+          </a:xfrm>
+          <a:prstGeom prst="straightConnector1">
+            <a:avLst/>
+          </a:prstGeom>
+          <a:ln w="38100">
+            <a:solidFill>
+              <a:schemeClr val="accent5"/>
+            </a:solidFill>
+            <a:tailEnd type="triangle" w="lg" len="sm"/>
+          </a:ln>
+        </p:spPr>
+        <p:style>
+          <a:lnRef idx="1">
+            <a:schemeClr val="accent1"/>
+          </a:lnRef>
+          <a:fillRef idx="0">
+            <a:schemeClr val="accent1"/>
+          </a:fillRef>
+          <a:effectRef idx="0">
+            <a:schemeClr val="accent1"/>
+          </a:effectRef>
+          <a:fontRef idx="minor">
+            <a:schemeClr val="tx1"/>
+          </a:fontRef>
+        </p:style>
+      </p:cxnSp>
+      <p:pic>
+        <p:nvPicPr>
+          <p:cNvPr id="8" name="Graphic 7" descr="Users">
+            <a:extLst>
+              <a:ext uri="{FF2B5EF4-FFF2-40B4-BE49-F238E27FC236}">
+                <a16:creationId xmlns:a16="http://schemas.microsoft.com/office/drawing/2014/main" id="{33D1FEEA-A59E-4F2B-83C9-94AFA3F45ECE}"/>
+              </a:ext>
+            </a:extLst>
+          </p:cNvPr>
+          <p:cNvPicPr>
+            <a:picLocks noChangeAspect="1"/>
+          </p:cNvPicPr>
+          <p:nvPr/>
+        </p:nvPicPr>
+        <p:blipFill>
+          <a:blip r:embed="rId10">
+            <a:extLst>
+              <a:ext uri="{28A0092B-C50C-407E-A947-70E740481C1C}">
+                <a14:useLocalDpi xmlns:a14="http://schemas.microsoft.com/office/drawing/2010/main" val="0"/>
+              </a:ext>
+              <a:ext uri="{96DAC541-7B7A-43D3-8B79-37D633B846F1}">
+                <asvg:svgBlip xmlns:asvg="http://schemas.microsoft.com/office/drawing/2016/SVG/main" r:embed="rId11"/>
+              </a:ext>
+            </a:extLst>
+          </a:blip>
+          <a:stretch>
+            <a:fillRect/>
+          </a:stretch>
+        </p:blipFill>
+        <p:spPr>
+          <a:xfrm>
+            <a:off x="6386560" y="1930819"/>
+            <a:ext cx="562954" cy="562954"/>
+          </a:xfrm>
+          <a:prstGeom prst="rect">
+            <a:avLst/>
+          </a:prstGeom>
+        </p:spPr>
+      </p:pic>
+      <p:pic>
+        <p:nvPicPr>
+          <p:cNvPr id="25" name="Graphic 24" descr="Users">
+            <a:extLst>
+              <a:ext uri="{FF2B5EF4-FFF2-40B4-BE49-F238E27FC236}">
+                <a16:creationId xmlns:a16="http://schemas.microsoft.com/office/drawing/2014/main" id="{C2B37791-10C9-438D-9698-B07A5EFA3C6A}"/>
+              </a:ext>
+            </a:extLst>
+          </p:cNvPr>
+          <p:cNvPicPr>
+            <a:picLocks noChangeAspect="1"/>
+          </p:cNvPicPr>
+          <p:nvPr/>
+        </p:nvPicPr>
+        <p:blipFill>
+          <a:blip r:embed="rId10">
+            <a:extLst>
+              <a:ext uri="{28A0092B-C50C-407E-A947-70E740481C1C}">
+                <a14:useLocalDpi xmlns:a14="http://schemas.microsoft.com/office/drawing/2010/main" val="0"/>
+              </a:ext>
+              <a:ext uri="{96DAC541-7B7A-43D3-8B79-37D633B846F1}">
+                <asvg:svgBlip xmlns:asvg="http://schemas.microsoft.com/office/drawing/2016/SVG/main" r:embed="rId11"/>
+              </a:ext>
+            </a:extLst>
+          </a:blip>
+          <a:stretch>
+            <a:fillRect/>
+          </a:stretch>
+        </p:blipFill>
+        <p:spPr>
+          <a:xfrm>
+            <a:off x="8369144" y="1930819"/>
+            <a:ext cx="562954" cy="562954"/>
+          </a:xfrm>
+          <a:prstGeom prst="rect">
+            <a:avLst/>
+          </a:prstGeom>
+        </p:spPr>
+      </p:pic>
+      <p:sp>
+        <p:nvSpPr>
+          <p:cNvPr id="26" name="TextBox 25">
+            <a:extLst>
+              <a:ext uri="{FF2B5EF4-FFF2-40B4-BE49-F238E27FC236}">
+                <a16:creationId xmlns:a16="http://schemas.microsoft.com/office/drawing/2014/main" id="{30616876-95DC-42BA-B8DA-4365FFDD5FC3}"/>
+              </a:ext>
+            </a:extLst>
+          </p:cNvPr>
+          <p:cNvSpPr txBox="1"/>
+          <p:nvPr/>
+        </p:nvSpPr>
+        <p:spPr>
+          <a:xfrm>
+            <a:off x="1687928" y="1379310"/>
+            <a:ext cx="2879669" cy="369332"/>
+          </a:xfrm>
+          <a:prstGeom prst="rect">
+            <a:avLst/>
+          </a:prstGeom>
+          <a:noFill/>
+        </p:spPr>
+        <p:txBody>
+          <a:bodyPr wrap="square" rtlCol="0">
+            <a:spAutoFit/>
+          </a:bodyPr>
+          <a:lstStyle/>
+          <a:p>
+            <a:pPr algn="ctr"/>
+            <a:r>
+              <a:rPr lang="en-US" dirty="0">
+                <a:solidFill>
+                  <a:schemeClr val="accent5"/>
+                </a:solidFill>
+              </a:rPr>
+              <a:t>Continuous Integration (CI)</a:t>
+            </a:r>
+            <a:endParaRPr lang="en-CA" dirty="0">
+              <a:solidFill>
+                <a:schemeClr val="accent5"/>
+              </a:solidFill>
+            </a:endParaRPr>
+          </a:p>
+        </p:txBody>
+      </p:sp>
+      <p:sp>
+        <p:nvSpPr>
+          <p:cNvPr id="27" name="TextBox 26">
+            <a:extLst>
+              <a:ext uri="{FF2B5EF4-FFF2-40B4-BE49-F238E27FC236}">
+                <a16:creationId xmlns:a16="http://schemas.microsoft.com/office/drawing/2014/main" id="{EADA062A-E007-4FF0-8017-EE517FA519E6}"/>
+              </a:ext>
+            </a:extLst>
+          </p:cNvPr>
+          <p:cNvSpPr txBox="1"/>
+          <p:nvPr/>
+        </p:nvSpPr>
+        <p:spPr>
+          <a:xfrm>
+            <a:off x="5191209" y="1366039"/>
+            <a:ext cx="4561676" cy="369332"/>
+          </a:xfrm>
+          <a:prstGeom prst="rect">
+            <a:avLst/>
+          </a:prstGeom>
+          <a:noFill/>
+        </p:spPr>
+        <p:txBody>
+          <a:bodyPr wrap="square" rtlCol="0">
+            <a:spAutoFit/>
+          </a:bodyPr>
+          <a:lstStyle/>
+          <a:p>
+            <a:pPr algn="ctr"/>
+            <a:r>
+              <a:rPr lang="en-US" dirty="0">
+                <a:solidFill>
+                  <a:schemeClr val="accent5"/>
+                </a:solidFill>
+              </a:rPr>
+              <a:t>Continuous Delivery (CD)</a:t>
+            </a:r>
+            <a:endParaRPr lang="en-CA" dirty="0">
+              <a:solidFill>
+                <a:schemeClr val="accent5"/>
+              </a:solidFill>
+            </a:endParaRPr>
+          </a:p>
+        </p:txBody>
+      </p:sp>
+      <p:sp>
+        <p:nvSpPr>
+          <p:cNvPr id="32" name="Right Brace 31">
+            <a:extLst>
+              <a:ext uri="{FF2B5EF4-FFF2-40B4-BE49-F238E27FC236}">
+                <a16:creationId xmlns:a16="http://schemas.microsoft.com/office/drawing/2014/main" id="{B72D28CE-6001-4865-A640-C81827C7A958}"/>
+              </a:ext>
+            </a:extLst>
+          </p:cNvPr>
+          <p:cNvSpPr/>
+          <p:nvPr/>
+        </p:nvSpPr>
+        <p:spPr>
+          <a:xfrm rot="16200000">
+            <a:off x="7300329" y="-819540"/>
+            <a:ext cx="151061" cy="5436619"/>
+          </a:xfrm>
+          <a:prstGeom prst="rightBrace">
+            <a:avLst/>
+          </a:prstGeom>
+        </p:spPr>
+        <p:style>
+          <a:lnRef idx="1">
+            <a:schemeClr val="accent1"/>
+          </a:lnRef>
+          <a:fillRef idx="0">
+            <a:schemeClr val="accent1"/>
+          </a:fillRef>
+          <a:effectRef idx="0">
+            <a:schemeClr val="accent1"/>
+          </a:effectRef>
+          <a:fontRef idx="minor">
+            <a:schemeClr val="tx1"/>
+          </a:fontRef>
+        </p:style>
+        <p:txBody>
+          <a:bodyPr rtlCol="0" anchor="ctr"/>
+          <a:lstStyle/>
+          <a:p>
+            <a:pPr algn="ctr"/>
+            <a:endParaRPr lang="en-CA"/>
+          </a:p>
+        </p:txBody>
+      </p:sp>
+      <p:sp>
+        <p:nvSpPr>
+          <p:cNvPr id="33" name="Right Brace 32">
+            <a:extLst>
+              <a:ext uri="{FF2B5EF4-FFF2-40B4-BE49-F238E27FC236}">
+                <a16:creationId xmlns:a16="http://schemas.microsoft.com/office/drawing/2014/main" id="{3AADABDB-81F4-47F3-808B-65E34F10BE78}"/>
+              </a:ext>
+            </a:extLst>
+          </p:cNvPr>
+          <p:cNvSpPr/>
+          <p:nvPr/>
+        </p:nvSpPr>
+        <p:spPr>
+          <a:xfrm rot="16200000">
+            <a:off x="2858295" y="264998"/>
+            <a:ext cx="144418" cy="3274185"/>
+          </a:xfrm>
+          <a:prstGeom prst="rightBrace">
+            <a:avLst/>
+          </a:prstGeom>
+        </p:spPr>
+        <p:style>
+          <a:lnRef idx="1">
+            <a:schemeClr val="accent1"/>
+          </a:lnRef>
+          <a:fillRef idx="0">
+            <a:schemeClr val="accent1"/>
+          </a:fillRef>
+          <a:effectRef idx="0">
+            <a:schemeClr val="accent1"/>
+          </a:effectRef>
+          <a:fontRef idx="minor">
+            <a:schemeClr val="tx1"/>
+          </a:fontRef>
+        </p:style>
+        <p:txBody>
+          <a:bodyPr rtlCol="0" anchor="ctr"/>
+          <a:lstStyle/>
+          <a:p>
+            <a:pPr algn="ctr"/>
+            <a:endParaRPr lang="en-CA"/>
+          </a:p>
+        </p:txBody>
+      </p:sp>
+      <p:sp>
+        <p:nvSpPr>
+          <p:cNvPr id="34" name="TextBox 33">
+            <a:extLst>
+              <a:ext uri="{FF2B5EF4-FFF2-40B4-BE49-F238E27FC236}">
+                <a16:creationId xmlns:a16="http://schemas.microsoft.com/office/drawing/2014/main" id="{1E94C33A-7921-463C-B96A-B643B7902577}"/>
+              </a:ext>
+            </a:extLst>
+          </p:cNvPr>
+          <p:cNvSpPr txBox="1"/>
+          <p:nvPr/>
+        </p:nvSpPr>
+        <p:spPr>
+          <a:xfrm>
+            <a:off x="2270450" y="2424871"/>
+            <a:ext cx="896399" cy="369332"/>
+          </a:xfrm>
+          <a:prstGeom prst="rect">
+            <a:avLst/>
+          </a:prstGeom>
+          <a:noFill/>
+        </p:spPr>
+        <p:txBody>
+          <a:bodyPr wrap="none" rtlCol="0">
+            <a:spAutoFit/>
+          </a:bodyPr>
+          <a:lstStyle/>
+          <a:p>
+            <a:r>
+              <a:rPr lang="en-US" dirty="0" err="1">
+                <a:solidFill>
+                  <a:schemeClr val="accent5"/>
+                </a:solidFill>
+              </a:rPr>
+              <a:t>checkin</a:t>
+            </a:r>
+            <a:endParaRPr lang="en-CA" dirty="0">
+              <a:solidFill>
+                <a:schemeClr val="accent5"/>
+              </a:solidFill>
+            </a:endParaRPr>
+          </a:p>
+        </p:txBody>
+      </p:sp>
+      <p:sp>
+        <p:nvSpPr>
+          <p:cNvPr id="35" name="TextBox 34">
+            <a:extLst>
+              <a:ext uri="{FF2B5EF4-FFF2-40B4-BE49-F238E27FC236}">
+                <a16:creationId xmlns:a16="http://schemas.microsoft.com/office/drawing/2014/main" id="{1FB60D12-76A5-44D8-A534-5ED7E597F5B7}"/>
+              </a:ext>
+            </a:extLst>
+          </p:cNvPr>
+          <p:cNvSpPr txBox="1"/>
+          <p:nvPr/>
+        </p:nvSpPr>
+        <p:spPr>
+          <a:xfrm>
+            <a:off x="3975743" y="2465863"/>
+            <a:ext cx="1312732" cy="369332"/>
+          </a:xfrm>
+          <a:prstGeom prst="rect">
+            <a:avLst/>
+          </a:prstGeom>
+          <a:noFill/>
+        </p:spPr>
+        <p:txBody>
+          <a:bodyPr wrap="none" rtlCol="0">
+            <a:spAutoFit/>
+          </a:bodyPr>
+          <a:lstStyle/>
+          <a:p>
+            <a:r>
+              <a:rPr lang="en-US" dirty="0">
+                <a:solidFill>
+                  <a:schemeClr val="accent5"/>
+                </a:solidFill>
+              </a:rPr>
+              <a:t>auto trigger</a:t>
+            </a:r>
+            <a:endParaRPr lang="en-CA" dirty="0">
+              <a:solidFill>
+                <a:schemeClr val="accent5"/>
+              </a:solidFill>
+            </a:endParaRPr>
+          </a:p>
+        </p:txBody>
+      </p:sp>
+      <p:sp>
+        <p:nvSpPr>
+          <p:cNvPr id="36" name="TextBox 35">
+            <a:extLst>
+              <a:ext uri="{FF2B5EF4-FFF2-40B4-BE49-F238E27FC236}">
+                <a16:creationId xmlns:a16="http://schemas.microsoft.com/office/drawing/2014/main" id="{C6F53E87-8BF8-456D-8571-89AD36568C0D}"/>
+              </a:ext>
+            </a:extLst>
+          </p:cNvPr>
+          <p:cNvSpPr txBox="1"/>
+          <p:nvPr/>
+        </p:nvSpPr>
+        <p:spPr>
+          <a:xfrm>
+            <a:off x="6235035" y="2465863"/>
+            <a:ext cx="1000467" cy="369332"/>
+          </a:xfrm>
+          <a:prstGeom prst="rect">
+            <a:avLst/>
+          </a:prstGeom>
+          <a:noFill/>
+        </p:spPr>
+        <p:txBody>
+          <a:bodyPr wrap="none" rtlCol="0">
+            <a:spAutoFit/>
+          </a:bodyPr>
+          <a:lstStyle/>
+          <a:p>
+            <a:r>
+              <a:rPr lang="en-US" dirty="0">
+                <a:solidFill>
+                  <a:schemeClr val="accent5"/>
+                </a:solidFill>
+              </a:rPr>
+              <a:t>approval</a:t>
+            </a:r>
+            <a:endParaRPr lang="en-CA" dirty="0">
+              <a:solidFill>
+                <a:schemeClr val="accent5"/>
+              </a:solidFill>
+            </a:endParaRPr>
+          </a:p>
+        </p:txBody>
+      </p:sp>
+      <p:sp>
+        <p:nvSpPr>
+          <p:cNvPr id="39" name="TextBox 38">
+            <a:extLst>
+              <a:ext uri="{FF2B5EF4-FFF2-40B4-BE49-F238E27FC236}">
+                <a16:creationId xmlns:a16="http://schemas.microsoft.com/office/drawing/2014/main" id="{B3BBD6F1-A1BE-4C62-9F83-7CDE39CD0146}"/>
+              </a:ext>
+            </a:extLst>
+          </p:cNvPr>
+          <p:cNvSpPr txBox="1"/>
+          <p:nvPr/>
+        </p:nvSpPr>
+        <p:spPr>
+          <a:xfrm>
+            <a:off x="8207060" y="2465863"/>
+            <a:ext cx="1000467" cy="369332"/>
+          </a:xfrm>
+          <a:prstGeom prst="rect">
+            <a:avLst/>
+          </a:prstGeom>
+          <a:noFill/>
+        </p:spPr>
+        <p:txBody>
+          <a:bodyPr wrap="none" rtlCol="0">
+            <a:spAutoFit/>
+          </a:bodyPr>
+          <a:lstStyle/>
+          <a:p>
+            <a:r>
+              <a:rPr lang="en-US" dirty="0">
+                <a:solidFill>
+                  <a:schemeClr val="accent5"/>
+                </a:solidFill>
+              </a:rPr>
+              <a:t>approval</a:t>
+            </a:r>
+            <a:endParaRPr lang="en-CA" dirty="0">
+              <a:solidFill>
+                <a:schemeClr val="accent5"/>
+              </a:solidFill>
+            </a:endParaRPr>
+          </a:p>
+        </p:txBody>
+      </p:sp>
+      <p:cxnSp>
+        <p:nvCxnSpPr>
+          <p:cNvPr id="48" name="Straight Arrow Connector 47">
+            <a:extLst>
+              <a:ext uri="{FF2B5EF4-FFF2-40B4-BE49-F238E27FC236}">
+                <a16:creationId xmlns:a16="http://schemas.microsoft.com/office/drawing/2014/main" id="{4197CFFE-FF41-46D2-84B4-3AB8B1F1C865}"/>
+              </a:ext>
+            </a:extLst>
+          </p:cNvPr>
+          <p:cNvCxnSpPr>
+            <a:cxnSpLocks/>
+            <a:stCxn id="12" idx="2"/>
+            <a:endCxn id="38" idx="0"/>
+          </p:cNvCxnSpPr>
+          <p:nvPr/>
+        </p:nvCxnSpPr>
+        <p:spPr>
+          <a:xfrm>
+            <a:off x="9722199" y="2882071"/>
+            <a:ext cx="0" cy="399627"/>
+          </a:xfrm>
+          <a:prstGeom prst="straightConnector1">
+            <a:avLst/>
+          </a:prstGeom>
+          <a:ln w="25400">
+            <a:solidFill>
+              <a:srgbClr val="C00000"/>
+            </a:solidFill>
+            <a:prstDash val="sysDash"/>
+            <a:headEnd w="lg" len="sm"/>
+            <a:tailEnd type="triangle" w="lg" len="sm"/>
+          </a:ln>
+        </p:spPr>
+        <p:style>
+          <a:lnRef idx="1">
+            <a:schemeClr val="accent1"/>
+          </a:lnRef>
+          <a:fillRef idx="0">
+            <a:schemeClr val="accent1"/>
+          </a:fillRef>
+          <a:effectRef idx="0">
+            <a:schemeClr val="accent1"/>
+          </a:effectRef>
+          <a:fontRef idx="minor">
+            <a:schemeClr val="tx1"/>
+          </a:fontRef>
+        </p:style>
+      </p:cxnSp>
+      <p:cxnSp>
+        <p:nvCxnSpPr>
+          <p:cNvPr id="51" name="Straight Arrow Connector 50">
+            <a:extLst>
+              <a:ext uri="{FF2B5EF4-FFF2-40B4-BE49-F238E27FC236}">
+                <a16:creationId xmlns:a16="http://schemas.microsoft.com/office/drawing/2014/main" id="{F606D633-7EE9-4972-8954-D8820835F949}"/>
+              </a:ext>
+            </a:extLst>
+          </p:cNvPr>
+          <p:cNvCxnSpPr>
+            <a:cxnSpLocks/>
+            <a:endCxn id="37" idx="0"/>
+          </p:cNvCxnSpPr>
+          <p:nvPr/>
+        </p:nvCxnSpPr>
+        <p:spPr>
+          <a:xfrm>
+            <a:off x="7967663" y="2794203"/>
+            <a:ext cx="18453" cy="487495"/>
+          </a:xfrm>
+          <a:prstGeom prst="straightConnector1">
+            <a:avLst/>
+          </a:prstGeom>
+          <a:ln w="25400">
+            <a:solidFill>
+              <a:srgbClr val="C00000"/>
+            </a:solidFill>
+            <a:prstDash val="sysDash"/>
+            <a:headEnd w="lg" len="sm"/>
+            <a:tailEnd type="triangle" w="lg" len="sm"/>
+          </a:ln>
+        </p:spPr>
+        <p:style>
+          <a:lnRef idx="1">
+            <a:schemeClr val="accent1"/>
+          </a:lnRef>
+          <a:fillRef idx="0">
+            <a:schemeClr val="accent1"/>
+          </a:fillRef>
+          <a:effectRef idx="0">
+            <a:schemeClr val="accent1"/>
+          </a:effectRef>
+          <a:fontRef idx="minor">
+            <a:schemeClr val="tx1"/>
+          </a:fontRef>
+        </p:style>
+      </p:cxnSp>
+      <p:cxnSp>
+        <p:nvCxnSpPr>
+          <p:cNvPr id="54" name="Straight Arrow Connector 53">
+            <a:extLst>
+              <a:ext uri="{FF2B5EF4-FFF2-40B4-BE49-F238E27FC236}">
+                <a16:creationId xmlns:a16="http://schemas.microsoft.com/office/drawing/2014/main" id="{614CB16D-F1C7-4723-96C8-92B494EE56F2}"/>
+              </a:ext>
+            </a:extLst>
+          </p:cNvPr>
+          <p:cNvCxnSpPr>
+            <a:cxnSpLocks/>
+            <a:endCxn id="11" idx="0"/>
+          </p:cNvCxnSpPr>
+          <p:nvPr/>
+        </p:nvCxnSpPr>
+        <p:spPr>
+          <a:xfrm>
+            <a:off x="5867400" y="2767138"/>
+            <a:ext cx="0" cy="514560"/>
+          </a:xfrm>
+          <a:prstGeom prst="straightConnector1">
+            <a:avLst/>
+          </a:prstGeom>
+          <a:ln w="25400">
+            <a:solidFill>
+              <a:srgbClr val="C00000"/>
+            </a:solidFill>
+            <a:prstDash val="sysDash"/>
+            <a:headEnd w="lg" len="sm"/>
+            <a:tailEnd type="triangle" w="lg" len="sm"/>
+          </a:ln>
+        </p:spPr>
+        <p:style>
+          <a:lnRef idx="1">
+            <a:schemeClr val="accent1"/>
+          </a:lnRef>
+          <a:fillRef idx="0">
+            <a:schemeClr val="accent1"/>
+          </a:fillRef>
+          <a:effectRef idx="0">
+            <a:schemeClr val="accent1"/>
+          </a:effectRef>
+          <a:fontRef idx="minor">
+            <a:schemeClr val="tx1"/>
+          </a:fontRef>
+        </p:style>
+      </p:cxnSp>
+      <p:sp>
+        <p:nvSpPr>
+          <p:cNvPr id="74" name="TextBox 73">
+            <a:extLst>
+              <a:ext uri="{FF2B5EF4-FFF2-40B4-BE49-F238E27FC236}">
+                <a16:creationId xmlns:a16="http://schemas.microsoft.com/office/drawing/2014/main" id="{67CCE3B4-509D-45C3-A37B-9EB72909E972}"/>
+              </a:ext>
+            </a:extLst>
+          </p:cNvPr>
+          <p:cNvSpPr txBox="1"/>
+          <p:nvPr/>
+        </p:nvSpPr>
+        <p:spPr>
+          <a:xfrm>
+            <a:off x="787024" y="3038854"/>
+            <a:ext cx="1085320" cy="369332"/>
+          </a:xfrm>
+          <a:prstGeom prst="rect">
+            <a:avLst/>
+          </a:prstGeom>
+          <a:noFill/>
+        </p:spPr>
+        <p:txBody>
+          <a:bodyPr wrap="square" rtlCol="0">
+            <a:spAutoFit/>
+          </a:bodyPr>
+          <a:lstStyle/>
+          <a:p>
+            <a:pPr algn="ctr"/>
+            <a:r>
+              <a:rPr lang="en-US" dirty="0">
+                <a:solidFill>
+                  <a:schemeClr val="accent5"/>
+                </a:solidFill>
+              </a:rPr>
+              <a:t>PIPELINE</a:t>
+            </a:r>
+            <a:endParaRPr lang="en-CA" dirty="0">
+              <a:solidFill>
+                <a:schemeClr val="accent5"/>
+              </a:solidFill>
+            </a:endParaRPr>
+          </a:p>
+        </p:txBody>
+      </p:sp>
+      <p:pic>
+        <p:nvPicPr>
+          <p:cNvPr id="11" name="Graphic 10" descr="Database">
+            <a:extLst>
+              <a:ext uri="{FF2B5EF4-FFF2-40B4-BE49-F238E27FC236}">
+                <a16:creationId xmlns:a16="http://schemas.microsoft.com/office/drawing/2014/main" id="{7625CF66-7E9F-4B09-B8B9-AC8F5FC0C381}"/>
+              </a:ext>
+            </a:extLst>
+          </p:cNvPr>
+          <p:cNvPicPr>
+            <a:picLocks noChangeAspect="1"/>
+          </p:cNvPicPr>
+          <p:nvPr/>
+        </p:nvPicPr>
+        <p:blipFill>
+          <a:blip r:embed="rId12">
+            <a:extLst>
+              <a:ext uri="{28A0092B-C50C-407E-A947-70E740481C1C}">
+                <a14:useLocalDpi xmlns:a14="http://schemas.microsoft.com/office/drawing/2010/main" val="0"/>
+              </a:ext>
+              <a:ext uri="{96DAC541-7B7A-43D3-8B79-37D633B846F1}">
+                <asvg:svgBlip xmlns:asvg="http://schemas.microsoft.com/office/drawing/2016/SVG/main" r:embed="rId13"/>
+              </a:ext>
+            </a:extLst>
+          </a:blip>
+          <a:stretch>
+            <a:fillRect/>
+          </a:stretch>
+        </p:blipFill>
+        <p:spPr>
+          <a:xfrm>
+            <a:off x="5410200" y="3281698"/>
+            <a:ext cx="914400" cy="914400"/>
+          </a:xfrm>
+          <a:prstGeom prst="rect">
+            <a:avLst/>
+          </a:prstGeom>
+        </p:spPr>
+      </p:pic>
+      <p:pic>
+        <p:nvPicPr>
+          <p:cNvPr id="37" name="Graphic 36" descr="Database">
+            <a:extLst>
+              <a:ext uri="{FF2B5EF4-FFF2-40B4-BE49-F238E27FC236}">
+                <a16:creationId xmlns:a16="http://schemas.microsoft.com/office/drawing/2014/main" id="{85D44198-F327-4F80-8CAB-F68143BC97EA}"/>
+              </a:ext>
+            </a:extLst>
+          </p:cNvPr>
+          <p:cNvPicPr>
+            <a:picLocks noChangeAspect="1"/>
+          </p:cNvPicPr>
+          <p:nvPr/>
+        </p:nvPicPr>
+        <p:blipFill>
+          <a:blip r:embed="rId12">
+            <a:extLst>
+              <a:ext uri="{28A0092B-C50C-407E-A947-70E740481C1C}">
+                <a14:useLocalDpi xmlns:a14="http://schemas.microsoft.com/office/drawing/2010/main" val="0"/>
+              </a:ext>
+              <a:ext uri="{96DAC541-7B7A-43D3-8B79-37D633B846F1}">
+                <asvg:svgBlip xmlns:asvg="http://schemas.microsoft.com/office/drawing/2016/SVG/main" r:embed="rId13"/>
+              </a:ext>
+            </a:extLst>
+          </a:blip>
+          <a:stretch>
+            <a:fillRect/>
+          </a:stretch>
+        </p:blipFill>
+        <p:spPr>
+          <a:xfrm>
+            <a:off x="7528916" y="3281698"/>
+            <a:ext cx="914400" cy="914400"/>
+          </a:xfrm>
+          <a:prstGeom prst="rect">
+            <a:avLst/>
+          </a:prstGeom>
+        </p:spPr>
+      </p:pic>
+      <p:pic>
+        <p:nvPicPr>
+          <p:cNvPr id="38" name="Graphic 37" descr="Database">
+            <a:extLst>
+              <a:ext uri="{FF2B5EF4-FFF2-40B4-BE49-F238E27FC236}">
+                <a16:creationId xmlns:a16="http://schemas.microsoft.com/office/drawing/2014/main" id="{DA7E7334-962A-483E-BE02-65DD943EC071}"/>
+              </a:ext>
+            </a:extLst>
+          </p:cNvPr>
+          <p:cNvPicPr>
+            <a:picLocks noChangeAspect="1"/>
+          </p:cNvPicPr>
+          <p:nvPr/>
+        </p:nvPicPr>
+        <p:blipFill>
+          <a:blip r:embed="rId12">
+            <a:extLst>
+              <a:ext uri="{28A0092B-C50C-407E-A947-70E740481C1C}">
+                <a14:useLocalDpi xmlns:a14="http://schemas.microsoft.com/office/drawing/2010/main" val="0"/>
+              </a:ext>
+              <a:ext uri="{96DAC541-7B7A-43D3-8B79-37D633B846F1}">
+                <asvg:svgBlip xmlns:asvg="http://schemas.microsoft.com/office/drawing/2016/SVG/main" r:embed="rId13"/>
+              </a:ext>
+            </a:extLst>
+          </a:blip>
+          <a:stretch>
+            <a:fillRect/>
+          </a:stretch>
+        </p:blipFill>
+        <p:spPr>
+          <a:xfrm>
+            <a:off x="9264999" y="3281698"/>
+            <a:ext cx="914400" cy="914400"/>
+          </a:xfrm>
+          <a:prstGeom prst="rect">
+            <a:avLst/>
+          </a:prstGeom>
+        </p:spPr>
+      </p:pic>
+      <p:sp>
+        <p:nvSpPr>
+          <p:cNvPr id="40" name="TextBox 39">
+            <a:extLst>
+              <a:ext uri="{FF2B5EF4-FFF2-40B4-BE49-F238E27FC236}">
+                <a16:creationId xmlns:a16="http://schemas.microsoft.com/office/drawing/2014/main" id="{C852B1F6-25CE-4EE5-9965-DA489E750387}"/>
+              </a:ext>
+            </a:extLst>
+          </p:cNvPr>
+          <p:cNvSpPr txBox="1"/>
+          <p:nvPr/>
+        </p:nvSpPr>
+        <p:spPr>
+          <a:xfrm>
+            <a:off x="6206999" y="3826766"/>
+            <a:ext cx="569387" cy="369332"/>
+          </a:xfrm>
+          <a:prstGeom prst="rect">
+            <a:avLst/>
+          </a:prstGeom>
+          <a:noFill/>
+        </p:spPr>
+        <p:txBody>
+          <a:bodyPr wrap="none" rtlCol="0">
+            <a:spAutoFit/>
+          </a:bodyPr>
+          <a:lstStyle/>
+          <a:p>
+            <a:r>
+              <a:rPr lang="en-US" dirty="0">
+                <a:solidFill>
+                  <a:schemeClr val="accent5"/>
+                </a:solidFill>
+              </a:rPr>
+              <a:t>DB1</a:t>
+            </a:r>
+            <a:endParaRPr lang="en-CA" dirty="0">
+              <a:solidFill>
+                <a:schemeClr val="accent5"/>
+              </a:solidFill>
+            </a:endParaRPr>
+          </a:p>
+        </p:txBody>
+      </p:sp>
+      <p:sp>
+        <p:nvSpPr>
+          <p:cNvPr id="41" name="TextBox 40">
+            <a:extLst>
+              <a:ext uri="{FF2B5EF4-FFF2-40B4-BE49-F238E27FC236}">
+                <a16:creationId xmlns:a16="http://schemas.microsoft.com/office/drawing/2014/main" id="{CAC517D8-6F4A-4F3F-82EA-2F05306311FF}"/>
+              </a:ext>
+            </a:extLst>
+          </p:cNvPr>
+          <p:cNvSpPr txBox="1"/>
+          <p:nvPr/>
+        </p:nvSpPr>
+        <p:spPr>
+          <a:xfrm>
+            <a:off x="8284770" y="3826766"/>
+            <a:ext cx="569387" cy="369332"/>
+          </a:xfrm>
+          <a:prstGeom prst="rect">
+            <a:avLst/>
+          </a:prstGeom>
+          <a:noFill/>
+        </p:spPr>
+        <p:txBody>
+          <a:bodyPr wrap="none" rtlCol="0">
+            <a:spAutoFit/>
+          </a:bodyPr>
+          <a:lstStyle/>
+          <a:p>
+            <a:r>
+              <a:rPr lang="en-US" dirty="0">
+                <a:solidFill>
+                  <a:schemeClr val="accent5"/>
+                </a:solidFill>
+              </a:rPr>
+              <a:t>DB2</a:t>
+            </a:r>
+            <a:endParaRPr lang="en-CA" dirty="0">
+              <a:solidFill>
+                <a:schemeClr val="accent5"/>
+              </a:solidFill>
+            </a:endParaRPr>
+          </a:p>
+        </p:txBody>
+      </p:sp>
+      <p:sp>
+        <p:nvSpPr>
+          <p:cNvPr id="42" name="TextBox 41">
+            <a:extLst>
+              <a:ext uri="{FF2B5EF4-FFF2-40B4-BE49-F238E27FC236}">
+                <a16:creationId xmlns:a16="http://schemas.microsoft.com/office/drawing/2014/main" id="{83196958-CA6A-4073-8DA5-9F81391417BF}"/>
+              </a:ext>
+            </a:extLst>
+          </p:cNvPr>
+          <p:cNvSpPr txBox="1"/>
+          <p:nvPr/>
+        </p:nvSpPr>
+        <p:spPr>
+          <a:xfrm>
+            <a:off x="10030306" y="3826766"/>
+            <a:ext cx="569387" cy="369332"/>
+          </a:xfrm>
+          <a:prstGeom prst="rect">
+            <a:avLst/>
+          </a:prstGeom>
+          <a:noFill/>
+        </p:spPr>
+        <p:txBody>
+          <a:bodyPr wrap="none" rtlCol="0">
+            <a:spAutoFit/>
+          </a:bodyPr>
+          <a:lstStyle/>
+          <a:p>
+            <a:r>
+              <a:rPr lang="en-US" dirty="0">
+                <a:solidFill>
+                  <a:schemeClr val="accent5"/>
+                </a:solidFill>
+              </a:rPr>
+              <a:t>DB2</a:t>
+            </a:r>
+            <a:endParaRPr lang="en-CA" dirty="0">
+              <a:solidFill>
+                <a:schemeClr val="accent5"/>
+              </a:solidFill>
+            </a:endParaRPr>
+          </a:p>
+        </p:txBody>
+      </p:sp>
+    </p:spTree>
+    <p:extLst>
+      <p:ext uri="{BB962C8B-B14F-4D97-AF65-F5344CB8AC3E}">
+        <p14:creationId xmlns:p14="http://schemas.microsoft.com/office/powerpoint/2010/main" val="3267695919"/>
       </p:ext>
     </p:extLst>
   </p:cSld>

</xml_diff>

<commit_message>
Safety push with DRAFT 0.3
</commit_message>
<xml_diff>
--- a/src/DevOps/Illustrations.pptx
+++ b/src/DevOps/Illustrations.pptx
@@ -211,7 +211,7 @@
           <a:p>
             <a:fld id="{EB1108B4-53EF-4F9E-9491-F5ABDE6A4EA7}" type="datetimeFigureOut">
               <a:rPr lang="en-CA" smtClean="0"/>
-              <a:t>2017-05-11</a:t>
+              <a:t>2017-05-25</a:t>
             </a:fld>
             <a:endParaRPr lang="en-CA"/>
           </a:p>
@@ -479,6 +479,930 @@
 </p:notesMaster>
 </file>
 
+<file path=ppt/notesSlides/notesSlide1.xml><?xml version="1.0" encoding="utf-8"?>
+<p:notes xmlns:a="http://schemas.openxmlformats.org/drawingml/2006/main" xmlns:r="http://schemas.openxmlformats.org/officeDocument/2006/relationships" xmlns:p="http://schemas.openxmlformats.org/presentationml/2006/main">
+  <p:cSld>
+    <p:spTree>
+      <p:nvGrpSpPr>
+        <p:cNvPr id="1" name=""/>
+        <p:cNvGrpSpPr/>
+        <p:nvPr/>
+      </p:nvGrpSpPr>
+      <p:grpSpPr>
+        <a:xfrm>
+          <a:off x="0" y="0"/>
+          <a:ext cx="0" cy="0"/>
+          <a:chOff x="0" y="0"/>
+          <a:chExt cx="0" cy="0"/>
+        </a:xfrm>
+      </p:grpSpPr>
+      <p:sp>
+        <p:nvSpPr>
+          <p:cNvPr id="2" name="Slide Image Placeholder 1"/>
+          <p:cNvSpPr>
+            <a:spLocks noGrp="1" noRot="1" noChangeAspect="1"/>
+          </p:cNvSpPr>
+          <p:nvPr>
+            <p:ph type="sldImg"/>
+          </p:nvPr>
+        </p:nvSpPr>
+        <p:spPr/>
+      </p:sp>
+      <p:sp>
+        <p:nvSpPr>
+          <p:cNvPr id="3" name="Notes Placeholder 2"/>
+          <p:cNvSpPr>
+            <a:spLocks noGrp="1"/>
+          </p:cNvSpPr>
+          <p:nvPr>
+            <p:ph type="body" idx="1"/>
+          </p:nvPr>
+        </p:nvSpPr>
+        <p:spPr/>
+        <p:txBody>
+          <a:bodyPr/>
+          <a:lstStyle/>
+          <a:p>
+            <a:endParaRPr lang="en-CA"/>
+          </a:p>
+        </p:txBody>
+      </p:sp>
+      <p:sp>
+        <p:nvSpPr>
+          <p:cNvPr id="4" name="Slide Number Placeholder 3"/>
+          <p:cNvSpPr>
+            <a:spLocks noGrp="1"/>
+          </p:cNvSpPr>
+          <p:nvPr>
+            <p:ph type="sldNum" sz="quarter" idx="10"/>
+          </p:nvPr>
+        </p:nvSpPr>
+        <p:spPr/>
+        <p:txBody>
+          <a:bodyPr/>
+          <a:lstStyle/>
+          <a:p>
+            <a:fld id="{05240458-CBDF-4242-A98F-5E1D8B45E643}" type="slidenum">
+              <a:rPr lang="en-CA" smtClean="0"/>
+              <a:t>1</a:t>
+            </a:fld>
+            <a:endParaRPr lang="en-CA"/>
+          </a:p>
+        </p:txBody>
+      </p:sp>
+    </p:spTree>
+    <p:extLst>
+      <p:ext uri="{BB962C8B-B14F-4D97-AF65-F5344CB8AC3E}">
+        <p14:creationId xmlns:p14="http://schemas.microsoft.com/office/powerpoint/2010/main" val="1715842587"/>
+      </p:ext>
+    </p:extLst>
+  </p:cSld>
+  <p:clrMapOvr>
+    <a:masterClrMapping/>
+  </p:clrMapOvr>
+</p:notes>
+</file>
+
+<file path=ppt/notesSlides/notesSlide10.xml><?xml version="1.0" encoding="utf-8"?>
+<p:notes xmlns:a="http://schemas.openxmlformats.org/drawingml/2006/main" xmlns:r="http://schemas.openxmlformats.org/officeDocument/2006/relationships" xmlns:p="http://schemas.openxmlformats.org/presentationml/2006/main">
+  <p:cSld>
+    <p:spTree>
+      <p:nvGrpSpPr>
+        <p:cNvPr id="1" name=""/>
+        <p:cNvGrpSpPr/>
+        <p:nvPr/>
+      </p:nvGrpSpPr>
+      <p:grpSpPr>
+        <a:xfrm>
+          <a:off x="0" y="0"/>
+          <a:ext cx="0" cy="0"/>
+          <a:chOff x="0" y="0"/>
+          <a:chExt cx="0" cy="0"/>
+        </a:xfrm>
+      </p:grpSpPr>
+      <p:sp>
+        <p:nvSpPr>
+          <p:cNvPr id="2" name="Slide Image Placeholder 1"/>
+          <p:cNvSpPr>
+            <a:spLocks noGrp="1" noRot="1" noChangeAspect="1"/>
+          </p:cNvSpPr>
+          <p:nvPr>
+            <p:ph type="sldImg"/>
+          </p:nvPr>
+        </p:nvSpPr>
+        <p:spPr/>
+      </p:sp>
+      <p:sp>
+        <p:nvSpPr>
+          <p:cNvPr id="3" name="Notes Placeholder 2"/>
+          <p:cNvSpPr>
+            <a:spLocks noGrp="1"/>
+          </p:cNvSpPr>
+          <p:nvPr>
+            <p:ph type="body" idx="1"/>
+          </p:nvPr>
+        </p:nvSpPr>
+        <p:spPr/>
+        <p:txBody>
+          <a:bodyPr/>
+          <a:lstStyle/>
+          <a:p>
+            <a:endParaRPr lang="en-CA"/>
+          </a:p>
+        </p:txBody>
+      </p:sp>
+      <p:sp>
+        <p:nvSpPr>
+          <p:cNvPr id="4" name="Slide Number Placeholder 3"/>
+          <p:cNvSpPr>
+            <a:spLocks noGrp="1"/>
+          </p:cNvSpPr>
+          <p:nvPr>
+            <p:ph type="sldNum" sz="quarter" idx="10"/>
+          </p:nvPr>
+        </p:nvSpPr>
+        <p:spPr/>
+        <p:txBody>
+          <a:bodyPr/>
+          <a:lstStyle/>
+          <a:p>
+            <a:fld id="{05240458-CBDF-4242-A98F-5E1D8B45E643}" type="slidenum">
+              <a:rPr lang="en-CA" smtClean="0"/>
+              <a:t>10</a:t>
+            </a:fld>
+            <a:endParaRPr lang="en-CA"/>
+          </a:p>
+        </p:txBody>
+      </p:sp>
+    </p:spTree>
+    <p:extLst>
+      <p:ext uri="{BB962C8B-B14F-4D97-AF65-F5344CB8AC3E}">
+        <p14:creationId xmlns:p14="http://schemas.microsoft.com/office/powerpoint/2010/main" val="1781854223"/>
+      </p:ext>
+    </p:extLst>
+  </p:cSld>
+  <p:clrMapOvr>
+    <a:masterClrMapping/>
+  </p:clrMapOvr>
+</p:notes>
+</file>
+
+<file path=ppt/notesSlides/notesSlide11.xml><?xml version="1.0" encoding="utf-8"?>
+<p:notes xmlns:a="http://schemas.openxmlformats.org/drawingml/2006/main" xmlns:r="http://schemas.openxmlformats.org/officeDocument/2006/relationships" xmlns:p="http://schemas.openxmlformats.org/presentationml/2006/main">
+  <p:cSld>
+    <p:spTree>
+      <p:nvGrpSpPr>
+        <p:cNvPr id="1" name=""/>
+        <p:cNvGrpSpPr/>
+        <p:nvPr/>
+      </p:nvGrpSpPr>
+      <p:grpSpPr>
+        <a:xfrm>
+          <a:off x="0" y="0"/>
+          <a:ext cx="0" cy="0"/>
+          <a:chOff x="0" y="0"/>
+          <a:chExt cx="0" cy="0"/>
+        </a:xfrm>
+      </p:grpSpPr>
+      <p:sp>
+        <p:nvSpPr>
+          <p:cNvPr id="2" name="Slide Image Placeholder 1"/>
+          <p:cNvSpPr>
+            <a:spLocks noGrp="1" noRot="1" noChangeAspect="1"/>
+          </p:cNvSpPr>
+          <p:nvPr>
+            <p:ph type="sldImg"/>
+          </p:nvPr>
+        </p:nvSpPr>
+        <p:spPr/>
+      </p:sp>
+      <p:sp>
+        <p:nvSpPr>
+          <p:cNvPr id="3" name="Notes Placeholder 2"/>
+          <p:cNvSpPr>
+            <a:spLocks noGrp="1"/>
+          </p:cNvSpPr>
+          <p:nvPr>
+            <p:ph type="body" idx="1"/>
+          </p:nvPr>
+        </p:nvSpPr>
+        <p:spPr/>
+        <p:txBody>
+          <a:bodyPr/>
+          <a:lstStyle/>
+          <a:p>
+            <a:endParaRPr lang="en-CA"/>
+          </a:p>
+        </p:txBody>
+      </p:sp>
+      <p:sp>
+        <p:nvSpPr>
+          <p:cNvPr id="4" name="Slide Number Placeholder 3"/>
+          <p:cNvSpPr>
+            <a:spLocks noGrp="1"/>
+          </p:cNvSpPr>
+          <p:nvPr>
+            <p:ph type="sldNum" sz="quarter" idx="10"/>
+          </p:nvPr>
+        </p:nvSpPr>
+        <p:spPr/>
+        <p:txBody>
+          <a:bodyPr/>
+          <a:lstStyle/>
+          <a:p>
+            <a:fld id="{05240458-CBDF-4242-A98F-5E1D8B45E643}" type="slidenum">
+              <a:rPr lang="en-CA" smtClean="0"/>
+              <a:t>11</a:t>
+            </a:fld>
+            <a:endParaRPr lang="en-CA"/>
+          </a:p>
+        </p:txBody>
+      </p:sp>
+    </p:spTree>
+    <p:extLst>
+      <p:ext uri="{BB962C8B-B14F-4D97-AF65-F5344CB8AC3E}">
+        <p14:creationId xmlns:p14="http://schemas.microsoft.com/office/powerpoint/2010/main" val="1349685022"/>
+      </p:ext>
+    </p:extLst>
+  </p:cSld>
+  <p:clrMapOvr>
+    <a:masterClrMapping/>
+  </p:clrMapOvr>
+</p:notes>
+</file>
+
+<file path=ppt/notesSlides/notesSlide2.xml><?xml version="1.0" encoding="utf-8"?>
+<p:notes xmlns:a="http://schemas.openxmlformats.org/drawingml/2006/main" xmlns:r="http://schemas.openxmlformats.org/officeDocument/2006/relationships" xmlns:p="http://schemas.openxmlformats.org/presentationml/2006/main">
+  <p:cSld>
+    <p:spTree>
+      <p:nvGrpSpPr>
+        <p:cNvPr id="1" name=""/>
+        <p:cNvGrpSpPr/>
+        <p:nvPr/>
+      </p:nvGrpSpPr>
+      <p:grpSpPr>
+        <a:xfrm>
+          <a:off x="0" y="0"/>
+          <a:ext cx="0" cy="0"/>
+          <a:chOff x="0" y="0"/>
+          <a:chExt cx="0" cy="0"/>
+        </a:xfrm>
+      </p:grpSpPr>
+      <p:sp>
+        <p:nvSpPr>
+          <p:cNvPr id="2" name="Slide Image Placeholder 1"/>
+          <p:cNvSpPr>
+            <a:spLocks noGrp="1" noRot="1" noChangeAspect="1"/>
+          </p:cNvSpPr>
+          <p:nvPr>
+            <p:ph type="sldImg"/>
+          </p:nvPr>
+        </p:nvSpPr>
+        <p:spPr/>
+      </p:sp>
+      <p:sp>
+        <p:nvSpPr>
+          <p:cNvPr id="3" name="Notes Placeholder 2"/>
+          <p:cNvSpPr>
+            <a:spLocks noGrp="1"/>
+          </p:cNvSpPr>
+          <p:nvPr>
+            <p:ph type="body" idx="1"/>
+          </p:nvPr>
+        </p:nvSpPr>
+        <p:spPr/>
+        <p:txBody>
+          <a:bodyPr/>
+          <a:lstStyle/>
+          <a:p>
+            <a:endParaRPr lang="en-CA"/>
+          </a:p>
+        </p:txBody>
+      </p:sp>
+      <p:sp>
+        <p:nvSpPr>
+          <p:cNvPr id="4" name="Slide Number Placeholder 3"/>
+          <p:cNvSpPr>
+            <a:spLocks noGrp="1"/>
+          </p:cNvSpPr>
+          <p:nvPr>
+            <p:ph type="sldNum" sz="quarter" idx="10"/>
+          </p:nvPr>
+        </p:nvSpPr>
+        <p:spPr/>
+        <p:txBody>
+          <a:bodyPr/>
+          <a:lstStyle/>
+          <a:p>
+            <a:fld id="{05240458-CBDF-4242-A98F-5E1D8B45E643}" type="slidenum">
+              <a:rPr lang="en-CA" smtClean="0"/>
+              <a:t>2</a:t>
+            </a:fld>
+            <a:endParaRPr lang="en-CA"/>
+          </a:p>
+        </p:txBody>
+      </p:sp>
+    </p:spTree>
+    <p:extLst>
+      <p:ext uri="{BB962C8B-B14F-4D97-AF65-F5344CB8AC3E}">
+        <p14:creationId xmlns:p14="http://schemas.microsoft.com/office/powerpoint/2010/main" val="3500783608"/>
+      </p:ext>
+    </p:extLst>
+  </p:cSld>
+  <p:clrMapOvr>
+    <a:masterClrMapping/>
+  </p:clrMapOvr>
+</p:notes>
+</file>
+
+<file path=ppt/notesSlides/notesSlide3.xml><?xml version="1.0" encoding="utf-8"?>
+<p:notes xmlns:a="http://schemas.openxmlformats.org/drawingml/2006/main" xmlns:r="http://schemas.openxmlformats.org/officeDocument/2006/relationships" xmlns:p="http://schemas.openxmlformats.org/presentationml/2006/main">
+  <p:cSld>
+    <p:spTree>
+      <p:nvGrpSpPr>
+        <p:cNvPr id="1" name=""/>
+        <p:cNvGrpSpPr/>
+        <p:nvPr/>
+      </p:nvGrpSpPr>
+      <p:grpSpPr>
+        <a:xfrm>
+          <a:off x="0" y="0"/>
+          <a:ext cx="0" cy="0"/>
+          <a:chOff x="0" y="0"/>
+          <a:chExt cx="0" cy="0"/>
+        </a:xfrm>
+      </p:grpSpPr>
+      <p:sp>
+        <p:nvSpPr>
+          <p:cNvPr id="2" name="Slide Image Placeholder 1"/>
+          <p:cNvSpPr>
+            <a:spLocks noGrp="1" noRot="1" noChangeAspect="1"/>
+          </p:cNvSpPr>
+          <p:nvPr>
+            <p:ph type="sldImg"/>
+          </p:nvPr>
+        </p:nvSpPr>
+        <p:spPr/>
+      </p:sp>
+      <p:sp>
+        <p:nvSpPr>
+          <p:cNvPr id="3" name="Notes Placeholder 2"/>
+          <p:cNvSpPr>
+            <a:spLocks noGrp="1"/>
+          </p:cNvSpPr>
+          <p:nvPr>
+            <p:ph type="body" idx="1"/>
+          </p:nvPr>
+        </p:nvSpPr>
+        <p:spPr/>
+        <p:txBody>
+          <a:bodyPr/>
+          <a:lstStyle/>
+          <a:p>
+            <a:endParaRPr lang="en-CA"/>
+          </a:p>
+        </p:txBody>
+      </p:sp>
+      <p:sp>
+        <p:nvSpPr>
+          <p:cNvPr id="4" name="Slide Number Placeholder 3"/>
+          <p:cNvSpPr>
+            <a:spLocks noGrp="1"/>
+          </p:cNvSpPr>
+          <p:nvPr>
+            <p:ph type="sldNum" sz="quarter" idx="10"/>
+          </p:nvPr>
+        </p:nvSpPr>
+        <p:spPr/>
+        <p:txBody>
+          <a:bodyPr/>
+          <a:lstStyle/>
+          <a:p>
+            <a:fld id="{05240458-CBDF-4242-A98F-5E1D8B45E643}" type="slidenum">
+              <a:rPr lang="en-CA" smtClean="0"/>
+              <a:t>3</a:t>
+            </a:fld>
+            <a:endParaRPr lang="en-CA"/>
+          </a:p>
+        </p:txBody>
+      </p:sp>
+    </p:spTree>
+    <p:extLst>
+      <p:ext uri="{BB962C8B-B14F-4D97-AF65-F5344CB8AC3E}">
+        <p14:creationId xmlns:p14="http://schemas.microsoft.com/office/powerpoint/2010/main" val="3593601620"/>
+      </p:ext>
+    </p:extLst>
+  </p:cSld>
+  <p:clrMapOvr>
+    <a:masterClrMapping/>
+  </p:clrMapOvr>
+</p:notes>
+</file>
+
+<file path=ppt/notesSlides/notesSlide4.xml><?xml version="1.0" encoding="utf-8"?>
+<p:notes xmlns:a="http://schemas.openxmlformats.org/drawingml/2006/main" xmlns:r="http://schemas.openxmlformats.org/officeDocument/2006/relationships" xmlns:p="http://schemas.openxmlformats.org/presentationml/2006/main">
+  <p:cSld>
+    <p:spTree>
+      <p:nvGrpSpPr>
+        <p:cNvPr id="1" name=""/>
+        <p:cNvGrpSpPr/>
+        <p:nvPr/>
+      </p:nvGrpSpPr>
+      <p:grpSpPr>
+        <a:xfrm>
+          <a:off x="0" y="0"/>
+          <a:ext cx="0" cy="0"/>
+          <a:chOff x="0" y="0"/>
+          <a:chExt cx="0" cy="0"/>
+        </a:xfrm>
+      </p:grpSpPr>
+      <p:sp>
+        <p:nvSpPr>
+          <p:cNvPr id="2" name="Slide Image Placeholder 1"/>
+          <p:cNvSpPr>
+            <a:spLocks noGrp="1" noRot="1" noChangeAspect="1"/>
+          </p:cNvSpPr>
+          <p:nvPr>
+            <p:ph type="sldImg"/>
+          </p:nvPr>
+        </p:nvSpPr>
+        <p:spPr/>
+      </p:sp>
+      <p:sp>
+        <p:nvSpPr>
+          <p:cNvPr id="3" name="Notes Placeholder 2"/>
+          <p:cNvSpPr>
+            <a:spLocks noGrp="1"/>
+          </p:cNvSpPr>
+          <p:nvPr>
+            <p:ph type="body" idx="1"/>
+          </p:nvPr>
+        </p:nvSpPr>
+        <p:spPr/>
+        <p:txBody>
+          <a:bodyPr/>
+          <a:lstStyle/>
+          <a:p>
+            <a:endParaRPr lang="en-CA"/>
+          </a:p>
+        </p:txBody>
+      </p:sp>
+      <p:sp>
+        <p:nvSpPr>
+          <p:cNvPr id="4" name="Slide Number Placeholder 3"/>
+          <p:cNvSpPr>
+            <a:spLocks noGrp="1"/>
+          </p:cNvSpPr>
+          <p:nvPr>
+            <p:ph type="sldNum" sz="quarter" idx="10"/>
+          </p:nvPr>
+        </p:nvSpPr>
+        <p:spPr/>
+        <p:txBody>
+          <a:bodyPr/>
+          <a:lstStyle/>
+          <a:p>
+            <a:fld id="{05240458-CBDF-4242-A98F-5E1D8B45E643}" type="slidenum">
+              <a:rPr lang="en-CA" smtClean="0"/>
+              <a:t>4</a:t>
+            </a:fld>
+            <a:endParaRPr lang="en-CA"/>
+          </a:p>
+        </p:txBody>
+      </p:sp>
+    </p:spTree>
+    <p:extLst>
+      <p:ext uri="{BB962C8B-B14F-4D97-AF65-F5344CB8AC3E}">
+        <p14:creationId xmlns:p14="http://schemas.microsoft.com/office/powerpoint/2010/main" val="1770055894"/>
+      </p:ext>
+    </p:extLst>
+  </p:cSld>
+  <p:clrMapOvr>
+    <a:masterClrMapping/>
+  </p:clrMapOvr>
+</p:notes>
+</file>
+
+<file path=ppt/notesSlides/notesSlide5.xml><?xml version="1.0" encoding="utf-8"?>
+<p:notes xmlns:a="http://schemas.openxmlformats.org/drawingml/2006/main" xmlns:r="http://schemas.openxmlformats.org/officeDocument/2006/relationships" xmlns:p="http://schemas.openxmlformats.org/presentationml/2006/main">
+  <p:cSld>
+    <p:spTree>
+      <p:nvGrpSpPr>
+        <p:cNvPr id="1" name=""/>
+        <p:cNvGrpSpPr/>
+        <p:nvPr/>
+      </p:nvGrpSpPr>
+      <p:grpSpPr>
+        <a:xfrm>
+          <a:off x="0" y="0"/>
+          <a:ext cx="0" cy="0"/>
+          <a:chOff x="0" y="0"/>
+          <a:chExt cx="0" cy="0"/>
+        </a:xfrm>
+      </p:grpSpPr>
+      <p:sp>
+        <p:nvSpPr>
+          <p:cNvPr id="2" name="Slide Image Placeholder 1"/>
+          <p:cNvSpPr>
+            <a:spLocks noGrp="1" noRot="1" noChangeAspect="1"/>
+          </p:cNvSpPr>
+          <p:nvPr>
+            <p:ph type="sldImg"/>
+          </p:nvPr>
+        </p:nvSpPr>
+        <p:spPr/>
+      </p:sp>
+      <p:sp>
+        <p:nvSpPr>
+          <p:cNvPr id="3" name="Notes Placeholder 2"/>
+          <p:cNvSpPr>
+            <a:spLocks noGrp="1"/>
+          </p:cNvSpPr>
+          <p:nvPr>
+            <p:ph type="body" idx="1"/>
+          </p:nvPr>
+        </p:nvSpPr>
+        <p:spPr/>
+        <p:txBody>
+          <a:bodyPr/>
+          <a:lstStyle/>
+          <a:p>
+            <a:endParaRPr lang="en-CA"/>
+          </a:p>
+        </p:txBody>
+      </p:sp>
+      <p:sp>
+        <p:nvSpPr>
+          <p:cNvPr id="4" name="Slide Number Placeholder 3"/>
+          <p:cNvSpPr>
+            <a:spLocks noGrp="1"/>
+          </p:cNvSpPr>
+          <p:nvPr>
+            <p:ph type="sldNum" sz="quarter" idx="10"/>
+          </p:nvPr>
+        </p:nvSpPr>
+        <p:spPr/>
+        <p:txBody>
+          <a:bodyPr/>
+          <a:lstStyle/>
+          <a:p>
+            <a:fld id="{05240458-CBDF-4242-A98F-5E1D8B45E643}" type="slidenum">
+              <a:rPr lang="en-CA" smtClean="0"/>
+              <a:t>5</a:t>
+            </a:fld>
+            <a:endParaRPr lang="en-CA"/>
+          </a:p>
+        </p:txBody>
+      </p:sp>
+    </p:spTree>
+    <p:extLst>
+      <p:ext uri="{BB962C8B-B14F-4D97-AF65-F5344CB8AC3E}">
+        <p14:creationId xmlns:p14="http://schemas.microsoft.com/office/powerpoint/2010/main" val="2838658331"/>
+      </p:ext>
+    </p:extLst>
+  </p:cSld>
+  <p:clrMapOvr>
+    <a:masterClrMapping/>
+  </p:clrMapOvr>
+</p:notes>
+</file>
+
+<file path=ppt/notesSlides/notesSlide6.xml><?xml version="1.0" encoding="utf-8"?>
+<p:notes xmlns:a="http://schemas.openxmlformats.org/drawingml/2006/main" xmlns:r="http://schemas.openxmlformats.org/officeDocument/2006/relationships" xmlns:p="http://schemas.openxmlformats.org/presentationml/2006/main">
+  <p:cSld>
+    <p:spTree>
+      <p:nvGrpSpPr>
+        <p:cNvPr id="1" name=""/>
+        <p:cNvGrpSpPr/>
+        <p:nvPr/>
+      </p:nvGrpSpPr>
+      <p:grpSpPr>
+        <a:xfrm>
+          <a:off x="0" y="0"/>
+          <a:ext cx="0" cy="0"/>
+          <a:chOff x="0" y="0"/>
+          <a:chExt cx="0" cy="0"/>
+        </a:xfrm>
+      </p:grpSpPr>
+      <p:sp>
+        <p:nvSpPr>
+          <p:cNvPr id="2" name="Slide Image Placeholder 1"/>
+          <p:cNvSpPr>
+            <a:spLocks noGrp="1" noRot="1" noChangeAspect="1"/>
+          </p:cNvSpPr>
+          <p:nvPr>
+            <p:ph type="sldImg"/>
+          </p:nvPr>
+        </p:nvSpPr>
+        <p:spPr/>
+      </p:sp>
+      <p:sp>
+        <p:nvSpPr>
+          <p:cNvPr id="3" name="Notes Placeholder 2"/>
+          <p:cNvSpPr>
+            <a:spLocks noGrp="1"/>
+          </p:cNvSpPr>
+          <p:nvPr>
+            <p:ph type="body" idx="1"/>
+          </p:nvPr>
+        </p:nvSpPr>
+        <p:spPr/>
+        <p:txBody>
+          <a:bodyPr/>
+          <a:lstStyle/>
+          <a:p>
+            <a:endParaRPr lang="en-CA"/>
+          </a:p>
+        </p:txBody>
+      </p:sp>
+      <p:sp>
+        <p:nvSpPr>
+          <p:cNvPr id="4" name="Slide Number Placeholder 3"/>
+          <p:cNvSpPr>
+            <a:spLocks noGrp="1"/>
+          </p:cNvSpPr>
+          <p:nvPr>
+            <p:ph type="sldNum" sz="quarter" idx="10"/>
+          </p:nvPr>
+        </p:nvSpPr>
+        <p:spPr/>
+        <p:txBody>
+          <a:bodyPr/>
+          <a:lstStyle/>
+          <a:p>
+            <a:fld id="{05240458-CBDF-4242-A98F-5E1D8B45E643}" type="slidenum">
+              <a:rPr lang="en-CA" smtClean="0"/>
+              <a:t>6</a:t>
+            </a:fld>
+            <a:endParaRPr lang="en-CA"/>
+          </a:p>
+        </p:txBody>
+      </p:sp>
+    </p:spTree>
+    <p:extLst>
+      <p:ext uri="{BB962C8B-B14F-4D97-AF65-F5344CB8AC3E}">
+        <p14:creationId xmlns:p14="http://schemas.microsoft.com/office/powerpoint/2010/main" val="4015451626"/>
+      </p:ext>
+    </p:extLst>
+  </p:cSld>
+  <p:clrMapOvr>
+    <a:masterClrMapping/>
+  </p:clrMapOvr>
+</p:notes>
+</file>
+
+<file path=ppt/notesSlides/notesSlide7.xml><?xml version="1.0" encoding="utf-8"?>
+<p:notes xmlns:a="http://schemas.openxmlformats.org/drawingml/2006/main" xmlns:r="http://schemas.openxmlformats.org/officeDocument/2006/relationships" xmlns:p="http://schemas.openxmlformats.org/presentationml/2006/main">
+  <p:cSld>
+    <p:spTree>
+      <p:nvGrpSpPr>
+        <p:cNvPr id="1" name=""/>
+        <p:cNvGrpSpPr/>
+        <p:nvPr/>
+      </p:nvGrpSpPr>
+      <p:grpSpPr>
+        <a:xfrm>
+          <a:off x="0" y="0"/>
+          <a:ext cx="0" cy="0"/>
+          <a:chOff x="0" y="0"/>
+          <a:chExt cx="0" cy="0"/>
+        </a:xfrm>
+      </p:grpSpPr>
+      <p:sp>
+        <p:nvSpPr>
+          <p:cNvPr id="2" name="Slide Image Placeholder 1"/>
+          <p:cNvSpPr>
+            <a:spLocks noGrp="1" noRot="1" noChangeAspect="1"/>
+          </p:cNvSpPr>
+          <p:nvPr>
+            <p:ph type="sldImg"/>
+          </p:nvPr>
+        </p:nvSpPr>
+        <p:spPr/>
+      </p:sp>
+      <p:sp>
+        <p:nvSpPr>
+          <p:cNvPr id="3" name="Notes Placeholder 2"/>
+          <p:cNvSpPr>
+            <a:spLocks noGrp="1"/>
+          </p:cNvSpPr>
+          <p:nvPr>
+            <p:ph type="body" idx="1"/>
+          </p:nvPr>
+        </p:nvSpPr>
+        <p:spPr/>
+        <p:txBody>
+          <a:bodyPr/>
+          <a:lstStyle/>
+          <a:p>
+            <a:endParaRPr lang="en-CA"/>
+          </a:p>
+        </p:txBody>
+      </p:sp>
+      <p:sp>
+        <p:nvSpPr>
+          <p:cNvPr id="4" name="Slide Number Placeholder 3"/>
+          <p:cNvSpPr>
+            <a:spLocks noGrp="1"/>
+          </p:cNvSpPr>
+          <p:nvPr>
+            <p:ph type="sldNum" sz="quarter" idx="10"/>
+          </p:nvPr>
+        </p:nvSpPr>
+        <p:spPr/>
+        <p:txBody>
+          <a:bodyPr/>
+          <a:lstStyle/>
+          <a:p>
+            <a:fld id="{05240458-CBDF-4242-A98F-5E1D8B45E643}" type="slidenum">
+              <a:rPr lang="en-CA" smtClean="0"/>
+              <a:t>7</a:t>
+            </a:fld>
+            <a:endParaRPr lang="en-CA"/>
+          </a:p>
+        </p:txBody>
+      </p:sp>
+    </p:spTree>
+    <p:extLst>
+      <p:ext uri="{BB962C8B-B14F-4D97-AF65-F5344CB8AC3E}">
+        <p14:creationId xmlns:p14="http://schemas.microsoft.com/office/powerpoint/2010/main" val="866592493"/>
+      </p:ext>
+    </p:extLst>
+  </p:cSld>
+  <p:clrMapOvr>
+    <a:masterClrMapping/>
+  </p:clrMapOvr>
+</p:notes>
+</file>
+
+<file path=ppt/notesSlides/notesSlide8.xml><?xml version="1.0" encoding="utf-8"?>
+<p:notes xmlns:a="http://schemas.openxmlformats.org/drawingml/2006/main" xmlns:r="http://schemas.openxmlformats.org/officeDocument/2006/relationships" xmlns:p="http://schemas.openxmlformats.org/presentationml/2006/main">
+  <p:cSld>
+    <p:spTree>
+      <p:nvGrpSpPr>
+        <p:cNvPr id="1" name=""/>
+        <p:cNvGrpSpPr/>
+        <p:nvPr/>
+      </p:nvGrpSpPr>
+      <p:grpSpPr>
+        <a:xfrm>
+          <a:off x="0" y="0"/>
+          <a:ext cx="0" cy="0"/>
+          <a:chOff x="0" y="0"/>
+          <a:chExt cx="0" cy="0"/>
+        </a:xfrm>
+      </p:grpSpPr>
+      <p:sp>
+        <p:nvSpPr>
+          <p:cNvPr id="2" name="Slide Image Placeholder 1"/>
+          <p:cNvSpPr>
+            <a:spLocks noGrp="1" noRot="1" noChangeAspect="1"/>
+          </p:cNvSpPr>
+          <p:nvPr>
+            <p:ph type="sldImg"/>
+          </p:nvPr>
+        </p:nvSpPr>
+        <p:spPr/>
+      </p:sp>
+      <p:sp>
+        <p:nvSpPr>
+          <p:cNvPr id="3" name="Notes Placeholder 2"/>
+          <p:cNvSpPr>
+            <a:spLocks noGrp="1"/>
+          </p:cNvSpPr>
+          <p:nvPr>
+            <p:ph type="body" idx="1"/>
+          </p:nvPr>
+        </p:nvSpPr>
+        <p:spPr/>
+        <p:txBody>
+          <a:bodyPr/>
+          <a:lstStyle/>
+          <a:p>
+            <a:endParaRPr lang="en-CA"/>
+          </a:p>
+        </p:txBody>
+      </p:sp>
+      <p:sp>
+        <p:nvSpPr>
+          <p:cNvPr id="4" name="Slide Number Placeholder 3"/>
+          <p:cNvSpPr>
+            <a:spLocks noGrp="1"/>
+          </p:cNvSpPr>
+          <p:nvPr>
+            <p:ph type="sldNum" sz="quarter" idx="10"/>
+          </p:nvPr>
+        </p:nvSpPr>
+        <p:spPr/>
+        <p:txBody>
+          <a:bodyPr/>
+          <a:lstStyle/>
+          <a:p>
+            <a:fld id="{05240458-CBDF-4242-A98F-5E1D8B45E643}" type="slidenum">
+              <a:rPr lang="en-CA" smtClean="0"/>
+              <a:t>8</a:t>
+            </a:fld>
+            <a:endParaRPr lang="en-CA"/>
+          </a:p>
+        </p:txBody>
+      </p:sp>
+    </p:spTree>
+    <p:extLst>
+      <p:ext uri="{BB962C8B-B14F-4D97-AF65-F5344CB8AC3E}">
+        <p14:creationId xmlns:p14="http://schemas.microsoft.com/office/powerpoint/2010/main" val="851356397"/>
+      </p:ext>
+    </p:extLst>
+  </p:cSld>
+  <p:clrMapOvr>
+    <a:masterClrMapping/>
+  </p:clrMapOvr>
+</p:notes>
+</file>
+
+<file path=ppt/notesSlides/notesSlide9.xml><?xml version="1.0" encoding="utf-8"?>
+<p:notes xmlns:a="http://schemas.openxmlformats.org/drawingml/2006/main" xmlns:r="http://schemas.openxmlformats.org/officeDocument/2006/relationships" xmlns:p="http://schemas.openxmlformats.org/presentationml/2006/main">
+  <p:cSld>
+    <p:spTree>
+      <p:nvGrpSpPr>
+        <p:cNvPr id="1" name=""/>
+        <p:cNvGrpSpPr/>
+        <p:nvPr/>
+      </p:nvGrpSpPr>
+      <p:grpSpPr>
+        <a:xfrm>
+          <a:off x="0" y="0"/>
+          <a:ext cx="0" cy="0"/>
+          <a:chOff x="0" y="0"/>
+          <a:chExt cx="0" cy="0"/>
+        </a:xfrm>
+      </p:grpSpPr>
+      <p:sp>
+        <p:nvSpPr>
+          <p:cNvPr id="2" name="Slide Image Placeholder 1"/>
+          <p:cNvSpPr>
+            <a:spLocks noGrp="1" noRot="1" noChangeAspect="1"/>
+          </p:cNvSpPr>
+          <p:nvPr>
+            <p:ph type="sldImg"/>
+          </p:nvPr>
+        </p:nvSpPr>
+        <p:spPr/>
+      </p:sp>
+      <p:sp>
+        <p:nvSpPr>
+          <p:cNvPr id="3" name="Notes Placeholder 2"/>
+          <p:cNvSpPr>
+            <a:spLocks noGrp="1"/>
+          </p:cNvSpPr>
+          <p:nvPr>
+            <p:ph type="body" idx="1"/>
+          </p:nvPr>
+        </p:nvSpPr>
+        <p:spPr/>
+        <p:txBody>
+          <a:bodyPr/>
+          <a:lstStyle/>
+          <a:p>
+            <a:endParaRPr lang="en-CA"/>
+          </a:p>
+        </p:txBody>
+      </p:sp>
+      <p:sp>
+        <p:nvSpPr>
+          <p:cNvPr id="4" name="Slide Number Placeholder 3"/>
+          <p:cNvSpPr>
+            <a:spLocks noGrp="1"/>
+          </p:cNvSpPr>
+          <p:nvPr>
+            <p:ph type="sldNum" sz="quarter" idx="10"/>
+          </p:nvPr>
+        </p:nvSpPr>
+        <p:spPr/>
+        <p:txBody>
+          <a:bodyPr/>
+          <a:lstStyle/>
+          <a:p>
+            <a:fld id="{05240458-CBDF-4242-A98F-5E1D8B45E643}" type="slidenum">
+              <a:rPr lang="en-CA" smtClean="0"/>
+              <a:t>9</a:t>
+            </a:fld>
+            <a:endParaRPr lang="en-CA"/>
+          </a:p>
+        </p:txBody>
+      </p:sp>
+    </p:spTree>
+    <p:extLst>
+      <p:ext uri="{BB962C8B-B14F-4D97-AF65-F5344CB8AC3E}">
+        <p14:creationId xmlns:p14="http://schemas.microsoft.com/office/powerpoint/2010/main" val="3348258263"/>
+      </p:ext>
+    </p:extLst>
+  </p:cSld>
+  <p:clrMapOvr>
+    <a:masterClrMapping/>
+  </p:clrMapOvr>
+</p:notes>
+</file>
+
 <file path=ppt/slideLayouts/slideLayout1.xml><?xml version="1.0" encoding="utf-8"?>
 <p:sldLayout xmlns:a="http://schemas.openxmlformats.org/drawingml/2006/main" xmlns:r="http://schemas.openxmlformats.org/officeDocument/2006/relationships" xmlns:p="http://schemas.openxmlformats.org/presentationml/2006/main" type="title" preserve="1">
   <p:cSld name="Title Slide">
@@ -610,7 +1534,7 @@
           <a:p>
             <a:fld id="{F71EBF1D-DE49-4C53-B029-DA93D2E44EE4}" type="datetimeFigureOut">
               <a:rPr lang="en-CA" smtClean="0"/>
-              <a:t>2017-05-11</a:t>
+              <a:t>2017-05-25</a:t>
             </a:fld>
             <a:endParaRPr lang="en-CA"/>
           </a:p>
@@ -780,7 +1704,7 @@
           <a:p>
             <a:fld id="{F71EBF1D-DE49-4C53-B029-DA93D2E44EE4}" type="datetimeFigureOut">
               <a:rPr lang="en-CA" smtClean="0"/>
-              <a:t>2017-05-11</a:t>
+              <a:t>2017-05-25</a:t>
             </a:fld>
             <a:endParaRPr lang="en-CA"/>
           </a:p>
@@ -960,7 +1884,7 @@
           <a:p>
             <a:fld id="{F71EBF1D-DE49-4C53-B029-DA93D2E44EE4}" type="datetimeFigureOut">
               <a:rPr lang="en-CA" smtClean="0"/>
-              <a:t>2017-05-11</a:t>
+              <a:t>2017-05-25</a:t>
             </a:fld>
             <a:endParaRPr lang="en-CA"/>
           </a:p>
@@ -1130,7 +2054,7 @@
           <a:p>
             <a:fld id="{F71EBF1D-DE49-4C53-B029-DA93D2E44EE4}" type="datetimeFigureOut">
               <a:rPr lang="en-CA" smtClean="0"/>
-              <a:t>2017-05-11</a:t>
+              <a:t>2017-05-25</a:t>
             </a:fld>
             <a:endParaRPr lang="en-CA"/>
           </a:p>
@@ -1376,7 +2300,7 @@
           <a:p>
             <a:fld id="{F71EBF1D-DE49-4C53-B029-DA93D2E44EE4}" type="datetimeFigureOut">
               <a:rPr lang="en-CA" smtClean="0"/>
-              <a:t>2017-05-11</a:t>
+              <a:t>2017-05-25</a:t>
             </a:fld>
             <a:endParaRPr lang="en-CA"/>
           </a:p>
@@ -1608,7 +2532,7 @@
           <a:p>
             <a:fld id="{F71EBF1D-DE49-4C53-B029-DA93D2E44EE4}" type="datetimeFigureOut">
               <a:rPr lang="en-CA" smtClean="0"/>
-              <a:t>2017-05-11</a:t>
+              <a:t>2017-05-25</a:t>
             </a:fld>
             <a:endParaRPr lang="en-CA"/>
           </a:p>
@@ -1975,7 +2899,7 @@
           <a:p>
             <a:fld id="{F71EBF1D-DE49-4C53-B029-DA93D2E44EE4}" type="datetimeFigureOut">
               <a:rPr lang="en-CA" smtClean="0"/>
-              <a:t>2017-05-11</a:t>
+              <a:t>2017-05-25</a:t>
             </a:fld>
             <a:endParaRPr lang="en-CA"/>
           </a:p>
@@ -2112,7 +3036,7 @@
           <a:p>
             <a:fld id="{F71EBF1D-DE49-4C53-B029-DA93D2E44EE4}" type="datetimeFigureOut">
               <a:rPr lang="en-CA" smtClean="0"/>
-              <a:t>2017-05-11</a:t>
+              <a:t>2017-05-25</a:t>
             </a:fld>
             <a:endParaRPr lang="en-CA"/>
           </a:p>
@@ -2207,7 +3131,7 @@
           <a:p>
             <a:fld id="{F71EBF1D-DE49-4C53-B029-DA93D2E44EE4}" type="datetimeFigureOut">
               <a:rPr lang="en-CA" smtClean="0"/>
-              <a:t>2017-05-11</a:t>
+              <a:t>2017-05-25</a:t>
             </a:fld>
             <a:endParaRPr lang="en-CA"/>
           </a:p>
@@ -2484,7 +3408,7 @@
           <a:p>
             <a:fld id="{F71EBF1D-DE49-4C53-B029-DA93D2E44EE4}" type="datetimeFigureOut">
               <a:rPr lang="en-CA" smtClean="0"/>
-              <a:t>2017-05-11</a:t>
+              <a:t>2017-05-25</a:t>
             </a:fld>
             <a:endParaRPr lang="en-CA"/>
           </a:p>
@@ -2737,7 +3661,7 @@
           <a:p>
             <a:fld id="{F71EBF1D-DE49-4C53-B029-DA93D2E44EE4}" type="datetimeFigureOut">
               <a:rPr lang="en-CA" smtClean="0"/>
-              <a:t>2017-05-11</a:t>
+              <a:t>2017-05-25</a:t>
             </a:fld>
             <a:endParaRPr lang="en-CA"/>
           </a:p>
@@ -2950,7 +3874,7 @@
           <a:p>
             <a:fld id="{F71EBF1D-DE49-4C53-B029-DA93D2E44EE4}" type="datetimeFigureOut">
               <a:rPr lang="en-CA" smtClean="0"/>
-              <a:t>2017-05-11</a:t>
+              <a:t>2017-05-25</a:t>
             </a:fld>
             <a:endParaRPr lang="en-CA"/>
           </a:p>
@@ -3508,52 +4432,6 @@
       </p:sp>
       <p:sp>
         <p:nvSpPr>
-          <p:cNvPr id="8" name="Left Arrow 7"/>
-          <p:cNvSpPr/>
-          <p:nvPr/>
-        </p:nvSpPr>
-        <p:spPr>
-          <a:xfrm rot="10800000">
-            <a:off x="3628251" y="3694351"/>
-            <a:ext cx="1487324" cy="845502"/>
-          </a:xfrm>
-          <a:prstGeom prst="leftArrow">
-            <a:avLst/>
-          </a:prstGeom>
-          <a:solidFill>
-            <a:schemeClr val="bg1"/>
-          </a:solidFill>
-          <a:ln>
-            <a:noFill/>
-          </a:ln>
-        </p:spPr>
-        <p:style>
-          <a:lnRef idx="2">
-            <a:schemeClr val="accent1">
-              <a:shade val="50000"/>
-            </a:schemeClr>
-          </a:lnRef>
-          <a:fillRef idx="1">
-            <a:schemeClr val="accent1"/>
-          </a:fillRef>
-          <a:effectRef idx="0">
-            <a:schemeClr val="accent1"/>
-          </a:effectRef>
-          <a:fontRef idx="minor">
-            <a:schemeClr val="lt1"/>
-          </a:fontRef>
-        </p:style>
-        <p:txBody>
-          <a:bodyPr rtlCol="0" anchor="ctr"/>
-          <a:lstStyle/>
-          <a:p>
-            <a:pPr algn="ctr"/>
-            <a:endParaRPr lang="en-CA"/>
-          </a:p>
-        </p:txBody>
-      </p:sp>
-      <p:sp>
-        <p:nvSpPr>
           <p:cNvPr id="2" name="Flowchart: Connector 1"/>
           <p:cNvSpPr/>
           <p:nvPr/>
@@ -3637,35 +4515,6 @@
       </p:sp>
       <p:sp>
         <p:nvSpPr>
-          <p:cNvPr id="9" name="TextBox 8"/>
-          <p:cNvSpPr txBox="1"/>
-          <p:nvPr/>
-        </p:nvSpPr>
-        <p:spPr>
-          <a:xfrm>
-            <a:off x="3960923" y="3914083"/>
-            <a:ext cx="1002903" cy="400110"/>
-          </a:xfrm>
-          <a:prstGeom prst="rect">
-            <a:avLst/>
-          </a:prstGeom>
-          <a:noFill/>
-        </p:spPr>
-        <p:txBody>
-          <a:bodyPr wrap="square" rtlCol="0">
-            <a:spAutoFit/>
-          </a:bodyPr>
-          <a:lstStyle/>
-          <a:p>
-            <a:r>
-              <a:rPr lang="en-CA" sz="2000" dirty="0"/>
-              <a:t>Product</a:t>
-            </a:r>
-          </a:p>
-        </p:txBody>
-      </p:sp>
-      <p:sp>
-        <p:nvSpPr>
           <p:cNvPr id="10" name="Flowchart: Connector 9">
             <a:extLst>
               <a:ext uri="{FF2B5EF4-FFF2-40B4-BE49-F238E27FC236}">
@@ -3770,7 +4619,7 @@
         </p:nvSpPr>
         <p:spPr>
           <a:xfrm>
-            <a:off x="7762308" y="2945218"/>
+            <a:off x="7762308" y="2899219"/>
             <a:ext cx="2303900" cy="400110"/>
           </a:xfrm>
           <a:prstGeom prst="rect">
@@ -3812,7 +4661,7 @@
         </p:nvSpPr>
         <p:spPr>
           <a:xfrm>
-            <a:off x="8489895" y="2223893"/>
+            <a:off x="8417039" y="2112366"/>
             <a:ext cx="994439" cy="400110"/>
           </a:xfrm>
           <a:prstGeom prst="rect">
@@ -3826,6 +4675,7 @@
           </a:bodyPr>
           <a:lstStyle/>
           <a:p>
+            <a:pPr algn="ctr"/>
             <a:r>
               <a:rPr lang="en-CA" sz="2000" dirty="0">
                 <a:solidFill>
@@ -3836,58 +4686,6 @@
               </a:rPr>
               <a:t>PROD</a:t>
             </a:r>
-          </a:p>
-        </p:txBody>
-      </p:sp>
-      <p:sp>
-        <p:nvSpPr>
-          <p:cNvPr id="14" name="Left Arrow 7">
-            <a:extLst>
-              <a:ext uri="{FF2B5EF4-FFF2-40B4-BE49-F238E27FC236}">
-                <a16:creationId xmlns:a16="http://schemas.microsoft.com/office/drawing/2014/main" id="{277FA49D-6290-45CF-B770-2E7338B37048}"/>
-              </a:ext>
-            </a:extLst>
-          </p:cNvPr>
-          <p:cNvSpPr/>
-          <p:nvPr/>
-        </p:nvSpPr>
-        <p:spPr>
-          <a:xfrm rot="10800000">
-            <a:off x="9484334" y="3694351"/>
-            <a:ext cx="1487324" cy="845502"/>
-          </a:xfrm>
-          <a:prstGeom prst="leftArrow">
-            <a:avLst/>
-          </a:prstGeom>
-          <a:solidFill>
-            <a:schemeClr val="bg1"/>
-          </a:solidFill>
-          <a:ln>
-            <a:noFill/>
-          </a:ln>
-        </p:spPr>
-        <p:style>
-          <a:lnRef idx="2">
-            <a:schemeClr val="accent1">
-              <a:shade val="50000"/>
-            </a:schemeClr>
-          </a:lnRef>
-          <a:fillRef idx="1">
-            <a:schemeClr val="accent1"/>
-          </a:fillRef>
-          <a:effectRef idx="0">
-            <a:schemeClr val="accent1"/>
-          </a:effectRef>
-          <a:fontRef idx="minor">
-            <a:schemeClr val="lt1"/>
-          </a:fontRef>
-        </p:style>
-        <p:txBody>
-          <a:bodyPr rtlCol="0" anchor="ctr"/>
-          <a:lstStyle/>
-          <a:p>
-            <a:pPr algn="ctr"/>
-            <a:endParaRPr lang="en-CA"/>
           </a:p>
         </p:txBody>
       </p:sp>
@@ -3951,7 +4749,7 @@
         </p:nvSpPr>
         <p:spPr>
           <a:xfrm>
-            <a:off x="8197555" y="3875792"/>
+            <a:off x="8197555" y="3828448"/>
             <a:ext cx="1433406" cy="400110"/>
           </a:xfrm>
           <a:prstGeom prst="rect">
@@ -3998,41 +4796,6 @@
       </p:sp>
       <p:sp>
         <p:nvSpPr>
-          <p:cNvPr id="17" name="TextBox 16">
-            <a:extLst>
-              <a:ext uri="{FF2B5EF4-FFF2-40B4-BE49-F238E27FC236}">
-                <a16:creationId xmlns:a16="http://schemas.microsoft.com/office/drawing/2014/main" id="{90F1C19B-F05B-410E-B74D-B33B9D00B712}"/>
-              </a:ext>
-            </a:extLst>
-          </p:cNvPr>
-          <p:cNvSpPr txBox="1"/>
-          <p:nvPr/>
-        </p:nvSpPr>
-        <p:spPr>
-          <a:xfrm>
-            <a:off x="9817006" y="3914083"/>
-            <a:ext cx="1002903" cy="400110"/>
-          </a:xfrm>
-          <a:prstGeom prst="rect">
-            <a:avLst/>
-          </a:prstGeom>
-          <a:noFill/>
-        </p:spPr>
-        <p:txBody>
-          <a:bodyPr wrap="square" rtlCol="0">
-            <a:spAutoFit/>
-          </a:bodyPr>
-          <a:lstStyle/>
-          <a:p>
-            <a:r>
-              <a:rPr lang="en-CA" sz="2000" dirty="0"/>
-              <a:t>Product</a:t>
-            </a:r>
-          </a:p>
-        </p:txBody>
-      </p:sp>
-      <p:sp>
-        <p:nvSpPr>
           <p:cNvPr id="18" name="Title 17">
             <a:extLst>
               <a:ext uri="{FF2B5EF4-FFF2-40B4-BE49-F238E27FC236}">
@@ -4081,8 +4844,8 @@
         </p:nvSpPr>
         <p:spPr>
           <a:xfrm>
-            <a:off x="1333490" y="1013434"/>
-            <a:ext cx="3449370" cy="584775"/>
+            <a:off x="3390890" y="1464884"/>
+            <a:ext cx="3449370" cy="1077218"/>
           </a:xfrm>
           <a:prstGeom prst="rect">
             <a:avLst/>
@@ -4105,7 +4868,34 @@
                 <a:latin typeface="Segoe UI" panose="020B0502040204020203" pitchFamily="34" charset="0"/>
                 <a:cs typeface="Segoe UI" panose="020B0502040204020203" pitchFamily="34" charset="0"/>
               </a:rPr>
-              <a:t>GENERIC MODEL </a:t>
+              <a:t>USER TYPES</a:t>
+            </a:r>
+          </a:p>
+          <a:p>
+            <a:r>
+              <a:rPr lang="en-US" sz="3200" dirty="0">
+                <a:solidFill>
+                  <a:schemeClr val="bg1">
+                    <a:lumMod val="50000"/>
+                  </a:schemeClr>
+                </a:solidFill>
+                <a:latin typeface="Segoe UI" panose="020B0502040204020203" pitchFamily="34" charset="0"/>
+                <a:cs typeface="Segoe UI" panose="020B0502040204020203" pitchFamily="34" charset="0"/>
+                <a:sym typeface="Wingdings 3" panose="05040102010807070707" pitchFamily="18" charset="2"/>
+              </a:rPr>
+              <a:t>       </a:t>
+            </a:r>
+            <a:r>
+              <a:rPr lang="en-US" sz="3200" dirty="0">
+                <a:solidFill>
+                  <a:schemeClr val="bg1">
+                    <a:lumMod val="50000"/>
+                  </a:schemeClr>
+                </a:solidFill>
+                <a:latin typeface="Segoe UI" panose="020B0502040204020203" pitchFamily="34" charset="0"/>
+                <a:cs typeface="Segoe UI" panose="020B0502040204020203" pitchFamily="34" charset="0"/>
+              </a:rPr>
+              <a:t> </a:t>
             </a:r>
             <a:endParaRPr lang="en-CA" sz="3200" dirty="0">
               <a:solidFill>
@@ -4133,8 +4923,8 @@
         </p:nvSpPr>
         <p:spPr>
           <a:xfrm>
-            <a:off x="5794218" y="1026503"/>
-            <a:ext cx="5839485" cy="584775"/>
+            <a:off x="5041838" y="5734053"/>
+            <a:ext cx="5839485" cy="1077218"/>
           </a:xfrm>
           <a:prstGeom prst="rect">
             <a:avLst/>
@@ -4146,6 +4936,21 @@
             <a:spAutoFit/>
           </a:bodyPr>
           <a:lstStyle/>
+          <a:p>
+            <a:r>
+              <a:rPr lang="en-US" sz="3200" dirty="0">
+                <a:solidFill>
+                  <a:schemeClr val="bg1">
+                    <a:lumMod val="50000"/>
+                  </a:schemeClr>
+                </a:solidFill>
+                <a:latin typeface="Segoe UI" panose="020B0502040204020203" pitchFamily="34" charset="0"/>
+                <a:cs typeface="Segoe UI" panose="020B0502040204020203" pitchFamily="34" charset="0"/>
+                <a:sym typeface="Wingdings 3" panose="05040102010807070707" pitchFamily="18" charset="2"/>
+              </a:rPr>
+              <a:t>                     </a:t>
+            </a:r>
+          </a:p>
           <a:p>
             <a:r>
               <a:rPr lang="en-US" sz="3200" dirty="0">
@@ -4157,7 +4962,7 @@
                 <a:latin typeface="Segoe UI" panose="020B0502040204020203" pitchFamily="34" charset="0"/>
                 <a:cs typeface="Segoe UI" panose="020B0502040204020203" pitchFamily="34" charset="0"/>
               </a:rPr>
-              <a:t>RANGERS EXTENSION  MODEL </a:t>
+              <a:t>ENVIRONMENT TYPES</a:t>
             </a:r>
             <a:endParaRPr lang="en-CA" sz="3200" dirty="0">
               <a:solidFill>
@@ -4533,13 +5338,13 @@
           <p:nvPr/>
         </p:nvPicPr>
         <p:blipFill>
-          <a:blip r:embed="rId2">
+          <a:blip r:embed="rId3">
             <a:extLst>
               <a:ext uri="{28A0092B-C50C-407E-A947-70E740481C1C}">
                 <a14:useLocalDpi xmlns:a14="http://schemas.microsoft.com/office/drawing/2010/main" val="0"/>
               </a:ext>
               <a:ext uri="{96DAC541-7B7A-43D3-8B79-37D633B846F1}">
-                <asvg:svgBlip xmlns:asvg="http://schemas.microsoft.com/office/drawing/2016/SVG/main" r:embed="rId3"/>
+                <asvg:svgBlip xmlns:asvg="http://schemas.microsoft.com/office/drawing/2016/SVG/main" r:embed="rId4"/>
               </a:ext>
             </a:extLst>
           </a:blip>
@@ -4608,13 +5413,13 @@
           <p:nvPr/>
         </p:nvPicPr>
         <p:blipFill>
-          <a:blip r:embed="rId4">
+          <a:blip r:embed="rId5">
             <a:extLst>
               <a:ext uri="{28A0092B-C50C-407E-A947-70E740481C1C}">
                 <a14:useLocalDpi xmlns:a14="http://schemas.microsoft.com/office/drawing/2010/main" val="0"/>
               </a:ext>
               <a:ext uri="{96DAC541-7B7A-43D3-8B79-37D633B846F1}">
-                <asvg:svgBlip xmlns:asvg="http://schemas.microsoft.com/office/drawing/2016/SVG/main" r:embed="rId5"/>
+                <asvg:svgBlip xmlns:asvg="http://schemas.microsoft.com/office/drawing/2016/SVG/main" r:embed="rId6"/>
               </a:ext>
             </a:extLst>
           </a:blip>
@@ -6170,13 +6975,13 @@
           <p:nvPr/>
         </p:nvPicPr>
         <p:blipFill>
-          <a:blip r:embed="rId2">
+          <a:blip r:embed="rId3">
             <a:extLst>
               <a:ext uri="{28A0092B-C50C-407E-A947-70E740481C1C}">
                 <a14:useLocalDpi xmlns:a14="http://schemas.microsoft.com/office/drawing/2010/main" val="0"/>
               </a:ext>
               <a:ext uri="{96DAC541-7B7A-43D3-8B79-37D633B846F1}">
-                <asvg:svgBlip xmlns:asvg="http://schemas.microsoft.com/office/drawing/2016/SVG/main" r:embed="rId3"/>
+                <asvg:svgBlip xmlns:asvg="http://schemas.microsoft.com/office/drawing/2016/SVG/main" r:embed="rId4"/>
               </a:ext>
             </a:extLst>
           </a:blip>
@@ -6253,13 +7058,13 @@
           <p:nvPr/>
         </p:nvPicPr>
         <p:blipFill>
-          <a:blip r:embed="rId4">
+          <a:blip r:embed="rId5">
             <a:extLst>
               <a:ext uri="{28A0092B-C50C-407E-A947-70E740481C1C}">
                 <a14:useLocalDpi xmlns:a14="http://schemas.microsoft.com/office/drawing/2010/main" val="0"/>
               </a:ext>
               <a:ext uri="{96DAC541-7B7A-43D3-8B79-37D633B846F1}">
-                <asvg:svgBlip xmlns:asvg="http://schemas.microsoft.com/office/drawing/2016/SVG/main" r:embed="rId5"/>
+                <asvg:svgBlip xmlns:asvg="http://schemas.microsoft.com/office/drawing/2016/SVG/main" r:embed="rId6"/>
               </a:ext>
             </a:extLst>
           </a:blip>
@@ -10272,7 +11077,7 @@
             <p:nvPr/>
           </p:nvPicPr>
           <p:blipFill>
-            <a:blip r:embed="rId2">
+            <a:blip r:embed="rId3">
               <a:duotone>
                 <a:prstClr val="black"/>
                 <a:schemeClr val="tx2">
@@ -10304,7 +11109,7 @@
             <p:nvPr/>
           </p:nvPicPr>
           <p:blipFill>
-            <a:blip r:embed="rId2">
+            <a:blip r:embed="rId3">
               <a:duotone>
                 <a:prstClr val="black"/>
                 <a:schemeClr val="tx2">
@@ -10554,10 +11359,10 @@
       </p:grpSpPr>
       <p:sp>
         <p:nvSpPr>
-          <p:cNvPr id="73" name="Cylinder 72">
-            <a:extLst>
-              <a:ext uri="{FF2B5EF4-FFF2-40B4-BE49-F238E27FC236}">
-                <a16:creationId xmlns:a16="http://schemas.microsoft.com/office/drawing/2014/main" id="{4ED5EA49-6261-417A-90A2-02AF3C4B50DF}"/>
+          <p:cNvPr id="94" name="Cylinder 93">
+            <a:extLst>
+              <a:ext uri="{FF2B5EF4-FFF2-40B4-BE49-F238E27FC236}">
+                <a16:creationId xmlns:a16="http://schemas.microsoft.com/office/drawing/2014/main" id="{A0958864-8217-4156-8404-E313E3BD06F2}"/>
               </a:ext>
             </a:extLst>
           </p:cNvPr>
@@ -10566,11 +11371,13 @@
         </p:nvSpPr>
         <p:spPr>
           <a:xfrm rot="16200000">
-            <a:off x="4744223" y="-2752558"/>
-            <a:ext cx="1713652" cy="9822504"/>
+            <a:off x="4568496" y="-3523256"/>
+            <a:ext cx="1519649" cy="10369964"/>
           </a:xfrm>
           <a:prstGeom prst="can">
-            <a:avLst/>
+            <a:avLst>
+              <a:gd name="adj" fmla="val 13510"/>
+            </a:avLst>
           </a:prstGeom>
         </p:spPr>
         <p:style>
@@ -10598,6 +11405,61 @@
       </p:sp>
       <p:sp>
         <p:nvSpPr>
+          <p:cNvPr id="52" name="Right Triangle 51">
+            <a:extLst>
+              <a:ext uri="{FF2B5EF4-FFF2-40B4-BE49-F238E27FC236}">
+                <a16:creationId xmlns:a16="http://schemas.microsoft.com/office/drawing/2014/main" id="{7EEC47FB-05CD-4B35-9AE0-C2A61A013DBF}"/>
+              </a:ext>
+            </a:extLst>
+          </p:cNvPr>
+          <p:cNvSpPr/>
+          <p:nvPr/>
+        </p:nvSpPr>
+        <p:spPr>
+          <a:xfrm flipH="1">
+            <a:off x="1722681" y="2670841"/>
+            <a:ext cx="8744672" cy="2153378"/>
+          </a:xfrm>
+          <a:prstGeom prst="rtTriangle">
+            <a:avLst/>
+          </a:prstGeom>
+          <a:solidFill>
+            <a:schemeClr val="tx2">
+              <a:lumMod val="20000"/>
+              <a:lumOff val="80000"/>
+            </a:schemeClr>
+          </a:solidFill>
+          <a:ln>
+            <a:noFill/>
+          </a:ln>
+        </p:spPr>
+        <p:style>
+          <a:lnRef idx="2">
+            <a:schemeClr val="accent1">
+              <a:shade val="50000"/>
+            </a:schemeClr>
+          </a:lnRef>
+          <a:fillRef idx="1">
+            <a:schemeClr val="accent1"/>
+          </a:fillRef>
+          <a:effectRef idx="0">
+            <a:schemeClr val="accent1"/>
+          </a:effectRef>
+          <a:fontRef idx="minor">
+            <a:schemeClr val="lt1"/>
+          </a:fontRef>
+        </p:style>
+        <p:txBody>
+          <a:bodyPr rtlCol="0" anchor="ctr"/>
+          <a:lstStyle/>
+          <a:p>
+            <a:pPr algn="ctr"/>
+            <a:endParaRPr lang="en-CA"/>
+          </a:p>
+        </p:txBody>
+      </p:sp>
+      <p:sp>
+        <p:nvSpPr>
           <p:cNvPr id="2" name="Title 1">
             <a:extLst>
               <a:ext uri="{FF2B5EF4-FFF2-40B4-BE49-F238E27FC236}">
@@ -10645,13 +11507,13 @@
           <p:nvPr/>
         </p:nvPicPr>
         <p:blipFill>
-          <a:blip r:embed="rId2">
+          <a:blip r:embed="rId3">
             <a:extLst>
               <a:ext uri="{28A0092B-C50C-407E-A947-70E740481C1C}">
                 <a14:useLocalDpi xmlns:a14="http://schemas.microsoft.com/office/drawing/2010/main" val="0"/>
               </a:ext>
               <a:ext uri="{96DAC541-7B7A-43D3-8B79-37D633B846F1}">
-                <asvg:svgBlip xmlns:asvg="http://schemas.microsoft.com/office/drawing/2016/SVG/main" r:embed="rId3"/>
+                <asvg:svgBlip xmlns:asvg="http://schemas.microsoft.com/office/drawing/2016/SVG/main" r:embed="rId4"/>
               </a:ext>
             </a:extLst>
           </a:blip>
@@ -10661,7 +11523,7 @@
         </p:blipFill>
         <p:spPr>
           <a:xfrm>
-            <a:off x="3209492" y="1967671"/>
+            <a:off x="2460510" y="1466819"/>
             <a:ext cx="914400" cy="914400"/>
           </a:xfrm>
           <a:prstGeom prst="rect">
@@ -10684,13 +11546,13 @@
           <p:nvPr/>
         </p:nvPicPr>
         <p:blipFill>
-          <a:blip r:embed="rId4">
+          <a:blip r:embed="rId5">
             <a:extLst>
               <a:ext uri="{28A0092B-C50C-407E-A947-70E740481C1C}">
                 <a14:useLocalDpi xmlns:a14="http://schemas.microsoft.com/office/drawing/2010/main" val="0"/>
               </a:ext>
               <a:ext uri="{96DAC541-7B7A-43D3-8B79-37D633B846F1}">
-                <asvg:svgBlip xmlns:asvg="http://schemas.microsoft.com/office/drawing/2016/SVG/main" r:embed="rId5"/>
+                <asvg:svgBlip xmlns:asvg="http://schemas.microsoft.com/office/drawing/2016/SVG/main" r:embed="rId6"/>
               </a:ext>
             </a:extLst>
           </a:blip>
@@ -10700,7 +11562,7 @@
         </p:blipFill>
         <p:spPr>
           <a:xfrm>
-            <a:off x="1313409" y="1967671"/>
+            <a:off x="762012" y="1466819"/>
             <a:ext cx="914400" cy="914400"/>
           </a:xfrm>
           <a:prstGeom prst="rect">
@@ -10723,13 +11585,13 @@
           <p:nvPr/>
         </p:nvPicPr>
         <p:blipFill>
-          <a:blip r:embed="rId6">
+          <a:blip r:embed="rId7">
             <a:extLst>
               <a:ext uri="{28A0092B-C50C-407E-A947-70E740481C1C}">
                 <a14:useLocalDpi xmlns:a14="http://schemas.microsoft.com/office/drawing/2010/main" val="0"/>
               </a:ext>
               <a:ext uri="{96DAC541-7B7A-43D3-8B79-37D633B846F1}">
-                <asvg:svgBlip xmlns:asvg="http://schemas.microsoft.com/office/drawing/2016/SVG/main" r:embed="rId7"/>
+                <asvg:svgBlip xmlns:asvg="http://schemas.microsoft.com/office/drawing/2016/SVG/main" r:embed="rId8"/>
               </a:ext>
             </a:extLst>
           </a:blip>
@@ -10739,7 +11601,7 @@
         </p:blipFill>
         <p:spPr>
           <a:xfrm>
-            <a:off x="5191209" y="1967671"/>
+            <a:off x="4331947" y="1466819"/>
             <a:ext cx="914400" cy="914400"/>
           </a:xfrm>
           <a:prstGeom prst="rect">
@@ -10762,13 +11624,13 @@
           <p:nvPr/>
         </p:nvPicPr>
         <p:blipFill>
-          <a:blip r:embed="rId8">
+          <a:blip r:embed="rId9">
             <a:extLst>
               <a:ext uri="{28A0092B-C50C-407E-A947-70E740481C1C}">
                 <a14:useLocalDpi xmlns:a14="http://schemas.microsoft.com/office/drawing/2010/main" val="0"/>
               </a:ext>
               <a:ext uri="{96DAC541-7B7A-43D3-8B79-37D633B846F1}">
-                <asvg:svgBlip xmlns:asvg="http://schemas.microsoft.com/office/drawing/2016/SVG/main" r:embed="rId9"/>
+                <asvg:svgBlip xmlns:asvg="http://schemas.microsoft.com/office/drawing/2016/SVG/main" r:embed="rId10"/>
               </a:ext>
             </a:extLst>
           </a:blip>
@@ -10778,7 +11640,7 @@
         </p:blipFill>
         <p:spPr>
           <a:xfrm>
-            <a:off x="9264999" y="1967671"/>
+            <a:off x="8405737" y="1466819"/>
             <a:ext cx="914400" cy="914400"/>
           </a:xfrm>
           <a:prstGeom prst="rect">
@@ -10801,13 +11663,13 @@
           <p:nvPr/>
         </p:nvPicPr>
         <p:blipFill>
-          <a:blip r:embed="rId6">
+          <a:blip r:embed="rId7">
             <a:extLst>
               <a:ext uri="{28A0092B-C50C-407E-A947-70E740481C1C}">
                 <a14:useLocalDpi xmlns:a14="http://schemas.microsoft.com/office/drawing/2010/main" val="0"/>
               </a:ext>
               <a:ext uri="{96DAC541-7B7A-43D3-8B79-37D633B846F1}">
-                <asvg:svgBlip xmlns:asvg="http://schemas.microsoft.com/office/drawing/2016/SVG/main" r:embed="rId7"/>
+                <asvg:svgBlip xmlns:asvg="http://schemas.microsoft.com/office/drawing/2016/SVG/main" r:embed="rId8"/>
               </a:ext>
             </a:extLst>
           </a:blip>
@@ -10817,7 +11679,7 @@
         </p:blipFill>
         <p:spPr>
           <a:xfrm>
-            <a:off x="7230466" y="1967671"/>
+            <a:off x="6371204" y="1466819"/>
             <a:ext cx="914400" cy="914400"/>
           </a:xfrm>
           <a:prstGeom prst="rect">
@@ -10842,8 +11704,8 @@
         </p:nvCxnSpPr>
         <p:spPr>
           <a:xfrm>
-            <a:off x="2227809" y="2424871"/>
-            <a:ext cx="981683" cy="0"/>
+            <a:off x="1676412" y="1924019"/>
+            <a:ext cx="784098" cy="0"/>
           </a:xfrm>
           <a:prstGeom prst="straightConnector1">
             <a:avLst/>
@@ -10888,8 +11750,8 @@
         </p:nvCxnSpPr>
         <p:spPr>
           <a:xfrm>
-            <a:off x="4123892" y="2424871"/>
-            <a:ext cx="1067317" cy="0"/>
+            <a:off x="3374910" y="1924019"/>
+            <a:ext cx="957037" cy="0"/>
           </a:xfrm>
           <a:prstGeom prst="straightConnector1">
             <a:avLst/>
@@ -10934,7 +11796,7 @@
         </p:nvCxnSpPr>
         <p:spPr>
           <a:xfrm>
-            <a:off x="6105609" y="2424871"/>
+            <a:off x="5246347" y="1924019"/>
             <a:ext cx="1124857" cy="0"/>
           </a:xfrm>
           <a:prstGeom prst="straightConnector1">
@@ -10980,7 +11842,7 @@
         </p:nvCxnSpPr>
         <p:spPr>
           <a:xfrm>
-            <a:off x="8144866" y="2424871"/>
+            <a:off x="7285604" y="1924019"/>
             <a:ext cx="1120133" cy="0"/>
           </a:xfrm>
           <a:prstGeom prst="straightConnector1">
@@ -11023,13 +11885,13 @@
           <p:nvPr/>
         </p:nvPicPr>
         <p:blipFill>
-          <a:blip r:embed="rId10">
+          <a:blip r:embed="rId11">
             <a:extLst>
               <a:ext uri="{28A0092B-C50C-407E-A947-70E740481C1C}">
                 <a14:useLocalDpi xmlns:a14="http://schemas.microsoft.com/office/drawing/2010/main" val="0"/>
               </a:ext>
               <a:ext uri="{96DAC541-7B7A-43D3-8B79-37D633B846F1}">
-                <asvg:svgBlip xmlns:asvg="http://schemas.microsoft.com/office/drawing/2016/SVG/main" r:embed="rId11"/>
+                <asvg:svgBlip xmlns:asvg="http://schemas.microsoft.com/office/drawing/2016/SVG/main" r:embed="rId12"/>
               </a:ext>
             </a:extLst>
           </a:blip>
@@ -11039,7 +11901,7 @@
         </p:blipFill>
         <p:spPr>
           <a:xfrm>
-            <a:off x="6386560" y="1930819"/>
+            <a:off x="5527298" y="1429967"/>
             <a:ext cx="562954" cy="562954"/>
           </a:xfrm>
           <a:prstGeom prst="rect">
@@ -11062,13 +11924,13 @@
           <p:nvPr/>
         </p:nvPicPr>
         <p:blipFill>
-          <a:blip r:embed="rId10">
+          <a:blip r:embed="rId11">
             <a:extLst>
               <a:ext uri="{28A0092B-C50C-407E-A947-70E740481C1C}">
                 <a14:useLocalDpi xmlns:a14="http://schemas.microsoft.com/office/drawing/2010/main" val="0"/>
               </a:ext>
               <a:ext uri="{96DAC541-7B7A-43D3-8B79-37D633B846F1}">
-                <asvg:svgBlip xmlns:asvg="http://schemas.microsoft.com/office/drawing/2016/SVG/main" r:embed="rId11"/>
+                <asvg:svgBlip xmlns:asvg="http://schemas.microsoft.com/office/drawing/2016/SVG/main" r:embed="rId12"/>
               </a:ext>
             </a:extLst>
           </a:blip>
@@ -11078,7 +11940,7 @@
         </p:blipFill>
         <p:spPr>
           <a:xfrm>
-            <a:off x="8369144" y="1930819"/>
+            <a:off x="7509882" y="1429967"/>
             <a:ext cx="562954" cy="562954"/>
           </a:xfrm>
           <a:prstGeom prst="rect">
@@ -11100,7 +11962,7 @@
         </p:nvSpPr>
         <p:spPr>
           <a:xfrm>
-            <a:off x="1687928" y="1379310"/>
+            <a:off x="769811" y="901903"/>
             <a:ext cx="2879669" cy="369332"/>
           </a:xfrm>
           <a:prstGeom prst="rect">
@@ -11145,7 +12007,7 @@
         </p:nvSpPr>
         <p:spPr>
           <a:xfrm>
-            <a:off x="5191209" y="1366039"/>
+            <a:off x="4225151" y="937759"/>
             <a:ext cx="4561676" cy="369332"/>
           </a:xfrm>
           <a:prstGeom prst="rect">
@@ -11190,8 +12052,8 @@
         </p:nvSpPr>
         <p:spPr>
           <a:xfrm rot="16200000">
-            <a:off x="7300329" y="-819540"/>
-            <a:ext cx="151061" cy="5436619"/>
+            <a:off x="6427137" y="-1437961"/>
+            <a:ext cx="157704" cy="5678397"/>
           </a:xfrm>
           <a:prstGeom prst="rightBrace">
             <a:avLst/>
@@ -11234,8 +12096,8 @@
         </p:nvSpPr>
         <p:spPr>
           <a:xfrm rot="16200000">
-            <a:off x="2858295" y="264998"/>
-            <a:ext cx="144418" cy="3274185"/>
+            <a:off x="2079092" y="-8048"/>
+            <a:ext cx="154129" cy="2828283"/>
           </a:xfrm>
           <a:prstGeom prst="rightBrace">
             <a:avLst/>
@@ -11278,7 +12140,7 @@
         </p:nvSpPr>
         <p:spPr>
           <a:xfrm>
-            <a:off x="2270450" y="2424871"/>
+            <a:off x="1719053" y="1924019"/>
             <a:ext cx="896399" cy="369332"/>
           </a:xfrm>
           <a:prstGeom prst="rect">
@@ -11322,7 +12184,7 @@
         </p:nvSpPr>
         <p:spPr>
           <a:xfrm>
-            <a:off x="3975743" y="2465863"/>
+            <a:off x="3138594" y="1965011"/>
             <a:ext cx="1312732" cy="369332"/>
           </a:xfrm>
           <a:prstGeom prst="rect">
@@ -11366,7 +12228,7 @@
         </p:nvSpPr>
         <p:spPr>
           <a:xfrm>
-            <a:off x="6235035" y="2465863"/>
+            <a:off x="5375773" y="1965011"/>
             <a:ext cx="1000467" cy="369332"/>
           </a:xfrm>
           <a:prstGeom prst="rect">
@@ -11410,7 +12272,7 @@
         </p:nvSpPr>
         <p:spPr>
           <a:xfrm>
-            <a:off x="8207060" y="2465863"/>
+            <a:off x="7347798" y="1965011"/>
             <a:ext cx="1000467" cy="369332"/>
           </a:xfrm>
           <a:prstGeom prst="rect">
@@ -11440,44 +12302,6 @@
           </a:p>
         </p:txBody>
       </p:sp>
-      <p:pic>
-        <p:nvPicPr>
-          <p:cNvPr id="46" name="Picture 45">
-            <a:extLst>
-              <a:ext uri="{FF2B5EF4-FFF2-40B4-BE49-F238E27FC236}">
-                <a16:creationId xmlns:a16="http://schemas.microsoft.com/office/drawing/2014/main" id="{5E7715B3-A03B-4672-8FB0-5F1B410F303B}"/>
-              </a:ext>
-            </a:extLst>
-          </p:cNvPr>
-          <p:cNvPicPr>
-            <a:picLocks noChangeAspect="1"/>
-          </p:cNvPicPr>
-          <p:nvPr/>
-        </p:nvPicPr>
-        <p:blipFill>
-          <a:blip r:embed="rId12">
-            <a:duotone>
-              <a:schemeClr val="accent5">
-                <a:shade val="45000"/>
-                <a:satMod val="135000"/>
-              </a:schemeClr>
-              <a:prstClr val="white"/>
-            </a:duotone>
-          </a:blip>
-          <a:stretch>
-            <a:fillRect/>
-          </a:stretch>
-        </p:blipFill>
-        <p:spPr>
-          <a:xfrm>
-            <a:off x="8932098" y="3224337"/>
-            <a:ext cx="1580203" cy="1580203"/>
-          </a:xfrm>
-          <a:prstGeom prst="rect">
-            <a:avLst/>
-          </a:prstGeom>
-        </p:spPr>
-      </p:pic>
       <p:cxnSp>
         <p:nvCxnSpPr>
           <p:cNvPr id="48" name="Straight Arrow Connector 47">
@@ -11490,21 +12314,21 @@
           <p:cNvCxnSpPr>
             <a:cxnSpLocks/>
             <a:stCxn id="12" idx="2"/>
-            <a:endCxn id="46" idx="0"/>
+            <a:endCxn id="56" idx="0"/>
           </p:cNvCxnSpPr>
           <p:nvPr/>
         </p:nvCxnSpPr>
         <p:spPr>
           <a:xfrm>
-            <a:off x="9722199" y="2882071"/>
-            <a:ext cx="1" cy="342266"/>
+            <a:off x="8862937" y="2381219"/>
+            <a:ext cx="11159" cy="813261"/>
           </a:xfrm>
           <a:prstGeom prst="straightConnector1">
             <a:avLst/>
           </a:prstGeom>
           <a:ln w="25400">
             <a:solidFill>
-              <a:srgbClr val="C00000"/>
+              <a:schemeClr val="accent1"/>
             </a:solidFill>
             <a:prstDash val="sysDash"/>
             <a:headEnd w="lg" len="sm"/>
@@ -11537,20 +12361,22 @@
           </p:cNvPr>
           <p:cNvCxnSpPr>
             <a:cxnSpLocks/>
+            <a:stCxn id="13" idx="2"/>
+            <a:endCxn id="50" idx="0"/>
           </p:cNvCxnSpPr>
           <p:nvPr/>
         </p:nvCxnSpPr>
         <p:spPr>
           <a:xfrm>
-            <a:off x="7967663" y="2794203"/>
-            <a:ext cx="1381125" cy="858635"/>
+            <a:off x="6828404" y="2381219"/>
+            <a:ext cx="13108" cy="1326625"/>
           </a:xfrm>
           <a:prstGeom prst="straightConnector1">
             <a:avLst/>
           </a:prstGeom>
           <a:ln w="25400">
             <a:solidFill>
-              <a:srgbClr val="C00000"/>
+              <a:srgbClr val="3366CC"/>
             </a:solidFill>
             <a:prstDash val="sysDash"/>
             <a:headEnd w="lg" len="sm"/>
@@ -11583,20 +12409,22 @@
           </p:cNvPr>
           <p:cNvCxnSpPr>
             <a:cxnSpLocks/>
+            <a:stCxn id="10" idx="2"/>
+            <a:endCxn id="55" idx="0"/>
           </p:cNvCxnSpPr>
           <p:nvPr/>
         </p:nvCxnSpPr>
         <p:spPr>
           <a:xfrm>
-            <a:off x="5867400" y="2767138"/>
-            <a:ext cx="3609975" cy="1157162"/>
+            <a:off x="4789147" y="2381219"/>
+            <a:ext cx="12172" cy="1887550"/>
           </a:xfrm>
           <a:prstGeom prst="straightConnector1">
             <a:avLst/>
           </a:prstGeom>
           <a:ln w="25400">
             <a:solidFill>
-              <a:srgbClr val="C00000"/>
+              <a:schemeClr val="tx1"/>
             </a:solidFill>
             <a:prstDash val="sysDash"/>
             <a:headEnd w="lg" len="sm"/>
@@ -11632,7 +12460,7 @@
         </p:nvSpPr>
         <p:spPr>
           <a:xfrm>
-            <a:off x="787024" y="3038854"/>
+            <a:off x="152796" y="2431120"/>
             <a:ext cx="1085320" cy="369332"/>
           </a:xfrm>
           <a:prstGeom prst="rect">
@@ -11654,6 +12482,708 @@
                 </a:solidFill>
               </a:rPr>
               <a:t>PIPELINE</a:t>
+            </a:r>
+            <a:endParaRPr lang="en-CA" dirty="0">
+              <a:solidFill>
+                <a:schemeClr val="accent5"/>
+              </a:solidFill>
+            </a:endParaRPr>
+          </a:p>
+        </p:txBody>
+      </p:sp>
+      <p:cxnSp>
+        <p:nvCxnSpPr>
+          <p:cNvPr id="57" name="Straight Connector 56">
+            <a:extLst>
+              <a:ext uri="{FF2B5EF4-FFF2-40B4-BE49-F238E27FC236}">
+                <a16:creationId xmlns:a16="http://schemas.microsoft.com/office/drawing/2014/main" id="{A2E57009-F88B-412B-890D-C7F6065077AE}"/>
+              </a:ext>
+            </a:extLst>
+          </p:cNvPr>
+          <p:cNvCxnSpPr>
+            <a:cxnSpLocks/>
+          </p:cNvCxnSpPr>
+          <p:nvPr/>
+        </p:nvCxnSpPr>
+        <p:spPr>
+          <a:xfrm flipH="1" flipV="1">
+            <a:off x="1769065" y="4268769"/>
+            <a:ext cx="8698289" cy="22938"/>
+          </a:xfrm>
+          <a:prstGeom prst="line">
+            <a:avLst/>
+          </a:prstGeom>
+          <a:ln/>
+        </p:spPr>
+        <p:style>
+          <a:lnRef idx="1">
+            <a:schemeClr val="accent3"/>
+          </a:lnRef>
+          <a:fillRef idx="0">
+            <a:schemeClr val="accent3"/>
+          </a:fillRef>
+          <a:effectRef idx="0">
+            <a:schemeClr val="accent3"/>
+          </a:effectRef>
+          <a:fontRef idx="minor">
+            <a:schemeClr val="tx1"/>
+          </a:fontRef>
+        </p:style>
+      </p:cxnSp>
+      <p:cxnSp>
+        <p:nvCxnSpPr>
+          <p:cNvPr id="61" name="Straight Connector 60">
+            <a:extLst>
+              <a:ext uri="{FF2B5EF4-FFF2-40B4-BE49-F238E27FC236}">
+                <a16:creationId xmlns:a16="http://schemas.microsoft.com/office/drawing/2014/main" id="{AC56B326-4519-482A-9F9A-93BC826B9AB3}"/>
+              </a:ext>
+            </a:extLst>
+          </p:cNvPr>
+          <p:cNvCxnSpPr>
+            <a:cxnSpLocks/>
+          </p:cNvCxnSpPr>
+          <p:nvPr/>
+        </p:nvCxnSpPr>
+        <p:spPr>
+          <a:xfrm flipH="1">
+            <a:off x="1757191" y="3707844"/>
+            <a:ext cx="8710162" cy="0"/>
+          </a:xfrm>
+          <a:prstGeom prst="line">
+            <a:avLst/>
+          </a:prstGeom>
+          <a:ln/>
+        </p:spPr>
+        <p:style>
+          <a:lnRef idx="1">
+            <a:schemeClr val="accent3"/>
+          </a:lnRef>
+          <a:fillRef idx="0">
+            <a:schemeClr val="accent3"/>
+          </a:fillRef>
+          <a:effectRef idx="0">
+            <a:schemeClr val="accent3"/>
+          </a:effectRef>
+          <a:fontRef idx="minor">
+            <a:schemeClr val="tx1"/>
+          </a:fontRef>
+        </p:style>
+      </p:cxnSp>
+      <p:cxnSp>
+        <p:nvCxnSpPr>
+          <p:cNvPr id="64" name="Straight Connector 63">
+            <a:extLst>
+              <a:ext uri="{FF2B5EF4-FFF2-40B4-BE49-F238E27FC236}">
+                <a16:creationId xmlns:a16="http://schemas.microsoft.com/office/drawing/2014/main" id="{C0EF3E87-77F2-46B0-A6F1-45E6F71A5D57}"/>
+              </a:ext>
+            </a:extLst>
+          </p:cNvPr>
+          <p:cNvCxnSpPr>
+            <a:cxnSpLocks/>
+            <a:endCxn id="82" idx="0"/>
+          </p:cNvCxnSpPr>
+          <p:nvPr/>
+        </p:nvCxnSpPr>
+        <p:spPr>
+          <a:xfrm flipH="1">
+            <a:off x="1770603" y="3194481"/>
+            <a:ext cx="8696750" cy="2475"/>
+          </a:xfrm>
+          <a:prstGeom prst="line">
+            <a:avLst/>
+          </a:prstGeom>
+          <a:ln/>
+        </p:spPr>
+        <p:style>
+          <a:lnRef idx="1">
+            <a:schemeClr val="accent3"/>
+          </a:lnRef>
+          <a:fillRef idx="0">
+            <a:schemeClr val="accent3"/>
+          </a:fillRef>
+          <a:effectRef idx="0">
+            <a:schemeClr val="accent3"/>
+          </a:effectRef>
+          <a:fontRef idx="minor">
+            <a:schemeClr val="tx1"/>
+          </a:fontRef>
+        </p:style>
+      </p:cxnSp>
+      <p:sp>
+        <p:nvSpPr>
+          <p:cNvPr id="50" name="Rectangle: Rounded Corners 49">
+            <a:extLst>
+              <a:ext uri="{FF2B5EF4-FFF2-40B4-BE49-F238E27FC236}">
+                <a16:creationId xmlns:a16="http://schemas.microsoft.com/office/drawing/2014/main" id="{9C5E88E7-C695-4FB5-A7D9-97F0FC51FB29}"/>
+              </a:ext>
+            </a:extLst>
+          </p:cNvPr>
+          <p:cNvSpPr/>
+          <p:nvPr/>
+        </p:nvSpPr>
+        <p:spPr>
+          <a:xfrm>
+            <a:off x="6199666" y="3707844"/>
+            <a:ext cx="1283691" cy="1121851"/>
+          </a:xfrm>
+          <a:prstGeom prst="roundRect">
+            <a:avLst/>
+          </a:prstGeom>
+          <a:solidFill>
+            <a:srgbClr val="3366CC"/>
+          </a:solidFill>
+          <a:ln>
+            <a:noFill/>
+          </a:ln>
+        </p:spPr>
+        <p:style>
+          <a:lnRef idx="2">
+            <a:schemeClr val="accent1">
+              <a:shade val="50000"/>
+            </a:schemeClr>
+          </a:lnRef>
+          <a:fillRef idx="1">
+            <a:schemeClr val="accent1"/>
+          </a:fillRef>
+          <a:effectRef idx="0">
+            <a:schemeClr val="accent1"/>
+          </a:effectRef>
+          <a:fontRef idx="minor">
+            <a:schemeClr val="lt1"/>
+          </a:fontRef>
+        </p:style>
+        <p:txBody>
+          <a:bodyPr rtlCol="0" anchor="ctr"/>
+          <a:lstStyle/>
+          <a:p>
+            <a:pPr algn="ctr"/>
+            <a:r>
+              <a:rPr lang="en-US" dirty="0"/>
+              <a:t>BETA</a:t>
+            </a:r>
+            <a:endParaRPr lang="en-CA" dirty="0"/>
+          </a:p>
+        </p:txBody>
+      </p:sp>
+      <p:sp>
+        <p:nvSpPr>
+          <p:cNvPr id="55" name="Rectangle: Rounded Corners 54">
+            <a:extLst>
+              <a:ext uri="{FF2B5EF4-FFF2-40B4-BE49-F238E27FC236}">
+                <a16:creationId xmlns:a16="http://schemas.microsoft.com/office/drawing/2014/main" id="{288E7A8A-C49F-4AB8-B6C8-BEEF8A4FC830}"/>
+              </a:ext>
+            </a:extLst>
+          </p:cNvPr>
+          <p:cNvSpPr/>
+          <p:nvPr/>
+        </p:nvSpPr>
+        <p:spPr>
+          <a:xfrm>
+            <a:off x="4159473" y="4268769"/>
+            <a:ext cx="1283691" cy="555450"/>
+          </a:xfrm>
+          <a:prstGeom prst="roundRect">
+            <a:avLst/>
+          </a:prstGeom>
+          <a:solidFill>
+            <a:schemeClr val="tx1"/>
+          </a:solidFill>
+          <a:ln>
+            <a:noFill/>
+          </a:ln>
+        </p:spPr>
+        <p:style>
+          <a:lnRef idx="2">
+            <a:schemeClr val="accent1">
+              <a:shade val="50000"/>
+            </a:schemeClr>
+          </a:lnRef>
+          <a:fillRef idx="1">
+            <a:schemeClr val="accent1"/>
+          </a:fillRef>
+          <a:effectRef idx="0">
+            <a:schemeClr val="accent1"/>
+          </a:effectRef>
+          <a:fontRef idx="minor">
+            <a:schemeClr val="lt1"/>
+          </a:fontRef>
+        </p:style>
+        <p:txBody>
+          <a:bodyPr rtlCol="0" anchor="ctr"/>
+          <a:lstStyle/>
+          <a:p>
+            <a:pPr algn="ctr"/>
+            <a:r>
+              <a:rPr lang="en-US" dirty="0"/>
+              <a:t>DEV</a:t>
+            </a:r>
+            <a:endParaRPr lang="en-CA" dirty="0"/>
+          </a:p>
+        </p:txBody>
+      </p:sp>
+      <p:sp>
+        <p:nvSpPr>
+          <p:cNvPr id="56" name="Rectangle: Rounded Corners 55">
+            <a:extLst>
+              <a:ext uri="{FF2B5EF4-FFF2-40B4-BE49-F238E27FC236}">
+                <a16:creationId xmlns:a16="http://schemas.microsoft.com/office/drawing/2014/main" id="{D682599B-F71F-4935-8D54-65112F594AC7}"/>
+              </a:ext>
+            </a:extLst>
+          </p:cNvPr>
+          <p:cNvSpPr/>
+          <p:nvPr/>
+        </p:nvSpPr>
+        <p:spPr>
+          <a:xfrm>
+            <a:off x="8232250" y="3194480"/>
+            <a:ext cx="1283691" cy="1643019"/>
+          </a:xfrm>
+          <a:prstGeom prst="roundRect">
+            <a:avLst/>
+          </a:prstGeom>
+          <a:ln>
+            <a:noFill/>
+          </a:ln>
+        </p:spPr>
+        <p:style>
+          <a:lnRef idx="2">
+            <a:schemeClr val="accent1">
+              <a:shade val="50000"/>
+            </a:schemeClr>
+          </a:lnRef>
+          <a:fillRef idx="1">
+            <a:schemeClr val="accent1"/>
+          </a:fillRef>
+          <a:effectRef idx="0">
+            <a:schemeClr val="accent1"/>
+          </a:effectRef>
+          <a:fontRef idx="minor">
+            <a:schemeClr val="lt1"/>
+          </a:fontRef>
+        </p:style>
+        <p:txBody>
+          <a:bodyPr rtlCol="0" anchor="ctr"/>
+          <a:lstStyle/>
+          <a:p>
+            <a:pPr algn="ctr"/>
+            <a:r>
+              <a:rPr lang="en-US" dirty="0"/>
+              <a:t>PROD</a:t>
+            </a:r>
+            <a:endParaRPr lang="en-CA" dirty="0"/>
+          </a:p>
+        </p:txBody>
+      </p:sp>
+      <p:sp>
+        <p:nvSpPr>
+          <p:cNvPr id="76" name="Arrow: Right 75">
+            <a:extLst>
+              <a:ext uri="{FF2B5EF4-FFF2-40B4-BE49-F238E27FC236}">
+                <a16:creationId xmlns:a16="http://schemas.microsoft.com/office/drawing/2014/main" id="{001D007F-B636-4968-956F-E7E0899B39AC}"/>
+              </a:ext>
+            </a:extLst>
+          </p:cNvPr>
+          <p:cNvSpPr/>
+          <p:nvPr/>
+        </p:nvSpPr>
+        <p:spPr>
+          <a:xfrm>
+            <a:off x="5606958" y="4398678"/>
+            <a:ext cx="436523" cy="330839"/>
+          </a:xfrm>
+          <a:prstGeom prst="rightArrow">
+            <a:avLst/>
+          </a:prstGeom>
+          <a:solidFill>
+            <a:schemeClr val="bg1"/>
+          </a:solidFill>
+          <a:ln>
+            <a:noFill/>
+          </a:ln>
+        </p:spPr>
+        <p:style>
+          <a:lnRef idx="2">
+            <a:schemeClr val="accent1">
+              <a:shade val="50000"/>
+            </a:schemeClr>
+          </a:lnRef>
+          <a:fillRef idx="1">
+            <a:schemeClr val="accent1"/>
+          </a:fillRef>
+          <a:effectRef idx="0">
+            <a:schemeClr val="accent1"/>
+          </a:effectRef>
+          <a:fontRef idx="minor">
+            <a:schemeClr val="lt1"/>
+          </a:fontRef>
+        </p:style>
+        <p:txBody>
+          <a:bodyPr rtlCol="0" anchor="ctr"/>
+          <a:lstStyle/>
+          <a:p>
+            <a:pPr algn="ctr"/>
+            <a:endParaRPr lang="en-CA"/>
+          </a:p>
+        </p:txBody>
+      </p:sp>
+      <p:sp>
+        <p:nvSpPr>
+          <p:cNvPr id="77" name="Arrow: Right 76">
+            <a:extLst>
+              <a:ext uri="{FF2B5EF4-FFF2-40B4-BE49-F238E27FC236}">
+                <a16:creationId xmlns:a16="http://schemas.microsoft.com/office/drawing/2014/main" id="{2D7D67BC-E51A-4BF7-975B-0950EF02E4AC}"/>
+              </a:ext>
+            </a:extLst>
+          </p:cNvPr>
+          <p:cNvSpPr/>
+          <p:nvPr/>
+        </p:nvSpPr>
+        <p:spPr>
+          <a:xfrm>
+            <a:off x="7672334" y="4402847"/>
+            <a:ext cx="436523" cy="330839"/>
+          </a:xfrm>
+          <a:prstGeom prst="rightArrow">
+            <a:avLst/>
+          </a:prstGeom>
+          <a:solidFill>
+            <a:schemeClr val="bg1"/>
+          </a:solidFill>
+          <a:ln>
+            <a:noFill/>
+          </a:ln>
+        </p:spPr>
+        <p:style>
+          <a:lnRef idx="2">
+            <a:schemeClr val="accent1">
+              <a:shade val="50000"/>
+            </a:schemeClr>
+          </a:lnRef>
+          <a:fillRef idx="1">
+            <a:schemeClr val="accent1"/>
+          </a:fillRef>
+          <a:effectRef idx="0">
+            <a:schemeClr val="accent1"/>
+          </a:effectRef>
+          <a:fontRef idx="minor">
+            <a:schemeClr val="lt1"/>
+          </a:fontRef>
+        </p:style>
+        <p:txBody>
+          <a:bodyPr rtlCol="0" anchor="ctr"/>
+          <a:lstStyle/>
+          <a:p>
+            <a:pPr algn="ctr"/>
+            <a:endParaRPr lang="en-CA"/>
+          </a:p>
+        </p:txBody>
+      </p:sp>
+      <p:sp>
+        <p:nvSpPr>
+          <p:cNvPr id="78" name="Rectangle: Rounded Corners 77">
+            <a:extLst>
+              <a:ext uri="{FF2B5EF4-FFF2-40B4-BE49-F238E27FC236}">
+                <a16:creationId xmlns:a16="http://schemas.microsoft.com/office/drawing/2014/main" id="{4E00C7DC-E618-4BC7-9320-DC58F1FFD931}"/>
+              </a:ext>
+            </a:extLst>
+          </p:cNvPr>
+          <p:cNvSpPr/>
+          <p:nvPr/>
+        </p:nvSpPr>
+        <p:spPr>
+          <a:xfrm>
+            <a:off x="3850589" y="2787849"/>
+            <a:ext cx="6033202" cy="2133369"/>
+          </a:xfrm>
+          <a:prstGeom prst="roundRect">
+            <a:avLst>
+              <a:gd name="adj" fmla="val 3973"/>
+            </a:avLst>
+          </a:prstGeom>
+          <a:noFill/>
+          <a:ln>
+            <a:solidFill>
+              <a:srgbClr val="C00000"/>
+            </a:solidFill>
+          </a:ln>
+        </p:spPr>
+        <p:style>
+          <a:lnRef idx="2">
+            <a:schemeClr val="accent1">
+              <a:shade val="50000"/>
+            </a:schemeClr>
+          </a:lnRef>
+          <a:fillRef idx="1">
+            <a:schemeClr val="accent1"/>
+          </a:fillRef>
+          <a:effectRef idx="0">
+            <a:schemeClr val="accent1"/>
+          </a:effectRef>
+          <a:fontRef idx="minor">
+            <a:schemeClr val="lt1"/>
+          </a:fontRef>
+        </p:style>
+        <p:txBody>
+          <a:bodyPr rtlCol="0" anchor="ctr"/>
+          <a:lstStyle/>
+          <a:p>
+            <a:pPr algn="ctr"/>
+            <a:endParaRPr lang="en-CA"/>
+          </a:p>
+        </p:txBody>
+      </p:sp>
+      <p:pic>
+        <p:nvPicPr>
+          <p:cNvPr id="82" name="Picture 81">
+            <a:extLst>
+              <a:ext uri="{FF2B5EF4-FFF2-40B4-BE49-F238E27FC236}">
+                <a16:creationId xmlns:a16="http://schemas.microsoft.com/office/drawing/2014/main" id="{A3998AF7-CB7B-4D21-9067-337AC1620989}"/>
+              </a:ext>
+            </a:extLst>
+          </p:cNvPr>
+          <p:cNvPicPr>
+            <a:picLocks noChangeAspect="1"/>
+          </p:cNvPicPr>
+          <p:nvPr/>
+        </p:nvPicPr>
+        <p:blipFill>
+          <a:blip r:embed="rId13"/>
+          <a:stretch>
+            <a:fillRect/>
+          </a:stretch>
+        </p:blipFill>
+        <p:spPr>
+          <a:xfrm>
+            <a:off x="143340" y="3196956"/>
+            <a:ext cx="3254525" cy="3254525"/>
+          </a:xfrm>
+          <a:prstGeom prst="rect">
+            <a:avLst/>
+          </a:prstGeom>
+        </p:spPr>
+      </p:pic>
+      <p:sp>
+        <p:nvSpPr>
+          <p:cNvPr id="91" name="TextBox 90">
+            <a:extLst>
+              <a:ext uri="{FF2B5EF4-FFF2-40B4-BE49-F238E27FC236}">
+                <a16:creationId xmlns:a16="http://schemas.microsoft.com/office/drawing/2014/main" id="{8CE76E01-13D9-46C7-94CB-E064263B7654}"/>
+              </a:ext>
+            </a:extLst>
+          </p:cNvPr>
+          <p:cNvSpPr txBox="1"/>
+          <p:nvPr/>
+        </p:nvSpPr>
+        <p:spPr>
+          <a:xfrm>
+            <a:off x="6085707" y="4918529"/>
+            <a:ext cx="1562966" cy="369332"/>
+          </a:xfrm>
+          <a:prstGeom prst="rect">
+            <a:avLst/>
+          </a:prstGeom>
+          <a:noFill/>
+        </p:spPr>
+        <p:txBody>
+          <a:bodyPr wrap="square" rtlCol="0">
+            <a:spAutoFit/>
+          </a:bodyPr>
+          <a:lstStyle/>
+          <a:p>
+            <a:pPr algn="ctr"/>
+            <a:r>
+              <a:rPr lang="en-US" dirty="0">
+                <a:solidFill>
+                  <a:schemeClr val="accent5"/>
+                </a:solidFill>
+              </a:rPr>
+              <a:t>PRODUCTION</a:t>
+            </a:r>
+            <a:endParaRPr lang="en-CA" dirty="0">
+              <a:solidFill>
+                <a:schemeClr val="accent5"/>
+              </a:solidFill>
+            </a:endParaRPr>
+          </a:p>
+        </p:txBody>
+      </p:sp>
+      <p:sp>
+        <p:nvSpPr>
+          <p:cNvPr id="92" name="Right Brace 91">
+            <a:extLst>
+              <a:ext uri="{FF2B5EF4-FFF2-40B4-BE49-F238E27FC236}">
+                <a16:creationId xmlns:a16="http://schemas.microsoft.com/office/drawing/2014/main" id="{EBE17CC5-8068-4094-9C19-A80C42D31655}"/>
+              </a:ext>
+            </a:extLst>
+          </p:cNvPr>
+          <p:cNvSpPr/>
+          <p:nvPr/>
+        </p:nvSpPr>
+        <p:spPr>
+          <a:xfrm>
+            <a:off x="10571790" y="2670841"/>
+            <a:ext cx="51792" cy="2166658"/>
+          </a:xfrm>
+          <a:prstGeom prst="rightBrace">
+            <a:avLst/>
+          </a:prstGeom>
+        </p:spPr>
+        <p:style>
+          <a:lnRef idx="1">
+            <a:schemeClr val="accent1"/>
+          </a:lnRef>
+          <a:fillRef idx="0">
+            <a:schemeClr val="accent1"/>
+          </a:fillRef>
+          <a:effectRef idx="0">
+            <a:schemeClr val="accent1"/>
+          </a:effectRef>
+          <a:fontRef idx="minor">
+            <a:schemeClr val="tx1"/>
+          </a:fontRef>
+        </p:style>
+        <p:txBody>
+          <a:bodyPr rtlCol="0" anchor="ctr"/>
+          <a:lstStyle/>
+          <a:p>
+            <a:pPr algn="ctr"/>
+            <a:endParaRPr lang="en-CA"/>
+          </a:p>
+        </p:txBody>
+      </p:sp>
+      <p:sp>
+        <p:nvSpPr>
+          <p:cNvPr id="95" name="TextBox 94">
+            <a:extLst>
+              <a:ext uri="{FF2B5EF4-FFF2-40B4-BE49-F238E27FC236}">
+                <a16:creationId xmlns:a16="http://schemas.microsoft.com/office/drawing/2014/main" id="{5F8DAC43-CA3B-4540-9A63-D2064FB521AE}"/>
+              </a:ext>
+            </a:extLst>
+          </p:cNvPr>
+          <p:cNvSpPr txBox="1"/>
+          <p:nvPr/>
+        </p:nvSpPr>
+        <p:spPr>
+          <a:xfrm rot="16200000">
+            <a:off x="9911910" y="3510267"/>
+            <a:ext cx="1858173" cy="369332"/>
+          </a:xfrm>
+          <a:prstGeom prst="rect">
+            <a:avLst/>
+          </a:prstGeom>
+          <a:noFill/>
+        </p:spPr>
+        <p:txBody>
+          <a:bodyPr wrap="square" rtlCol="0">
+            <a:spAutoFit/>
+          </a:bodyPr>
+          <a:lstStyle/>
+          <a:p>
+            <a:pPr algn="ctr"/>
+            <a:r>
+              <a:rPr lang="en-US" dirty="0">
+                <a:solidFill>
+                  <a:schemeClr val="accent5"/>
+                </a:solidFill>
+              </a:rPr>
+              <a:t>IMPACT RADIUS</a:t>
+            </a:r>
+            <a:endParaRPr lang="en-CA" dirty="0">
+              <a:solidFill>
+                <a:schemeClr val="accent5"/>
+              </a:solidFill>
+            </a:endParaRPr>
+          </a:p>
+        </p:txBody>
+      </p:sp>
+      <p:sp>
+        <p:nvSpPr>
+          <p:cNvPr id="3" name="Rectangle 2">
+            <a:extLst>
+              <a:ext uri="{FF2B5EF4-FFF2-40B4-BE49-F238E27FC236}">
+                <a16:creationId xmlns:a16="http://schemas.microsoft.com/office/drawing/2014/main" id="{7916D823-0B55-454F-A33D-CC568DAAD096}"/>
+              </a:ext>
+            </a:extLst>
+          </p:cNvPr>
+          <p:cNvSpPr/>
+          <p:nvPr/>
+        </p:nvSpPr>
+        <p:spPr>
+          <a:xfrm>
+            <a:off x="81144" y="4831393"/>
+            <a:ext cx="3582521" cy="1757239"/>
+          </a:xfrm>
+          <a:prstGeom prst="rect">
+            <a:avLst/>
+          </a:prstGeom>
+          <a:solidFill>
+            <a:schemeClr val="bg1"/>
+          </a:solidFill>
+          <a:ln>
+            <a:noFill/>
+          </a:ln>
+        </p:spPr>
+        <p:style>
+          <a:lnRef idx="2">
+            <a:schemeClr val="accent1">
+              <a:shade val="50000"/>
+            </a:schemeClr>
+          </a:lnRef>
+          <a:fillRef idx="1">
+            <a:schemeClr val="accent1"/>
+          </a:fillRef>
+          <a:effectRef idx="0">
+            <a:schemeClr val="accent1"/>
+          </a:effectRef>
+          <a:fontRef idx="minor">
+            <a:schemeClr val="lt1"/>
+          </a:fontRef>
+        </p:style>
+        <p:txBody>
+          <a:bodyPr rtlCol="0" anchor="ctr"/>
+          <a:lstStyle/>
+          <a:p>
+            <a:pPr algn="ctr"/>
+            <a:endParaRPr lang="en-CA"/>
+          </a:p>
+        </p:txBody>
+      </p:sp>
+      <p:sp>
+        <p:nvSpPr>
+          <p:cNvPr id="93" name="TextBox 92">
+            <a:extLst>
+              <a:ext uri="{FF2B5EF4-FFF2-40B4-BE49-F238E27FC236}">
+                <a16:creationId xmlns:a16="http://schemas.microsoft.com/office/drawing/2014/main" id="{BA66B829-BAF5-47A7-88EE-09F6A035853E}"/>
+              </a:ext>
+            </a:extLst>
+          </p:cNvPr>
+          <p:cNvSpPr txBox="1"/>
+          <p:nvPr/>
+        </p:nvSpPr>
+        <p:spPr>
+          <a:xfrm>
+            <a:off x="987582" y="4888843"/>
+            <a:ext cx="1562966" cy="369332"/>
+          </a:xfrm>
+          <a:prstGeom prst="rect">
+            <a:avLst/>
+          </a:prstGeom>
+          <a:noFill/>
+        </p:spPr>
+        <p:txBody>
+          <a:bodyPr wrap="square" rtlCol="0">
+            <a:spAutoFit/>
+          </a:bodyPr>
+          <a:lstStyle/>
+          <a:p>
+            <a:pPr algn="ctr"/>
+            <a:r>
+              <a:rPr lang="en-US" dirty="0">
+                <a:solidFill>
+                  <a:schemeClr val="accent5"/>
+                </a:solidFill>
+              </a:rPr>
+              <a:t>RINGS</a:t>
             </a:r>
             <a:endParaRPr lang="en-CA" dirty="0">
               <a:solidFill>
@@ -11781,13 +13311,13 @@
           <p:nvPr/>
         </p:nvPicPr>
         <p:blipFill>
-          <a:blip r:embed="rId2">
+          <a:blip r:embed="rId3">
             <a:extLst>
               <a:ext uri="{28A0092B-C50C-407E-A947-70E740481C1C}">
                 <a14:useLocalDpi xmlns:a14="http://schemas.microsoft.com/office/drawing/2010/main" val="0"/>
               </a:ext>
               <a:ext uri="{96DAC541-7B7A-43D3-8B79-37D633B846F1}">
-                <asvg:svgBlip xmlns:asvg="http://schemas.microsoft.com/office/drawing/2016/SVG/main" r:embed="rId3"/>
+                <asvg:svgBlip xmlns:asvg="http://schemas.microsoft.com/office/drawing/2016/SVG/main" r:embed="rId4"/>
               </a:ext>
             </a:extLst>
           </a:blip>
@@ -11820,13 +13350,13 @@
           <p:nvPr/>
         </p:nvPicPr>
         <p:blipFill>
-          <a:blip r:embed="rId4">
+          <a:blip r:embed="rId5">
             <a:extLst>
               <a:ext uri="{28A0092B-C50C-407E-A947-70E740481C1C}">
                 <a14:useLocalDpi xmlns:a14="http://schemas.microsoft.com/office/drawing/2010/main" val="0"/>
               </a:ext>
               <a:ext uri="{96DAC541-7B7A-43D3-8B79-37D633B846F1}">
-                <asvg:svgBlip xmlns:asvg="http://schemas.microsoft.com/office/drawing/2016/SVG/main" r:embed="rId5"/>
+                <asvg:svgBlip xmlns:asvg="http://schemas.microsoft.com/office/drawing/2016/SVG/main" r:embed="rId6"/>
               </a:ext>
             </a:extLst>
           </a:blip>
@@ -11859,13 +13389,13 @@
           <p:nvPr/>
         </p:nvPicPr>
         <p:blipFill>
-          <a:blip r:embed="rId6">
+          <a:blip r:embed="rId7">
             <a:extLst>
               <a:ext uri="{28A0092B-C50C-407E-A947-70E740481C1C}">
                 <a14:useLocalDpi xmlns:a14="http://schemas.microsoft.com/office/drawing/2010/main" val="0"/>
               </a:ext>
               <a:ext uri="{96DAC541-7B7A-43D3-8B79-37D633B846F1}">
-                <asvg:svgBlip xmlns:asvg="http://schemas.microsoft.com/office/drawing/2016/SVG/main" r:embed="rId7"/>
+                <asvg:svgBlip xmlns:asvg="http://schemas.microsoft.com/office/drawing/2016/SVG/main" r:embed="rId8"/>
               </a:ext>
             </a:extLst>
           </a:blip>
@@ -11898,13 +13428,13 @@
           <p:nvPr/>
         </p:nvPicPr>
         <p:blipFill>
-          <a:blip r:embed="rId8">
+          <a:blip r:embed="rId9">
             <a:extLst>
               <a:ext uri="{28A0092B-C50C-407E-A947-70E740481C1C}">
                 <a14:useLocalDpi xmlns:a14="http://schemas.microsoft.com/office/drawing/2010/main" val="0"/>
               </a:ext>
               <a:ext uri="{96DAC541-7B7A-43D3-8B79-37D633B846F1}">
-                <asvg:svgBlip xmlns:asvg="http://schemas.microsoft.com/office/drawing/2016/SVG/main" r:embed="rId9"/>
+                <asvg:svgBlip xmlns:asvg="http://schemas.microsoft.com/office/drawing/2016/SVG/main" r:embed="rId10"/>
               </a:ext>
             </a:extLst>
           </a:blip>
@@ -12290,13 +13820,13 @@
           <p:nvPr/>
         </p:nvPicPr>
         <p:blipFill>
-          <a:blip r:embed="rId10">
+          <a:blip r:embed="rId11">
             <a:extLst>
               <a:ext uri="{28A0092B-C50C-407E-A947-70E740481C1C}">
                 <a14:useLocalDpi xmlns:a14="http://schemas.microsoft.com/office/drawing/2010/main" val="0"/>
               </a:ext>
               <a:ext uri="{96DAC541-7B7A-43D3-8B79-37D633B846F1}">
-                <asvg:svgBlip xmlns:asvg="http://schemas.microsoft.com/office/drawing/2016/SVG/main" r:embed="rId11"/>
+                <asvg:svgBlip xmlns:asvg="http://schemas.microsoft.com/office/drawing/2016/SVG/main" r:embed="rId12"/>
               </a:ext>
             </a:extLst>
           </a:blip>
@@ -12329,13 +13859,13 @@
           <p:nvPr/>
         </p:nvPicPr>
         <p:blipFill>
-          <a:blip r:embed="rId12">
+          <a:blip r:embed="rId13">
             <a:extLst>
               <a:ext uri="{28A0092B-C50C-407E-A947-70E740481C1C}">
                 <a14:useLocalDpi xmlns:a14="http://schemas.microsoft.com/office/drawing/2010/main" val="0"/>
               </a:ext>
               <a:ext uri="{96DAC541-7B7A-43D3-8B79-37D633B846F1}">
-                <asvg:svgBlip xmlns:asvg="http://schemas.microsoft.com/office/drawing/2016/SVG/main" r:embed="rId13"/>
+                <asvg:svgBlip xmlns:asvg="http://schemas.microsoft.com/office/drawing/2016/SVG/main" r:embed="rId14"/>
               </a:ext>
             </a:extLst>
           </a:blip>
@@ -12695,13 +14225,13 @@
           <p:nvPr/>
         </p:nvPicPr>
         <p:blipFill>
-          <a:blip r:embed="rId2">
+          <a:blip r:embed="rId3">
             <a:extLst>
               <a:ext uri="{28A0092B-C50C-407E-A947-70E740481C1C}">
                 <a14:useLocalDpi xmlns:a14="http://schemas.microsoft.com/office/drawing/2010/main" val="0"/>
               </a:ext>
               <a:ext uri="{96DAC541-7B7A-43D3-8B79-37D633B846F1}">
-                <asvg:svgBlip xmlns:asvg="http://schemas.microsoft.com/office/drawing/2016/SVG/main" r:embed="rId3"/>
+                <asvg:svgBlip xmlns:asvg="http://schemas.microsoft.com/office/drawing/2016/SVG/main" r:embed="rId4"/>
               </a:ext>
             </a:extLst>
           </a:blip>
@@ -12734,13 +14264,13 @@
           <p:nvPr/>
         </p:nvPicPr>
         <p:blipFill>
-          <a:blip r:embed="rId4">
+          <a:blip r:embed="rId5">
             <a:extLst>
               <a:ext uri="{28A0092B-C50C-407E-A947-70E740481C1C}">
                 <a14:useLocalDpi xmlns:a14="http://schemas.microsoft.com/office/drawing/2010/main" val="0"/>
               </a:ext>
               <a:ext uri="{96DAC541-7B7A-43D3-8B79-37D633B846F1}">
-                <asvg:svgBlip xmlns:asvg="http://schemas.microsoft.com/office/drawing/2016/SVG/main" r:embed="rId5"/>
+                <asvg:svgBlip xmlns:asvg="http://schemas.microsoft.com/office/drawing/2016/SVG/main" r:embed="rId6"/>
               </a:ext>
             </a:extLst>
           </a:blip>
@@ -12773,13 +14303,13 @@
           <p:nvPr/>
         </p:nvPicPr>
         <p:blipFill>
-          <a:blip r:embed="rId6">
+          <a:blip r:embed="rId7">
             <a:extLst>
               <a:ext uri="{28A0092B-C50C-407E-A947-70E740481C1C}">
                 <a14:useLocalDpi xmlns:a14="http://schemas.microsoft.com/office/drawing/2010/main" val="0"/>
               </a:ext>
               <a:ext uri="{96DAC541-7B7A-43D3-8B79-37D633B846F1}">
-                <asvg:svgBlip xmlns:asvg="http://schemas.microsoft.com/office/drawing/2016/SVG/main" r:embed="rId7"/>
+                <asvg:svgBlip xmlns:asvg="http://schemas.microsoft.com/office/drawing/2016/SVG/main" r:embed="rId8"/>
               </a:ext>
             </a:extLst>
           </a:blip>
@@ -12812,13 +14342,13 @@
           <p:nvPr/>
         </p:nvPicPr>
         <p:blipFill>
-          <a:blip r:embed="rId8">
+          <a:blip r:embed="rId9">
             <a:extLst>
               <a:ext uri="{28A0092B-C50C-407E-A947-70E740481C1C}">
                 <a14:useLocalDpi xmlns:a14="http://schemas.microsoft.com/office/drawing/2010/main" val="0"/>
               </a:ext>
               <a:ext uri="{96DAC541-7B7A-43D3-8B79-37D633B846F1}">
-                <asvg:svgBlip xmlns:asvg="http://schemas.microsoft.com/office/drawing/2016/SVG/main" r:embed="rId9"/>
+                <asvg:svgBlip xmlns:asvg="http://schemas.microsoft.com/office/drawing/2016/SVG/main" r:embed="rId10"/>
               </a:ext>
             </a:extLst>
           </a:blip>
@@ -13118,13 +14648,13 @@
           <p:nvPr/>
         </p:nvPicPr>
         <p:blipFill>
-          <a:blip r:embed="rId10">
+          <a:blip r:embed="rId11">
             <a:extLst>
               <a:ext uri="{28A0092B-C50C-407E-A947-70E740481C1C}">
                 <a14:useLocalDpi xmlns:a14="http://schemas.microsoft.com/office/drawing/2010/main" val="0"/>
               </a:ext>
               <a:ext uri="{96DAC541-7B7A-43D3-8B79-37D633B846F1}">
-                <asvg:svgBlip xmlns:asvg="http://schemas.microsoft.com/office/drawing/2016/SVG/main" r:embed="rId11"/>
+                <asvg:svgBlip xmlns:asvg="http://schemas.microsoft.com/office/drawing/2016/SVG/main" r:embed="rId12"/>
               </a:ext>
             </a:extLst>
           </a:blip>
@@ -13157,13 +14687,13 @@
           <p:nvPr/>
         </p:nvPicPr>
         <p:blipFill>
-          <a:blip r:embed="rId12">
+          <a:blip r:embed="rId13">
             <a:extLst>
               <a:ext uri="{28A0092B-C50C-407E-A947-70E740481C1C}">
                 <a14:useLocalDpi xmlns:a14="http://schemas.microsoft.com/office/drawing/2010/main" val="0"/>
               </a:ext>
               <a:ext uri="{96DAC541-7B7A-43D3-8B79-37D633B846F1}">
-                <asvg:svgBlip xmlns:asvg="http://schemas.microsoft.com/office/drawing/2016/SVG/main" r:embed="rId13"/>
+                <asvg:svgBlip xmlns:asvg="http://schemas.microsoft.com/office/drawing/2016/SVG/main" r:embed="rId14"/>
               </a:ext>
             </a:extLst>
           </a:blip>
@@ -13376,13 +14906,13 @@
           <p:nvPr/>
         </p:nvPicPr>
         <p:blipFill>
-          <a:blip r:embed="rId14">
+          <a:blip r:embed="rId15">
             <a:extLst>
               <a:ext uri="{28A0092B-C50C-407E-A947-70E740481C1C}">
                 <a14:useLocalDpi xmlns:a14="http://schemas.microsoft.com/office/drawing/2010/main" val="0"/>
               </a:ext>
               <a:ext uri="{96DAC541-7B7A-43D3-8B79-37D633B846F1}">
-                <asvg:svgBlip xmlns:asvg="http://schemas.microsoft.com/office/drawing/2016/SVG/main" r:embed="rId15"/>
+                <asvg:svgBlip xmlns:asvg="http://schemas.microsoft.com/office/drawing/2016/SVG/main" r:embed="rId16"/>
               </a:ext>
             </a:extLst>
           </a:blip>
@@ -13415,13 +14945,13 @@
           <p:nvPr/>
         </p:nvPicPr>
         <p:blipFill>
-          <a:blip r:embed="rId6">
+          <a:blip r:embed="rId7">
             <a:extLst>
               <a:ext uri="{28A0092B-C50C-407E-A947-70E740481C1C}">
                 <a14:useLocalDpi xmlns:a14="http://schemas.microsoft.com/office/drawing/2010/main" val="0"/>
               </a:ext>
               <a:ext uri="{96DAC541-7B7A-43D3-8B79-37D633B846F1}">
-                <asvg:svgBlip xmlns:asvg="http://schemas.microsoft.com/office/drawing/2016/SVG/main" r:embed="rId7"/>
+                <asvg:svgBlip xmlns:asvg="http://schemas.microsoft.com/office/drawing/2016/SVG/main" r:embed="rId8"/>
               </a:ext>
             </a:extLst>
           </a:blip>
@@ -13813,13 +15343,13 @@
           <p:nvPr/>
         </p:nvPicPr>
         <p:blipFill>
-          <a:blip r:embed="rId6">
+          <a:blip r:embed="rId7">
             <a:extLst>
               <a:ext uri="{28A0092B-C50C-407E-A947-70E740481C1C}">
                 <a14:useLocalDpi xmlns:a14="http://schemas.microsoft.com/office/drawing/2010/main" val="0"/>
               </a:ext>
               <a:ext uri="{96DAC541-7B7A-43D3-8B79-37D633B846F1}">
-                <asvg:svgBlip xmlns:asvg="http://schemas.microsoft.com/office/drawing/2016/SVG/main" r:embed="rId7"/>
+                <asvg:svgBlip xmlns:asvg="http://schemas.microsoft.com/office/drawing/2016/SVG/main" r:embed="rId8"/>
               </a:ext>
             </a:extLst>
           </a:blip>
@@ -13898,13 +15428,13 @@
           <p:nvPr/>
         </p:nvPicPr>
         <p:blipFill>
-          <a:blip r:embed="rId16">
+          <a:blip r:embed="rId17">
             <a:extLst>
               <a:ext uri="{28A0092B-C50C-407E-A947-70E740481C1C}">
                 <a14:useLocalDpi xmlns:a14="http://schemas.microsoft.com/office/drawing/2010/main" val="0"/>
               </a:ext>
               <a:ext uri="{96DAC541-7B7A-43D3-8B79-37D633B846F1}">
-                <asvg:svgBlip xmlns:asvg="http://schemas.microsoft.com/office/drawing/2016/SVG/main" r:embed="rId17"/>
+                <asvg:svgBlip xmlns:asvg="http://schemas.microsoft.com/office/drawing/2016/SVG/main" r:embed="rId18"/>
               </a:ext>
             </a:extLst>
           </a:blip>
@@ -15259,13 +16789,13 @@
           <p:nvPr/>
         </p:nvPicPr>
         <p:blipFill>
-          <a:blip r:embed="rId2">
+          <a:blip r:embed="rId3">
             <a:extLst>
               <a:ext uri="{28A0092B-C50C-407E-A947-70E740481C1C}">
                 <a14:useLocalDpi xmlns:a14="http://schemas.microsoft.com/office/drawing/2010/main" val="0"/>
               </a:ext>
               <a:ext uri="{96DAC541-7B7A-43D3-8B79-37D633B846F1}">
-                <asvg:svgBlip xmlns:asvg="http://schemas.microsoft.com/office/drawing/2016/SVG/main" r:embed="rId3"/>
+                <asvg:svgBlip xmlns:asvg="http://schemas.microsoft.com/office/drawing/2016/SVG/main" r:embed="rId4"/>
               </a:ext>
             </a:extLst>
           </a:blip>
@@ -15298,13 +16828,13 @@
           <p:nvPr/>
         </p:nvPicPr>
         <p:blipFill>
-          <a:blip r:embed="rId4">
+          <a:blip r:embed="rId5">
             <a:extLst>
               <a:ext uri="{28A0092B-C50C-407E-A947-70E740481C1C}">
                 <a14:useLocalDpi xmlns:a14="http://schemas.microsoft.com/office/drawing/2010/main" val="0"/>
               </a:ext>
               <a:ext uri="{96DAC541-7B7A-43D3-8B79-37D633B846F1}">
-                <asvg:svgBlip xmlns:asvg="http://schemas.microsoft.com/office/drawing/2016/SVG/main" r:embed="rId5"/>
+                <asvg:svgBlip xmlns:asvg="http://schemas.microsoft.com/office/drawing/2016/SVG/main" r:embed="rId6"/>
               </a:ext>
             </a:extLst>
           </a:blip>
@@ -15337,13 +16867,13 @@
           <p:nvPr/>
         </p:nvPicPr>
         <p:blipFill>
-          <a:blip r:embed="rId6">
+          <a:blip r:embed="rId7">
             <a:extLst>
               <a:ext uri="{28A0092B-C50C-407E-A947-70E740481C1C}">
                 <a14:useLocalDpi xmlns:a14="http://schemas.microsoft.com/office/drawing/2010/main" val="0"/>
               </a:ext>
               <a:ext uri="{96DAC541-7B7A-43D3-8B79-37D633B846F1}">
-                <asvg:svgBlip xmlns:asvg="http://schemas.microsoft.com/office/drawing/2016/SVG/main" r:embed="rId7"/>
+                <asvg:svgBlip xmlns:asvg="http://schemas.microsoft.com/office/drawing/2016/SVG/main" r:embed="rId8"/>
               </a:ext>
             </a:extLst>
           </a:blip>
@@ -15376,13 +16906,13 @@
           <p:nvPr/>
         </p:nvPicPr>
         <p:blipFill>
-          <a:blip r:embed="rId8">
+          <a:blip r:embed="rId9">
             <a:extLst>
               <a:ext uri="{28A0092B-C50C-407E-A947-70E740481C1C}">
                 <a14:useLocalDpi xmlns:a14="http://schemas.microsoft.com/office/drawing/2010/main" val="0"/>
               </a:ext>
               <a:ext uri="{96DAC541-7B7A-43D3-8B79-37D633B846F1}">
-                <asvg:svgBlip xmlns:asvg="http://schemas.microsoft.com/office/drawing/2016/SVG/main" r:embed="rId9"/>
+                <asvg:svgBlip xmlns:asvg="http://schemas.microsoft.com/office/drawing/2016/SVG/main" r:embed="rId10"/>
               </a:ext>
             </a:extLst>
           </a:blip>
@@ -15415,13 +16945,13 @@
           <p:nvPr/>
         </p:nvPicPr>
         <p:blipFill>
-          <a:blip r:embed="rId6">
+          <a:blip r:embed="rId7">
             <a:extLst>
               <a:ext uri="{28A0092B-C50C-407E-A947-70E740481C1C}">
                 <a14:useLocalDpi xmlns:a14="http://schemas.microsoft.com/office/drawing/2010/main" val="0"/>
               </a:ext>
               <a:ext uri="{96DAC541-7B7A-43D3-8B79-37D633B846F1}">
-                <asvg:svgBlip xmlns:asvg="http://schemas.microsoft.com/office/drawing/2016/SVG/main" r:embed="rId7"/>
+                <asvg:svgBlip xmlns:asvg="http://schemas.microsoft.com/office/drawing/2016/SVG/main" r:embed="rId8"/>
               </a:ext>
             </a:extLst>
           </a:blip>
@@ -15637,13 +17167,13 @@
           <p:nvPr/>
         </p:nvPicPr>
         <p:blipFill>
-          <a:blip r:embed="rId10">
+          <a:blip r:embed="rId11">
             <a:extLst>
               <a:ext uri="{28A0092B-C50C-407E-A947-70E740481C1C}">
                 <a14:useLocalDpi xmlns:a14="http://schemas.microsoft.com/office/drawing/2010/main" val="0"/>
               </a:ext>
               <a:ext uri="{96DAC541-7B7A-43D3-8B79-37D633B846F1}">
-                <asvg:svgBlip xmlns:asvg="http://schemas.microsoft.com/office/drawing/2016/SVG/main" r:embed="rId11"/>
+                <asvg:svgBlip xmlns:asvg="http://schemas.microsoft.com/office/drawing/2016/SVG/main" r:embed="rId12"/>
               </a:ext>
             </a:extLst>
           </a:blip>
@@ -15676,13 +17206,13 @@
           <p:nvPr/>
         </p:nvPicPr>
         <p:blipFill>
-          <a:blip r:embed="rId10">
+          <a:blip r:embed="rId11">
             <a:extLst>
               <a:ext uri="{28A0092B-C50C-407E-A947-70E740481C1C}">
                 <a14:useLocalDpi xmlns:a14="http://schemas.microsoft.com/office/drawing/2010/main" val="0"/>
               </a:ext>
               <a:ext uri="{96DAC541-7B7A-43D3-8B79-37D633B846F1}">
-                <asvg:svgBlip xmlns:asvg="http://schemas.microsoft.com/office/drawing/2016/SVG/main" r:embed="rId11"/>
+                <asvg:svgBlip xmlns:asvg="http://schemas.microsoft.com/office/drawing/2016/SVG/main" r:embed="rId12"/>
               </a:ext>
             </a:extLst>
           </a:blip>
@@ -16256,13 +17786,13 @@
           <p:nvPr/>
         </p:nvPicPr>
         <p:blipFill>
-          <a:blip r:embed="rId12">
+          <a:blip r:embed="rId13">
             <a:extLst>
               <a:ext uri="{28A0092B-C50C-407E-A947-70E740481C1C}">
                 <a14:useLocalDpi xmlns:a14="http://schemas.microsoft.com/office/drawing/2010/main" val="0"/>
               </a:ext>
               <a:ext uri="{96DAC541-7B7A-43D3-8B79-37D633B846F1}">
-                <asvg:svgBlip xmlns:asvg="http://schemas.microsoft.com/office/drawing/2016/SVG/main" r:embed="rId13"/>
+                <asvg:svgBlip xmlns:asvg="http://schemas.microsoft.com/office/drawing/2016/SVG/main" r:embed="rId14"/>
               </a:ext>
             </a:extLst>
           </a:blip>
@@ -16295,13 +17825,13 @@
           <p:nvPr/>
         </p:nvPicPr>
         <p:blipFill>
-          <a:blip r:embed="rId12">
+          <a:blip r:embed="rId13">
             <a:extLst>
               <a:ext uri="{28A0092B-C50C-407E-A947-70E740481C1C}">
                 <a14:useLocalDpi xmlns:a14="http://schemas.microsoft.com/office/drawing/2010/main" val="0"/>
               </a:ext>
               <a:ext uri="{96DAC541-7B7A-43D3-8B79-37D633B846F1}">
-                <asvg:svgBlip xmlns:asvg="http://schemas.microsoft.com/office/drawing/2016/SVG/main" r:embed="rId13"/>
+                <asvg:svgBlip xmlns:asvg="http://schemas.microsoft.com/office/drawing/2016/SVG/main" r:embed="rId14"/>
               </a:ext>
             </a:extLst>
           </a:blip>
@@ -16334,13 +17864,13 @@
           <p:nvPr/>
         </p:nvPicPr>
         <p:blipFill>
-          <a:blip r:embed="rId12">
+          <a:blip r:embed="rId13">
             <a:extLst>
               <a:ext uri="{28A0092B-C50C-407E-A947-70E740481C1C}">
                 <a14:useLocalDpi xmlns:a14="http://schemas.microsoft.com/office/drawing/2010/main" val="0"/>
               </a:ext>
               <a:ext uri="{96DAC541-7B7A-43D3-8B79-37D633B846F1}">
-                <asvg:svgBlip xmlns:asvg="http://schemas.microsoft.com/office/drawing/2016/SVG/main" r:embed="rId13"/>
+                <asvg:svgBlip xmlns:asvg="http://schemas.microsoft.com/office/drawing/2016/SVG/main" r:embed="rId14"/>
               </a:ext>
             </a:extLst>
           </a:blip>
@@ -16857,13 +18387,13 @@
           <p:nvPr/>
         </p:nvPicPr>
         <p:blipFill>
-          <a:blip r:embed="rId2">
+          <a:blip r:embed="rId3">
             <a:extLst>
               <a:ext uri="{28A0092B-C50C-407E-A947-70E740481C1C}">
                 <a14:useLocalDpi xmlns:a14="http://schemas.microsoft.com/office/drawing/2010/main" val="0"/>
               </a:ext>
               <a:ext uri="{96DAC541-7B7A-43D3-8B79-37D633B846F1}">
-                <asvg:svgBlip xmlns:asvg="http://schemas.microsoft.com/office/drawing/2016/SVG/main" r:embed="rId3"/>
+                <asvg:svgBlip xmlns:asvg="http://schemas.microsoft.com/office/drawing/2016/SVG/main" r:embed="rId4"/>
               </a:ext>
             </a:extLst>
           </a:blip>
@@ -16896,13 +18426,13 @@
           <p:nvPr/>
         </p:nvPicPr>
         <p:blipFill>
-          <a:blip r:embed="rId4">
+          <a:blip r:embed="rId5">
             <a:extLst>
               <a:ext uri="{28A0092B-C50C-407E-A947-70E740481C1C}">
                 <a14:useLocalDpi xmlns:a14="http://schemas.microsoft.com/office/drawing/2010/main" val="0"/>
               </a:ext>
               <a:ext uri="{96DAC541-7B7A-43D3-8B79-37D633B846F1}">
-                <asvg:svgBlip xmlns:asvg="http://schemas.microsoft.com/office/drawing/2016/SVG/main" r:embed="rId5"/>
+                <asvg:svgBlip xmlns:asvg="http://schemas.microsoft.com/office/drawing/2016/SVG/main" r:embed="rId6"/>
               </a:ext>
             </a:extLst>
           </a:blip>
@@ -17972,13 +19502,13 @@
           <p:nvPr/>
         </p:nvPicPr>
         <p:blipFill>
-          <a:blip r:embed="rId2">
+          <a:blip r:embed="rId3">
             <a:extLst>
               <a:ext uri="{28A0092B-C50C-407E-A947-70E740481C1C}">
                 <a14:useLocalDpi xmlns:a14="http://schemas.microsoft.com/office/drawing/2010/main" val="0"/>
               </a:ext>
               <a:ext uri="{96DAC541-7B7A-43D3-8B79-37D633B846F1}">
-                <asvg:svgBlip xmlns:asvg="http://schemas.microsoft.com/office/drawing/2016/SVG/main" r:embed="rId3"/>
+                <asvg:svgBlip xmlns:asvg="http://schemas.microsoft.com/office/drawing/2016/SVG/main" r:embed="rId4"/>
               </a:ext>
             </a:extLst>
           </a:blip>
@@ -18011,13 +19541,13 @@
           <p:nvPr/>
         </p:nvPicPr>
         <p:blipFill>
-          <a:blip r:embed="rId4">
+          <a:blip r:embed="rId5">
             <a:extLst>
               <a:ext uri="{28A0092B-C50C-407E-A947-70E740481C1C}">
                 <a14:useLocalDpi xmlns:a14="http://schemas.microsoft.com/office/drawing/2010/main" val="0"/>
               </a:ext>
               <a:ext uri="{96DAC541-7B7A-43D3-8B79-37D633B846F1}">
-                <asvg:svgBlip xmlns:asvg="http://schemas.microsoft.com/office/drawing/2016/SVG/main" r:embed="rId5"/>
+                <asvg:svgBlip xmlns:asvg="http://schemas.microsoft.com/office/drawing/2016/SVG/main" r:embed="rId6"/>
               </a:ext>
             </a:extLst>
           </a:blip>

</xml_diff>

<commit_message>
Tweak images, do a spell check, and finsih final sections.
</commit_message>
<xml_diff>
--- a/src/DevOps/Illustrations.pptx
+++ b/src/DevOps/Illustrations.pptx
@@ -5,7 +5,7 @@
     <p:sldMasterId id="2147483648" r:id="rId1"/>
   </p:sldMasterIdLst>
   <p:notesMasterIdLst>
-    <p:notesMasterId r:id="rId13"/>
+    <p:notesMasterId r:id="rId14"/>
   </p:notesMasterIdLst>
   <p:sldIdLst>
     <p:sldId id="327" r:id="rId2"/>
@@ -19,6 +19,7 @@
     <p:sldId id="344" r:id="rId10"/>
     <p:sldId id="343" r:id="rId11"/>
     <p:sldId id="345" r:id="rId12"/>
+    <p:sldId id="346" r:id="rId13"/>
   </p:sldIdLst>
   <p:sldSz cx="12192000" cy="6858000"/>
   <p:notesSz cx="6858000" cy="9144000"/>
@@ -211,7 +212,7 @@
           <a:p>
             <a:fld id="{EB1108B4-53EF-4F9E-9491-F5ABDE6A4EA7}" type="datetimeFigureOut">
               <a:rPr lang="en-CA" smtClean="0"/>
-              <a:t>2017-05-25</a:t>
+              <a:t>2017-05-26</a:t>
             </a:fld>
             <a:endParaRPr lang="en-CA"/>
           </a:p>
@@ -731,6 +732,90 @@
 </p:notes>
 </file>
 
+<file path=ppt/notesSlides/notesSlide12.xml><?xml version="1.0" encoding="utf-8"?>
+<p:notes xmlns:a="http://schemas.openxmlformats.org/drawingml/2006/main" xmlns:r="http://schemas.openxmlformats.org/officeDocument/2006/relationships" xmlns:p="http://schemas.openxmlformats.org/presentationml/2006/main">
+  <p:cSld>
+    <p:spTree>
+      <p:nvGrpSpPr>
+        <p:cNvPr id="1" name=""/>
+        <p:cNvGrpSpPr/>
+        <p:nvPr/>
+      </p:nvGrpSpPr>
+      <p:grpSpPr>
+        <a:xfrm>
+          <a:off x="0" y="0"/>
+          <a:ext cx="0" cy="0"/>
+          <a:chOff x="0" y="0"/>
+          <a:chExt cx="0" cy="0"/>
+        </a:xfrm>
+      </p:grpSpPr>
+      <p:sp>
+        <p:nvSpPr>
+          <p:cNvPr id="2" name="Slide Image Placeholder 1"/>
+          <p:cNvSpPr>
+            <a:spLocks noGrp="1" noRot="1" noChangeAspect="1"/>
+          </p:cNvSpPr>
+          <p:nvPr>
+            <p:ph type="sldImg"/>
+          </p:nvPr>
+        </p:nvSpPr>
+        <p:spPr/>
+      </p:sp>
+      <p:sp>
+        <p:nvSpPr>
+          <p:cNvPr id="3" name="Notes Placeholder 2"/>
+          <p:cNvSpPr>
+            <a:spLocks noGrp="1"/>
+          </p:cNvSpPr>
+          <p:nvPr>
+            <p:ph type="body" idx="1"/>
+          </p:nvPr>
+        </p:nvSpPr>
+        <p:spPr/>
+        <p:txBody>
+          <a:bodyPr/>
+          <a:lstStyle/>
+          <a:p>
+            <a:endParaRPr lang="en-CA"/>
+          </a:p>
+        </p:txBody>
+      </p:sp>
+      <p:sp>
+        <p:nvSpPr>
+          <p:cNvPr id="4" name="Slide Number Placeholder 3"/>
+          <p:cNvSpPr>
+            <a:spLocks noGrp="1"/>
+          </p:cNvSpPr>
+          <p:nvPr>
+            <p:ph type="sldNum" sz="quarter" idx="10"/>
+          </p:nvPr>
+        </p:nvSpPr>
+        <p:spPr/>
+        <p:txBody>
+          <a:bodyPr/>
+          <a:lstStyle/>
+          <a:p>
+            <a:fld id="{05240458-CBDF-4242-A98F-5E1D8B45E643}" type="slidenum">
+              <a:rPr lang="en-CA" smtClean="0"/>
+              <a:t>12</a:t>
+            </a:fld>
+            <a:endParaRPr lang="en-CA"/>
+          </a:p>
+        </p:txBody>
+      </p:sp>
+    </p:spTree>
+    <p:extLst>
+      <p:ext uri="{BB962C8B-B14F-4D97-AF65-F5344CB8AC3E}">
+        <p14:creationId xmlns:p14="http://schemas.microsoft.com/office/powerpoint/2010/main" val="341673753"/>
+      </p:ext>
+    </p:extLst>
+  </p:cSld>
+  <p:clrMapOvr>
+    <a:masterClrMapping/>
+  </p:clrMapOvr>
+</p:notes>
+</file>
+
 <file path=ppt/notesSlides/notesSlide2.xml><?xml version="1.0" encoding="utf-8"?>
 <p:notes xmlns:a="http://schemas.openxmlformats.org/drawingml/2006/main" xmlns:r="http://schemas.openxmlformats.org/officeDocument/2006/relationships" xmlns:p="http://schemas.openxmlformats.org/presentationml/2006/main">
   <p:cSld>
@@ -1534,7 +1619,7 @@
           <a:p>
             <a:fld id="{F71EBF1D-DE49-4C53-B029-DA93D2E44EE4}" type="datetimeFigureOut">
               <a:rPr lang="en-CA" smtClean="0"/>
-              <a:t>2017-05-25</a:t>
+              <a:t>2017-05-26</a:t>
             </a:fld>
             <a:endParaRPr lang="en-CA"/>
           </a:p>
@@ -1704,7 +1789,7 @@
           <a:p>
             <a:fld id="{F71EBF1D-DE49-4C53-B029-DA93D2E44EE4}" type="datetimeFigureOut">
               <a:rPr lang="en-CA" smtClean="0"/>
-              <a:t>2017-05-25</a:t>
+              <a:t>2017-05-26</a:t>
             </a:fld>
             <a:endParaRPr lang="en-CA"/>
           </a:p>
@@ -1884,7 +1969,7 @@
           <a:p>
             <a:fld id="{F71EBF1D-DE49-4C53-B029-DA93D2E44EE4}" type="datetimeFigureOut">
               <a:rPr lang="en-CA" smtClean="0"/>
-              <a:t>2017-05-25</a:t>
+              <a:t>2017-05-26</a:t>
             </a:fld>
             <a:endParaRPr lang="en-CA"/>
           </a:p>
@@ -2054,7 +2139,7 @@
           <a:p>
             <a:fld id="{F71EBF1D-DE49-4C53-B029-DA93D2E44EE4}" type="datetimeFigureOut">
               <a:rPr lang="en-CA" smtClean="0"/>
-              <a:t>2017-05-25</a:t>
+              <a:t>2017-05-26</a:t>
             </a:fld>
             <a:endParaRPr lang="en-CA"/>
           </a:p>
@@ -2300,7 +2385,7 @@
           <a:p>
             <a:fld id="{F71EBF1D-DE49-4C53-B029-DA93D2E44EE4}" type="datetimeFigureOut">
               <a:rPr lang="en-CA" smtClean="0"/>
-              <a:t>2017-05-25</a:t>
+              <a:t>2017-05-26</a:t>
             </a:fld>
             <a:endParaRPr lang="en-CA"/>
           </a:p>
@@ -2532,7 +2617,7 @@
           <a:p>
             <a:fld id="{F71EBF1D-DE49-4C53-B029-DA93D2E44EE4}" type="datetimeFigureOut">
               <a:rPr lang="en-CA" smtClean="0"/>
-              <a:t>2017-05-25</a:t>
+              <a:t>2017-05-26</a:t>
             </a:fld>
             <a:endParaRPr lang="en-CA"/>
           </a:p>
@@ -2899,7 +2984,7 @@
           <a:p>
             <a:fld id="{F71EBF1D-DE49-4C53-B029-DA93D2E44EE4}" type="datetimeFigureOut">
               <a:rPr lang="en-CA" smtClean="0"/>
-              <a:t>2017-05-25</a:t>
+              <a:t>2017-05-26</a:t>
             </a:fld>
             <a:endParaRPr lang="en-CA"/>
           </a:p>
@@ -3036,7 +3121,7 @@
           <a:p>
             <a:fld id="{F71EBF1D-DE49-4C53-B029-DA93D2E44EE4}" type="datetimeFigureOut">
               <a:rPr lang="en-CA" smtClean="0"/>
-              <a:t>2017-05-25</a:t>
+              <a:t>2017-05-26</a:t>
             </a:fld>
             <a:endParaRPr lang="en-CA"/>
           </a:p>
@@ -3131,7 +3216,7 @@
           <a:p>
             <a:fld id="{F71EBF1D-DE49-4C53-B029-DA93D2E44EE4}" type="datetimeFigureOut">
               <a:rPr lang="en-CA" smtClean="0"/>
-              <a:t>2017-05-25</a:t>
+              <a:t>2017-05-26</a:t>
             </a:fld>
             <a:endParaRPr lang="en-CA"/>
           </a:p>
@@ -3408,7 +3493,7 @@
           <a:p>
             <a:fld id="{F71EBF1D-DE49-4C53-B029-DA93D2E44EE4}" type="datetimeFigureOut">
               <a:rPr lang="en-CA" smtClean="0"/>
-              <a:t>2017-05-25</a:t>
+              <a:t>2017-05-26</a:t>
             </a:fld>
             <a:endParaRPr lang="en-CA"/>
           </a:p>
@@ -3661,7 +3746,7 @@
           <a:p>
             <a:fld id="{F71EBF1D-DE49-4C53-B029-DA93D2E44EE4}" type="datetimeFigureOut">
               <a:rPr lang="en-CA" smtClean="0"/>
-              <a:t>2017-05-25</a:t>
+              <a:t>2017-05-26</a:t>
             </a:fld>
             <a:endParaRPr lang="en-CA"/>
           </a:p>
@@ -3874,7 +3959,7 @@
           <a:p>
             <a:fld id="{F71EBF1D-DE49-4C53-B029-DA93D2E44EE4}" type="datetimeFigureOut">
               <a:rPr lang="en-CA" smtClean="0"/>
-              <a:t>2017-05-25</a:t>
+              <a:t>2017-05-26</a:t>
             </a:fld>
             <a:endParaRPr lang="en-CA"/>
           </a:p>
@@ -4844,8 +4929,8 @@
         </p:nvSpPr>
         <p:spPr>
           <a:xfrm>
-            <a:off x="3390890" y="1464884"/>
-            <a:ext cx="3449370" cy="1077218"/>
+            <a:off x="3993390" y="1839173"/>
+            <a:ext cx="3449370" cy="584775"/>
           </a:xfrm>
           <a:prstGeom prst="rect">
             <a:avLst/>
@@ -4857,20 +4942,6 @@
             <a:spAutoFit/>
           </a:bodyPr>
           <a:lstStyle/>
-          <a:p>
-            <a:r>
-              <a:rPr lang="en-US" sz="3200" dirty="0">
-                <a:solidFill>
-                  <a:schemeClr val="bg1">
-                    <a:lumMod val="50000"/>
-                  </a:schemeClr>
-                </a:solidFill>
-                <a:latin typeface="Segoe UI" panose="020B0502040204020203" pitchFamily="34" charset="0"/>
-                <a:cs typeface="Segoe UI" panose="020B0502040204020203" pitchFamily="34" charset="0"/>
-              </a:rPr>
-              <a:t>USER TYPES</a:t>
-            </a:r>
-          </a:p>
           <a:p>
             <a:r>
               <a:rPr lang="en-US" sz="3200" dirty="0">
@@ -4883,7 +4954,7 @@
                 <a:cs typeface="Segoe UI" panose="020B0502040204020203" pitchFamily="34" charset="0"/>
                 <a:sym typeface="Wingdings 3" panose="05040102010807070707" pitchFamily="18" charset="2"/>
               </a:rPr>
-              <a:t>       </a:t>
+              <a:t></a:t>
             </a:r>
             <a:r>
               <a:rPr lang="en-US" sz="3200" dirty="0">
@@ -4895,7 +4966,7 @@
                 <a:latin typeface="Segoe UI" panose="020B0502040204020203" pitchFamily="34" charset="0"/>
                 <a:cs typeface="Segoe UI" panose="020B0502040204020203" pitchFamily="34" charset="0"/>
               </a:rPr>
-              <a:t> </a:t>
+              <a:t>USER TYPES </a:t>
             </a:r>
             <a:endParaRPr lang="en-CA" sz="3200" dirty="0">
               <a:solidFill>
@@ -4923,8 +4994,8 @@
         </p:nvSpPr>
         <p:spPr>
           <a:xfrm>
-            <a:off x="5041838" y="5734053"/>
-            <a:ext cx="5839485" cy="1077218"/>
+            <a:off x="1873662" y="5592752"/>
+            <a:ext cx="5839485" cy="584775"/>
           </a:xfrm>
           <a:prstGeom prst="rect">
             <a:avLst/>
@@ -4937,6 +5008,7 @@
           </a:bodyPr>
           <a:lstStyle/>
           <a:p>
+            <a:pPr algn="r"/>
             <a:r>
               <a:rPr lang="en-US" sz="3200" dirty="0">
                 <a:solidFill>
@@ -4948,10 +5020,8 @@
                 <a:cs typeface="Segoe UI" panose="020B0502040204020203" pitchFamily="34" charset="0"/>
                 <a:sym typeface="Wingdings 3" panose="05040102010807070707" pitchFamily="18" charset="2"/>
               </a:rPr>
-              <a:t>                     </a:t>
-            </a:r>
-          </a:p>
-          <a:p>
+              <a:t>                    RI</a:t>
+            </a:r>
             <a:r>
               <a:rPr lang="en-US" sz="3200" dirty="0">
                 <a:solidFill>
@@ -4962,7 +5032,20 @@
                 <a:latin typeface="Segoe UI" panose="020B0502040204020203" pitchFamily="34" charset="0"/>
                 <a:cs typeface="Segoe UI" panose="020B0502040204020203" pitchFamily="34" charset="0"/>
               </a:rPr>
-              <a:t>ENVIRONMENT TYPES</a:t>
+              <a:t>NG NAMES </a:t>
+            </a:r>
+            <a:r>
+              <a:rPr lang="en-US" sz="3200" dirty="0">
+                <a:solidFill>
+                  <a:schemeClr val="bg1">
+                    <a:lumMod val="50000"/>
+                  </a:schemeClr>
+                </a:solidFill>
+                <a:latin typeface="Segoe UI" panose="020B0502040204020203" pitchFamily="34" charset="0"/>
+                <a:cs typeface="Segoe UI" panose="020B0502040204020203" pitchFamily="34" charset="0"/>
+                <a:sym typeface="Wingdings 3" panose="05040102010807070707" pitchFamily="18" charset="2"/>
+              </a:rPr>
+              <a:t></a:t>
             </a:r>
             <a:endParaRPr lang="en-CA" sz="3200" dirty="0">
               <a:solidFill>
@@ -8226,6 +8309,1390 @@
     <p:extLst>
       <p:ext uri="{BB962C8B-B14F-4D97-AF65-F5344CB8AC3E}">
         <p14:creationId xmlns:p14="http://schemas.microsoft.com/office/powerpoint/2010/main" val="211575232"/>
+      </p:ext>
+    </p:extLst>
+  </p:cSld>
+  <p:clrMapOvr>
+    <a:masterClrMapping/>
+  </p:clrMapOvr>
+</p:sld>
+</file>
+
+<file path=ppt/slides/slide12.xml><?xml version="1.0" encoding="utf-8"?>
+<p:sld xmlns:a="http://schemas.openxmlformats.org/drawingml/2006/main" xmlns:r="http://schemas.openxmlformats.org/officeDocument/2006/relationships" xmlns:p="http://schemas.openxmlformats.org/presentationml/2006/main">
+  <p:cSld>
+    <p:spTree>
+      <p:nvGrpSpPr>
+        <p:cNvPr id="1" name=""/>
+        <p:cNvGrpSpPr/>
+        <p:nvPr/>
+      </p:nvGrpSpPr>
+      <p:grpSpPr>
+        <a:xfrm>
+          <a:off x="0" y="0"/>
+          <a:ext cx="0" cy="0"/>
+          <a:chOff x="0" y="0"/>
+          <a:chExt cx="0" cy="0"/>
+        </a:xfrm>
+      </p:grpSpPr>
+      <p:sp>
+        <p:nvSpPr>
+          <p:cNvPr id="3" name="TextBox 2">
+            <a:extLst>
+              <a:ext uri="{FF2B5EF4-FFF2-40B4-BE49-F238E27FC236}">
+                <a16:creationId xmlns:a16="http://schemas.microsoft.com/office/drawing/2014/main" id="{191B744B-1048-4F57-BEA3-BE3F98E25232}"/>
+              </a:ext>
+            </a:extLst>
+          </p:cNvPr>
+          <p:cNvSpPr txBox="1"/>
+          <p:nvPr/>
+        </p:nvSpPr>
+        <p:spPr>
+          <a:xfrm>
+            <a:off x="157316" y="138024"/>
+            <a:ext cx="11341509" cy="6719976"/>
+          </a:xfrm>
+          <a:prstGeom prst="rect">
+            <a:avLst/>
+          </a:prstGeom>
+          <a:noFill/>
+        </p:spPr>
+        <p:txBody>
+          <a:bodyPr wrap="square" rtlCol="0">
+            <a:normAutofit/>
+          </a:bodyPr>
+          <a:lstStyle/>
+          <a:p>
+            <a:pPr algn="ctr"/>
+            <a:r>
+              <a:rPr lang="en-US" sz="3200" dirty="0">
+                <a:solidFill>
+                  <a:schemeClr val="bg1">
+                    <a:lumMod val="50000"/>
+                  </a:schemeClr>
+                </a:solidFill>
+                <a:latin typeface="Segoe UI" panose="020B0502040204020203" pitchFamily="34" charset="0"/>
+                <a:cs typeface="Segoe UI" panose="020B0502040204020203" pitchFamily="34" charset="0"/>
+              </a:rPr>
+              <a:t>BEFORE </a:t>
+            </a:r>
+            <a:r>
+              <a:rPr lang="en-US" sz="3200" dirty="0">
+                <a:solidFill>
+                  <a:schemeClr val="bg1">
+                    <a:lumMod val="50000"/>
+                  </a:schemeClr>
+                </a:solidFill>
+                <a:latin typeface="Segoe UI" panose="020B0502040204020203" pitchFamily="34" charset="0"/>
+                <a:cs typeface="Segoe UI" panose="020B0502040204020203" pitchFamily="34" charset="0"/>
+                <a:sym typeface="Wingdings 3" panose="05040102010807070707" pitchFamily="18" charset="2"/>
+              </a:rPr>
+              <a:t></a:t>
+            </a:r>
+            <a:r>
+              <a:rPr lang="en-US" sz="3200" dirty="0">
+                <a:solidFill>
+                  <a:schemeClr val="bg1">
+                    <a:lumMod val="50000"/>
+                  </a:schemeClr>
+                </a:solidFill>
+                <a:latin typeface="Segoe UI" panose="020B0502040204020203" pitchFamily="34" charset="0"/>
+                <a:cs typeface="Segoe UI" panose="020B0502040204020203" pitchFamily="34" charset="0"/>
+              </a:rPr>
+              <a:t>                         |                           </a:t>
+            </a:r>
+            <a:r>
+              <a:rPr lang="en-US" sz="3200" dirty="0">
+                <a:solidFill>
+                  <a:schemeClr val="bg1">
+                    <a:lumMod val="50000"/>
+                  </a:schemeClr>
+                </a:solidFill>
+                <a:latin typeface="Segoe UI" panose="020B0502040204020203" pitchFamily="34" charset="0"/>
+                <a:cs typeface="Segoe UI" panose="020B0502040204020203" pitchFamily="34" charset="0"/>
+                <a:sym typeface="Wingdings 3" panose="05040102010807070707" pitchFamily="18" charset="2"/>
+              </a:rPr>
+              <a:t> </a:t>
+            </a:r>
+            <a:r>
+              <a:rPr lang="en-US" sz="3200" dirty="0">
+                <a:solidFill>
+                  <a:schemeClr val="bg1">
+                    <a:lumMod val="50000"/>
+                  </a:schemeClr>
+                </a:solidFill>
+                <a:latin typeface="Segoe UI" panose="020B0502040204020203" pitchFamily="34" charset="0"/>
+                <a:cs typeface="Segoe UI" panose="020B0502040204020203" pitchFamily="34" charset="0"/>
+              </a:rPr>
+              <a:t>AFTER</a:t>
+            </a:r>
+            <a:endParaRPr lang="en-US" sz="3200" dirty="0">
+              <a:solidFill>
+                <a:schemeClr val="bg1">
+                  <a:lumMod val="50000"/>
+                </a:schemeClr>
+              </a:solidFill>
+              <a:latin typeface="Segoe UI" panose="020B0502040204020203" pitchFamily="34" charset="0"/>
+              <a:cs typeface="Segoe UI" panose="020B0502040204020203" pitchFamily="34" charset="0"/>
+              <a:sym typeface="Wingdings 3" panose="05040102010807070707" pitchFamily="18" charset="2"/>
+            </a:endParaRPr>
+          </a:p>
+          <a:p>
+            <a:pPr algn="ctr"/>
+            <a:endParaRPr lang="en-US" sz="3200" dirty="0">
+              <a:solidFill>
+                <a:schemeClr val="bg1">
+                  <a:lumMod val="50000"/>
+                </a:schemeClr>
+              </a:solidFill>
+              <a:latin typeface="Segoe UI" panose="020B0502040204020203" pitchFamily="34" charset="0"/>
+              <a:cs typeface="Segoe UI" panose="020B0502040204020203" pitchFamily="34" charset="0"/>
+              <a:sym typeface="Wingdings 3" panose="05040102010807070707" pitchFamily="18" charset="2"/>
+            </a:endParaRPr>
+          </a:p>
+          <a:p>
+            <a:pPr algn="ctr"/>
+            <a:r>
+              <a:rPr lang="en-US" sz="3200" dirty="0">
+                <a:solidFill>
+                  <a:srgbClr val="3366CC"/>
+                </a:solidFill>
+                <a:latin typeface="Segoe UI" panose="020B0502040204020203" pitchFamily="34" charset="0"/>
+                <a:cs typeface="Segoe UI" panose="020B0502040204020203" pitchFamily="34" charset="0"/>
+                <a:sym typeface="Wingdings 3" panose="05040102010807070707" pitchFamily="18" charset="2"/>
+              </a:rPr>
+              <a:t>BUILD</a:t>
+            </a:r>
+          </a:p>
+          <a:p>
+            <a:pPr algn="ctr"/>
+            <a:endParaRPr lang="en-US" sz="3200" dirty="0">
+              <a:solidFill>
+                <a:srgbClr val="3366CC"/>
+              </a:solidFill>
+              <a:latin typeface="Segoe UI" panose="020B0502040204020203" pitchFamily="34" charset="0"/>
+              <a:cs typeface="Segoe UI" panose="020B0502040204020203" pitchFamily="34" charset="0"/>
+              <a:sym typeface="Wingdings 3" panose="05040102010807070707" pitchFamily="18" charset="2"/>
+            </a:endParaRPr>
+          </a:p>
+          <a:p>
+            <a:pPr algn="ctr"/>
+            <a:r>
+              <a:rPr lang="en-US" sz="3200" dirty="0">
+                <a:solidFill>
+                  <a:srgbClr val="3366CC"/>
+                </a:solidFill>
+                <a:latin typeface="Segoe UI" panose="020B0502040204020203" pitchFamily="34" charset="0"/>
+                <a:cs typeface="Segoe UI" panose="020B0502040204020203" pitchFamily="34" charset="0"/>
+                <a:sym typeface="Wingdings 3" panose="05040102010807070707" pitchFamily="18" charset="2"/>
+              </a:rPr>
+              <a:t>RELEASE </a:t>
+            </a:r>
+          </a:p>
+          <a:p>
+            <a:pPr algn="ctr"/>
+            <a:endParaRPr lang="en-US" sz="3200" dirty="0">
+              <a:solidFill>
+                <a:srgbClr val="3366CC"/>
+              </a:solidFill>
+              <a:latin typeface="Segoe UI" panose="020B0502040204020203" pitchFamily="34" charset="0"/>
+              <a:cs typeface="Segoe UI" panose="020B0502040204020203" pitchFamily="34" charset="0"/>
+              <a:sym typeface="Wingdings 3" panose="05040102010807070707" pitchFamily="18" charset="2"/>
+            </a:endParaRPr>
+          </a:p>
+          <a:p>
+            <a:pPr algn="ctr"/>
+            <a:r>
+              <a:rPr lang="en-US" sz="3200" dirty="0">
+                <a:solidFill>
+                  <a:srgbClr val="3366CC"/>
+                </a:solidFill>
+                <a:latin typeface="Segoe UI" panose="020B0502040204020203" pitchFamily="34" charset="0"/>
+                <a:cs typeface="Segoe UI" panose="020B0502040204020203" pitchFamily="34" charset="0"/>
+                <a:sym typeface="Wingdings 3" panose="05040102010807070707" pitchFamily="18" charset="2"/>
+              </a:rPr>
+              <a:t>TTB </a:t>
+            </a:r>
+            <a:r>
+              <a:rPr lang="en-US" dirty="0">
+                <a:solidFill>
+                  <a:srgbClr val="3366CC"/>
+                </a:solidFill>
+                <a:latin typeface="Segoe UI" panose="020B0502040204020203" pitchFamily="34" charset="0"/>
+                <a:cs typeface="Segoe UI" panose="020B0502040204020203" pitchFamily="34" charset="0"/>
+                <a:sym typeface="Wingdings 3" panose="05040102010807070707" pitchFamily="18" charset="2"/>
+              </a:rPr>
+              <a:t>(time to build)</a:t>
+            </a:r>
+          </a:p>
+          <a:p>
+            <a:pPr algn="ctr"/>
+            <a:endParaRPr lang="en-US" sz="3200" dirty="0">
+              <a:solidFill>
+                <a:srgbClr val="3366CC"/>
+              </a:solidFill>
+              <a:latin typeface="Segoe UI" panose="020B0502040204020203" pitchFamily="34" charset="0"/>
+              <a:cs typeface="Segoe UI" panose="020B0502040204020203" pitchFamily="34" charset="0"/>
+              <a:sym typeface="Wingdings 3" panose="05040102010807070707" pitchFamily="18" charset="2"/>
+            </a:endParaRPr>
+          </a:p>
+          <a:p>
+            <a:pPr algn="ctr"/>
+            <a:r>
+              <a:rPr lang="en-US" sz="3200" dirty="0">
+                <a:solidFill>
+                  <a:srgbClr val="3366CC"/>
+                </a:solidFill>
+                <a:latin typeface="Segoe UI" panose="020B0502040204020203" pitchFamily="34" charset="0"/>
+                <a:cs typeface="Segoe UI" panose="020B0502040204020203" pitchFamily="34" charset="0"/>
+                <a:sym typeface="Wingdings 3" panose="05040102010807070707" pitchFamily="18" charset="2"/>
+              </a:rPr>
+              <a:t>TTR </a:t>
+            </a:r>
+            <a:r>
+              <a:rPr lang="en-US" dirty="0">
+                <a:solidFill>
+                  <a:srgbClr val="3366CC"/>
+                </a:solidFill>
+                <a:latin typeface="Segoe UI" panose="020B0502040204020203" pitchFamily="34" charset="0"/>
+                <a:cs typeface="Segoe UI" panose="020B0502040204020203" pitchFamily="34" charset="0"/>
+                <a:sym typeface="Wingdings 3" panose="05040102010807070707" pitchFamily="18" charset="2"/>
+              </a:rPr>
+              <a:t>(time to release)</a:t>
+            </a:r>
+          </a:p>
+          <a:p>
+            <a:pPr algn="ctr"/>
+            <a:endParaRPr lang="en-US" dirty="0">
+              <a:solidFill>
+                <a:srgbClr val="3366CC"/>
+              </a:solidFill>
+              <a:latin typeface="Segoe UI" panose="020B0502040204020203" pitchFamily="34" charset="0"/>
+              <a:cs typeface="Segoe UI" panose="020B0502040204020203" pitchFamily="34" charset="0"/>
+              <a:sym typeface="Wingdings 3" panose="05040102010807070707" pitchFamily="18" charset="2"/>
+            </a:endParaRPr>
+          </a:p>
+          <a:p>
+            <a:pPr algn="ctr"/>
+            <a:endParaRPr lang="en-US" sz="3200" dirty="0">
+              <a:solidFill>
+                <a:srgbClr val="3366CC"/>
+              </a:solidFill>
+              <a:latin typeface="Segoe UI" panose="020B0502040204020203" pitchFamily="34" charset="0"/>
+              <a:cs typeface="Segoe UI" panose="020B0502040204020203" pitchFamily="34" charset="0"/>
+              <a:sym typeface="Wingdings 3" panose="05040102010807070707" pitchFamily="18" charset="2"/>
+            </a:endParaRPr>
+          </a:p>
+          <a:p>
+            <a:pPr algn="ctr"/>
+            <a:r>
+              <a:rPr lang="en-US" sz="3200" dirty="0">
+                <a:solidFill>
+                  <a:srgbClr val="3366CC"/>
+                </a:solidFill>
+                <a:latin typeface="Segoe UI" panose="020B0502040204020203" pitchFamily="34" charset="0"/>
+                <a:cs typeface="Segoe UI" panose="020B0502040204020203" pitchFamily="34" charset="0"/>
+                <a:sym typeface="Wingdings 3" panose="05040102010807070707" pitchFamily="18" charset="2"/>
+              </a:rPr>
+              <a:t>ISSUE DETECTION</a:t>
+            </a:r>
+          </a:p>
+          <a:p>
+            <a:pPr algn="ctr"/>
+            <a:endParaRPr lang="en-US" sz="3200" dirty="0">
+              <a:solidFill>
+                <a:srgbClr val="3366CC"/>
+              </a:solidFill>
+              <a:latin typeface="Segoe UI" panose="020B0502040204020203" pitchFamily="34" charset="0"/>
+              <a:cs typeface="Segoe UI" panose="020B0502040204020203" pitchFamily="34" charset="0"/>
+              <a:sym typeface="Wingdings 3" panose="05040102010807070707" pitchFamily="18" charset="2"/>
+            </a:endParaRPr>
+          </a:p>
+          <a:p>
+            <a:pPr algn="ctr"/>
+            <a:r>
+              <a:rPr lang="en-US" sz="3200" dirty="0">
+                <a:solidFill>
+                  <a:srgbClr val="3366CC"/>
+                </a:solidFill>
+                <a:latin typeface="Segoe UI" panose="020B0502040204020203" pitchFamily="34" charset="0"/>
+                <a:cs typeface="Segoe UI" panose="020B0502040204020203" pitchFamily="34" charset="0"/>
+                <a:sym typeface="Wingdings 3" panose="05040102010807070707" pitchFamily="18" charset="2"/>
+              </a:rPr>
+              <a:t>ISSUE RESOLUTION  </a:t>
+            </a:r>
+            <a:endParaRPr lang="en-CA" sz="3200" dirty="0">
+              <a:solidFill>
+                <a:srgbClr val="3366CC"/>
+              </a:solidFill>
+              <a:latin typeface="Segoe UI" panose="020B0502040204020203" pitchFamily="34" charset="0"/>
+              <a:cs typeface="Segoe UI" panose="020B0502040204020203" pitchFamily="34" charset="0"/>
+            </a:endParaRPr>
+          </a:p>
+        </p:txBody>
+      </p:sp>
+      <p:pic>
+        <p:nvPicPr>
+          <p:cNvPr id="5" name="Graphic 4" descr="Gears">
+            <a:extLst>
+              <a:ext uri="{FF2B5EF4-FFF2-40B4-BE49-F238E27FC236}">
+                <a16:creationId xmlns:a16="http://schemas.microsoft.com/office/drawing/2014/main" id="{2EEC257D-F369-41DF-8749-D1F530E98BF3}"/>
+              </a:ext>
+            </a:extLst>
+          </p:cNvPr>
+          <p:cNvPicPr>
+            <a:picLocks noChangeAspect="1"/>
+          </p:cNvPicPr>
+          <p:nvPr/>
+        </p:nvPicPr>
+        <p:blipFill>
+          <a:blip r:embed="rId3">
+            <a:extLst>
+              <a:ext uri="{28A0092B-C50C-407E-A947-70E740481C1C}">
+                <a14:useLocalDpi xmlns:a14="http://schemas.microsoft.com/office/drawing/2010/main" val="0"/>
+              </a:ext>
+              <a:ext uri="{96DAC541-7B7A-43D3-8B79-37D633B846F1}">
+                <asvg:svgBlip xmlns:asvg="http://schemas.microsoft.com/office/drawing/2016/SVG/main" r:embed="rId4"/>
+              </a:ext>
+            </a:extLst>
+          </a:blip>
+          <a:stretch>
+            <a:fillRect/>
+          </a:stretch>
+        </p:blipFill>
+        <p:spPr>
+          <a:xfrm>
+            <a:off x="6319935" y="964760"/>
+            <a:ext cx="480123" cy="480123"/>
+          </a:xfrm>
+          <a:prstGeom prst="rect">
+            <a:avLst/>
+          </a:prstGeom>
+        </p:spPr>
+      </p:pic>
+      <p:pic>
+        <p:nvPicPr>
+          <p:cNvPr id="7" name="Graphic 6" descr="Box">
+            <a:extLst>
+              <a:ext uri="{FF2B5EF4-FFF2-40B4-BE49-F238E27FC236}">
+                <a16:creationId xmlns:a16="http://schemas.microsoft.com/office/drawing/2014/main" id="{03AA03E1-6C7B-486F-B9C7-A8FC5BBA5B2F}"/>
+              </a:ext>
+            </a:extLst>
+          </p:cNvPr>
+          <p:cNvPicPr>
+            <a:picLocks noChangeAspect="1"/>
+          </p:cNvPicPr>
+          <p:nvPr/>
+        </p:nvPicPr>
+        <p:blipFill>
+          <a:blip r:embed="rId5">
+            <a:extLst>
+              <a:ext uri="{28A0092B-C50C-407E-A947-70E740481C1C}">
+                <a14:useLocalDpi xmlns:a14="http://schemas.microsoft.com/office/drawing/2010/main" val="0"/>
+              </a:ext>
+              <a:ext uri="{96DAC541-7B7A-43D3-8B79-37D633B846F1}">
+                <asvg:svgBlip xmlns:asvg="http://schemas.microsoft.com/office/drawing/2016/SVG/main" r:embed="rId6"/>
+              </a:ext>
+            </a:extLst>
+          </a:blip>
+          <a:stretch>
+            <a:fillRect/>
+          </a:stretch>
+        </p:blipFill>
+        <p:spPr>
+          <a:xfrm>
+            <a:off x="6559996" y="1926182"/>
+            <a:ext cx="447476" cy="447476"/>
+          </a:xfrm>
+          <a:prstGeom prst="rect">
+            <a:avLst/>
+          </a:prstGeom>
+        </p:spPr>
+      </p:pic>
+      <p:pic>
+        <p:nvPicPr>
+          <p:cNvPr id="9" name="Graphic 8" descr="Clock">
+            <a:extLst>
+              <a:ext uri="{FF2B5EF4-FFF2-40B4-BE49-F238E27FC236}">
+                <a16:creationId xmlns:a16="http://schemas.microsoft.com/office/drawing/2014/main" id="{BE5C200F-C95C-4DD8-B56E-781587A06571}"/>
+              </a:ext>
+            </a:extLst>
+          </p:cNvPr>
+          <p:cNvPicPr>
+            <a:picLocks noChangeAspect="1"/>
+          </p:cNvPicPr>
+          <p:nvPr/>
+        </p:nvPicPr>
+        <p:blipFill>
+          <a:blip r:embed="rId7" cstate="print">
+            <a:extLst>
+              <a:ext uri="{28A0092B-C50C-407E-A947-70E740481C1C}">
+                <a14:useLocalDpi xmlns:a14="http://schemas.microsoft.com/office/drawing/2010/main" val="0"/>
+              </a:ext>
+              <a:ext uri="{96DAC541-7B7A-43D3-8B79-37D633B846F1}">
+                <asvg:svgBlip xmlns:asvg="http://schemas.microsoft.com/office/drawing/2016/SVG/main" r:embed="rId8"/>
+              </a:ext>
+            </a:extLst>
+          </a:blip>
+          <a:stretch>
+            <a:fillRect/>
+          </a:stretch>
+        </p:blipFill>
+        <p:spPr>
+          <a:xfrm>
+            <a:off x="5377481" y="2994792"/>
+            <a:ext cx="301668" cy="301668"/>
+          </a:xfrm>
+          <a:prstGeom prst="rect">
+            <a:avLst/>
+          </a:prstGeom>
+        </p:spPr>
+      </p:pic>
+      <p:pic>
+        <p:nvPicPr>
+          <p:cNvPr id="13" name="Graphic 12" descr="Bug">
+            <a:extLst>
+              <a:ext uri="{FF2B5EF4-FFF2-40B4-BE49-F238E27FC236}">
+                <a16:creationId xmlns:a16="http://schemas.microsoft.com/office/drawing/2014/main" id="{E08A25AA-9303-40E8-B46F-0A14C2BE558F}"/>
+              </a:ext>
+            </a:extLst>
+          </p:cNvPr>
+          <p:cNvPicPr>
+            <a:picLocks noChangeAspect="1"/>
+          </p:cNvPicPr>
+          <p:nvPr/>
+        </p:nvPicPr>
+        <p:blipFill>
+          <a:blip r:embed="rId9" cstate="print">
+            <a:extLst>
+              <a:ext uri="{28A0092B-C50C-407E-A947-70E740481C1C}">
+                <a14:useLocalDpi xmlns:a14="http://schemas.microsoft.com/office/drawing/2010/main" val="0"/>
+              </a:ext>
+              <a:ext uri="{96DAC541-7B7A-43D3-8B79-37D633B846F1}">
+                <asvg:svgBlip xmlns:asvg="http://schemas.microsoft.com/office/drawing/2016/SVG/main" r:embed="rId10"/>
+              </a:ext>
+            </a:extLst>
+          </a:blip>
+          <a:stretch>
+            <a:fillRect/>
+          </a:stretch>
+        </p:blipFill>
+        <p:spPr>
+          <a:xfrm>
+            <a:off x="7611836" y="6117922"/>
+            <a:ext cx="342983" cy="342983"/>
+          </a:xfrm>
+          <a:prstGeom prst="rect">
+            <a:avLst/>
+          </a:prstGeom>
+        </p:spPr>
+      </p:pic>
+      <p:sp>
+        <p:nvSpPr>
+          <p:cNvPr id="17" name="Rectangle 16">
+            <a:extLst>
+              <a:ext uri="{FF2B5EF4-FFF2-40B4-BE49-F238E27FC236}">
+                <a16:creationId xmlns:a16="http://schemas.microsoft.com/office/drawing/2014/main" id="{B70E71CA-13F4-4AAF-B823-B7D4004B0590}"/>
+              </a:ext>
+            </a:extLst>
+          </p:cNvPr>
+          <p:cNvSpPr/>
+          <p:nvPr/>
+        </p:nvSpPr>
+        <p:spPr>
+          <a:xfrm>
+            <a:off x="1602169" y="1966897"/>
+            <a:ext cx="1529906" cy="646331"/>
+          </a:xfrm>
+          <a:prstGeom prst="rect">
+            <a:avLst/>
+          </a:prstGeom>
+        </p:spPr>
+        <p:txBody>
+          <a:bodyPr wrap="none">
+            <a:spAutoFit/>
+          </a:bodyPr>
+          <a:lstStyle/>
+          <a:p>
+            <a:r>
+              <a:rPr lang="en-US" dirty="0">
+                <a:solidFill>
+                  <a:srgbClr val="C00000"/>
+                </a:solidFill>
+                <a:cs typeface="Segoe UI" panose="020B0502040204020203" pitchFamily="34" charset="0"/>
+              </a:rPr>
+              <a:t>MANUAL </a:t>
+            </a:r>
+            <a:br>
+              <a:rPr lang="en-US" dirty="0">
+                <a:solidFill>
+                  <a:srgbClr val="C00000"/>
+                </a:solidFill>
+                <a:cs typeface="Segoe UI" panose="020B0502040204020203" pitchFamily="34" charset="0"/>
+              </a:rPr>
+            </a:br>
+            <a:r>
+              <a:rPr lang="en-US" dirty="0">
+                <a:solidFill>
+                  <a:srgbClr val="C00000"/>
+                </a:solidFill>
+                <a:cs typeface="Segoe UI" panose="020B0502040204020203" pitchFamily="34" charset="0"/>
+              </a:rPr>
+              <a:t>ERROR PRONE</a:t>
+            </a:r>
+            <a:endParaRPr lang="en-CA" dirty="0">
+              <a:solidFill>
+                <a:srgbClr val="C00000"/>
+              </a:solidFill>
+            </a:endParaRPr>
+          </a:p>
+        </p:txBody>
+      </p:sp>
+      <p:pic>
+        <p:nvPicPr>
+          <p:cNvPr id="18" name="Graphic 17" descr="Man">
+            <a:extLst>
+              <a:ext uri="{FF2B5EF4-FFF2-40B4-BE49-F238E27FC236}">
+                <a16:creationId xmlns:a16="http://schemas.microsoft.com/office/drawing/2014/main" id="{421FBD24-863B-4897-AE55-12A26A13ADE9}"/>
+              </a:ext>
+            </a:extLst>
+          </p:cNvPr>
+          <p:cNvPicPr>
+            <a:picLocks noChangeAspect="1"/>
+          </p:cNvPicPr>
+          <p:nvPr/>
+        </p:nvPicPr>
+        <p:blipFill>
+          <a:blip r:embed="rId11">
+            <a:extLst>
+              <a:ext uri="{28A0092B-C50C-407E-A947-70E740481C1C}">
+                <a14:useLocalDpi xmlns:a14="http://schemas.microsoft.com/office/drawing/2010/main" val="0"/>
+              </a:ext>
+              <a:ext uri="{96DAC541-7B7A-43D3-8B79-37D633B846F1}">
+                <asvg:svgBlip xmlns:asvg="http://schemas.microsoft.com/office/drawing/2016/SVG/main" r:embed="rId12"/>
+              </a:ext>
+            </a:extLst>
+          </a:blip>
+          <a:stretch>
+            <a:fillRect/>
+          </a:stretch>
+        </p:blipFill>
+        <p:spPr>
+          <a:xfrm>
+            <a:off x="1119361" y="1951566"/>
+            <a:ext cx="676993" cy="676993"/>
+          </a:xfrm>
+          <a:prstGeom prst="rect">
+            <a:avLst/>
+          </a:prstGeom>
+        </p:spPr>
+      </p:pic>
+      <p:sp>
+        <p:nvSpPr>
+          <p:cNvPr id="19" name="Rectangle 18">
+            <a:extLst>
+              <a:ext uri="{FF2B5EF4-FFF2-40B4-BE49-F238E27FC236}">
+                <a16:creationId xmlns:a16="http://schemas.microsoft.com/office/drawing/2014/main" id="{3D92C07A-08C6-45CF-BCC0-9259A4DA68F3}"/>
+              </a:ext>
+            </a:extLst>
+          </p:cNvPr>
+          <p:cNvSpPr/>
+          <p:nvPr/>
+        </p:nvSpPr>
+        <p:spPr>
+          <a:xfrm>
+            <a:off x="1602169" y="980226"/>
+            <a:ext cx="1529906" cy="646331"/>
+          </a:xfrm>
+          <a:prstGeom prst="rect">
+            <a:avLst/>
+          </a:prstGeom>
+        </p:spPr>
+        <p:txBody>
+          <a:bodyPr wrap="none">
+            <a:spAutoFit/>
+          </a:bodyPr>
+          <a:lstStyle/>
+          <a:p>
+            <a:r>
+              <a:rPr lang="en-US" dirty="0">
+                <a:solidFill>
+                  <a:srgbClr val="C00000"/>
+                </a:solidFill>
+                <a:cs typeface="Segoe UI" panose="020B0502040204020203" pitchFamily="34" charset="0"/>
+              </a:rPr>
+              <a:t>MANUAL </a:t>
+            </a:r>
+            <a:br>
+              <a:rPr lang="en-US" dirty="0">
+                <a:solidFill>
+                  <a:srgbClr val="C00000"/>
+                </a:solidFill>
+                <a:cs typeface="Segoe UI" panose="020B0502040204020203" pitchFamily="34" charset="0"/>
+              </a:rPr>
+            </a:br>
+            <a:r>
+              <a:rPr lang="en-US" dirty="0">
+                <a:solidFill>
+                  <a:srgbClr val="C00000"/>
+                </a:solidFill>
+                <a:cs typeface="Segoe UI" panose="020B0502040204020203" pitchFamily="34" charset="0"/>
+              </a:rPr>
+              <a:t>ERROR PRONE</a:t>
+            </a:r>
+            <a:endParaRPr lang="en-CA" dirty="0">
+              <a:solidFill>
+                <a:srgbClr val="C00000"/>
+              </a:solidFill>
+            </a:endParaRPr>
+          </a:p>
+        </p:txBody>
+      </p:sp>
+      <p:pic>
+        <p:nvPicPr>
+          <p:cNvPr id="20" name="Graphic 19" descr="Man">
+            <a:extLst>
+              <a:ext uri="{FF2B5EF4-FFF2-40B4-BE49-F238E27FC236}">
+                <a16:creationId xmlns:a16="http://schemas.microsoft.com/office/drawing/2014/main" id="{899646A3-AC08-48A0-B505-BAF43C4DD72E}"/>
+              </a:ext>
+            </a:extLst>
+          </p:cNvPr>
+          <p:cNvPicPr>
+            <a:picLocks noChangeAspect="1"/>
+          </p:cNvPicPr>
+          <p:nvPr/>
+        </p:nvPicPr>
+        <p:blipFill>
+          <a:blip r:embed="rId11">
+            <a:extLst>
+              <a:ext uri="{28A0092B-C50C-407E-A947-70E740481C1C}">
+                <a14:useLocalDpi xmlns:a14="http://schemas.microsoft.com/office/drawing/2010/main" val="0"/>
+              </a:ext>
+              <a:ext uri="{96DAC541-7B7A-43D3-8B79-37D633B846F1}">
+                <asvg:svgBlip xmlns:asvg="http://schemas.microsoft.com/office/drawing/2016/SVG/main" r:embed="rId12"/>
+              </a:ext>
+            </a:extLst>
+          </a:blip>
+          <a:stretch>
+            <a:fillRect/>
+          </a:stretch>
+        </p:blipFill>
+        <p:spPr>
+          <a:xfrm>
+            <a:off x="1119361" y="964895"/>
+            <a:ext cx="676993" cy="676993"/>
+          </a:xfrm>
+          <a:prstGeom prst="rect">
+            <a:avLst/>
+          </a:prstGeom>
+        </p:spPr>
+      </p:pic>
+      <p:sp>
+        <p:nvSpPr>
+          <p:cNvPr id="21" name="Rectangle 20">
+            <a:extLst>
+              <a:ext uri="{FF2B5EF4-FFF2-40B4-BE49-F238E27FC236}">
+                <a16:creationId xmlns:a16="http://schemas.microsoft.com/office/drawing/2014/main" id="{3184BE54-D81C-46AF-A5D5-9E9C5E352276}"/>
+              </a:ext>
+            </a:extLst>
+          </p:cNvPr>
+          <p:cNvSpPr/>
+          <p:nvPr/>
+        </p:nvSpPr>
+        <p:spPr>
+          <a:xfrm>
+            <a:off x="1602169" y="3128253"/>
+            <a:ext cx="856517" cy="369332"/>
+          </a:xfrm>
+          <a:prstGeom prst="rect">
+            <a:avLst/>
+          </a:prstGeom>
+        </p:spPr>
+        <p:txBody>
+          <a:bodyPr wrap="none">
+            <a:spAutoFit/>
+          </a:bodyPr>
+          <a:lstStyle/>
+          <a:p>
+            <a:r>
+              <a:rPr lang="en-US" dirty="0">
+                <a:solidFill>
+                  <a:srgbClr val="C00000"/>
+                </a:solidFill>
+                <a:cs typeface="Segoe UI" panose="020B0502040204020203" pitchFamily="34" charset="0"/>
+              </a:rPr>
+              <a:t>HOURS</a:t>
+            </a:r>
+            <a:endParaRPr lang="en-CA" dirty="0">
+              <a:solidFill>
+                <a:srgbClr val="C00000"/>
+              </a:solidFill>
+            </a:endParaRPr>
+          </a:p>
+        </p:txBody>
+      </p:sp>
+      <p:sp>
+        <p:nvSpPr>
+          <p:cNvPr id="22" name="Rectangle 21">
+            <a:extLst>
+              <a:ext uri="{FF2B5EF4-FFF2-40B4-BE49-F238E27FC236}">
+                <a16:creationId xmlns:a16="http://schemas.microsoft.com/office/drawing/2014/main" id="{EA6456A7-4486-4817-9FB7-FB3AE4CF9170}"/>
+              </a:ext>
+            </a:extLst>
+          </p:cNvPr>
+          <p:cNvSpPr/>
+          <p:nvPr/>
+        </p:nvSpPr>
+        <p:spPr>
+          <a:xfrm>
+            <a:off x="1602169" y="4139979"/>
+            <a:ext cx="656142" cy="369332"/>
+          </a:xfrm>
+          <a:prstGeom prst="rect">
+            <a:avLst/>
+          </a:prstGeom>
+        </p:spPr>
+        <p:txBody>
+          <a:bodyPr wrap="none">
+            <a:spAutoFit/>
+          </a:bodyPr>
+          <a:lstStyle/>
+          <a:p>
+            <a:r>
+              <a:rPr lang="en-US" dirty="0">
+                <a:solidFill>
+                  <a:srgbClr val="C00000"/>
+                </a:solidFill>
+                <a:cs typeface="Segoe UI" panose="020B0502040204020203" pitchFamily="34" charset="0"/>
+              </a:rPr>
+              <a:t>DAYS</a:t>
+            </a:r>
+            <a:endParaRPr lang="en-CA" dirty="0">
+              <a:solidFill>
+                <a:srgbClr val="C00000"/>
+              </a:solidFill>
+            </a:endParaRPr>
+          </a:p>
+        </p:txBody>
+      </p:sp>
+      <p:sp>
+        <p:nvSpPr>
+          <p:cNvPr id="23" name="Rectangle 22">
+            <a:extLst>
+              <a:ext uri="{FF2B5EF4-FFF2-40B4-BE49-F238E27FC236}">
+                <a16:creationId xmlns:a16="http://schemas.microsoft.com/office/drawing/2014/main" id="{8A893219-FEE9-4C11-9006-D97BB96B9BCD}"/>
+              </a:ext>
+            </a:extLst>
+          </p:cNvPr>
+          <p:cNvSpPr/>
+          <p:nvPr/>
+        </p:nvSpPr>
+        <p:spPr>
+          <a:xfrm>
+            <a:off x="1602169" y="5354620"/>
+            <a:ext cx="1811073" cy="369332"/>
+          </a:xfrm>
+          <a:prstGeom prst="rect">
+            <a:avLst/>
+          </a:prstGeom>
+        </p:spPr>
+        <p:txBody>
+          <a:bodyPr wrap="none">
+            <a:spAutoFit/>
+          </a:bodyPr>
+          <a:lstStyle/>
+          <a:p>
+            <a:r>
+              <a:rPr lang="en-US" dirty="0">
+                <a:solidFill>
+                  <a:srgbClr val="C00000"/>
+                </a:solidFill>
+                <a:cs typeface="Segoe UI" panose="020B0502040204020203" pitchFamily="34" charset="0"/>
+              </a:rPr>
+              <a:t>CALL FROM USER</a:t>
+            </a:r>
+            <a:endParaRPr lang="en-CA" dirty="0">
+              <a:solidFill>
+                <a:srgbClr val="C00000"/>
+              </a:solidFill>
+            </a:endParaRPr>
+          </a:p>
+        </p:txBody>
+      </p:sp>
+      <p:pic>
+        <p:nvPicPr>
+          <p:cNvPr id="25" name="Graphic 24" descr="Telephone">
+            <a:extLst>
+              <a:ext uri="{FF2B5EF4-FFF2-40B4-BE49-F238E27FC236}">
+                <a16:creationId xmlns:a16="http://schemas.microsoft.com/office/drawing/2014/main" id="{E09408DF-2002-4645-9025-012BA56969F9}"/>
+              </a:ext>
+            </a:extLst>
+          </p:cNvPr>
+          <p:cNvPicPr>
+            <a:picLocks noChangeAspect="1"/>
+          </p:cNvPicPr>
+          <p:nvPr/>
+        </p:nvPicPr>
+        <p:blipFill>
+          <a:blip r:embed="rId13">
+            <a:extLst>
+              <a:ext uri="{28A0092B-C50C-407E-A947-70E740481C1C}">
+                <a14:useLocalDpi xmlns:a14="http://schemas.microsoft.com/office/drawing/2010/main" val="0"/>
+              </a:ext>
+              <a:ext uri="{96DAC541-7B7A-43D3-8B79-37D633B846F1}">
+                <asvg:svgBlip xmlns:asvg="http://schemas.microsoft.com/office/drawing/2016/SVG/main" r:embed="rId14"/>
+              </a:ext>
+            </a:extLst>
+          </a:blip>
+          <a:stretch>
+            <a:fillRect/>
+          </a:stretch>
+        </p:blipFill>
+        <p:spPr>
+          <a:xfrm>
+            <a:off x="1094299" y="5272686"/>
+            <a:ext cx="533201" cy="533201"/>
+          </a:xfrm>
+          <a:prstGeom prst="rect">
+            <a:avLst/>
+          </a:prstGeom>
+        </p:spPr>
+      </p:pic>
+      <p:sp>
+        <p:nvSpPr>
+          <p:cNvPr id="26" name="Rectangle 25">
+            <a:extLst>
+              <a:ext uri="{FF2B5EF4-FFF2-40B4-BE49-F238E27FC236}">
+                <a16:creationId xmlns:a16="http://schemas.microsoft.com/office/drawing/2014/main" id="{BF4400D9-C9C7-4640-8224-2233D4D0E6D8}"/>
+              </a:ext>
+            </a:extLst>
+          </p:cNvPr>
+          <p:cNvSpPr/>
+          <p:nvPr/>
+        </p:nvSpPr>
+        <p:spPr>
+          <a:xfrm>
+            <a:off x="1602169" y="6384050"/>
+            <a:ext cx="1486048" cy="369332"/>
+          </a:xfrm>
+          <a:prstGeom prst="rect">
+            <a:avLst/>
+          </a:prstGeom>
+        </p:spPr>
+        <p:txBody>
+          <a:bodyPr wrap="none">
+            <a:spAutoFit/>
+          </a:bodyPr>
+          <a:lstStyle/>
+          <a:p>
+            <a:r>
+              <a:rPr lang="en-US" dirty="0">
+                <a:solidFill>
+                  <a:srgbClr val="C00000"/>
+                </a:solidFill>
+                <a:cs typeface="Segoe UI" panose="020B0502040204020203" pitchFamily="34" charset="0"/>
+              </a:rPr>
+              <a:t>DAYS - WEEKS</a:t>
+            </a:r>
+            <a:endParaRPr lang="en-CA" dirty="0">
+              <a:solidFill>
+                <a:srgbClr val="C00000"/>
+              </a:solidFill>
+            </a:endParaRPr>
+          </a:p>
+        </p:txBody>
+      </p:sp>
+      <p:sp>
+        <p:nvSpPr>
+          <p:cNvPr id="27" name="Rectangle 26">
+            <a:extLst>
+              <a:ext uri="{FF2B5EF4-FFF2-40B4-BE49-F238E27FC236}">
+                <a16:creationId xmlns:a16="http://schemas.microsoft.com/office/drawing/2014/main" id="{79BE7AA4-F781-41C3-9CC5-8F1E14F31773}"/>
+              </a:ext>
+            </a:extLst>
+          </p:cNvPr>
+          <p:cNvSpPr/>
+          <p:nvPr/>
+        </p:nvSpPr>
+        <p:spPr>
+          <a:xfrm>
+            <a:off x="9232555" y="1966897"/>
+            <a:ext cx="1398844" cy="646331"/>
+          </a:xfrm>
+          <a:prstGeom prst="rect">
+            <a:avLst/>
+          </a:prstGeom>
+        </p:spPr>
+        <p:txBody>
+          <a:bodyPr wrap="none">
+            <a:spAutoFit/>
+          </a:bodyPr>
+          <a:lstStyle/>
+          <a:p>
+            <a:pPr algn="r"/>
+            <a:r>
+              <a:rPr lang="en-US" dirty="0">
+                <a:solidFill>
+                  <a:srgbClr val="00B050"/>
+                </a:solidFill>
+                <a:cs typeface="Segoe UI" panose="020B0502040204020203" pitchFamily="34" charset="0"/>
+              </a:rPr>
+              <a:t>AUTOMATED</a:t>
+            </a:r>
+          </a:p>
+          <a:p>
+            <a:pPr algn="r"/>
+            <a:r>
+              <a:rPr lang="en-US" dirty="0">
+                <a:solidFill>
+                  <a:srgbClr val="00B050"/>
+                </a:solidFill>
+                <a:cs typeface="Segoe UI" panose="020B0502040204020203" pitchFamily="34" charset="0"/>
+              </a:rPr>
+              <a:t>CONSISTENT</a:t>
+            </a:r>
+            <a:endParaRPr lang="en-CA" dirty="0">
+              <a:solidFill>
+                <a:srgbClr val="00B050"/>
+              </a:solidFill>
+            </a:endParaRPr>
+          </a:p>
+        </p:txBody>
+      </p:sp>
+      <p:sp>
+        <p:nvSpPr>
+          <p:cNvPr id="29" name="Rectangle 28">
+            <a:extLst>
+              <a:ext uri="{FF2B5EF4-FFF2-40B4-BE49-F238E27FC236}">
+                <a16:creationId xmlns:a16="http://schemas.microsoft.com/office/drawing/2014/main" id="{52200813-BDD6-4B79-9817-BC54B9AFF633}"/>
+              </a:ext>
+            </a:extLst>
+          </p:cNvPr>
+          <p:cNvSpPr/>
+          <p:nvPr/>
+        </p:nvSpPr>
+        <p:spPr>
+          <a:xfrm>
+            <a:off x="9232555" y="980226"/>
+            <a:ext cx="1398844" cy="646331"/>
+          </a:xfrm>
+          <a:prstGeom prst="rect">
+            <a:avLst/>
+          </a:prstGeom>
+        </p:spPr>
+        <p:txBody>
+          <a:bodyPr wrap="none">
+            <a:spAutoFit/>
+          </a:bodyPr>
+          <a:lstStyle/>
+          <a:p>
+            <a:pPr algn="r"/>
+            <a:r>
+              <a:rPr lang="en-US" dirty="0">
+                <a:solidFill>
+                  <a:srgbClr val="00B050"/>
+                </a:solidFill>
+              </a:rPr>
+              <a:t>AUTOMATED</a:t>
+            </a:r>
+          </a:p>
+          <a:p>
+            <a:pPr algn="r"/>
+            <a:r>
+              <a:rPr lang="en-US" dirty="0">
+                <a:solidFill>
+                  <a:srgbClr val="00B050"/>
+                </a:solidFill>
+              </a:rPr>
+              <a:t>CONSISTENT</a:t>
+            </a:r>
+            <a:endParaRPr lang="en-CA" dirty="0">
+              <a:solidFill>
+                <a:srgbClr val="00B050"/>
+              </a:solidFill>
+            </a:endParaRPr>
+          </a:p>
+        </p:txBody>
+      </p:sp>
+      <p:sp>
+        <p:nvSpPr>
+          <p:cNvPr id="31" name="Rectangle 30">
+            <a:extLst>
+              <a:ext uri="{FF2B5EF4-FFF2-40B4-BE49-F238E27FC236}">
+                <a16:creationId xmlns:a16="http://schemas.microsoft.com/office/drawing/2014/main" id="{C75D8F19-2752-42FB-80C4-5BED389EB775}"/>
+              </a:ext>
+            </a:extLst>
+          </p:cNvPr>
+          <p:cNvSpPr/>
+          <p:nvPr/>
+        </p:nvSpPr>
+        <p:spPr>
+          <a:xfrm>
+            <a:off x="9560208" y="3134708"/>
+            <a:ext cx="1071191" cy="369332"/>
+          </a:xfrm>
+          <a:prstGeom prst="rect">
+            <a:avLst/>
+          </a:prstGeom>
+        </p:spPr>
+        <p:txBody>
+          <a:bodyPr wrap="none">
+            <a:spAutoFit/>
+          </a:bodyPr>
+          <a:lstStyle/>
+          <a:p>
+            <a:pPr algn="r"/>
+            <a:r>
+              <a:rPr lang="en-US" dirty="0">
+                <a:solidFill>
+                  <a:srgbClr val="00B050"/>
+                </a:solidFill>
+                <a:cs typeface="Segoe UI" panose="020B0502040204020203" pitchFamily="34" charset="0"/>
+              </a:rPr>
+              <a:t>SECONDS</a:t>
+            </a:r>
+            <a:endParaRPr lang="en-CA" dirty="0">
+              <a:solidFill>
+                <a:srgbClr val="00B050"/>
+              </a:solidFill>
+            </a:endParaRPr>
+          </a:p>
+        </p:txBody>
+      </p:sp>
+      <p:sp>
+        <p:nvSpPr>
+          <p:cNvPr id="32" name="Rectangle 31">
+            <a:extLst>
+              <a:ext uri="{FF2B5EF4-FFF2-40B4-BE49-F238E27FC236}">
+                <a16:creationId xmlns:a16="http://schemas.microsoft.com/office/drawing/2014/main" id="{6D32CFFA-DC31-4FE8-AC80-6EBAF910500F}"/>
+              </a:ext>
+            </a:extLst>
+          </p:cNvPr>
+          <p:cNvSpPr/>
+          <p:nvPr/>
+        </p:nvSpPr>
+        <p:spPr>
+          <a:xfrm>
+            <a:off x="9567325" y="4139979"/>
+            <a:ext cx="1064074" cy="369332"/>
+          </a:xfrm>
+          <a:prstGeom prst="rect">
+            <a:avLst/>
+          </a:prstGeom>
+        </p:spPr>
+        <p:txBody>
+          <a:bodyPr wrap="none">
+            <a:spAutoFit/>
+          </a:bodyPr>
+          <a:lstStyle/>
+          <a:p>
+            <a:pPr algn="r"/>
+            <a:r>
+              <a:rPr lang="en-US" dirty="0">
+                <a:solidFill>
+                  <a:srgbClr val="00B050"/>
+                </a:solidFill>
+                <a:cs typeface="Segoe UI" panose="020B0502040204020203" pitchFamily="34" charset="0"/>
+              </a:rPr>
+              <a:t>MINUTES</a:t>
+            </a:r>
+            <a:endParaRPr lang="en-CA" dirty="0">
+              <a:solidFill>
+                <a:srgbClr val="00B050"/>
+              </a:solidFill>
+            </a:endParaRPr>
+          </a:p>
+        </p:txBody>
+      </p:sp>
+      <p:sp>
+        <p:nvSpPr>
+          <p:cNvPr id="33" name="Rectangle 32">
+            <a:extLst>
+              <a:ext uri="{FF2B5EF4-FFF2-40B4-BE49-F238E27FC236}">
+                <a16:creationId xmlns:a16="http://schemas.microsoft.com/office/drawing/2014/main" id="{AD8E9CA0-2444-4524-84DA-B640DEA63DC4}"/>
+              </a:ext>
+            </a:extLst>
+          </p:cNvPr>
+          <p:cNvSpPr/>
+          <p:nvPr/>
+        </p:nvSpPr>
+        <p:spPr>
+          <a:xfrm>
+            <a:off x="9386058" y="5354620"/>
+            <a:ext cx="1245341" cy="369332"/>
+          </a:xfrm>
+          <a:prstGeom prst="rect">
+            <a:avLst/>
+          </a:prstGeom>
+        </p:spPr>
+        <p:txBody>
+          <a:bodyPr wrap="none">
+            <a:spAutoFit/>
+          </a:bodyPr>
+          <a:lstStyle/>
+          <a:p>
+            <a:pPr algn="r"/>
+            <a:r>
+              <a:rPr lang="en-US" dirty="0">
+                <a:solidFill>
+                  <a:srgbClr val="00B050"/>
+                </a:solidFill>
+                <a:cs typeface="Segoe UI" panose="020B0502040204020203" pitchFamily="34" charset="0"/>
+              </a:rPr>
+              <a:t>PROACTIVE</a:t>
+            </a:r>
+            <a:endParaRPr lang="en-CA" dirty="0">
+              <a:solidFill>
+                <a:srgbClr val="00B050"/>
+              </a:solidFill>
+            </a:endParaRPr>
+          </a:p>
+        </p:txBody>
+      </p:sp>
+      <p:sp>
+        <p:nvSpPr>
+          <p:cNvPr id="35" name="Rectangle 34">
+            <a:extLst>
+              <a:ext uri="{FF2B5EF4-FFF2-40B4-BE49-F238E27FC236}">
+                <a16:creationId xmlns:a16="http://schemas.microsoft.com/office/drawing/2014/main" id="{AB2BD789-E97F-46CC-B087-AF8AAF3411BD}"/>
+              </a:ext>
+            </a:extLst>
+          </p:cNvPr>
+          <p:cNvSpPr/>
+          <p:nvPr/>
+        </p:nvSpPr>
+        <p:spPr>
+          <a:xfrm>
+            <a:off x="8919519" y="6384050"/>
+            <a:ext cx="1711880" cy="369332"/>
+          </a:xfrm>
+          <a:prstGeom prst="rect">
+            <a:avLst/>
+          </a:prstGeom>
+        </p:spPr>
+        <p:txBody>
+          <a:bodyPr wrap="none">
+            <a:spAutoFit/>
+          </a:bodyPr>
+          <a:lstStyle/>
+          <a:p>
+            <a:pPr algn="r"/>
+            <a:r>
+              <a:rPr lang="en-US" dirty="0">
+                <a:solidFill>
+                  <a:srgbClr val="00B050"/>
+                </a:solidFill>
+                <a:cs typeface="Segoe UI" panose="020B0502040204020203" pitchFamily="34" charset="0"/>
+              </a:rPr>
+              <a:t>MINUTES - DAYS</a:t>
+            </a:r>
+            <a:endParaRPr lang="en-CA" dirty="0">
+              <a:solidFill>
+                <a:srgbClr val="00B050"/>
+              </a:solidFill>
+            </a:endParaRPr>
+          </a:p>
+        </p:txBody>
+      </p:sp>
+      <p:pic>
+        <p:nvPicPr>
+          <p:cNvPr id="40" name="Graphic 39" descr="Bar chart">
+            <a:extLst>
+              <a:ext uri="{FF2B5EF4-FFF2-40B4-BE49-F238E27FC236}">
+                <a16:creationId xmlns:a16="http://schemas.microsoft.com/office/drawing/2014/main" id="{00931057-8A9A-4450-A9C8-5F1D1C7A039B}"/>
+              </a:ext>
+            </a:extLst>
+          </p:cNvPr>
+          <p:cNvPicPr>
+            <a:picLocks noChangeAspect="1"/>
+          </p:cNvPicPr>
+          <p:nvPr/>
+        </p:nvPicPr>
+        <p:blipFill>
+          <a:blip r:embed="rId15">
+            <a:extLst>
+              <a:ext uri="{28A0092B-C50C-407E-A947-70E740481C1C}">
+                <a14:useLocalDpi xmlns:a14="http://schemas.microsoft.com/office/drawing/2010/main" val="0"/>
+              </a:ext>
+              <a:ext uri="{96DAC541-7B7A-43D3-8B79-37D633B846F1}">
+                <asvg:svgBlip xmlns:asvg="http://schemas.microsoft.com/office/drawing/2016/SVG/main" r:embed="rId16"/>
+              </a:ext>
+            </a:extLst>
+          </a:blip>
+          <a:stretch>
+            <a:fillRect/>
+          </a:stretch>
+        </p:blipFill>
+        <p:spPr>
+          <a:xfrm>
+            <a:off x="10576057" y="5199189"/>
+            <a:ext cx="606152" cy="606152"/>
+          </a:xfrm>
+          <a:prstGeom prst="rect">
+            <a:avLst/>
+          </a:prstGeom>
+        </p:spPr>
+      </p:pic>
+      <p:pic>
+        <p:nvPicPr>
+          <p:cNvPr id="42" name="Graphic 41" descr="Factory">
+            <a:extLst>
+              <a:ext uri="{FF2B5EF4-FFF2-40B4-BE49-F238E27FC236}">
+                <a16:creationId xmlns:a16="http://schemas.microsoft.com/office/drawing/2014/main" id="{AA50D103-2A31-4945-AE51-EB25BEB5981A}"/>
+              </a:ext>
+            </a:extLst>
+          </p:cNvPr>
+          <p:cNvPicPr>
+            <a:picLocks noChangeAspect="1"/>
+          </p:cNvPicPr>
+          <p:nvPr/>
+        </p:nvPicPr>
+        <p:blipFill>
+          <a:blip r:embed="rId17">
+            <a:extLst>
+              <a:ext uri="{28A0092B-C50C-407E-A947-70E740481C1C}">
+                <a14:useLocalDpi xmlns:a14="http://schemas.microsoft.com/office/drawing/2010/main" val="0"/>
+              </a:ext>
+              <a:ext uri="{96DAC541-7B7A-43D3-8B79-37D633B846F1}">
+                <asvg:svgBlip xmlns:asvg="http://schemas.microsoft.com/office/drawing/2016/SVG/main" r:embed="rId18"/>
+              </a:ext>
+            </a:extLst>
+          </a:blip>
+          <a:stretch>
+            <a:fillRect/>
+          </a:stretch>
+        </p:blipFill>
+        <p:spPr>
+          <a:xfrm>
+            <a:off x="10594002" y="1027485"/>
+            <a:ext cx="565501" cy="565501"/>
+          </a:xfrm>
+          <a:prstGeom prst="rect">
+            <a:avLst/>
+          </a:prstGeom>
+        </p:spPr>
+      </p:pic>
+      <p:pic>
+        <p:nvPicPr>
+          <p:cNvPr id="43" name="Graphic 42" descr="Factory">
+            <a:extLst>
+              <a:ext uri="{FF2B5EF4-FFF2-40B4-BE49-F238E27FC236}">
+                <a16:creationId xmlns:a16="http://schemas.microsoft.com/office/drawing/2014/main" id="{AF49E30C-3E53-403F-A76D-BC9DCC9315BC}"/>
+              </a:ext>
+            </a:extLst>
+          </p:cNvPr>
+          <p:cNvPicPr>
+            <a:picLocks noChangeAspect="1"/>
+          </p:cNvPicPr>
+          <p:nvPr/>
+        </p:nvPicPr>
+        <p:blipFill>
+          <a:blip r:embed="rId17">
+            <a:extLst>
+              <a:ext uri="{28A0092B-C50C-407E-A947-70E740481C1C}">
+                <a14:useLocalDpi xmlns:a14="http://schemas.microsoft.com/office/drawing/2010/main" val="0"/>
+              </a:ext>
+              <a:ext uri="{96DAC541-7B7A-43D3-8B79-37D633B846F1}">
+                <asvg:svgBlip xmlns:asvg="http://schemas.microsoft.com/office/drawing/2016/SVG/main" r:embed="rId18"/>
+              </a:ext>
+            </a:extLst>
+          </a:blip>
+          <a:stretch>
+            <a:fillRect/>
+          </a:stretch>
+        </p:blipFill>
+        <p:spPr>
+          <a:xfrm>
+            <a:off x="10576057" y="2005090"/>
+            <a:ext cx="566718" cy="566718"/>
+          </a:xfrm>
+          <a:prstGeom prst="rect">
+            <a:avLst/>
+          </a:prstGeom>
+        </p:spPr>
+      </p:pic>
+      <p:pic>
+        <p:nvPicPr>
+          <p:cNvPr id="30" name="Graphic 29" descr="Clock">
+            <a:extLst>
+              <a:ext uri="{FF2B5EF4-FFF2-40B4-BE49-F238E27FC236}">
+                <a16:creationId xmlns:a16="http://schemas.microsoft.com/office/drawing/2014/main" id="{10087B20-408B-4B94-B148-BE68E6F70D68}"/>
+              </a:ext>
+            </a:extLst>
+          </p:cNvPr>
+          <p:cNvPicPr>
+            <a:picLocks noChangeAspect="1"/>
+          </p:cNvPicPr>
+          <p:nvPr/>
+        </p:nvPicPr>
+        <p:blipFill>
+          <a:blip r:embed="rId7" cstate="print">
+            <a:extLst>
+              <a:ext uri="{28A0092B-C50C-407E-A947-70E740481C1C}">
+                <a14:useLocalDpi xmlns:a14="http://schemas.microsoft.com/office/drawing/2010/main" val="0"/>
+              </a:ext>
+              <a:ext uri="{96DAC541-7B7A-43D3-8B79-37D633B846F1}">
+                <asvg:svgBlip xmlns:asvg="http://schemas.microsoft.com/office/drawing/2016/SVG/main" r:embed="rId8"/>
+              </a:ext>
+            </a:extLst>
+          </a:blip>
+          <a:stretch>
+            <a:fillRect/>
+          </a:stretch>
+        </p:blipFill>
+        <p:spPr>
+          <a:xfrm>
+            <a:off x="5265009" y="3947083"/>
+            <a:ext cx="301668" cy="301668"/>
+          </a:xfrm>
+          <a:prstGeom prst="rect">
+            <a:avLst/>
+          </a:prstGeom>
+        </p:spPr>
+      </p:pic>
+      <p:pic>
+        <p:nvPicPr>
+          <p:cNvPr id="34" name="Graphic 33" descr="Bug">
+            <a:extLst>
+              <a:ext uri="{FF2B5EF4-FFF2-40B4-BE49-F238E27FC236}">
+                <a16:creationId xmlns:a16="http://schemas.microsoft.com/office/drawing/2014/main" id="{BA08B6AD-984A-4573-9A6A-7765BA0D1FE3}"/>
+              </a:ext>
+            </a:extLst>
+          </p:cNvPr>
+          <p:cNvPicPr>
+            <a:picLocks noChangeAspect="1"/>
+          </p:cNvPicPr>
+          <p:nvPr/>
+        </p:nvPicPr>
+        <p:blipFill>
+          <a:blip r:embed="rId9" cstate="print">
+            <a:extLst>
+              <a:ext uri="{28A0092B-C50C-407E-A947-70E740481C1C}">
+                <a14:useLocalDpi xmlns:a14="http://schemas.microsoft.com/office/drawing/2010/main" val="0"/>
+              </a:ext>
+              <a:ext uri="{96DAC541-7B7A-43D3-8B79-37D633B846F1}">
+                <asvg:svgBlip xmlns:asvg="http://schemas.microsoft.com/office/drawing/2016/SVG/main" r:embed="rId10"/>
+              </a:ext>
+            </a:extLst>
+          </a:blip>
+          <a:stretch>
+            <a:fillRect/>
+          </a:stretch>
+        </p:blipFill>
+        <p:spPr>
+          <a:xfrm>
+            <a:off x="7454988" y="5206352"/>
+            <a:ext cx="342983" cy="342983"/>
+          </a:xfrm>
+          <a:prstGeom prst="rect">
+            <a:avLst/>
+          </a:prstGeom>
+        </p:spPr>
+      </p:pic>
+    </p:spTree>
+    <p:extLst>
+      <p:ext uri="{BB962C8B-B14F-4D97-AF65-F5344CB8AC3E}">
+        <p14:creationId xmlns:p14="http://schemas.microsoft.com/office/powerpoint/2010/main" val="1143639952"/>
       </p:ext>
     </p:extLst>
   </p:cSld>

</xml_diff>

<commit_message>
Devops/phase rollout rings (#22)
* Action VM's feedback

JG has reviewed the changes and is A OK to merge.

* Minor typo with users environment.
</commit_message>
<xml_diff>
--- a/src/DevOps/Illustrations.pptx
+++ b/src/DevOps/Illustrations.pptx
@@ -212,7 +212,7 @@
           <a:p>
             <a:fld id="{EB1108B4-53EF-4F9E-9491-F5ABDE6A4EA7}" type="datetimeFigureOut">
               <a:rPr lang="en-CA" smtClean="0"/>
-              <a:t>2017-05-26</a:t>
+              <a:t>2017-05-31</a:t>
             </a:fld>
             <a:endParaRPr lang="en-CA"/>
           </a:p>
@@ -1619,7 +1619,7 @@
           <a:p>
             <a:fld id="{F71EBF1D-DE49-4C53-B029-DA93D2E44EE4}" type="datetimeFigureOut">
               <a:rPr lang="en-CA" smtClean="0"/>
-              <a:t>2017-05-26</a:t>
+              <a:t>2017-05-31</a:t>
             </a:fld>
             <a:endParaRPr lang="en-CA"/>
           </a:p>
@@ -1789,7 +1789,7 @@
           <a:p>
             <a:fld id="{F71EBF1D-DE49-4C53-B029-DA93D2E44EE4}" type="datetimeFigureOut">
               <a:rPr lang="en-CA" smtClean="0"/>
-              <a:t>2017-05-26</a:t>
+              <a:t>2017-05-31</a:t>
             </a:fld>
             <a:endParaRPr lang="en-CA"/>
           </a:p>
@@ -1969,7 +1969,7 @@
           <a:p>
             <a:fld id="{F71EBF1D-DE49-4C53-B029-DA93D2E44EE4}" type="datetimeFigureOut">
               <a:rPr lang="en-CA" smtClean="0"/>
-              <a:t>2017-05-26</a:t>
+              <a:t>2017-05-31</a:t>
             </a:fld>
             <a:endParaRPr lang="en-CA"/>
           </a:p>
@@ -2139,7 +2139,7 @@
           <a:p>
             <a:fld id="{F71EBF1D-DE49-4C53-B029-DA93D2E44EE4}" type="datetimeFigureOut">
               <a:rPr lang="en-CA" smtClean="0"/>
-              <a:t>2017-05-26</a:t>
+              <a:t>2017-05-31</a:t>
             </a:fld>
             <a:endParaRPr lang="en-CA"/>
           </a:p>
@@ -2385,7 +2385,7 @@
           <a:p>
             <a:fld id="{F71EBF1D-DE49-4C53-B029-DA93D2E44EE4}" type="datetimeFigureOut">
               <a:rPr lang="en-CA" smtClean="0"/>
-              <a:t>2017-05-26</a:t>
+              <a:t>2017-05-31</a:t>
             </a:fld>
             <a:endParaRPr lang="en-CA"/>
           </a:p>
@@ -2617,7 +2617,7 @@
           <a:p>
             <a:fld id="{F71EBF1D-DE49-4C53-B029-DA93D2E44EE4}" type="datetimeFigureOut">
               <a:rPr lang="en-CA" smtClean="0"/>
-              <a:t>2017-05-26</a:t>
+              <a:t>2017-05-31</a:t>
             </a:fld>
             <a:endParaRPr lang="en-CA"/>
           </a:p>
@@ -2984,7 +2984,7 @@
           <a:p>
             <a:fld id="{F71EBF1D-DE49-4C53-B029-DA93D2E44EE4}" type="datetimeFigureOut">
               <a:rPr lang="en-CA" smtClean="0"/>
-              <a:t>2017-05-26</a:t>
+              <a:t>2017-05-31</a:t>
             </a:fld>
             <a:endParaRPr lang="en-CA"/>
           </a:p>
@@ -3121,7 +3121,7 @@
           <a:p>
             <a:fld id="{F71EBF1D-DE49-4C53-B029-DA93D2E44EE4}" type="datetimeFigureOut">
               <a:rPr lang="en-CA" smtClean="0"/>
-              <a:t>2017-05-26</a:t>
+              <a:t>2017-05-31</a:t>
             </a:fld>
             <a:endParaRPr lang="en-CA"/>
           </a:p>
@@ -3216,7 +3216,7 @@
           <a:p>
             <a:fld id="{F71EBF1D-DE49-4C53-B029-DA93D2E44EE4}" type="datetimeFigureOut">
               <a:rPr lang="en-CA" smtClean="0"/>
-              <a:t>2017-05-26</a:t>
+              <a:t>2017-05-31</a:t>
             </a:fld>
             <a:endParaRPr lang="en-CA"/>
           </a:p>
@@ -3493,7 +3493,7 @@
           <a:p>
             <a:fld id="{F71EBF1D-DE49-4C53-B029-DA93D2E44EE4}" type="datetimeFigureOut">
               <a:rPr lang="en-CA" smtClean="0"/>
-              <a:t>2017-05-26</a:t>
+              <a:t>2017-05-31</a:t>
             </a:fld>
             <a:endParaRPr lang="en-CA"/>
           </a:p>
@@ -3746,7 +3746,7 @@
           <a:p>
             <a:fld id="{F71EBF1D-DE49-4C53-B029-DA93D2E44EE4}" type="datetimeFigureOut">
               <a:rPr lang="en-CA" smtClean="0"/>
-              <a:t>2017-05-26</a:t>
+              <a:t>2017-05-31</a:t>
             </a:fld>
             <a:endParaRPr lang="en-CA"/>
           </a:p>
@@ -3959,7 +3959,7 @@
           <a:p>
             <a:fld id="{F71EBF1D-DE49-4C53-B029-DA93D2E44EE4}" type="datetimeFigureOut">
               <a:rPr lang="en-CA" smtClean="0"/>
-              <a:t>2017-05-26</a:t>
+              <a:t>2017-05-31</a:t>
             </a:fld>
             <a:endParaRPr lang="en-CA"/>
           </a:p>
@@ -12826,52 +12826,6 @@
       </p:grpSpPr>
       <p:sp>
         <p:nvSpPr>
-          <p:cNvPr id="94" name="Cylinder 93">
-            <a:extLst>
-              <a:ext uri="{FF2B5EF4-FFF2-40B4-BE49-F238E27FC236}">
-                <a16:creationId xmlns:a16="http://schemas.microsoft.com/office/drawing/2014/main" id="{A0958864-8217-4156-8404-E313E3BD06F2}"/>
-              </a:ext>
-            </a:extLst>
-          </p:cNvPr>
-          <p:cNvSpPr/>
-          <p:nvPr/>
-        </p:nvSpPr>
-        <p:spPr>
-          <a:xfrm rot="16200000">
-            <a:off x="4568496" y="-3523256"/>
-            <a:ext cx="1519649" cy="10369964"/>
-          </a:xfrm>
-          <a:prstGeom prst="can">
-            <a:avLst>
-              <a:gd name="adj" fmla="val 13510"/>
-            </a:avLst>
-          </a:prstGeom>
-        </p:spPr>
-        <p:style>
-          <a:lnRef idx="2">
-            <a:schemeClr val="accent5"/>
-          </a:lnRef>
-          <a:fillRef idx="1">
-            <a:schemeClr val="lt1"/>
-          </a:fillRef>
-          <a:effectRef idx="0">
-            <a:schemeClr val="accent5"/>
-          </a:effectRef>
-          <a:fontRef idx="minor">
-            <a:schemeClr val="dk1"/>
-          </a:fontRef>
-        </p:style>
-        <p:txBody>
-          <a:bodyPr rtlCol="0" anchor="ctr"/>
-          <a:lstStyle/>
-          <a:p>
-            <a:pPr algn="ctr"/>
-            <a:endParaRPr lang="en-CA"/>
-          </a:p>
-        </p:txBody>
-      </p:sp>
-      <p:sp>
-        <p:nvSpPr>
           <p:cNvPr id="52" name="Right Triangle 51">
             <a:extLst>
               <a:ext uri="{FF2B5EF4-FFF2-40B4-BE49-F238E27FC236}">
@@ -12925,6 +12879,199 @@
           </a:p>
         </p:txBody>
       </p:sp>
+      <p:cxnSp>
+        <p:nvCxnSpPr>
+          <p:cNvPr id="57" name="Straight Connector 56">
+            <a:extLst>
+              <a:ext uri="{FF2B5EF4-FFF2-40B4-BE49-F238E27FC236}">
+                <a16:creationId xmlns:a16="http://schemas.microsoft.com/office/drawing/2014/main" id="{A2E57009-F88B-412B-890D-C7F6065077AE}"/>
+              </a:ext>
+            </a:extLst>
+          </p:cNvPr>
+          <p:cNvCxnSpPr>
+            <a:cxnSpLocks/>
+          </p:cNvCxnSpPr>
+          <p:nvPr/>
+        </p:nvCxnSpPr>
+        <p:spPr>
+          <a:xfrm flipH="1" flipV="1">
+            <a:off x="1769065" y="4268769"/>
+            <a:ext cx="8698289" cy="22938"/>
+          </a:xfrm>
+          <a:prstGeom prst="line">
+            <a:avLst/>
+          </a:prstGeom>
+          <a:ln/>
+        </p:spPr>
+        <p:style>
+          <a:lnRef idx="1">
+            <a:schemeClr val="accent3"/>
+          </a:lnRef>
+          <a:fillRef idx="0">
+            <a:schemeClr val="accent3"/>
+          </a:fillRef>
+          <a:effectRef idx="0">
+            <a:schemeClr val="accent3"/>
+          </a:effectRef>
+          <a:fontRef idx="minor">
+            <a:schemeClr val="tx1"/>
+          </a:fontRef>
+        </p:style>
+      </p:cxnSp>
+      <p:cxnSp>
+        <p:nvCxnSpPr>
+          <p:cNvPr id="61" name="Straight Connector 60">
+            <a:extLst>
+              <a:ext uri="{FF2B5EF4-FFF2-40B4-BE49-F238E27FC236}">
+                <a16:creationId xmlns:a16="http://schemas.microsoft.com/office/drawing/2014/main" id="{AC56B326-4519-482A-9F9A-93BC826B9AB3}"/>
+              </a:ext>
+            </a:extLst>
+          </p:cNvPr>
+          <p:cNvCxnSpPr>
+            <a:cxnSpLocks/>
+          </p:cNvCxnSpPr>
+          <p:nvPr/>
+        </p:nvCxnSpPr>
+        <p:spPr>
+          <a:xfrm flipH="1">
+            <a:off x="1757191" y="3707844"/>
+            <a:ext cx="8710162" cy="0"/>
+          </a:xfrm>
+          <a:prstGeom prst="line">
+            <a:avLst/>
+          </a:prstGeom>
+          <a:ln/>
+        </p:spPr>
+        <p:style>
+          <a:lnRef idx="1">
+            <a:schemeClr val="accent3"/>
+          </a:lnRef>
+          <a:fillRef idx="0">
+            <a:schemeClr val="accent3"/>
+          </a:fillRef>
+          <a:effectRef idx="0">
+            <a:schemeClr val="accent3"/>
+          </a:effectRef>
+          <a:fontRef idx="minor">
+            <a:schemeClr val="tx1"/>
+          </a:fontRef>
+        </p:style>
+      </p:cxnSp>
+      <p:cxnSp>
+        <p:nvCxnSpPr>
+          <p:cNvPr id="64" name="Straight Connector 63">
+            <a:extLst>
+              <a:ext uri="{FF2B5EF4-FFF2-40B4-BE49-F238E27FC236}">
+                <a16:creationId xmlns:a16="http://schemas.microsoft.com/office/drawing/2014/main" id="{C0EF3E87-77F2-46B0-A6F1-45E6F71A5D57}"/>
+              </a:ext>
+            </a:extLst>
+          </p:cNvPr>
+          <p:cNvCxnSpPr>
+            <a:cxnSpLocks/>
+          </p:cNvCxnSpPr>
+          <p:nvPr/>
+        </p:nvCxnSpPr>
+        <p:spPr>
+          <a:xfrm flipH="1">
+            <a:off x="1770603" y="3194481"/>
+            <a:ext cx="8696750" cy="2475"/>
+          </a:xfrm>
+          <a:prstGeom prst="line">
+            <a:avLst/>
+          </a:prstGeom>
+          <a:ln/>
+        </p:spPr>
+        <p:style>
+          <a:lnRef idx="1">
+            <a:schemeClr val="accent3"/>
+          </a:lnRef>
+          <a:fillRef idx="0">
+            <a:schemeClr val="accent3"/>
+          </a:fillRef>
+          <a:effectRef idx="0">
+            <a:schemeClr val="accent3"/>
+          </a:effectRef>
+          <a:fontRef idx="minor">
+            <a:schemeClr val="tx1"/>
+          </a:fontRef>
+        </p:style>
+      </p:cxnSp>
+      <p:pic>
+        <p:nvPicPr>
+          <p:cNvPr id="5" name="Picture 4">
+            <a:extLst>
+              <a:ext uri="{FF2B5EF4-FFF2-40B4-BE49-F238E27FC236}">
+                <a16:creationId xmlns:a16="http://schemas.microsoft.com/office/drawing/2014/main" id="{40A931D9-88CF-4930-847D-B2F1926DDABA}"/>
+              </a:ext>
+            </a:extLst>
+          </p:cNvPr>
+          <p:cNvPicPr>
+            <a:picLocks noChangeAspect="1"/>
+          </p:cNvPicPr>
+          <p:nvPr/>
+        </p:nvPicPr>
+        <p:blipFill>
+          <a:blip r:embed="rId3"/>
+          <a:stretch>
+            <a:fillRect/>
+          </a:stretch>
+        </p:blipFill>
+        <p:spPr>
+          <a:xfrm>
+            <a:off x="257620" y="3199535"/>
+            <a:ext cx="2986192" cy="2986192"/>
+          </a:xfrm>
+          <a:prstGeom prst="rect">
+            <a:avLst/>
+          </a:prstGeom>
+        </p:spPr>
+      </p:pic>
+      <p:sp>
+        <p:nvSpPr>
+          <p:cNvPr id="94" name="Cylinder 93">
+            <a:extLst>
+              <a:ext uri="{FF2B5EF4-FFF2-40B4-BE49-F238E27FC236}">
+                <a16:creationId xmlns:a16="http://schemas.microsoft.com/office/drawing/2014/main" id="{A0958864-8217-4156-8404-E313E3BD06F2}"/>
+              </a:ext>
+            </a:extLst>
+          </p:cNvPr>
+          <p:cNvSpPr/>
+          <p:nvPr/>
+        </p:nvSpPr>
+        <p:spPr>
+          <a:xfrm rot="16200000">
+            <a:off x="4568496" y="-3523256"/>
+            <a:ext cx="1519649" cy="10369964"/>
+          </a:xfrm>
+          <a:prstGeom prst="can">
+            <a:avLst>
+              <a:gd name="adj" fmla="val 13510"/>
+            </a:avLst>
+          </a:prstGeom>
+        </p:spPr>
+        <p:style>
+          <a:lnRef idx="2">
+            <a:schemeClr val="accent5"/>
+          </a:lnRef>
+          <a:fillRef idx="1">
+            <a:schemeClr val="lt1"/>
+          </a:fillRef>
+          <a:effectRef idx="0">
+            <a:schemeClr val="accent5"/>
+          </a:effectRef>
+          <a:fontRef idx="minor">
+            <a:schemeClr val="dk1"/>
+          </a:fontRef>
+        </p:style>
+        <p:txBody>
+          <a:bodyPr rtlCol="0" anchor="ctr"/>
+          <a:lstStyle/>
+          <a:p>
+            <a:pPr algn="ctr"/>
+            <a:endParaRPr lang="en-CA"/>
+          </a:p>
+        </p:txBody>
+      </p:sp>
       <p:sp>
         <p:nvSpPr>
           <p:cNvPr id="2" name="Title 1">
@@ -12974,13 +13121,13 @@
           <p:nvPr/>
         </p:nvPicPr>
         <p:blipFill>
-          <a:blip r:embed="rId3">
+          <a:blip r:embed="rId4">
             <a:extLst>
               <a:ext uri="{28A0092B-C50C-407E-A947-70E740481C1C}">
                 <a14:useLocalDpi xmlns:a14="http://schemas.microsoft.com/office/drawing/2010/main" val="0"/>
               </a:ext>
               <a:ext uri="{96DAC541-7B7A-43D3-8B79-37D633B846F1}">
-                <asvg:svgBlip xmlns:asvg="http://schemas.microsoft.com/office/drawing/2016/SVG/main" r:embed="rId4"/>
+                <asvg:svgBlip xmlns:asvg="http://schemas.microsoft.com/office/drawing/2016/SVG/main" r:embed="rId5"/>
               </a:ext>
             </a:extLst>
           </a:blip>
@@ -13013,13 +13160,13 @@
           <p:nvPr/>
         </p:nvPicPr>
         <p:blipFill>
-          <a:blip r:embed="rId5">
+          <a:blip r:embed="rId6">
             <a:extLst>
               <a:ext uri="{28A0092B-C50C-407E-A947-70E740481C1C}">
                 <a14:useLocalDpi xmlns:a14="http://schemas.microsoft.com/office/drawing/2010/main" val="0"/>
               </a:ext>
               <a:ext uri="{96DAC541-7B7A-43D3-8B79-37D633B846F1}">
-                <asvg:svgBlip xmlns:asvg="http://schemas.microsoft.com/office/drawing/2016/SVG/main" r:embed="rId6"/>
+                <asvg:svgBlip xmlns:asvg="http://schemas.microsoft.com/office/drawing/2016/SVG/main" r:embed="rId7"/>
               </a:ext>
             </a:extLst>
           </a:blip>
@@ -13052,13 +13199,13 @@
           <p:nvPr/>
         </p:nvPicPr>
         <p:blipFill>
-          <a:blip r:embed="rId7">
+          <a:blip r:embed="rId8">
             <a:extLst>
               <a:ext uri="{28A0092B-C50C-407E-A947-70E740481C1C}">
                 <a14:useLocalDpi xmlns:a14="http://schemas.microsoft.com/office/drawing/2010/main" val="0"/>
               </a:ext>
               <a:ext uri="{96DAC541-7B7A-43D3-8B79-37D633B846F1}">
-                <asvg:svgBlip xmlns:asvg="http://schemas.microsoft.com/office/drawing/2016/SVG/main" r:embed="rId8"/>
+                <asvg:svgBlip xmlns:asvg="http://schemas.microsoft.com/office/drawing/2016/SVG/main" r:embed="rId9"/>
               </a:ext>
             </a:extLst>
           </a:blip>
@@ -13091,13 +13238,13 @@
           <p:nvPr/>
         </p:nvPicPr>
         <p:blipFill>
-          <a:blip r:embed="rId9">
+          <a:blip r:embed="rId10">
             <a:extLst>
               <a:ext uri="{28A0092B-C50C-407E-A947-70E740481C1C}">
                 <a14:useLocalDpi xmlns:a14="http://schemas.microsoft.com/office/drawing/2010/main" val="0"/>
               </a:ext>
               <a:ext uri="{96DAC541-7B7A-43D3-8B79-37D633B846F1}">
-                <asvg:svgBlip xmlns:asvg="http://schemas.microsoft.com/office/drawing/2016/SVG/main" r:embed="rId10"/>
+                <asvg:svgBlip xmlns:asvg="http://schemas.microsoft.com/office/drawing/2016/SVG/main" r:embed="rId11"/>
               </a:ext>
             </a:extLst>
           </a:blip>
@@ -13130,13 +13277,13 @@
           <p:nvPr/>
         </p:nvPicPr>
         <p:blipFill>
-          <a:blip r:embed="rId7">
+          <a:blip r:embed="rId8">
             <a:extLst>
               <a:ext uri="{28A0092B-C50C-407E-A947-70E740481C1C}">
                 <a14:useLocalDpi xmlns:a14="http://schemas.microsoft.com/office/drawing/2010/main" val="0"/>
               </a:ext>
               <a:ext uri="{96DAC541-7B7A-43D3-8B79-37D633B846F1}">
-                <asvg:svgBlip xmlns:asvg="http://schemas.microsoft.com/office/drawing/2016/SVG/main" r:embed="rId8"/>
+                <asvg:svgBlip xmlns:asvg="http://schemas.microsoft.com/office/drawing/2016/SVG/main" r:embed="rId9"/>
               </a:ext>
             </a:extLst>
           </a:blip>
@@ -13352,13 +13499,13 @@
           <p:nvPr/>
         </p:nvPicPr>
         <p:blipFill>
-          <a:blip r:embed="rId11">
+          <a:blip r:embed="rId12">
             <a:extLst>
               <a:ext uri="{28A0092B-C50C-407E-A947-70E740481C1C}">
                 <a14:useLocalDpi xmlns:a14="http://schemas.microsoft.com/office/drawing/2010/main" val="0"/>
               </a:ext>
               <a:ext uri="{96DAC541-7B7A-43D3-8B79-37D633B846F1}">
-                <asvg:svgBlip xmlns:asvg="http://schemas.microsoft.com/office/drawing/2016/SVG/main" r:embed="rId12"/>
+                <asvg:svgBlip xmlns:asvg="http://schemas.microsoft.com/office/drawing/2016/SVG/main" r:embed="rId13"/>
               </a:ext>
             </a:extLst>
           </a:blip>
@@ -13391,13 +13538,13 @@
           <p:nvPr/>
         </p:nvPicPr>
         <p:blipFill>
-          <a:blip r:embed="rId11">
+          <a:blip r:embed="rId12">
             <a:extLst>
               <a:ext uri="{28A0092B-C50C-407E-A947-70E740481C1C}">
                 <a14:useLocalDpi xmlns:a14="http://schemas.microsoft.com/office/drawing/2010/main" val="0"/>
               </a:ext>
               <a:ext uri="{96DAC541-7B7A-43D3-8B79-37D633B846F1}">
-                <asvg:svgBlip xmlns:asvg="http://schemas.microsoft.com/office/drawing/2016/SVG/main" r:embed="rId12"/>
+                <asvg:svgBlip xmlns:asvg="http://schemas.microsoft.com/office/drawing/2016/SVG/main" r:embed="rId13"/>
               </a:ext>
             </a:extLst>
           </a:blip>
@@ -13958,124 +14105,6 @@
           </a:p>
         </p:txBody>
       </p:sp>
-      <p:cxnSp>
-        <p:nvCxnSpPr>
-          <p:cNvPr id="57" name="Straight Connector 56">
-            <a:extLst>
-              <a:ext uri="{FF2B5EF4-FFF2-40B4-BE49-F238E27FC236}">
-                <a16:creationId xmlns:a16="http://schemas.microsoft.com/office/drawing/2014/main" id="{A2E57009-F88B-412B-890D-C7F6065077AE}"/>
-              </a:ext>
-            </a:extLst>
-          </p:cNvPr>
-          <p:cNvCxnSpPr>
-            <a:cxnSpLocks/>
-          </p:cNvCxnSpPr>
-          <p:nvPr/>
-        </p:nvCxnSpPr>
-        <p:spPr>
-          <a:xfrm flipH="1" flipV="1">
-            <a:off x="1769065" y="4268769"/>
-            <a:ext cx="8698289" cy="22938"/>
-          </a:xfrm>
-          <a:prstGeom prst="line">
-            <a:avLst/>
-          </a:prstGeom>
-          <a:ln/>
-        </p:spPr>
-        <p:style>
-          <a:lnRef idx="1">
-            <a:schemeClr val="accent3"/>
-          </a:lnRef>
-          <a:fillRef idx="0">
-            <a:schemeClr val="accent3"/>
-          </a:fillRef>
-          <a:effectRef idx="0">
-            <a:schemeClr val="accent3"/>
-          </a:effectRef>
-          <a:fontRef idx="minor">
-            <a:schemeClr val="tx1"/>
-          </a:fontRef>
-        </p:style>
-      </p:cxnSp>
-      <p:cxnSp>
-        <p:nvCxnSpPr>
-          <p:cNvPr id="61" name="Straight Connector 60">
-            <a:extLst>
-              <a:ext uri="{FF2B5EF4-FFF2-40B4-BE49-F238E27FC236}">
-                <a16:creationId xmlns:a16="http://schemas.microsoft.com/office/drawing/2014/main" id="{AC56B326-4519-482A-9F9A-93BC826B9AB3}"/>
-              </a:ext>
-            </a:extLst>
-          </p:cNvPr>
-          <p:cNvCxnSpPr>
-            <a:cxnSpLocks/>
-          </p:cNvCxnSpPr>
-          <p:nvPr/>
-        </p:nvCxnSpPr>
-        <p:spPr>
-          <a:xfrm flipH="1">
-            <a:off x="1757191" y="3707844"/>
-            <a:ext cx="8710162" cy="0"/>
-          </a:xfrm>
-          <a:prstGeom prst="line">
-            <a:avLst/>
-          </a:prstGeom>
-          <a:ln/>
-        </p:spPr>
-        <p:style>
-          <a:lnRef idx="1">
-            <a:schemeClr val="accent3"/>
-          </a:lnRef>
-          <a:fillRef idx="0">
-            <a:schemeClr val="accent3"/>
-          </a:fillRef>
-          <a:effectRef idx="0">
-            <a:schemeClr val="accent3"/>
-          </a:effectRef>
-          <a:fontRef idx="minor">
-            <a:schemeClr val="tx1"/>
-          </a:fontRef>
-        </p:style>
-      </p:cxnSp>
-      <p:cxnSp>
-        <p:nvCxnSpPr>
-          <p:cNvPr id="64" name="Straight Connector 63">
-            <a:extLst>
-              <a:ext uri="{FF2B5EF4-FFF2-40B4-BE49-F238E27FC236}">
-                <a16:creationId xmlns:a16="http://schemas.microsoft.com/office/drawing/2014/main" id="{C0EF3E87-77F2-46B0-A6F1-45E6F71A5D57}"/>
-              </a:ext>
-            </a:extLst>
-          </p:cNvPr>
-          <p:cNvCxnSpPr>
-            <a:cxnSpLocks/>
-            <a:endCxn id="82" idx="0"/>
-          </p:cNvCxnSpPr>
-          <p:nvPr/>
-        </p:nvCxnSpPr>
-        <p:spPr>
-          <a:xfrm flipH="1">
-            <a:off x="1770603" y="3194481"/>
-            <a:ext cx="8696750" cy="2475"/>
-          </a:xfrm>
-          <a:prstGeom prst="line">
-            <a:avLst/>
-          </a:prstGeom>
-          <a:ln/>
-        </p:spPr>
-        <p:style>
-          <a:lnRef idx="1">
-            <a:schemeClr val="accent3"/>
-          </a:lnRef>
-          <a:fillRef idx="0">
-            <a:schemeClr val="accent3"/>
-          </a:fillRef>
-          <a:effectRef idx="0">
-            <a:schemeClr val="accent3"/>
-          </a:effectRef>
-          <a:fontRef idx="minor">
-            <a:schemeClr val="tx1"/>
-          </a:fontRef>
-        </p:style>
-      </p:cxnSp>
       <p:sp>
         <p:nvSpPr>
           <p:cNvPr id="50" name="Rectangle: Rounded Corners 49">
@@ -14126,7 +14155,7 @@
             <a:pPr algn="ctr"/>
             <a:r>
               <a:rPr lang="en-US" dirty="0"/>
-              <a:t>BETA</a:t>
+              <a:t>Early Adopters</a:t>
             </a:r>
             <a:endParaRPr lang="en-CA" dirty="0"/>
           </a:p>
@@ -14182,7 +14211,7 @@
             <a:pPr algn="ctr"/>
             <a:r>
               <a:rPr lang="en-US" dirty="0"/>
-              <a:t>DEV</a:t>
+              <a:t>Canaries</a:t>
             </a:r>
             <a:endParaRPr lang="en-CA" dirty="0"/>
           </a:p>
@@ -14235,7 +14264,7 @@
             <a:pPr algn="ctr"/>
             <a:r>
               <a:rPr lang="en-US" dirty="0"/>
-              <a:t>PROD</a:t>
+              <a:t>Users</a:t>
             </a:r>
             <a:endParaRPr lang="en-CA" dirty="0"/>
           </a:p>
@@ -14399,36 +14428,6 @@
           </a:p>
         </p:txBody>
       </p:sp>
-      <p:pic>
-        <p:nvPicPr>
-          <p:cNvPr id="82" name="Picture 81">
-            <a:extLst>
-              <a:ext uri="{FF2B5EF4-FFF2-40B4-BE49-F238E27FC236}">
-                <a16:creationId xmlns:a16="http://schemas.microsoft.com/office/drawing/2014/main" id="{A3998AF7-CB7B-4D21-9067-337AC1620989}"/>
-              </a:ext>
-            </a:extLst>
-          </p:cNvPr>
-          <p:cNvPicPr>
-            <a:picLocks noChangeAspect="1"/>
-          </p:cNvPicPr>
-          <p:nvPr/>
-        </p:nvPicPr>
-        <p:blipFill>
-          <a:blip r:embed="rId13"/>
-          <a:stretch>
-            <a:fillRect/>
-          </a:stretch>
-        </p:blipFill>
-        <p:spPr>
-          <a:xfrm>
-            <a:off x="143340" y="3196956"/>
-            <a:ext cx="3254525" cy="3254525"/>
-          </a:xfrm>
-          <a:prstGeom prst="rect">
-            <a:avLst/>
-          </a:prstGeom>
-        </p:spPr>
-      </p:pic>
       <p:sp>
         <p:nvSpPr>
           <p:cNvPr id="91" name="TextBox 90">

</xml_diff>

<commit_message>
Feature Flag final DRAFT (#45)
* Safety push to create feature branch

* Safetu push

* Safety push

* Safety push before we wander home.

* Safety commit

* Safety commit

* Safety commit.

* Safety push.

* Apply copy edit revisions.

* Add reference to FF vs. Branching article by LaunchDarkly

* Action review feedback from Mike Fourie.
</commit_message>
<xml_diff>
--- a/src/DevOps/Illustrations.pptx
+++ b/src/DevOps/Illustrations.pptx
@@ -5,7 +5,7 @@
     <p:sldMasterId id="2147483648" r:id="rId1"/>
   </p:sldMasterIdLst>
   <p:notesMasterIdLst>
-    <p:notesMasterId r:id="rId14"/>
+    <p:notesMasterId r:id="rId17"/>
   </p:notesMasterIdLst>
   <p:sldIdLst>
     <p:sldId id="327" r:id="rId2"/>
@@ -20,6 +20,9 @@
     <p:sldId id="343" r:id="rId11"/>
     <p:sldId id="345" r:id="rId12"/>
     <p:sldId id="346" r:id="rId13"/>
+    <p:sldId id="347" r:id="rId14"/>
+    <p:sldId id="348" r:id="rId15"/>
+    <p:sldId id="349" r:id="rId16"/>
   </p:sldIdLst>
   <p:sldSz cx="12192000" cy="6858000"/>
   <p:notesSz cx="6858000" cy="9144000"/>
@@ -212,7 +215,7 @@
           <a:p>
             <a:fld id="{EB1108B4-53EF-4F9E-9491-F5ABDE6A4EA7}" type="datetimeFigureOut">
               <a:rPr lang="en-CA" smtClean="0"/>
-              <a:t>2017-05-31</a:t>
+              <a:t>2017-06-26</a:t>
             </a:fld>
             <a:endParaRPr lang="en-CA"/>
           </a:p>
@@ -816,6 +819,258 @@
 </p:notes>
 </file>
 
+<file path=ppt/notesSlides/notesSlide13.xml><?xml version="1.0" encoding="utf-8"?>
+<p:notes xmlns:a="http://schemas.openxmlformats.org/drawingml/2006/main" xmlns:r="http://schemas.openxmlformats.org/officeDocument/2006/relationships" xmlns:p="http://schemas.openxmlformats.org/presentationml/2006/main">
+  <p:cSld>
+    <p:spTree>
+      <p:nvGrpSpPr>
+        <p:cNvPr id="1" name=""/>
+        <p:cNvGrpSpPr/>
+        <p:nvPr/>
+      </p:nvGrpSpPr>
+      <p:grpSpPr>
+        <a:xfrm>
+          <a:off x="0" y="0"/>
+          <a:ext cx="0" cy="0"/>
+          <a:chOff x="0" y="0"/>
+          <a:chExt cx="0" cy="0"/>
+        </a:xfrm>
+      </p:grpSpPr>
+      <p:sp>
+        <p:nvSpPr>
+          <p:cNvPr id="2" name="Slide Image Placeholder 1"/>
+          <p:cNvSpPr>
+            <a:spLocks noGrp="1" noRot="1" noChangeAspect="1"/>
+          </p:cNvSpPr>
+          <p:nvPr>
+            <p:ph type="sldImg"/>
+          </p:nvPr>
+        </p:nvSpPr>
+        <p:spPr/>
+      </p:sp>
+      <p:sp>
+        <p:nvSpPr>
+          <p:cNvPr id="3" name="Notes Placeholder 2"/>
+          <p:cNvSpPr>
+            <a:spLocks noGrp="1"/>
+          </p:cNvSpPr>
+          <p:nvPr>
+            <p:ph type="body" idx="1"/>
+          </p:nvPr>
+        </p:nvSpPr>
+        <p:spPr/>
+        <p:txBody>
+          <a:bodyPr/>
+          <a:lstStyle/>
+          <a:p>
+            <a:endParaRPr lang="en-CA"/>
+          </a:p>
+        </p:txBody>
+      </p:sp>
+      <p:sp>
+        <p:nvSpPr>
+          <p:cNvPr id="4" name="Slide Number Placeholder 3"/>
+          <p:cNvSpPr>
+            <a:spLocks noGrp="1"/>
+          </p:cNvSpPr>
+          <p:nvPr>
+            <p:ph type="sldNum" sz="quarter" idx="10"/>
+          </p:nvPr>
+        </p:nvSpPr>
+        <p:spPr/>
+        <p:txBody>
+          <a:bodyPr/>
+          <a:lstStyle/>
+          <a:p>
+            <a:fld id="{05240458-CBDF-4242-A98F-5E1D8B45E643}" type="slidenum">
+              <a:rPr lang="en-CA" smtClean="0"/>
+              <a:t>13</a:t>
+            </a:fld>
+            <a:endParaRPr lang="en-CA"/>
+          </a:p>
+        </p:txBody>
+      </p:sp>
+    </p:spTree>
+    <p:extLst>
+      <p:ext uri="{BB962C8B-B14F-4D97-AF65-F5344CB8AC3E}">
+        <p14:creationId xmlns:p14="http://schemas.microsoft.com/office/powerpoint/2010/main" val="1511664339"/>
+      </p:ext>
+    </p:extLst>
+  </p:cSld>
+  <p:clrMapOvr>
+    <a:masterClrMapping/>
+  </p:clrMapOvr>
+</p:notes>
+</file>
+
+<file path=ppt/notesSlides/notesSlide14.xml><?xml version="1.0" encoding="utf-8"?>
+<p:notes xmlns:a="http://schemas.openxmlformats.org/drawingml/2006/main" xmlns:r="http://schemas.openxmlformats.org/officeDocument/2006/relationships" xmlns:p="http://schemas.openxmlformats.org/presentationml/2006/main">
+  <p:cSld>
+    <p:spTree>
+      <p:nvGrpSpPr>
+        <p:cNvPr id="1" name=""/>
+        <p:cNvGrpSpPr/>
+        <p:nvPr/>
+      </p:nvGrpSpPr>
+      <p:grpSpPr>
+        <a:xfrm>
+          <a:off x="0" y="0"/>
+          <a:ext cx="0" cy="0"/>
+          <a:chOff x="0" y="0"/>
+          <a:chExt cx="0" cy="0"/>
+        </a:xfrm>
+      </p:grpSpPr>
+      <p:sp>
+        <p:nvSpPr>
+          <p:cNvPr id="2" name="Slide Image Placeholder 1"/>
+          <p:cNvSpPr>
+            <a:spLocks noGrp="1" noRot="1" noChangeAspect="1"/>
+          </p:cNvSpPr>
+          <p:nvPr>
+            <p:ph type="sldImg"/>
+          </p:nvPr>
+        </p:nvSpPr>
+        <p:spPr/>
+      </p:sp>
+      <p:sp>
+        <p:nvSpPr>
+          <p:cNvPr id="3" name="Notes Placeholder 2"/>
+          <p:cNvSpPr>
+            <a:spLocks noGrp="1"/>
+          </p:cNvSpPr>
+          <p:nvPr>
+            <p:ph type="body" idx="1"/>
+          </p:nvPr>
+        </p:nvSpPr>
+        <p:spPr/>
+        <p:txBody>
+          <a:bodyPr/>
+          <a:lstStyle/>
+          <a:p>
+            <a:endParaRPr lang="en-CA"/>
+          </a:p>
+        </p:txBody>
+      </p:sp>
+      <p:sp>
+        <p:nvSpPr>
+          <p:cNvPr id="4" name="Slide Number Placeholder 3"/>
+          <p:cNvSpPr>
+            <a:spLocks noGrp="1"/>
+          </p:cNvSpPr>
+          <p:nvPr>
+            <p:ph type="sldNum" sz="quarter" idx="10"/>
+          </p:nvPr>
+        </p:nvSpPr>
+        <p:spPr/>
+        <p:txBody>
+          <a:bodyPr/>
+          <a:lstStyle/>
+          <a:p>
+            <a:fld id="{05240458-CBDF-4242-A98F-5E1D8B45E643}" type="slidenum">
+              <a:rPr lang="en-CA" smtClean="0"/>
+              <a:t>14</a:t>
+            </a:fld>
+            <a:endParaRPr lang="en-CA"/>
+          </a:p>
+        </p:txBody>
+      </p:sp>
+    </p:spTree>
+    <p:extLst>
+      <p:ext uri="{BB962C8B-B14F-4D97-AF65-F5344CB8AC3E}">
+        <p14:creationId xmlns:p14="http://schemas.microsoft.com/office/powerpoint/2010/main" val="3943855358"/>
+      </p:ext>
+    </p:extLst>
+  </p:cSld>
+  <p:clrMapOvr>
+    <a:masterClrMapping/>
+  </p:clrMapOvr>
+</p:notes>
+</file>
+
+<file path=ppt/notesSlides/notesSlide15.xml><?xml version="1.0" encoding="utf-8"?>
+<p:notes xmlns:a="http://schemas.openxmlformats.org/drawingml/2006/main" xmlns:r="http://schemas.openxmlformats.org/officeDocument/2006/relationships" xmlns:p="http://schemas.openxmlformats.org/presentationml/2006/main">
+  <p:cSld>
+    <p:spTree>
+      <p:nvGrpSpPr>
+        <p:cNvPr id="1" name=""/>
+        <p:cNvGrpSpPr/>
+        <p:nvPr/>
+      </p:nvGrpSpPr>
+      <p:grpSpPr>
+        <a:xfrm>
+          <a:off x="0" y="0"/>
+          <a:ext cx="0" cy="0"/>
+          <a:chOff x="0" y="0"/>
+          <a:chExt cx="0" cy="0"/>
+        </a:xfrm>
+      </p:grpSpPr>
+      <p:sp>
+        <p:nvSpPr>
+          <p:cNvPr id="2" name="Slide Image Placeholder 1"/>
+          <p:cNvSpPr>
+            <a:spLocks noGrp="1" noRot="1" noChangeAspect="1"/>
+          </p:cNvSpPr>
+          <p:nvPr>
+            <p:ph type="sldImg"/>
+          </p:nvPr>
+        </p:nvSpPr>
+        <p:spPr/>
+      </p:sp>
+      <p:sp>
+        <p:nvSpPr>
+          <p:cNvPr id="3" name="Notes Placeholder 2"/>
+          <p:cNvSpPr>
+            <a:spLocks noGrp="1"/>
+          </p:cNvSpPr>
+          <p:nvPr>
+            <p:ph type="body" idx="1"/>
+          </p:nvPr>
+        </p:nvSpPr>
+        <p:spPr/>
+        <p:txBody>
+          <a:bodyPr/>
+          <a:lstStyle/>
+          <a:p>
+            <a:endParaRPr lang="en-CA"/>
+          </a:p>
+        </p:txBody>
+      </p:sp>
+      <p:sp>
+        <p:nvSpPr>
+          <p:cNvPr id="4" name="Slide Number Placeholder 3"/>
+          <p:cNvSpPr>
+            <a:spLocks noGrp="1"/>
+          </p:cNvSpPr>
+          <p:nvPr>
+            <p:ph type="sldNum" sz="quarter" idx="10"/>
+          </p:nvPr>
+        </p:nvSpPr>
+        <p:spPr/>
+        <p:txBody>
+          <a:bodyPr/>
+          <a:lstStyle/>
+          <a:p>
+            <a:fld id="{05240458-CBDF-4242-A98F-5E1D8B45E643}" type="slidenum">
+              <a:rPr lang="en-CA" smtClean="0"/>
+              <a:t>15</a:t>
+            </a:fld>
+            <a:endParaRPr lang="en-CA"/>
+          </a:p>
+        </p:txBody>
+      </p:sp>
+    </p:spTree>
+    <p:extLst>
+      <p:ext uri="{BB962C8B-B14F-4D97-AF65-F5344CB8AC3E}">
+        <p14:creationId xmlns:p14="http://schemas.microsoft.com/office/powerpoint/2010/main" val="3103690337"/>
+      </p:ext>
+    </p:extLst>
+  </p:cSld>
+  <p:clrMapOvr>
+    <a:masterClrMapping/>
+  </p:clrMapOvr>
+</p:notes>
+</file>
+
 <file path=ppt/notesSlides/notesSlide2.xml><?xml version="1.0" encoding="utf-8"?>
 <p:notes xmlns:a="http://schemas.openxmlformats.org/drawingml/2006/main" xmlns:r="http://schemas.openxmlformats.org/officeDocument/2006/relationships" xmlns:p="http://schemas.openxmlformats.org/presentationml/2006/main">
   <p:cSld>
@@ -1619,7 +1874,7 @@
           <a:p>
             <a:fld id="{F71EBF1D-DE49-4C53-B029-DA93D2E44EE4}" type="datetimeFigureOut">
               <a:rPr lang="en-CA" smtClean="0"/>
-              <a:t>2017-05-31</a:t>
+              <a:t>2017-06-26</a:t>
             </a:fld>
             <a:endParaRPr lang="en-CA"/>
           </a:p>
@@ -1789,7 +2044,7 @@
           <a:p>
             <a:fld id="{F71EBF1D-DE49-4C53-B029-DA93D2E44EE4}" type="datetimeFigureOut">
               <a:rPr lang="en-CA" smtClean="0"/>
-              <a:t>2017-05-31</a:t>
+              <a:t>2017-06-26</a:t>
             </a:fld>
             <a:endParaRPr lang="en-CA"/>
           </a:p>
@@ -1969,7 +2224,7 @@
           <a:p>
             <a:fld id="{F71EBF1D-DE49-4C53-B029-DA93D2E44EE4}" type="datetimeFigureOut">
               <a:rPr lang="en-CA" smtClean="0"/>
-              <a:t>2017-05-31</a:t>
+              <a:t>2017-06-26</a:t>
             </a:fld>
             <a:endParaRPr lang="en-CA"/>
           </a:p>
@@ -2139,7 +2394,7 @@
           <a:p>
             <a:fld id="{F71EBF1D-DE49-4C53-B029-DA93D2E44EE4}" type="datetimeFigureOut">
               <a:rPr lang="en-CA" smtClean="0"/>
-              <a:t>2017-05-31</a:t>
+              <a:t>2017-06-26</a:t>
             </a:fld>
             <a:endParaRPr lang="en-CA"/>
           </a:p>
@@ -2385,7 +2640,7 @@
           <a:p>
             <a:fld id="{F71EBF1D-DE49-4C53-B029-DA93D2E44EE4}" type="datetimeFigureOut">
               <a:rPr lang="en-CA" smtClean="0"/>
-              <a:t>2017-05-31</a:t>
+              <a:t>2017-06-26</a:t>
             </a:fld>
             <a:endParaRPr lang="en-CA"/>
           </a:p>
@@ -2617,7 +2872,7 @@
           <a:p>
             <a:fld id="{F71EBF1D-DE49-4C53-B029-DA93D2E44EE4}" type="datetimeFigureOut">
               <a:rPr lang="en-CA" smtClean="0"/>
-              <a:t>2017-05-31</a:t>
+              <a:t>2017-06-26</a:t>
             </a:fld>
             <a:endParaRPr lang="en-CA"/>
           </a:p>
@@ -2984,7 +3239,7 @@
           <a:p>
             <a:fld id="{F71EBF1D-DE49-4C53-B029-DA93D2E44EE4}" type="datetimeFigureOut">
               <a:rPr lang="en-CA" smtClean="0"/>
-              <a:t>2017-05-31</a:t>
+              <a:t>2017-06-26</a:t>
             </a:fld>
             <a:endParaRPr lang="en-CA"/>
           </a:p>
@@ -3121,7 +3376,7 @@
           <a:p>
             <a:fld id="{F71EBF1D-DE49-4C53-B029-DA93D2E44EE4}" type="datetimeFigureOut">
               <a:rPr lang="en-CA" smtClean="0"/>
-              <a:t>2017-05-31</a:t>
+              <a:t>2017-06-26</a:t>
             </a:fld>
             <a:endParaRPr lang="en-CA"/>
           </a:p>
@@ -3216,7 +3471,7 @@
           <a:p>
             <a:fld id="{F71EBF1D-DE49-4C53-B029-DA93D2E44EE4}" type="datetimeFigureOut">
               <a:rPr lang="en-CA" smtClean="0"/>
-              <a:t>2017-05-31</a:t>
+              <a:t>2017-06-26</a:t>
             </a:fld>
             <a:endParaRPr lang="en-CA"/>
           </a:p>
@@ -3493,7 +3748,7 @@
           <a:p>
             <a:fld id="{F71EBF1D-DE49-4C53-B029-DA93D2E44EE4}" type="datetimeFigureOut">
               <a:rPr lang="en-CA" smtClean="0"/>
-              <a:t>2017-05-31</a:t>
+              <a:t>2017-06-26</a:t>
             </a:fld>
             <a:endParaRPr lang="en-CA"/>
           </a:p>
@@ -3746,7 +4001,7 @@
           <a:p>
             <a:fld id="{F71EBF1D-DE49-4C53-B029-DA93D2E44EE4}" type="datetimeFigureOut">
               <a:rPr lang="en-CA" smtClean="0"/>
-              <a:t>2017-05-31</a:t>
+              <a:t>2017-06-26</a:t>
             </a:fld>
             <a:endParaRPr lang="en-CA"/>
           </a:p>
@@ -3959,7 +4214,7 @@
           <a:p>
             <a:fld id="{F71EBF1D-DE49-4C53-B029-DA93D2E44EE4}" type="datetimeFigureOut">
               <a:rPr lang="en-CA" smtClean="0"/>
-              <a:t>2017-05-31</a:t>
+              <a:t>2017-06-26</a:t>
             </a:fld>
             <a:endParaRPr lang="en-CA"/>
           </a:p>
@@ -9702,6 +9957,4591 @@
 </p:sld>
 </file>
 
+<file path=ppt/slides/slide13.xml><?xml version="1.0" encoding="utf-8"?>
+<p:sld xmlns:a="http://schemas.openxmlformats.org/drawingml/2006/main" xmlns:r="http://schemas.openxmlformats.org/officeDocument/2006/relationships" xmlns:p="http://schemas.openxmlformats.org/presentationml/2006/main">
+  <p:cSld>
+    <p:spTree>
+      <p:nvGrpSpPr>
+        <p:cNvPr id="1" name=""/>
+        <p:cNvGrpSpPr/>
+        <p:nvPr/>
+      </p:nvGrpSpPr>
+      <p:grpSpPr>
+        <a:xfrm>
+          <a:off x="0" y="0"/>
+          <a:ext cx="0" cy="0"/>
+          <a:chOff x="0" y="0"/>
+          <a:chExt cx="0" cy="0"/>
+        </a:xfrm>
+      </p:grpSpPr>
+      <p:sp>
+        <p:nvSpPr>
+          <p:cNvPr id="39" name="Rectangle: Rounded Corners 38">
+            <a:extLst>
+              <a:ext uri="{FF2B5EF4-FFF2-40B4-BE49-F238E27FC236}">
+                <a16:creationId xmlns:a16="http://schemas.microsoft.com/office/drawing/2014/main" id="{988B7144-5859-4032-B9E0-1C81D22678C2}"/>
+              </a:ext>
+            </a:extLst>
+          </p:cNvPr>
+          <p:cNvSpPr/>
+          <p:nvPr/>
+        </p:nvSpPr>
+        <p:spPr>
+          <a:xfrm>
+            <a:off x="122699" y="895350"/>
+            <a:ext cx="909176" cy="1285875"/>
+          </a:xfrm>
+          <a:prstGeom prst="roundRect">
+            <a:avLst/>
+          </a:prstGeom>
+          <a:solidFill>
+            <a:schemeClr val="accent5"/>
+          </a:solidFill>
+        </p:spPr>
+        <p:style>
+          <a:lnRef idx="3">
+            <a:schemeClr val="lt1"/>
+          </a:lnRef>
+          <a:fillRef idx="1">
+            <a:schemeClr val="accent5"/>
+          </a:fillRef>
+          <a:effectRef idx="1">
+            <a:schemeClr val="accent5"/>
+          </a:effectRef>
+          <a:fontRef idx="minor">
+            <a:schemeClr val="lt1"/>
+          </a:fontRef>
+        </p:style>
+        <p:txBody>
+          <a:bodyPr rtlCol="0" anchor="ctr"/>
+          <a:lstStyle/>
+          <a:p>
+            <a:pPr algn="ctr"/>
+            <a:endParaRPr lang="en-CA"/>
+          </a:p>
+        </p:txBody>
+      </p:sp>
+      <p:sp>
+        <p:nvSpPr>
+          <p:cNvPr id="2" name="Title 1">
+            <a:extLst>
+              <a:ext uri="{FF2B5EF4-FFF2-40B4-BE49-F238E27FC236}">
+                <a16:creationId xmlns:a16="http://schemas.microsoft.com/office/drawing/2014/main" id="{D0BF88E3-7093-46AB-88BD-12B1CD7BBC92}"/>
+              </a:ext>
+            </a:extLst>
+          </p:cNvPr>
+          <p:cNvSpPr>
+            <a:spLocks noGrp="1"/>
+          </p:cNvSpPr>
+          <p:nvPr>
+            <p:ph type="title"/>
+          </p:nvPr>
+        </p:nvSpPr>
+        <p:spPr/>
+        <p:txBody>
+          <a:bodyPr/>
+          <a:lstStyle/>
+          <a:p>
+            <a:r>
+              <a:rPr lang="en-US" dirty="0"/>
+              <a:t>Feature Flag</a:t>
+            </a:r>
+            <a:endParaRPr lang="en-CA" dirty="0"/>
+          </a:p>
+        </p:txBody>
+      </p:sp>
+      <p:sp>
+        <p:nvSpPr>
+          <p:cNvPr id="9" name="TextBox 8">
+            <a:extLst>
+              <a:ext uri="{FF2B5EF4-FFF2-40B4-BE49-F238E27FC236}">
+                <a16:creationId xmlns:a16="http://schemas.microsoft.com/office/drawing/2014/main" id="{4CA782D2-3D20-4449-8299-8E7C909F73B8}"/>
+              </a:ext>
+            </a:extLst>
+          </p:cNvPr>
+          <p:cNvSpPr txBox="1"/>
+          <p:nvPr/>
+        </p:nvSpPr>
+        <p:spPr>
+          <a:xfrm>
+            <a:off x="1729936" y="1855346"/>
+            <a:ext cx="1060890" cy="646331"/>
+          </a:xfrm>
+          <a:prstGeom prst="rect">
+            <a:avLst/>
+          </a:prstGeom>
+          <a:noFill/>
+        </p:spPr>
+        <p:txBody>
+          <a:bodyPr wrap="square" rtlCol="0">
+            <a:spAutoFit/>
+          </a:bodyPr>
+          <a:lstStyle/>
+          <a:p>
+            <a:r>
+              <a:rPr lang="en-US" dirty="0"/>
+              <a:t>if ( </a:t>
+            </a:r>
+            <a:r>
+              <a:rPr lang="en-US" dirty="0">
+                <a:solidFill>
+                  <a:srgbClr val="0070C0"/>
+                </a:solidFill>
+              </a:rPr>
+              <a:t>flag</a:t>
+            </a:r>
+            <a:r>
+              <a:rPr lang="en-US" dirty="0"/>
+              <a:t> )</a:t>
+            </a:r>
+          </a:p>
+          <a:p>
+            <a:r>
+              <a:rPr lang="en-US" dirty="0"/>
+              <a:t>e</a:t>
+            </a:r>
+            <a:r>
+              <a:rPr lang="en-CA" dirty="0" err="1"/>
+              <a:t>lse</a:t>
+            </a:r>
+            <a:endParaRPr lang="en-CA" dirty="0"/>
+          </a:p>
+        </p:txBody>
+      </p:sp>
+      <p:sp>
+        <p:nvSpPr>
+          <p:cNvPr id="15" name="TextBox 14">
+            <a:extLst>
+              <a:ext uri="{FF2B5EF4-FFF2-40B4-BE49-F238E27FC236}">
+                <a16:creationId xmlns:a16="http://schemas.microsoft.com/office/drawing/2014/main" id="{4F94201C-ECA0-4549-9E69-258EE3E4E99C}"/>
+              </a:ext>
+            </a:extLst>
+          </p:cNvPr>
+          <p:cNvSpPr txBox="1"/>
+          <p:nvPr/>
+        </p:nvSpPr>
+        <p:spPr>
+          <a:xfrm>
+            <a:off x="156862" y="1034534"/>
+            <a:ext cx="533823" cy="307777"/>
+          </a:xfrm>
+          <a:prstGeom prst="rect">
+            <a:avLst/>
+          </a:prstGeom>
+          <a:noFill/>
+        </p:spPr>
+        <p:txBody>
+          <a:bodyPr wrap="square" rtlCol="0">
+            <a:spAutoFit/>
+          </a:bodyPr>
+          <a:lstStyle/>
+          <a:p>
+            <a:r>
+              <a:rPr lang="en-CA" sz="1400" dirty="0">
+                <a:solidFill>
+                  <a:schemeClr val="bg1"/>
+                </a:solidFill>
+                <a:sym typeface="Webdings" panose="05030102010509060703" pitchFamily="18" charset="2"/>
+              </a:rPr>
+              <a:t>ON</a:t>
+            </a:r>
+            <a:endParaRPr lang="en-CA" sz="1400" dirty="0">
+              <a:solidFill>
+                <a:schemeClr val="bg1"/>
+              </a:solidFill>
+            </a:endParaRPr>
+          </a:p>
+        </p:txBody>
+      </p:sp>
+      <p:sp>
+        <p:nvSpPr>
+          <p:cNvPr id="16" name="TextBox 15">
+            <a:extLst>
+              <a:ext uri="{FF2B5EF4-FFF2-40B4-BE49-F238E27FC236}">
+                <a16:creationId xmlns:a16="http://schemas.microsoft.com/office/drawing/2014/main" id="{98720D9D-9359-48BA-87DE-8A7880D05085}"/>
+              </a:ext>
+            </a:extLst>
+          </p:cNvPr>
+          <p:cNvSpPr txBox="1"/>
+          <p:nvPr/>
+        </p:nvSpPr>
+        <p:spPr>
+          <a:xfrm>
+            <a:off x="122699" y="1712842"/>
+            <a:ext cx="621586" cy="307777"/>
+          </a:xfrm>
+          <a:prstGeom prst="rect">
+            <a:avLst/>
+          </a:prstGeom>
+          <a:noFill/>
+        </p:spPr>
+        <p:txBody>
+          <a:bodyPr wrap="square" rtlCol="0">
+            <a:spAutoFit/>
+          </a:bodyPr>
+          <a:lstStyle/>
+          <a:p>
+            <a:r>
+              <a:rPr lang="en-CA" sz="1400" dirty="0">
+                <a:solidFill>
+                  <a:schemeClr val="bg1"/>
+                </a:solidFill>
+                <a:sym typeface="Webdings" panose="05030102010509060703" pitchFamily="18" charset="2"/>
+              </a:rPr>
+              <a:t>OFF</a:t>
+            </a:r>
+            <a:endParaRPr lang="en-CA" sz="1400" dirty="0">
+              <a:solidFill>
+                <a:schemeClr val="bg1"/>
+              </a:solidFill>
+            </a:endParaRPr>
+          </a:p>
+        </p:txBody>
+      </p:sp>
+      <p:sp>
+        <p:nvSpPr>
+          <p:cNvPr id="29" name="Flowchart: Alternate Process 28">
+            <a:extLst>
+              <a:ext uri="{FF2B5EF4-FFF2-40B4-BE49-F238E27FC236}">
+                <a16:creationId xmlns:a16="http://schemas.microsoft.com/office/drawing/2014/main" id="{D2377050-E018-41DE-942F-C183BB636380}"/>
+              </a:ext>
+            </a:extLst>
+          </p:cNvPr>
+          <p:cNvSpPr/>
+          <p:nvPr/>
+        </p:nvSpPr>
+        <p:spPr>
+          <a:xfrm>
+            <a:off x="690686" y="1187425"/>
+            <a:ext cx="155626" cy="713788"/>
+          </a:xfrm>
+          <a:prstGeom prst="flowChartAlternateProcess">
+            <a:avLst/>
+          </a:prstGeom>
+        </p:spPr>
+        <p:style>
+          <a:lnRef idx="2">
+            <a:schemeClr val="dk1"/>
+          </a:lnRef>
+          <a:fillRef idx="1">
+            <a:schemeClr val="lt1"/>
+          </a:fillRef>
+          <a:effectRef idx="0">
+            <a:schemeClr val="dk1"/>
+          </a:effectRef>
+          <a:fontRef idx="minor">
+            <a:schemeClr val="dk1"/>
+          </a:fontRef>
+        </p:style>
+        <p:txBody>
+          <a:bodyPr rtlCol="0" anchor="ctr"/>
+          <a:lstStyle/>
+          <a:p>
+            <a:pPr algn="ctr"/>
+            <a:endParaRPr lang="en-CA"/>
+          </a:p>
+        </p:txBody>
+      </p:sp>
+      <p:sp>
+        <p:nvSpPr>
+          <p:cNvPr id="30" name="Flowchart: Connector 29">
+            <a:extLst>
+              <a:ext uri="{FF2B5EF4-FFF2-40B4-BE49-F238E27FC236}">
+                <a16:creationId xmlns:a16="http://schemas.microsoft.com/office/drawing/2014/main" id="{4794B728-EB95-4883-9CE2-99AA666A9F18}"/>
+              </a:ext>
+            </a:extLst>
+          </p:cNvPr>
+          <p:cNvSpPr/>
+          <p:nvPr/>
+        </p:nvSpPr>
+        <p:spPr>
+          <a:xfrm>
+            <a:off x="639618" y="1068334"/>
+            <a:ext cx="257761" cy="279336"/>
+          </a:xfrm>
+          <a:prstGeom prst="flowChartConnector">
+            <a:avLst/>
+          </a:prstGeom>
+        </p:spPr>
+        <p:style>
+          <a:lnRef idx="0">
+            <a:schemeClr val="accent6"/>
+          </a:lnRef>
+          <a:fillRef idx="3">
+            <a:schemeClr val="accent6"/>
+          </a:fillRef>
+          <a:effectRef idx="3">
+            <a:schemeClr val="accent6"/>
+          </a:effectRef>
+          <a:fontRef idx="minor">
+            <a:schemeClr val="lt1"/>
+          </a:fontRef>
+        </p:style>
+        <p:txBody>
+          <a:bodyPr rtlCol="0" anchor="ctr"/>
+          <a:lstStyle/>
+          <a:p>
+            <a:pPr algn="ctr"/>
+            <a:endParaRPr lang="en-CA"/>
+          </a:p>
+        </p:txBody>
+      </p:sp>
+      <p:cxnSp>
+        <p:nvCxnSpPr>
+          <p:cNvPr id="35" name="Connector: Elbow 34">
+            <a:extLst>
+              <a:ext uri="{FF2B5EF4-FFF2-40B4-BE49-F238E27FC236}">
+                <a16:creationId xmlns:a16="http://schemas.microsoft.com/office/drawing/2014/main" id="{C10502E9-D81F-4D9E-A801-1DADFA739DE7}"/>
+              </a:ext>
+            </a:extLst>
+          </p:cNvPr>
+          <p:cNvCxnSpPr>
+            <a:cxnSpLocks/>
+            <a:stCxn id="39" idx="3"/>
+            <a:endCxn id="9" idx="0"/>
+          </p:cNvCxnSpPr>
+          <p:nvPr/>
+        </p:nvCxnSpPr>
+        <p:spPr>
+          <a:xfrm>
+            <a:off x="1031875" y="1538288"/>
+            <a:ext cx="1228506" cy="317058"/>
+          </a:xfrm>
+          <a:prstGeom prst="bentConnector2">
+            <a:avLst/>
+          </a:prstGeom>
+          <a:ln>
+            <a:tailEnd type="triangle"/>
+          </a:ln>
+        </p:spPr>
+        <p:style>
+          <a:lnRef idx="1">
+            <a:schemeClr val="accent1"/>
+          </a:lnRef>
+          <a:fillRef idx="0">
+            <a:schemeClr val="accent1"/>
+          </a:fillRef>
+          <a:effectRef idx="0">
+            <a:schemeClr val="accent1"/>
+          </a:effectRef>
+          <a:fontRef idx="minor">
+            <a:schemeClr val="tx1"/>
+          </a:fontRef>
+        </p:style>
+      </p:cxnSp>
+      <p:sp>
+        <p:nvSpPr>
+          <p:cNvPr id="38" name="TextBox 37">
+            <a:extLst>
+              <a:ext uri="{FF2B5EF4-FFF2-40B4-BE49-F238E27FC236}">
+                <a16:creationId xmlns:a16="http://schemas.microsoft.com/office/drawing/2014/main" id="{82351260-9E15-44D0-8ABF-BC84A18F23C1}"/>
+              </a:ext>
+            </a:extLst>
+          </p:cNvPr>
+          <p:cNvSpPr txBox="1"/>
+          <p:nvPr/>
+        </p:nvSpPr>
+        <p:spPr>
+          <a:xfrm>
+            <a:off x="1066745" y="1263799"/>
+            <a:ext cx="2724150" cy="276999"/>
+          </a:xfrm>
+          <a:prstGeom prst="rect">
+            <a:avLst/>
+          </a:prstGeom>
+          <a:noFill/>
+        </p:spPr>
+        <p:txBody>
+          <a:bodyPr wrap="square" rtlCol="0">
+            <a:spAutoFit/>
+          </a:bodyPr>
+          <a:lstStyle/>
+          <a:p>
+            <a:r>
+              <a:rPr lang="en-US" sz="1200" dirty="0">
+                <a:solidFill>
+                  <a:srgbClr val="0070C0"/>
+                </a:solidFill>
+              </a:rPr>
+              <a:t>Run-time call to FF management service</a:t>
+            </a:r>
+            <a:endParaRPr lang="en-CA" sz="1200" dirty="0">
+              <a:solidFill>
+                <a:srgbClr val="0070C0"/>
+              </a:solidFill>
+            </a:endParaRPr>
+          </a:p>
+        </p:txBody>
+      </p:sp>
+      <p:pic>
+        <p:nvPicPr>
+          <p:cNvPr id="44" name="Graphic 43" descr="Printer">
+            <a:extLst>
+              <a:ext uri="{FF2B5EF4-FFF2-40B4-BE49-F238E27FC236}">
+                <a16:creationId xmlns:a16="http://schemas.microsoft.com/office/drawing/2014/main" id="{1BB7189D-419D-4D8E-AD87-5C5C558449C4}"/>
+              </a:ext>
+            </a:extLst>
+          </p:cNvPr>
+          <p:cNvPicPr>
+            <a:picLocks noChangeAspect="1"/>
+          </p:cNvPicPr>
+          <p:nvPr/>
+        </p:nvPicPr>
+        <p:blipFill>
+          <a:blip r:embed="rId3">
+            <a:extLst>
+              <a:ext uri="{28A0092B-C50C-407E-A947-70E740481C1C}">
+                <a14:useLocalDpi xmlns:a14="http://schemas.microsoft.com/office/drawing/2010/main" val="0"/>
+              </a:ext>
+              <a:ext uri="{96DAC541-7B7A-43D3-8B79-37D633B846F1}">
+                <asvg:svgBlip xmlns:asvg="http://schemas.microsoft.com/office/drawing/2016/SVG/main" r:embed="rId4"/>
+              </a:ext>
+            </a:extLst>
+          </a:blip>
+          <a:stretch>
+            <a:fillRect/>
+          </a:stretch>
+        </p:blipFill>
+        <p:spPr>
+          <a:xfrm>
+            <a:off x="3170995" y="2142774"/>
+            <a:ext cx="689587" cy="689587"/>
+          </a:xfrm>
+          <a:prstGeom prst="rect">
+            <a:avLst/>
+          </a:prstGeom>
+        </p:spPr>
+      </p:pic>
+      <p:pic>
+        <p:nvPicPr>
+          <p:cNvPr id="46" name="Graphic 45" descr="Open envelope">
+            <a:extLst>
+              <a:ext uri="{FF2B5EF4-FFF2-40B4-BE49-F238E27FC236}">
+                <a16:creationId xmlns:a16="http://schemas.microsoft.com/office/drawing/2014/main" id="{A695B970-9A8C-498D-B591-9F40925198B4}"/>
+              </a:ext>
+            </a:extLst>
+          </p:cNvPr>
+          <p:cNvPicPr>
+            <a:picLocks noChangeAspect="1"/>
+          </p:cNvPicPr>
+          <p:nvPr/>
+        </p:nvPicPr>
+        <p:blipFill>
+          <a:blip r:embed="rId5">
+            <a:extLst>
+              <a:ext uri="{28A0092B-C50C-407E-A947-70E740481C1C}">
+                <a14:useLocalDpi xmlns:a14="http://schemas.microsoft.com/office/drawing/2010/main" val="0"/>
+              </a:ext>
+              <a:ext uri="{96DAC541-7B7A-43D3-8B79-37D633B846F1}">
+                <asvg:svgBlip xmlns:asvg="http://schemas.microsoft.com/office/drawing/2016/SVG/main" r:embed="rId6"/>
+              </a:ext>
+            </a:extLst>
+          </a:blip>
+          <a:stretch>
+            <a:fillRect/>
+          </a:stretch>
+        </p:blipFill>
+        <p:spPr>
+          <a:xfrm>
+            <a:off x="3170995" y="1535574"/>
+            <a:ext cx="607200" cy="607200"/>
+          </a:xfrm>
+          <a:prstGeom prst="rect">
+            <a:avLst/>
+          </a:prstGeom>
+        </p:spPr>
+      </p:pic>
+      <p:cxnSp>
+        <p:nvCxnSpPr>
+          <p:cNvPr id="49" name="Straight Arrow Connector 48">
+            <a:extLst>
+              <a:ext uri="{FF2B5EF4-FFF2-40B4-BE49-F238E27FC236}">
+                <a16:creationId xmlns:a16="http://schemas.microsoft.com/office/drawing/2014/main" id="{1B2F6C2C-E5E6-45E2-BFEF-496B5A415CCE}"/>
+              </a:ext>
+            </a:extLst>
+          </p:cNvPr>
+          <p:cNvCxnSpPr>
+            <a:endCxn id="46" idx="1"/>
+          </p:cNvCxnSpPr>
+          <p:nvPr/>
+        </p:nvCxnSpPr>
+        <p:spPr>
+          <a:xfrm flipV="1">
+            <a:off x="2641600" y="1839174"/>
+            <a:ext cx="529395" cy="181445"/>
+          </a:xfrm>
+          <a:prstGeom prst="straightConnector1">
+            <a:avLst/>
+          </a:prstGeom>
+          <a:ln>
+            <a:tailEnd type="triangle"/>
+          </a:ln>
+        </p:spPr>
+        <p:style>
+          <a:lnRef idx="1">
+            <a:schemeClr val="accent1"/>
+          </a:lnRef>
+          <a:fillRef idx="0">
+            <a:schemeClr val="accent1"/>
+          </a:fillRef>
+          <a:effectRef idx="0">
+            <a:schemeClr val="accent1"/>
+          </a:effectRef>
+          <a:fontRef idx="minor">
+            <a:schemeClr val="tx1"/>
+          </a:fontRef>
+        </p:style>
+      </p:cxnSp>
+      <p:cxnSp>
+        <p:nvCxnSpPr>
+          <p:cNvPr id="50" name="Straight Arrow Connector 49">
+            <a:extLst>
+              <a:ext uri="{FF2B5EF4-FFF2-40B4-BE49-F238E27FC236}">
+                <a16:creationId xmlns:a16="http://schemas.microsoft.com/office/drawing/2014/main" id="{85A18468-7290-43DB-97C4-F8F6182CEACF}"/>
+              </a:ext>
+            </a:extLst>
+          </p:cNvPr>
+          <p:cNvCxnSpPr>
+            <a:cxnSpLocks/>
+            <a:endCxn id="44" idx="1"/>
+          </p:cNvCxnSpPr>
+          <p:nvPr/>
+        </p:nvCxnSpPr>
+        <p:spPr>
+          <a:xfrm>
+            <a:off x="2260381" y="2337677"/>
+            <a:ext cx="910614" cy="149891"/>
+          </a:xfrm>
+          <a:prstGeom prst="straightConnector1">
+            <a:avLst/>
+          </a:prstGeom>
+          <a:ln>
+            <a:tailEnd type="triangle"/>
+          </a:ln>
+        </p:spPr>
+        <p:style>
+          <a:lnRef idx="1">
+            <a:schemeClr val="accent1"/>
+          </a:lnRef>
+          <a:fillRef idx="0">
+            <a:schemeClr val="accent1"/>
+          </a:fillRef>
+          <a:effectRef idx="0">
+            <a:schemeClr val="accent1"/>
+          </a:effectRef>
+          <a:fontRef idx="minor">
+            <a:schemeClr val="tx1"/>
+          </a:fontRef>
+        </p:style>
+      </p:cxnSp>
+      <p:sp>
+        <p:nvSpPr>
+          <p:cNvPr id="17" name="Rectangle: Rounded Corners 16">
+            <a:extLst>
+              <a:ext uri="{FF2B5EF4-FFF2-40B4-BE49-F238E27FC236}">
+                <a16:creationId xmlns:a16="http://schemas.microsoft.com/office/drawing/2014/main" id="{D8788900-CC80-40F5-8CEA-E7FC8AEC0D79}"/>
+              </a:ext>
+            </a:extLst>
+          </p:cNvPr>
+          <p:cNvSpPr/>
+          <p:nvPr/>
+        </p:nvSpPr>
+        <p:spPr>
+          <a:xfrm>
+            <a:off x="6372630" y="775944"/>
+            <a:ext cx="909176" cy="1285875"/>
+          </a:xfrm>
+          <a:prstGeom prst="roundRect">
+            <a:avLst/>
+          </a:prstGeom>
+          <a:solidFill>
+            <a:schemeClr val="accent5"/>
+          </a:solidFill>
+        </p:spPr>
+        <p:style>
+          <a:lnRef idx="3">
+            <a:schemeClr val="lt1"/>
+          </a:lnRef>
+          <a:fillRef idx="1">
+            <a:schemeClr val="accent5"/>
+          </a:fillRef>
+          <a:effectRef idx="1">
+            <a:schemeClr val="accent5"/>
+          </a:effectRef>
+          <a:fontRef idx="minor">
+            <a:schemeClr val="lt1"/>
+          </a:fontRef>
+        </p:style>
+        <p:txBody>
+          <a:bodyPr rtlCol="0" anchor="ctr"/>
+          <a:lstStyle/>
+          <a:p>
+            <a:pPr algn="ctr"/>
+            <a:endParaRPr lang="en-CA"/>
+          </a:p>
+        </p:txBody>
+      </p:sp>
+      <p:sp>
+        <p:nvSpPr>
+          <p:cNvPr id="18" name="TextBox 17">
+            <a:extLst>
+              <a:ext uri="{FF2B5EF4-FFF2-40B4-BE49-F238E27FC236}">
+                <a16:creationId xmlns:a16="http://schemas.microsoft.com/office/drawing/2014/main" id="{D9F058BC-5FE4-49BC-B9A9-B31279FD1DE9}"/>
+              </a:ext>
+            </a:extLst>
+          </p:cNvPr>
+          <p:cNvSpPr txBox="1"/>
+          <p:nvPr/>
+        </p:nvSpPr>
+        <p:spPr>
+          <a:xfrm>
+            <a:off x="6406793" y="915128"/>
+            <a:ext cx="533823" cy="307777"/>
+          </a:xfrm>
+          <a:prstGeom prst="rect">
+            <a:avLst/>
+          </a:prstGeom>
+          <a:noFill/>
+        </p:spPr>
+        <p:txBody>
+          <a:bodyPr wrap="square" rtlCol="0">
+            <a:spAutoFit/>
+          </a:bodyPr>
+          <a:lstStyle/>
+          <a:p>
+            <a:r>
+              <a:rPr lang="en-CA" sz="1400" dirty="0">
+                <a:solidFill>
+                  <a:schemeClr val="bg1"/>
+                </a:solidFill>
+                <a:sym typeface="Webdings" panose="05030102010509060703" pitchFamily="18" charset="2"/>
+              </a:rPr>
+              <a:t>ON</a:t>
+            </a:r>
+            <a:endParaRPr lang="en-CA" sz="1400" dirty="0">
+              <a:solidFill>
+                <a:schemeClr val="bg1"/>
+              </a:solidFill>
+            </a:endParaRPr>
+          </a:p>
+        </p:txBody>
+      </p:sp>
+      <p:sp>
+        <p:nvSpPr>
+          <p:cNvPr id="19" name="TextBox 18">
+            <a:extLst>
+              <a:ext uri="{FF2B5EF4-FFF2-40B4-BE49-F238E27FC236}">
+                <a16:creationId xmlns:a16="http://schemas.microsoft.com/office/drawing/2014/main" id="{200BBE15-5A19-468A-B9E1-F1550D582A33}"/>
+              </a:ext>
+            </a:extLst>
+          </p:cNvPr>
+          <p:cNvSpPr txBox="1"/>
+          <p:nvPr/>
+        </p:nvSpPr>
+        <p:spPr>
+          <a:xfrm>
+            <a:off x="6372630" y="1593436"/>
+            <a:ext cx="621586" cy="307777"/>
+          </a:xfrm>
+          <a:prstGeom prst="rect">
+            <a:avLst/>
+          </a:prstGeom>
+          <a:noFill/>
+        </p:spPr>
+        <p:txBody>
+          <a:bodyPr wrap="square" rtlCol="0">
+            <a:spAutoFit/>
+          </a:bodyPr>
+          <a:lstStyle/>
+          <a:p>
+            <a:r>
+              <a:rPr lang="en-CA" sz="1400" dirty="0">
+                <a:solidFill>
+                  <a:schemeClr val="bg1"/>
+                </a:solidFill>
+                <a:sym typeface="Webdings" panose="05030102010509060703" pitchFamily="18" charset="2"/>
+              </a:rPr>
+              <a:t>OFF</a:t>
+            </a:r>
+            <a:endParaRPr lang="en-CA" sz="1400" dirty="0">
+              <a:solidFill>
+                <a:schemeClr val="bg1"/>
+              </a:solidFill>
+            </a:endParaRPr>
+          </a:p>
+        </p:txBody>
+      </p:sp>
+      <p:sp>
+        <p:nvSpPr>
+          <p:cNvPr id="20" name="Flowchart: Alternate Process 19">
+            <a:extLst>
+              <a:ext uri="{FF2B5EF4-FFF2-40B4-BE49-F238E27FC236}">
+                <a16:creationId xmlns:a16="http://schemas.microsoft.com/office/drawing/2014/main" id="{415E0FF1-5EEC-411C-BD72-C46AD1B49426}"/>
+              </a:ext>
+            </a:extLst>
+          </p:cNvPr>
+          <p:cNvSpPr/>
+          <p:nvPr/>
+        </p:nvSpPr>
+        <p:spPr>
+          <a:xfrm>
+            <a:off x="6940617" y="1068019"/>
+            <a:ext cx="155626" cy="713788"/>
+          </a:xfrm>
+          <a:prstGeom prst="flowChartAlternateProcess">
+            <a:avLst/>
+          </a:prstGeom>
+        </p:spPr>
+        <p:style>
+          <a:lnRef idx="2">
+            <a:schemeClr val="dk1"/>
+          </a:lnRef>
+          <a:fillRef idx="1">
+            <a:schemeClr val="lt1"/>
+          </a:fillRef>
+          <a:effectRef idx="0">
+            <a:schemeClr val="dk1"/>
+          </a:effectRef>
+          <a:fontRef idx="minor">
+            <a:schemeClr val="dk1"/>
+          </a:fontRef>
+        </p:style>
+        <p:txBody>
+          <a:bodyPr rtlCol="0" anchor="ctr"/>
+          <a:lstStyle/>
+          <a:p>
+            <a:pPr algn="ctr"/>
+            <a:endParaRPr lang="en-CA"/>
+          </a:p>
+        </p:txBody>
+      </p:sp>
+      <p:sp>
+        <p:nvSpPr>
+          <p:cNvPr id="21" name="Flowchart: Connector 20">
+            <a:extLst>
+              <a:ext uri="{FF2B5EF4-FFF2-40B4-BE49-F238E27FC236}">
+                <a16:creationId xmlns:a16="http://schemas.microsoft.com/office/drawing/2014/main" id="{180A945F-C3B6-4324-B21B-3404498773C4}"/>
+              </a:ext>
+            </a:extLst>
+          </p:cNvPr>
+          <p:cNvSpPr/>
+          <p:nvPr/>
+        </p:nvSpPr>
+        <p:spPr>
+          <a:xfrm>
+            <a:off x="6889549" y="948928"/>
+            <a:ext cx="257761" cy="279336"/>
+          </a:xfrm>
+          <a:prstGeom prst="flowChartConnector">
+            <a:avLst/>
+          </a:prstGeom>
+        </p:spPr>
+        <p:style>
+          <a:lnRef idx="0">
+            <a:schemeClr val="accent6"/>
+          </a:lnRef>
+          <a:fillRef idx="3">
+            <a:schemeClr val="accent6"/>
+          </a:fillRef>
+          <a:effectRef idx="3">
+            <a:schemeClr val="accent6"/>
+          </a:effectRef>
+          <a:fontRef idx="minor">
+            <a:schemeClr val="lt1"/>
+          </a:fontRef>
+        </p:style>
+        <p:txBody>
+          <a:bodyPr rtlCol="0" anchor="ctr"/>
+          <a:lstStyle/>
+          <a:p>
+            <a:pPr algn="ctr"/>
+            <a:endParaRPr lang="en-CA"/>
+          </a:p>
+        </p:txBody>
+      </p:sp>
+      <p:pic>
+        <p:nvPicPr>
+          <p:cNvPr id="4" name="Graphic 3" descr="Earth Globe Europe-Africa">
+            <a:extLst>
+              <a:ext uri="{FF2B5EF4-FFF2-40B4-BE49-F238E27FC236}">
+                <a16:creationId xmlns:a16="http://schemas.microsoft.com/office/drawing/2014/main" id="{00718C2D-A047-4CA8-9CEE-8E768CE96C96}"/>
+              </a:ext>
+            </a:extLst>
+          </p:cNvPr>
+          <p:cNvPicPr>
+            <a:picLocks noChangeAspect="1"/>
+          </p:cNvPicPr>
+          <p:nvPr/>
+        </p:nvPicPr>
+        <p:blipFill>
+          <a:blip r:embed="rId7">
+            <a:extLst>
+              <a:ext uri="{28A0092B-C50C-407E-A947-70E740481C1C}">
+                <a14:useLocalDpi xmlns:a14="http://schemas.microsoft.com/office/drawing/2010/main" val="0"/>
+              </a:ext>
+              <a:ext uri="{96DAC541-7B7A-43D3-8B79-37D633B846F1}">
+                <asvg:svgBlip xmlns:asvg="http://schemas.microsoft.com/office/drawing/2016/SVG/main" r:embed="rId8"/>
+              </a:ext>
+            </a:extLst>
+          </a:blip>
+          <a:stretch>
+            <a:fillRect/>
+          </a:stretch>
+        </p:blipFill>
+        <p:spPr>
+          <a:xfrm>
+            <a:off x="8442205" y="973606"/>
+            <a:ext cx="914400" cy="914400"/>
+          </a:xfrm>
+          <a:prstGeom prst="rect">
+            <a:avLst/>
+          </a:prstGeom>
+        </p:spPr>
+      </p:pic>
+      <p:pic>
+        <p:nvPicPr>
+          <p:cNvPr id="6" name="Graphic 5" descr="User">
+            <a:extLst>
+              <a:ext uri="{FF2B5EF4-FFF2-40B4-BE49-F238E27FC236}">
+                <a16:creationId xmlns:a16="http://schemas.microsoft.com/office/drawing/2014/main" id="{8883C320-335F-4AF4-9254-27FFBEF0DE68}"/>
+              </a:ext>
+            </a:extLst>
+          </p:cNvPr>
+          <p:cNvPicPr>
+            <a:picLocks noChangeAspect="1"/>
+          </p:cNvPicPr>
+          <p:nvPr/>
+        </p:nvPicPr>
+        <p:blipFill>
+          <a:blip r:embed="rId9">
+            <a:extLst>
+              <a:ext uri="{28A0092B-C50C-407E-A947-70E740481C1C}">
+                <a14:useLocalDpi xmlns:a14="http://schemas.microsoft.com/office/drawing/2010/main" val="0"/>
+              </a:ext>
+              <a:ext uri="{96DAC541-7B7A-43D3-8B79-37D633B846F1}">
+                <asvg:svgBlip xmlns:asvg="http://schemas.microsoft.com/office/drawing/2016/SVG/main" r:embed="rId10"/>
+              </a:ext>
+            </a:extLst>
+          </a:blip>
+          <a:stretch>
+            <a:fillRect/>
+          </a:stretch>
+        </p:blipFill>
+        <p:spPr>
+          <a:xfrm>
+            <a:off x="8442205" y="2506971"/>
+            <a:ext cx="783415" cy="783415"/>
+          </a:xfrm>
+          <a:prstGeom prst="rect">
+            <a:avLst/>
+          </a:prstGeom>
+        </p:spPr>
+      </p:pic>
+      <p:pic>
+        <p:nvPicPr>
+          <p:cNvPr id="8" name="Graphic 7" descr="Users">
+            <a:extLst>
+              <a:ext uri="{FF2B5EF4-FFF2-40B4-BE49-F238E27FC236}">
+                <a16:creationId xmlns:a16="http://schemas.microsoft.com/office/drawing/2014/main" id="{CCF80667-CBB3-47BA-8B1B-1522CFF44E5E}"/>
+              </a:ext>
+            </a:extLst>
+          </p:cNvPr>
+          <p:cNvPicPr>
+            <a:picLocks noChangeAspect="1"/>
+          </p:cNvPicPr>
+          <p:nvPr/>
+        </p:nvPicPr>
+        <p:blipFill>
+          <a:blip r:embed="rId11">
+            <a:extLst>
+              <a:ext uri="{28A0092B-C50C-407E-A947-70E740481C1C}">
+                <a14:useLocalDpi xmlns:a14="http://schemas.microsoft.com/office/drawing/2010/main" val="0"/>
+              </a:ext>
+              <a:ext uri="{96DAC541-7B7A-43D3-8B79-37D633B846F1}">
+                <asvg:svgBlip xmlns:asvg="http://schemas.microsoft.com/office/drawing/2016/SVG/main" r:embed="rId12"/>
+              </a:ext>
+            </a:extLst>
+          </a:blip>
+          <a:stretch>
+            <a:fillRect/>
+          </a:stretch>
+        </p:blipFill>
+        <p:spPr>
+          <a:xfrm>
+            <a:off x="8442205" y="3025706"/>
+            <a:ext cx="1349750" cy="1349750"/>
+          </a:xfrm>
+          <a:prstGeom prst="rect">
+            <a:avLst/>
+          </a:prstGeom>
+        </p:spPr>
+      </p:pic>
+      <p:pic>
+        <p:nvPicPr>
+          <p:cNvPr id="11" name="Graphic 10" descr="Call center">
+            <a:extLst>
+              <a:ext uri="{FF2B5EF4-FFF2-40B4-BE49-F238E27FC236}">
+                <a16:creationId xmlns:a16="http://schemas.microsoft.com/office/drawing/2014/main" id="{BB9B00F9-247B-470C-BE76-E86592D772D1}"/>
+              </a:ext>
+            </a:extLst>
+          </p:cNvPr>
+          <p:cNvPicPr>
+            <a:picLocks noChangeAspect="1"/>
+          </p:cNvPicPr>
+          <p:nvPr/>
+        </p:nvPicPr>
+        <p:blipFill>
+          <a:blip r:embed="rId13">
+            <a:extLst>
+              <a:ext uri="{28A0092B-C50C-407E-A947-70E740481C1C}">
+                <a14:useLocalDpi xmlns:a14="http://schemas.microsoft.com/office/drawing/2010/main" val="0"/>
+              </a:ext>
+              <a:ext uri="{96DAC541-7B7A-43D3-8B79-37D633B846F1}">
+                <asvg:svgBlip xmlns:asvg="http://schemas.microsoft.com/office/drawing/2016/SVG/main" r:embed="rId14"/>
+              </a:ext>
+            </a:extLst>
+          </a:blip>
+          <a:stretch>
+            <a:fillRect/>
+          </a:stretch>
+        </p:blipFill>
+        <p:spPr>
+          <a:xfrm>
+            <a:off x="8476368" y="4789270"/>
+            <a:ext cx="914400" cy="914400"/>
+          </a:xfrm>
+          <a:prstGeom prst="rect">
+            <a:avLst/>
+          </a:prstGeom>
+        </p:spPr>
+      </p:pic>
+      <p:cxnSp>
+        <p:nvCxnSpPr>
+          <p:cNvPr id="13" name="Straight Arrow Connector 12">
+            <a:extLst>
+              <a:ext uri="{FF2B5EF4-FFF2-40B4-BE49-F238E27FC236}">
+                <a16:creationId xmlns:a16="http://schemas.microsoft.com/office/drawing/2014/main" id="{A05DE1C9-B367-4C21-80D8-48D9BC375545}"/>
+              </a:ext>
+            </a:extLst>
+          </p:cNvPr>
+          <p:cNvCxnSpPr>
+            <a:stCxn id="17" idx="3"/>
+            <a:endCxn id="4" idx="1"/>
+          </p:cNvCxnSpPr>
+          <p:nvPr/>
+        </p:nvCxnSpPr>
+        <p:spPr>
+          <a:xfrm>
+            <a:off x="7281806" y="1418882"/>
+            <a:ext cx="1160399" cy="11924"/>
+          </a:xfrm>
+          <a:prstGeom prst="straightConnector1">
+            <a:avLst/>
+          </a:prstGeom>
+          <a:ln w="34925">
+            <a:tailEnd type="triangle" w="lg" len="sm"/>
+          </a:ln>
+        </p:spPr>
+        <p:style>
+          <a:lnRef idx="1">
+            <a:schemeClr val="accent1"/>
+          </a:lnRef>
+          <a:fillRef idx="0">
+            <a:schemeClr val="accent1"/>
+          </a:fillRef>
+          <a:effectRef idx="0">
+            <a:schemeClr val="accent1"/>
+          </a:effectRef>
+          <a:fontRef idx="minor">
+            <a:schemeClr val="tx1"/>
+          </a:fontRef>
+        </p:style>
+      </p:cxnSp>
+      <p:sp>
+        <p:nvSpPr>
+          <p:cNvPr id="31" name="Rectangle: Rounded Corners 30">
+            <a:extLst>
+              <a:ext uri="{FF2B5EF4-FFF2-40B4-BE49-F238E27FC236}">
+                <a16:creationId xmlns:a16="http://schemas.microsoft.com/office/drawing/2014/main" id="{BBEC0335-7147-4919-B140-8F15A12BE7D3}"/>
+              </a:ext>
+            </a:extLst>
+          </p:cNvPr>
+          <p:cNvSpPr/>
+          <p:nvPr/>
+        </p:nvSpPr>
+        <p:spPr>
+          <a:xfrm>
+            <a:off x="6372630" y="2578745"/>
+            <a:ext cx="909176" cy="1285875"/>
+          </a:xfrm>
+          <a:prstGeom prst="roundRect">
+            <a:avLst/>
+          </a:prstGeom>
+          <a:solidFill>
+            <a:schemeClr val="accent5"/>
+          </a:solidFill>
+        </p:spPr>
+        <p:style>
+          <a:lnRef idx="3">
+            <a:schemeClr val="lt1"/>
+          </a:lnRef>
+          <a:fillRef idx="1">
+            <a:schemeClr val="accent5"/>
+          </a:fillRef>
+          <a:effectRef idx="1">
+            <a:schemeClr val="accent5"/>
+          </a:effectRef>
+          <a:fontRef idx="minor">
+            <a:schemeClr val="lt1"/>
+          </a:fontRef>
+        </p:style>
+        <p:txBody>
+          <a:bodyPr rtlCol="0" anchor="ctr"/>
+          <a:lstStyle/>
+          <a:p>
+            <a:pPr algn="ctr"/>
+            <a:endParaRPr lang="en-CA"/>
+          </a:p>
+        </p:txBody>
+      </p:sp>
+      <p:sp>
+        <p:nvSpPr>
+          <p:cNvPr id="32" name="TextBox 31">
+            <a:extLst>
+              <a:ext uri="{FF2B5EF4-FFF2-40B4-BE49-F238E27FC236}">
+                <a16:creationId xmlns:a16="http://schemas.microsoft.com/office/drawing/2014/main" id="{DDFA9762-AECB-41B1-A2E1-856C634F7576}"/>
+              </a:ext>
+            </a:extLst>
+          </p:cNvPr>
+          <p:cNvSpPr txBox="1"/>
+          <p:nvPr/>
+        </p:nvSpPr>
+        <p:spPr>
+          <a:xfrm>
+            <a:off x="6406793" y="2717929"/>
+            <a:ext cx="533823" cy="307777"/>
+          </a:xfrm>
+          <a:prstGeom prst="rect">
+            <a:avLst/>
+          </a:prstGeom>
+          <a:noFill/>
+        </p:spPr>
+        <p:txBody>
+          <a:bodyPr wrap="square" rtlCol="0">
+            <a:spAutoFit/>
+          </a:bodyPr>
+          <a:lstStyle/>
+          <a:p>
+            <a:r>
+              <a:rPr lang="en-CA" sz="1400" dirty="0">
+                <a:solidFill>
+                  <a:schemeClr val="bg1"/>
+                </a:solidFill>
+                <a:sym typeface="Webdings" panose="05030102010509060703" pitchFamily="18" charset="2"/>
+              </a:rPr>
+              <a:t>ON</a:t>
+            </a:r>
+            <a:endParaRPr lang="en-CA" sz="1400" dirty="0">
+              <a:solidFill>
+                <a:schemeClr val="bg1"/>
+              </a:solidFill>
+            </a:endParaRPr>
+          </a:p>
+        </p:txBody>
+      </p:sp>
+      <p:sp>
+        <p:nvSpPr>
+          <p:cNvPr id="33" name="TextBox 32">
+            <a:extLst>
+              <a:ext uri="{FF2B5EF4-FFF2-40B4-BE49-F238E27FC236}">
+                <a16:creationId xmlns:a16="http://schemas.microsoft.com/office/drawing/2014/main" id="{7957302D-6009-4EC6-AA4D-6D11271C00B2}"/>
+              </a:ext>
+            </a:extLst>
+          </p:cNvPr>
+          <p:cNvSpPr txBox="1"/>
+          <p:nvPr/>
+        </p:nvSpPr>
+        <p:spPr>
+          <a:xfrm>
+            <a:off x="6372630" y="3396237"/>
+            <a:ext cx="621586" cy="307777"/>
+          </a:xfrm>
+          <a:prstGeom prst="rect">
+            <a:avLst/>
+          </a:prstGeom>
+          <a:noFill/>
+        </p:spPr>
+        <p:txBody>
+          <a:bodyPr wrap="square" rtlCol="0">
+            <a:spAutoFit/>
+          </a:bodyPr>
+          <a:lstStyle/>
+          <a:p>
+            <a:r>
+              <a:rPr lang="en-CA" sz="1400" dirty="0">
+                <a:solidFill>
+                  <a:schemeClr val="bg1"/>
+                </a:solidFill>
+                <a:sym typeface="Webdings" panose="05030102010509060703" pitchFamily="18" charset="2"/>
+              </a:rPr>
+              <a:t>OFF</a:t>
+            </a:r>
+            <a:endParaRPr lang="en-CA" sz="1400" dirty="0">
+              <a:solidFill>
+                <a:schemeClr val="bg1"/>
+              </a:solidFill>
+            </a:endParaRPr>
+          </a:p>
+        </p:txBody>
+      </p:sp>
+      <p:sp>
+        <p:nvSpPr>
+          <p:cNvPr id="34" name="Flowchart: Alternate Process 33">
+            <a:extLst>
+              <a:ext uri="{FF2B5EF4-FFF2-40B4-BE49-F238E27FC236}">
+                <a16:creationId xmlns:a16="http://schemas.microsoft.com/office/drawing/2014/main" id="{AC9347CB-EFB7-422E-AAFA-FBF4B7F4A955}"/>
+              </a:ext>
+            </a:extLst>
+          </p:cNvPr>
+          <p:cNvSpPr/>
+          <p:nvPr/>
+        </p:nvSpPr>
+        <p:spPr>
+          <a:xfrm>
+            <a:off x="6940617" y="2870820"/>
+            <a:ext cx="155626" cy="713788"/>
+          </a:xfrm>
+          <a:prstGeom prst="flowChartAlternateProcess">
+            <a:avLst/>
+          </a:prstGeom>
+        </p:spPr>
+        <p:style>
+          <a:lnRef idx="2">
+            <a:schemeClr val="dk1"/>
+          </a:lnRef>
+          <a:fillRef idx="1">
+            <a:schemeClr val="lt1"/>
+          </a:fillRef>
+          <a:effectRef idx="0">
+            <a:schemeClr val="dk1"/>
+          </a:effectRef>
+          <a:fontRef idx="minor">
+            <a:schemeClr val="dk1"/>
+          </a:fontRef>
+        </p:style>
+        <p:txBody>
+          <a:bodyPr rtlCol="0" anchor="ctr"/>
+          <a:lstStyle/>
+          <a:p>
+            <a:pPr algn="ctr"/>
+            <a:endParaRPr lang="en-CA"/>
+          </a:p>
+        </p:txBody>
+      </p:sp>
+      <p:sp>
+        <p:nvSpPr>
+          <p:cNvPr id="36" name="Flowchart: Connector 35">
+            <a:extLst>
+              <a:ext uri="{FF2B5EF4-FFF2-40B4-BE49-F238E27FC236}">
+                <a16:creationId xmlns:a16="http://schemas.microsoft.com/office/drawing/2014/main" id="{684A4BED-5160-4640-9D29-95C90EA86683}"/>
+              </a:ext>
+            </a:extLst>
+          </p:cNvPr>
+          <p:cNvSpPr/>
+          <p:nvPr/>
+        </p:nvSpPr>
+        <p:spPr>
+          <a:xfrm>
+            <a:off x="6889549" y="2751729"/>
+            <a:ext cx="257761" cy="279336"/>
+          </a:xfrm>
+          <a:prstGeom prst="flowChartConnector">
+            <a:avLst/>
+          </a:prstGeom>
+        </p:spPr>
+        <p:style>
+          <a:lnRef idx="0">
+            <a:schemeClr val="accent6"/>
+          </a:lnRef>
+          <a:fillRef idx="3">
+            <a:schemeClr val="accent6"/>
+          </a:fillRef>
+          <a:effectRef idx="3">
+            <a:schemeClr val="accent6"/>
+          </a:effectRef>
+          <a:fontRef idx="minor">
+            <a:schemeClr val="lt1"/>
+          </a:fontRef>
+        </p:style>
+        <p:txBody>
+          <a:bodyPr rtlCol="0" anchor="ctr"/>
+          <a:lstStyle/>
+          <a:p>
+            <a:pPr algn="ctr"/>
+            <a:endParaRPr lang="en-CA"/>
+          </a:p>
+        </p:txBody>
+      </p:sp>
+      <p:cxnSp>
+        <p:nvCxnSpPr>
+          <p:cNvPr id="40" name="Straight Arrow Connector 39">
+            <a:extLst>
+              <a:ext uri="{FF2B5EF4-FFF2-40B4-BE49-F238E27FC236}">
+                <a16:creationId xmlns:a16="http://schemas.microsoft.com/office/drawing/2014/main" id="{83DF8688-FE6B-4EF2-94CE-BC10B31E300B}"/>
+              </a:ext>
+            </a:extLst>
+          </p:cNvPr>
+          <p:cNvCxnSpPr>
+            <a:cxnSpLocks/>
+            <a:stCxn id="31" idx="3"/>
+            <a:endCxn id="6" idx="1"/>
+          </p:cNvCxnSpPr>
+          <p:nvPr/>
+        </p:nvCxnSpPr>
+        <p:spPr>
+          <a:xfrm flipV="1">
+            <a:off x="7281806" y="2898679"/>
+            <a:ext cx="1160399" cy="323004"/>
+          </a:xfrm>
+          <a:prstGeom prst="straightConnector1">
+            <a:avLst/>
+          </a:prstGeom>
+          <a:ln w="34925">
+            <a:tailEnd type="triangle" w="lg" len="sm"/>
+          </a:ln>
+        </p:spPr>
+        <p:style>
+          <a:lnRef idx="1">
+            <a:schemeClr val="accent1"/>
+          </a:lnRef>
+          <a:fillRef idx="0">
+            <a:schemeClr val="accent1"/>
+          </a:fillRef>
+          <a:effectRef idx="0">
+            <a:schemeClr val="accent1"/>
+          </a:effectRef>
+          <a:fontRef idx="minor">
+            <a:schemeClr val="tx1"/>
+          </a:fontRef>
+        </p:style>
+      </p:cxnSp>
+      <p:cxnSp>
+        <p:nvCxnSpPr>
+          <p:cNvPr id="43" name="Straight Arrow Connector 42">
+            <a:extLst>
+              <a:ext uri="{FF2B5EF4-FFF2-40B4-BE49-F238E27FC236}">
+                <a16:creationId xmlns:a16="http://schemas.microsoft.com/office/drawing/2014/main" id="{F24CA537-A3C4-439A-B33E-2C26348E47EC}"/>
+              </a:ext>
+            </a:extLst>
+          </p:cNvPr>
+          <p:cNvCxnSpPr>
+            <a:cxnSpLocks/>
+            <a:stCxn id="31" idx="3"/>
+            <a:endCxn id="8" idx="1"/>
+          </p:cNvCxnSpPr>
+          <p:nvPr/>
+        </p:nvCxnSpPr>
+        <p:spPr>
+          <a:xfrm>
+            <a:off x="7281806" y="3221683"/>
+            <a:ext cx="1160399" cy="478898"/>
+          </a:xfrm>
+          <a:prstGeom prst="straightConnector1">
+            <a:avLst/>
+          </a:prstGeom>
+          <a:ln w="34925">
+            <a:tailEnd type="triangle" w="lg" len="sm"/>
+          </a:ln>
+        </p:spPr>
+        <p:style>
+          <a:lnRef idx="1">
+            <a:schemeClr val="accent1"/>
+          </a:lnRef>
+          <a:fillRef idx="0">
+            <a:schemeClr val="accent1"/>
+          </a:fillRef>
+          <a:effectRef idx="0">
+            <a:schemeClr val="accent1"/>
+          </a:effectRef>
+          <a:fontRef idx="minor">
+            <a:schemeClr val="tx1"/>
+          </a:fontRef>
+        </p:style>
+      </p:cxnSp>
+      <p:sp>
+        <p:nvSpPr>
+          <p:cNvPr id="47" name="Rectangle: Rounded Corners 46">
+            <a:extLst>
+              <a:ext uri="{FF2B5EF4-FFF2-40B4-BE49-F238E27FC236}">
+                <a16:creationId xmlns:a16="http://schemas.microsoft.com/office/drawing/2014/main" id="{450037D6-7014-4B6E-8B93-2B15AE0C20D8}"/>
+              </a:ext>
+            </a:extLst>
+          </p:cNvPr>
+          <p:cNvSpPr/>
+          <p:nvPr/>
+        </p:nvSpPr>
+        <p:spPr>
+          <a:xfrm>
+            <a:off x="6406793" y="4616286"/>
+            <a:ext cx="909176" cy="1285875"/>
+          </a:xfrm>
+          <a:prstGeom prst="roundRect">
+            <a:avLst/>
+          </a:prstGeom>
+          <a:solidFill>
+            <a:schemeClr val="accent5"/>
+          </a:solidFill>
+        </p:spPr>
+        <p:style>
+          <a:lnRef idx="3">
+            <a:schemeClr val="lt1"/>
+          </a:lnRef>
+          <a:fillRef idx="1">
+            <a:schemeClr val="accent5"/>
+          </a:fillRef>
+          <a:effectRef idx="1">
+            <a:schemeClr val="accent5"/>
+          </a:effectRef>
+          <a:fontRef idx="minor">
+            <a:schemeClr val="lt1"/>
+          </a:fontRef>
+        </p:style>
+        <p:txBody>
+          <a:bodyPr rtlCol="0" anchor="ctr"/>
+          <a:lstStyle/>
+          <a:p>
+            <a:pPr algn="ctr"/>
+            <a:endParaRPr lang="en-CA"/>
+          </a:p>
+        </p:txBody>
+      </p:sp>
+      <p:sp>
+        <p:nvSpPr>
+          <p:cNvPr id="48" name="TextBox 47">
+            <a:extLst>
+              <a:ext uri="{FF2B5EF4-FFF2-40B4-BE49-F238E27FC236}">
+                <a16:creationId xmlns:a16="http://schemas.microsoft.com/office/drawing/2014/main" id="{5F732125-8E9B-4B3C-BD36-6186555CA506}"/>
+              </a:ext>
+            </a:extLst>
+          </p:cNvPr>
+          <p:cNvSpPr txBox="1"/>
+          <p:nvPr/>
+        </p:nvSpPr>
+        <p:spPr>
+          <a:xfrm>
+            <a:off x="6440956" y="4755470"/>
+            <a:ext cx="533823" cy="307777"/>
+          </a:xfrm>
+          <a:prstGeom prst="rect">
+            <a:avLst/>
+          </a:prstGeom>
+          <a:noFill/>
+        </p:spPr>
+        <p:txBody>
+          <a:bodyPr wrap="square" rtlCol="0">
+            <a:spAutoFit/>
+          </a:bodyPr>
+          <a:lstStyle/>
+          <a:p>
+            <a:r>
+              <a:rPr lang="en-CA" sz="1400" dirty="0">
+                <a:solidFill>
+                  <a:schemeClr val="bg1"/>
+                </a:solidFill>
+                <a:sym typeface="Webdings" panose="05030102010509060703" pitchFamily="18" charset="2"/>
+              </a:rPr>
+              <a:t>ON</a:t>
+            </a:r>
+            <a:endParaRPr lang="en-CA" sz="1400" dirty="0">
+              <a:solidFill>
+                <a:schemeClr val="bg1"/>
+              </a:solidFill>
+            </a:endParaRPr>
+          </a:p>
+        </p:txBody>
+      </p:sp>
+      <p:sp>
+        <p:nvSpPr>
+          <p:cNvPr id="51" name="TextBox 50">
+            <a:extLst>
+              <a:ext uri="{FF2B5EF4-FFF2-40B4-BE49-F238E27FC236}">
+                <a16:creationId xmlns:a16="http://schemas.microsoft.com/office/drawing/2014/main" id="{4CE441EB-2912-4395-BB57-0D13D102A0C3}"/>
+              </a:ext>
+            </a:extLst>
+          </p:cNvPr>
+          <p:cNvSpPr txBox="1"/>
+          <p:nvPr/>
+        </p:nvSpPr>
+        <p:spPr>
+          <a:xfrm>
+            <a:off x="6406793" y="5433778"/>
+            <a:ext cx="621586" cy="307777"/>
+          </a:xfrm>
+          <a:prstGeom prst="rect">
+            <a:avLst/>
+          </a:prstGeom>
+          <a:noFill/>
+        </p:spPr>
+        <p:txBody>
+          <a:bodyPr wrap="square" rtlCol="0">
+            <a:spAutoFit/>
+          </a:bodyPr>
+          <a:lstStyle/>
+          <a:p>
+            <a:r>
+              <a:rPr lang="en-CA" sz="1400" dirty="0">
+                <a:solidFill>
+                  <a:schemeClr val="bg1"/>
+                </a:solidFill>
+                <a:sym typeface="Webdings" panose="05030102010509060703" pitchFamily="18" charset="2"/>
+              </a:rPr>
+              <a:t>OFF</a:t>
+            </a:r>
+            <a:endParaRPr lang="en-CA" sz="1400" dirty="0">
+              <a:solidFill>
+                <a:schemeClr val="bg1"/>
+              </a:solidFill>
+            </a:endParaRPr>
+          </a:p>
+        </p:txBody>
+      </p:sp>
+      <p:sp>
+        <p:nvSpPr>
+          <p:cNvPr id="52" name="Flowchart: Alternate Process 51">
+            <a:extLst>
+              <a:ext uri="{FF2B5EF4-FFF2-40B4-BE49-F238E27FC236}">
+                <a16:creationId xmlns:a16="http://schemas.microsoft.com/office/drawing/2014/main" id="{EAE28376-6CF1-4607-ABE1-1E6BE283A1CD}"/>
+              </a:ext>
+            </a:extLst>
+          </p:cNvPr>
+          <p:cNvSpPr/>
+          <p:nvPr/>
+        </p:nvSpPr>
+        <p:spPr>
+          <a:xfrm>
+            <a:off x="6974780" y="4908361"/>
+            <a:ext cx="155626" cy="713788"/>
+          </a:xfrm>
+          <a:prstGeom prst="flowChartAlternateProcess">
+            <a:avLst/>
+          </a:prstGeom>
+        </p:spPr>
+        <p:style>
+          <a:lnRef idx="2">
+            <a:schemeClr val="dk1"/>
+          </a:lnRef>
+          <a:fillRef idx="1">
+            <a:schemeClr val="lt1"/>
+          </a:fillRef>
+          <a:effectRef idx="0">
+            <a:schemeClr val="dk1"/>
+          </a:effectRef>
+          <a:fontRef idx="minor">
+            <a:schemeClr val="dk1"/>
+          </a:fontRef>
+        </p:style>
+        <p:txBody>
+          <a:bodyPr rtlCol="0" anchor="ctr"/>
+          <a:lstStyle/>
+          <a:p>
+            <a:pPr algn="ctr"/>
+            <a:endParaRPr lang="en-CA"/>
+          </a:p>
+        </p:txBody>
+      </p:sp>
+      <p:sp>
+        <p:nvSpPr>
+          <p:cNvPr id="53" name="Flowchart: Connector 52">
+            <a:extLst>
+              <a:ext uri="{FF2B5EF4-FFF2-40B4-BE49-F238E27FC236}">
+                <a16:creationId xmlns:a16="http://schemas.microsoft.com/office/drawing/2014/main" id="{E87567FB-FD39-4731-A1B4-8B0F2A493BCA}"/>
+              </a:ext>
+            </a:extLst>
+          </p:cNvPr>
+          <p:cNvSpPr/>
+          <p:nvPr/>
+        </p:nvSpPr>
+        <p:spPr>
+          <a:xfrm>
+            <a:off x="6923712" y="4789270"/>
+            <a:ext cx="257761" cy="279336"/>
+          </a:xfrm>
+          <a:prstGeom prst="flowChartConnector">
+            <a:avLst/>
+          </a:prstGeom>
+        </p:spPr>
+        <p:style>
+          <a:lnRef idx="0">
+            <a:schemeClr val="accent6"/>
+          </a:lnRef>
+          <a:fillRef idx="3">
+            <a:schemeClr val="accent6"/>
+          </a:fillRef>
+          <a:effectRef idx="3">
+            <a:schemeClr val="accent6"/>
+          </a:effectRef>
+          <a:fontRef idx="minor">
+            <a:schemeClr val="lt1"/>
+          </a:fontRef>
+        </p:style>
+        <p:txBody>
+          <a:bodyPr rtlCol="0" anchor="ctr"/>
+          <a:lstStyle/>
+          <a:p>
+            <a:pPr algn="ctr"/>
+            <a:endParaRPr lang="en-CA"/>
+          </a:p>
+        </p:txBody>
+      </p:sp>
+      <p:cxnSp>
+        <p:nvCxnSpPr>
+          <p:cNvPr id="55" name="Straight Arrow Connector 54">
+            <a:extLst>
+              <a:ext uri="{FF2B5EF4-FFF2-40B4-BE49-F238E27FC236}">
+                <a16:creationId xmlns:a16="http://schemas.microsoft.com/office/drawing/2014/main" id="{B44952B6-E069-4623-86C8-B390F30DD297}"/>
+              </a:ext>
+            </a:extLst>
+          </p:cNvPr>
+          <p:cNvCxnSpPr>
+            <a:cxnSpLocks/>
+          </p:cNvCxnSpPr>
+          <p:nvPr/>
+        </p:nvCxnSpPr>
+        <p:spPr>
+          <a:xfrm flipH="1">
+            <a:off x="7303757" y="5127122"/>
+            <a:ext cx="1138448" cy="0"/>
+          </a:xfrm>
+          <a:prstGeom prst="straightConnector1">
+            <a:avLst/>
+          </a:prstGeom>
+          <a:ln w="34925">
+            <a:tailEnd type="triangle" w="lg" len="sm"/>
+          </a:ln>
+        </p:spPr>
+        <p:style>
+          <a:lnRef idx="1">
+            <a:schemeClr val="accent1"/>
+          </a:lnRef>
+          <a:fillRef idx="0">
+            <a:schemeClr val="accent1"/>
+          </a:fillRef>
+          <a:effectRef idx="0">
+            <a:schemeClr val="accent1"/>
+          </a:effectRef>
+          <a:fontRef idx="minor">
+            <a:schemeClr val="tx1"/>
+          </a:fontRef>
+        </p:style>
+      </p:cxnSp>
+      <p:cxnSp>
+        <p:nvCxnSpPr>
+          <p:cNvPr id="56" name="Straight Connector 55">
+            <a:extLst>
+              <a:ext uri="{FF2B5EF4-FFF2-40B4-BE49-F238E27FC236}">
+                <a16:creationId xmlns:a16="http://schemas.microsoft.com/office/drawing/2014/main" id="{C24A3594-2C54-4DFB-8584-5CE2A284BC92}"/>
+              </a:ext>
+            </a:extLst>
+          </p:cNvPr>
+          <p:cNvCxnSpPr>
+            <a:cxnSpLocks/>
+          </p:cNvCxnSpPr>
+          <p:nvPr/>
+        </p:nvCxnSpPr>
+        <p:spPr>
+          <a:xfrm flipH="1">
+            <a:off x="6251858" y="427509"/>
+            <a:ext cx="1" cy="6036551"/>
+          </a:xfrm>
+          <a:prstGeom prst="line">
+            <a:avLst/>
+          </a:prstGeom>
+        </p:spPr>
+        <p:style>
+          <a:lnRef idx="1">
+            <a:schemeClr val="accent1"/>
+          </a:lnRef>
+          <a:fillRef idx="0">
+            <a:schemeClr val="accent1"/>
+          </a:fillRef>
+          <a:effectRef idx="0">
+            <a:schemeClr val="accent1"/>
+          </a:effectRef>
+          <a:fontRef idx="minor">
+            <a:schemeClr val="tx1"/>
+          </a:fontRef>
+        </p:style>
+      </p:cxnSp>
+      <p:cxnSp>
+        <p:nvCxnSpPr>
+          <p:cNvPr id="65" name="Straight Connector 64">
+            <a:extLst>
+              <a:ext uri="{FF2B5EF4-FFF2-40B4-BE49-F238E27FC236}">
+                <a16:creationId xmlns:a16="http://schemas.microsoft.com/office/drawing/2014/main" id="{1F9ADED9-B47A-4F1B-9A7B-6C5DCB083DE5}"/>
+              </a:ext>
+            </a:extLst>
+          </p:cNvPr>
+          <p:cNvCxnSpPr>
+            <a:cxnSpLocks/>
+          </p:cNvCxnSpPr>
+          <p:nvPr/>
+        </p:nvCxnSpPr>
+        <p:spPr>
+          <a:xfrm flipH="1">
+            <a:off x="9840271" y="427509"/>
+            <a:ext cx="1" cy="6036551"/>
+          </a:xfrm>
+          <a:prstGeom prst="line">
+            <a:avLst/>
+          </a:prstGeom>
+        </p:spPr>
+        <p:style>
+          <a:lnRef idx="1">
+            <a:schemeClr val="accent1"/>
+          </a:lnRef>
+          <a:fillRef idx="0">
+            <a:schemeClr val="accent1"/>
+          </a:fillRef>
+          <a:effectRef idx="0">
+            <a:schemeClr val="accent1"/>
+          </a:effectRef>
+          <a:fontRef idx="minor">
+            <a:schemeClr val="tx1"/>
+          </a:fontRef>
+        </p:style>
+      </p:cxnSp>
+      <p:cxnSp>
+        <p:nvCxnSpPr>
+          <p:cNvPr id="69" name="Straight Arrow Connector 68">
+            <a:extLst>
+              <a:ext uri="{FF2B5EF4-FFF2-40B4-BE49-F238E27FC236}">
+                <a16:creationId xmlns:a16="http://schemas.microsoft.com/office/drawing/2014/main" id="{ED0A7E26-157E-4EAE-945D-62D65A2F7F21}"/>
+              </a:ext>
+            </a:extLst>
+          </p:cNvPr>
+          <p:cNvCxnSpPr/>
+          <p:nvPr/>
+        </p:nvCxnSpPr>
+        <p:spPr>
+          <a:xfrm>
+            <a:off x="7315969" y="5263192"/>
+            <a:ext cx="1160399" cy="11924"/>
+          </a:xfrm>
+          <a:prstGeom prst="straightConnector1">
+            <a:avLst/>
+          </a:prstGeom>
+          <a:ln w="34925">
+            <a:tailEnd type="triangle" w="lg" len="sm"/>
+          </a:ln>
+        </p:spPr>
+        <p:style>
+          <a:lnRef idx="1">
+            <a:schemeClr val="accent1"/>
+          </a:lnRef>
+          <a:fillRef idx="0">
+            <a:schemeClr val="accent1"/>
+          </a:fillRef>
+          <a:effectRef idx="0">
+            <a:schemeClr val="accent1"/>
+          </a:effectRef>
+          <a:fontRef idx="minor">
+            <a:schemeClr val="tx1"/>
+          </a:fontRef>
+        </p:style>
+      </p:cxnSp>
+    </p:spTree>
+    <p:extLst>
+      <p:ext uri="{BB962C8B-B14F-4D97-AF65-F5344CB8AC3E}">
+        <p14:creationId xmlns:p14="http://schemas.microsoft.com/office/powerpoint/2010/main" val="4118501722"/>
+      </p:ext>
+    </p:extLst>
+  </p:cSld>
+  <p:clrMapOvr>
+    <a:masterClrMapping/>
+  </p:clrMapOvr>
+</p:sld>
+</file>
+
+<file path=ppt/slides/slide14.xml><?xml version="1.0" encoding="utf-8"?>
+<p:sld xmlns:a="http://schemas.openxmlformats.org/drawingml/2006/main" xmlns:r="http://schemas.openxmlformats.org/officeDocument/2006/relationships" xmlns:p="http://schemas.openxmlformats.org/presentationml/2006/main">
+  <p:cSld>
+    <p:spTree>
+      <p:nvGrpSpPr>
+        <p:cNvPr id="1" name=""/>
+        <p:cNvGrpSpPr/>
+        <p:nvPr/>
+      </p:nvGrpSpPr>
+      <p:grpSpPr>
+        <a:xfrm>
+          <a:off x="0" y="0"/>
+          <a:ext cx="0" cy="0"/>
+          <a:chOff x="0" y="0"/>
+          <a:chExt cx="0" cy="0"/>
+        </a:xfrm>
+      </p:grpSpPr>
+      <p:sp>
+        <p:nvSpPr>
+          <p:cNvPr id="5" name="Rectangle: Rounded Corners 4">
+            <a:extLst>
+              <a:ext uri="{FF2B5EF4-FFF2-40B4-BE49-F238E27FC236}">
+                <a16:creationId xmlns:a16="http://schemas.microsoft.com/office/drawing/2014/main" id="{C06D6DF1-2789-4004-9B38-F7A2A98C5401}"/>
+              </a:ext>
+            </a:extLst>
+          </p:cNvPr>
+          <p:cNvSpPr/>
+          <p:nvPr/>
+        </p:nvSpPr>
+        <p:spPr>
+          <a:xfrm>
+            <a:off x="2759075" y="1462925"/>
+            <a:ext cx="2498725" cy="1416799"/>
+          </a:xfrm>
+          <a:prstGeom prst="roundRect">
+            <a:avLst>
+              <a:gd name="adj" fmla="val 7215"/>
+            </a:avLst>
+          </a:prstGeom>
+          <a:noFill/>
+          <a:ln>
+            <a:solidFill>
+              <a:schemeClr val="accent5"/>
+            </a:solidFill>
+          </a:ln>
+        </p:spPr>
+        <p:style>
+          <a:lnRef idx="2">
+            <a:schemeClr val="accent1">
+              <a:shade val="50000"/>
+            </a:schemeClr>
+          </a:lnRef>
+          <a:fillRef idx="1">
+            <a:schemeClr val="accent1"/>
+          </a:fillRef>
+          <a:effectRef idx="0">
+            <a:schemeClr val="accent1"/>
+          </a:effectRef>
+          <a:fontRef idx="minor">
+            <a:schemeClr val="lt1"/>
+          </a:fontRef>
+        </p:style>
+        <p:txBody>
+          <a:bodyPr rtlCol="0" anchor="ctr"/>
+          <a:lstStyle/>
+          <a:p>
+            <a:pPr algn="ctr"/>
+            <a:endParaRPr lang="en-CA"/>
+          </a:p>
+        </p:txBody>
+      </p:sp>
+      <p:sp>
+        <p:nvSpPr>
+          <p:cNvPr id="2" name="Title 1">
+            <a:extLst>
+              <a:ext uri="{FF2B5EF4-FFF2-40B4-BE49-F238E27FC236}">
+                <a16:creationId xmlns:a16="http://schemas.microsoft.com/office/drawing/2014/main" id="{D0BF88E3-7093-46AB-88BD-12B1CD7BBC92}"/>
+              </a:ext>
+            </a:extLst>
+          </p:cNvPr>
+          <p:cNvSpPr>
+            <a:spLocks noGrp="1"/>
+          </p:cNvSpPr>
+          <p:nvPr>
+            <p:ph type="title"/>
+          </p:nvPr>
+        </p:nvSpPr>
+        <p:spPr/>
+        <p:txBody>
+          <a:bodyPr/>
+          <a:lstStyle/>
+          <a:p>
+            <a:r>
+              <a:rPr lang="en-US" dirty="0"/>
+              <a:t>A|B Testing with Feature Flag</a:t>
+            </a:r>
+            <a:endParaRPr lang="en-CA" dirty="0"/>
+          </a:p>
+        </p:txBody>
+      </p:sp>
+      <p:sp>
+        <p:nvSpPr>
+          <p:cNvPr id="9" name="TextBox 8">
+            <a:extLst>
+              <a:ext uri="{FF2B5EF4-FFF2-40B4-BE49-F238E27FC236}">
+                <a16:creationId xmlns:a16="http://schemas.microsoft.com/office/drawing/2014/main" id="{4CA782D2-3D20-4449-8299-8E7C909F73B8}"/>
+              </a:ext>
+            </a:extLst>
+          </p:cNvPr>
+          <p:cNvSpPr txBox="1"/>
+          <p:nvPr/>
+        </p:nvSpPr>
+        <p:spPr>
+          <a:xfrm>
+            <a:off x="1729936" y="1855346"/>
+            <a:ext cx="1060890" cy="646331"/>
+          </a:xfrm>
+          <a:prstGeom prst="rect">
+            <a:avLst/>
+          </a:prstGeom>
+          <a:noFill/>
+        </p:spPr>
+        <p:txBody>
+          <a:bodyPr wrap="square" rtlCol="0">
+            <a:spAutoFit/>
+          </a:bodyPr>
+          <a:lstStyle/>
+          <a:p>
+            <a:r>
+              <a:rPr lang="en-US" dirty="0"/>
+              <a:t>if ( </a:t>
+            </a:r>
+            <a:r>
+              <a:rPr lang="en-US" dirty="0">
+                <a:solidFill>
+                  <a:srgbClr val="0070C0"/>
+                </a:solidFill>
+              </a:rPr>
+              <a:t>flag</a:t>
+            </a:r>
+            <a:r>
+              <a:rPr lang="en-US" dirty="0"/>
+              <a:t> )</a:t>
+            </a:r>
+          </a:p>
+          <a:p>
+            <a:r>
+              <a:rPr lang="en-US" dirty="0"/>
+              <a:t>e</a:t>
+            </a:r>
+            <a:r>
+              <a:rPr lang="en-CA" dirty="0" err="1"/>
+              <a:t>lse</a:t>
+            </a:r>
+            <a:endParaRPr lang="en-CA" dirty="0"/>
+          </a:p>
+        </p:txBody>
+      </p:sp>
+      <p:sp>
+        <p:nvSpPr>
+          <p:cNvPr id="15" name="TextBox 14">
+            <a:extLst>
+              <a:ext uri="{FF2B5EF4-FFF2-40B4-BE49-F238E27FC236}">
+                <a16:creationId xmlns:a16="http://schemas.microsoft.com/office/drawing/2014/main" id="{4F94201C-ECA0-4549-9E69-258EE3E4E99C}"/>
+              </a:ext>
+            </a:extLst>
+          </p:cNvPr>
+          <p:cNvSpPr txBox="1"/>
+          <p:nvPr/>
+        </p:nvSpPr>
+        <p:spPr>
+          <a:xfrm>
+            <a:off x="156862" y="1034534"/>
+            <a:ext cx="533823" cy="307777"/>
+          </a:xfrm>
+          <a:prstGeom prst="rect">
+            <a:avLst/>
+          </a:prstGeom>
+          <a:noFill/>
+        </p:spPr>
+        <p:txBody>
+          <a:bodyPr wrap="square" rtlCol="0">
+            <a:spAutoFit/>
+          </a:bodyPr>
+          <a:lstStyle/>
+          <a:p>
+            <a:r>
+              <a:rPr lang="en-CA" sz="1400" dirty="0">
+                <a:solidFill>
+                  <a:schemeClr val="bg1"/>
+                </a:solidFill>
+                <a:sym typeface="Webdings" panose="05030102010509060703" pitchFamily="18" charset="2"/>
+              </a:rPr>
+              <a:t>ON</a:t>
+            </a:r>
+            <a:endParaRPr lang="en-CA" sz="1400" dirty="0">
+              <a:solidFill>
+                <a:schemeClr val="bg1"/>
+              </a:solidFill>
+            </a:endParaRPr>
+          </a:p>
+        </p:txBody>
+      </p:sp>
+      <p:sp>
+        <p:nvSpPr>
+          <p:cNvPr id="16" name="TextBox 15">
+            <a:extLst>
+              <a:ext uri="{FF2B5EF4-FFF2-40B4-BE49-F238E27FC236}">
+                <a16:creationId xmlns:a16="http://schemas.microsoft.com/office/drawing/2014/main" id="{98720D9D-9359-48BA-87DE-8A7880D05085}"/>
+              </a:ext>
+            </a:extLst>
+          </p:cNvPr>
+          <p:cNvSpPr txBox="1"/>
+          <p:nvPr/>
+        </p:nvSpPr>
+        <p:spPr>
+          <a:xfrm>
+            <a:off x="122699" y="1712842"/>
+            <a:ext cx="621586" cy="307777"/>
+          </a:xfrm>
+          <a:prstGeom prst="rect">
+            <a:avLst/>
+          </a:prstGeom>
+          <a:noFill/>
+        </p:spPr>
+        <p:txBody>
+          <a:bodyPr wrap="square" rtlCol="0">
+            <a:spAutoFit/>
+          </a:bodyPr>
+          <a:lstStyle/>
+          <a:p>
+            <a:r>
+              <a:rPr lang="en-CA" sz="1400" dirty="0">
+                <a:solidFill>
+                  <a:schemeClr val="bg1"/>
+                </a:solidFill>
+                <a:sym typeface="Webdings" panose="05030102010509060703" pitchFamily="18" charset="2"/>
+              </a:rPr>
+              <a:t>OFF</a:t>
+            </a:r>
+            <a:endParaRPr lang="en-CA" sz="1400" dirty="0">
+              <a:solidFill>
+                <a:schemeClr val="bg1"/>
+              </a:solidFill>
+            </a:endParaRPr>
+          </a:p>
+        </p:txBody>
+      </p:sp>
+      <p:pic>
+        <p:nvPicPr>
+          <p:cNvPr id="44" name="Graphic 43" descr="Printer">
+            <a:extLst>
+              <a:ext uri="{FF2B5EF4-FFF2-40B4-BE49-F238E27FC236}">
+                <a16:creationId xmlns:a16="http://schemas.microsoft.com/office/drawing/2014/main" id="{1BB7189D-419D-4D8E-AD87-5C5C558449C4}"/>
+              </a:ext>
+            </a:extLst>
+          </p:cNvPr>
+          <p:cNvPicPr>
+            <a:picLocks noChangeAspect="1"/>
+          </p:cNvPicPr>
+          <p:nvPr/>
+        </p:nvPicPr>
+        <p:blipFill>
+          <a:blip r:embed="rId3">
+            <a:extLst>
+              <a:ext uri="{28A0092B-C50C-407E-A947-70E740481C1C}">
+                <a14:useLocalDpi xmlns:a14="http://schemas.microsoft.com/office/drawing/2010/main" val="0"/>
+              </a:ext>
+              <a:ext uri="{96DAC541-7B7A-43D3-8B79-37D633B846F1}">
+                <asvg:svgBlip xmlns:asvg="http://schemas.microsoft.com/office/drawing/2016/SVG/main" r:embed="rId4"/>
+              </a:ext>
+            </a:extLst>
+          </a:blip>
+          <a:stretch>
+            <a:fillRect/>
+          </a:stretch>
+        </p:blipFill>
+        <p:spPr>
+          <a:xfrm>
+            <a:off x="3170995" y="2142774"/>
+            <a:ext cx="689587" cy="689587"/>
+          </a:xfrm>
+          <a:prstGeom prst="rect">
+            <a:avLst/>
+          </a:prstGeom>
+        </p:spPr>
+      </p:pic>
+      <p:pic>
+        <p:nvPicPr>
+          <p:cNvPr id="46" name="Graphic 45" descr="Open envelope">
+            <a:extLst>
+              <a:ext uri="{FF2B5EF4-FFF2-40B4-BE49-F238E27FC236}">
+                <a16:creationId xmlns:a16="http://schemas.microsoft.com/office/drawing/2014/main" id="{A695B970-9A8C-498D-B591-9F40925198B4}"/>
+              </a:ext>
+            </a:extLst>
+          </p:cNvPr>
+          <p:cNvPicPr>
+            <a:picLocks noChangeAspect="1"/>
+          </p:cNvPicPr>
+          <p:nvPr/>
+        </p:nvPicPr>
+        <p:blipFill>
+          <a:blip r:embed="rId5">
+            <a:extLst>
+              <a:ext uri="{28A0092B-C50C-407E-A947-70E740481C1C}">
+                <a14:useLocalDpi xmlns:a14="http://schemas.microsoft.com/office/drawing/2010/main" val="0"/>
+              </a:ext>
+              <a:ext uri="{96DAC541-7B7A-43D3-8B79-37D633B846F1}">
+                <asvg:svgBlip xmlns:asvg="http://schemas.microsoft.com/office/drawing/2016/SVG/main" r:embed="rId6"/>
+              </a:ext>
+            </a:extLst>
+          </a:blip>
+          <a:stretch>
+            <a:fillRect/>
+          </a:stretch>
+        </p:blipFill>
+        <p:spPr>
+          <a:xfrm>
+            <a:off x="3170995" y="1535574"/>
+            <a:ext cx="607200" cy="607200"/>
+          </a:xfrm>
+          <a:prstGeom prst="rect">
+            <a:avLst/>
+          </a:prstGeom>
+        </p:spPr>
+      </p:pic>
+      <p:cxnSp>
+        <p:nvCxnSpPr>
+          <p:cNvPr id="49" name="Straight Arrow Connector 48">
+            <a:extLst>
+              <a:ext uri="{FF2B5EF4-FFF2-40B4-BE49-F238E27FC236}">
+                <a16:creationId xmlns:a16="http://schemas.microsoft.com/office/drawing/2014/main" id="{1B2F6C2C-E5E6-45E2-BFEF-496B5A415CCE}"/>
+              </a:ext>
+            </a:extLst>
+          </p:cNvPr>
+          <p:cNvCxnSpPr>
+            <a:endCxn id="46" idx="1"/>
+          </p:cNvCxnSpPr>
+          <p:nvPr/>
+        </p:nvCxnSpPr>
+        <p:spPr>
+          <a:xfrm flipV="1">
+            <a:off x="2641600" y="1839174"/>
+            <a:ext cx="529395" cy="181445"/>
+          </a:xfrm>
+          <a:prstGeom prst="straightConnector1">
+            <a:avLst/>
+          </a:prstGeom>
+          <a:ln>
+            <a:tailEnd type="triangle"/>
+          </a:ln>
+        </p:spPr>
+        <p:style>
+          <a:lnRef idx="1">
+            <a:schemeClr val="accent1"/>
+          </a:lnRef>
+          <a:fillRef idx="0">
+            <a:schemeClr val="accent1"/>
+          </a:fillRef>
+          <a:effectRef idx="0">
+            <a:schemeClr val="accent1"/>
+          </a:effectRef>
+          <a:fontRef idx="minor">
+            <a:schemeClr val="tx1"/>
+          </a:fontRef>
+        </p:style>
+      </p:cxnSp>
+      <p:cxnSp>
+        <p:nvCxnSpPr>
+          <p:cNvPr id="50" name="Straight Arrow Connector 49">
+            <a:extLst>
+              <a:ext uri="{FF2B5EF4-FFF2-40B4-BE49-F238E27FC236}">
+                <a16:creationId xmlns:a16="http://schemas.microsoft.com/office/drawing/2014/main" id="{85A18468-7290-43DB-97C4-F8F6182CEACF}"/>
+              </a:ext>
+            </a:extLst>
+          </p:cNvPr>
+          <p:cNvCxnSpPr>
+            <a:cxnSpLocks/>
+            <a:endCxn id="44" idx="1"/>
+          </p:cNvCxnSpPr>
+          <p:nvPr/>
+        </p:nvCxnSpPr>
+        <p:spPr>
+          <a:xfrm>
+            <a:off x="2260381" y="2337677"/>
+            <a:ext cx="910614" cy="149891"/>
+          </a:xfrm>
+          <a:prstGeom prst="straightConnector1">
+            <a:avLst/>
+          </a:prstGeom>
+          <a:ln>
+            <a:tailEnd type="triangle"/>
+          </a:ln>
+        </p:spPr>
+        <p:style>
+          <a:lnRef idx="1">
+            <a:schemeClr val="accent1"/>
+          </a:lnRef>
+          <a:fillRef idx="0">
+            <a:schemeClr val="accent1"/>
+          </a:fillRef>
+          <a:effectRef idx="0">
+            <a:schemeClr val="accent1"/>
+          </a:effectRef>
+          <a:fontRef idx="minor">
+            <a:schemeClr val="tx1"/>
+          </a:fontRef>
+        </p:style>
+      </p:cxnSp>
+      <p:grpSp>
+        <p:nvGrpSpPr>
+          <p:cNvPr id="3" name="Group 2">
+            <a:extLst>
+              <a:ext uri="{FF2B5EF4-FFF2-40B4-BE49-F238E27FC236}">
+                <a16:creationId xmlns:a16="http://schemas.microsoft.com/office/drawing/2014/main" id="{898B0381-B728-4943-82AB-2ED400878C9D}"/>
+              </a:ext>
+            </a:extLst>
+          </p:cNvPr>
+          <p:cNvGrpSpPr/>
+          <p:nvPr/>
+        </p:nvGrpSpPr>
+        <p:grpSpPr>
+          <a:xfrm>
+            <a:off x="4344782" y="1818287"/>
+            <a:ext cx="698371" cy="284917"/>
+            <a:chOff x="4080004" y="3699708"/>
+            <a:chExt cx="1316565" cy="571957"/>
+          </a:xfrm>
+        </p:grpSpPr>
+        <p:pic>
+          <p:nvPicPr>
+            <p:cNvPr id="17" name="Graphic 16" descr="Group">
+              <a:extLst>
+                <a:ext uri="{FF2B5EF4-FFF2-40B4-BE49-F238E27FC236}">
+                  <a16:creationId xmlns:a16="http://schemas.microsoft.com/office/drawing/2014/main" id="{8647EB4E-0132-4425-ABF1-7D8978B2AAF8}"/>
+                </a:ext>
+              </a:extLst>
+            </p:cNvPr>
+            <p:cNvPicPr>
+              <a:picLocks noChangeAspect="1"/>
+            </p:cNvPicPr>
+            <p:nvPr/>
+          </p:nvPicPr>
+          <p:blipFill>
+            <a:blip r:embed="rId7" cstate="print">
+              <a:extLst>
+                <a:ext uri="{28A0092B-C50C-407E-A947-70E740481C1C}">
+                  <a14:useLocalDpi xmlns:a14="http://schemas.microsoft.com/office/drawing/2010/main" val="0"/>
+                </a:ext>
+                <a:ext uri="{96DAC541-7B7A-43D3-8B79-37D633B846F1}">
+                  <asvg:svgBlip xmlns:asvg="http://schemas.microsoft.com/office/drawing/2016/SVG/main" r:embed="rId8"/>
+                </a:ext>
+              </a:extLst>
+            </a:blip>
+            <a:stretch>
+              <a:fillRect/>
+            </a:stretch>
+          </p:blipFill>
+          <p:spPr>
+            <a:xfrm>
+              <a:off x="4681099" y="3699708"/>
+              <a:ext cx="715470" cy="564144"/>
+            </a:xfrm>
+            <a:prstGeom prst="rect">
+              <a:avLst/>
+            </a:prstGeom>
+          </p:spPr>
+        </p:pic>
+        <p:pic>
+          <p:nvPicPr>
+            <p:cNvPr id="18" name="Graphic 17" descr="Group">
+              <a:extLst>
+                <a:ext uri="{FF2B5EF4-FFF2-40B4-BE49-F238E27FC236}">
+                  <a16:creationId xmlns:a16="http://schemas.microsoft.com/office/drawing/2014/main" id="{59E7CBD6-9CD0-47FA-9895-F601E4B0AAD5}"/>
+                </a:ext>
+              </a:extLst>
+            </p:cNvPr>
+            <p:cNvPicPr>
+              <a:picLocks noChangeAspect="1"/>
+            </p:cNvPicPr>
+            <p:nvPr/>
+          </p:nvPicPr>
+          <p:blipFill>
+            <a:blip r:embed="rId7" cstate="print">
+              <a:extLst>
+                <a:ext uri="{28A0092B-C50C-407E-A947-70E740481C1C}">
+                  <a14:useLocalDpi xmlns:a14="http://schemas.microsoft.com/office/drawing/2010/main" val="0"/>
+                </a:ext>
+                <a:ext uri="{96DAC541-7B7A-43D3-8B79-37D633B846F1}">
+                  <asvg:svgBlip xmlns:asvg="http://schemas.microsoft.com/office/drawing/2016/SVG/main" r:embed="rId8"/>
+                </a:ext>
+              </a:extLst>
+            </a:blip>
+            <a:stretch>
+              <a:fillRect/>
+            </a:stretch>
+          </p:blipFill>
+          <p:spPr>
+            <a:xfrm>
+              <a:off x="4080004" y="3707521"/>
+              <a:ext cx="715470" cy="564144"/>
+            </a:xfrm>
+            <a:prstGeom prst="rect">
+              <a:avLst/>
+            </a:prstGeom>
+          </p:spPr>
+        </p:pic>
+      </p:grpSp>
+      <p:sp>
+        <p:nvSpPr>
+          <p:cNvPr id="23" name="TextBox 22">
+            <a:extLst>
+              <a:ext uri="{FF2B5EF4-FFF2-40B4-BE49-F238E27FC236}">
+                <a16:creationId xmlns:a16="http://schemas.microsoft.com/office/drawing/2014/main" id="{12E6B1A1-D5CA-48D2-9A8A-0070424090D9}"/>
+              </a:ext>
+            </a:extLst>
+          </p:cNvPr>
+          <p:cNvSpPr txBox="1"/>
+          <p:nvPr/>
+        </p:nvSpPr>
+        <p:spPr>
+          <a:xfrm>
+            <a:off x="3809283" y="1510978"/>
+            <a:ext cx="583814" cy="646331"/>
+          </a:xfrm>
+          <a:prstGeom prst="rect">
+            <a:avLst/>
+          </a:prstGeom>
+          <a:noFill/>
+        </p:spPr>
+        <p:txBody>
+          <a:bodyPr wrap="none" rtlCol="0">
+            <a:spAutoFit/>
+          </a:bodyPr>
+          <a:lstStyle/>
+          <a:p>
+            <a:r>
+              <a:rPr lang="en-US" dirty="0">
+                <a:solidFill>
+                  <a:schemeClr val="bg1">
+                    <a:lumMod val="65000"/>
+                  </a:schemeClr>
+                </a:solidFill>
+              </a:rPr>
+              <a:t>A</a:t>
+            </a:r>
+          </a:p>
+          <a:p>
+            <a:r>
+              <a:rPr lang="en-US" dirty="0">
+                <a:solidFill>
+                  <a:schemeClr val="bg1">
+                    <a:lumMod val="65000"/>
+                  </a:schemeClr>
+                </a:solidFill>
+              </a:rPr>
+              <a:t>67%</a:t>
+            </a:r>
+            <a:endParaRPr lang="en-CA" dirty="0">
+              <a:solidFill>
+                <a:schemeClr val="bg1">
+                  <a:lumMod val="65000"/>
+                </a:schemeClr>
+              </a:solidFill>
+            </a:endParaRPr>
+          </a:p>
+        </p:txBody>
+      </p:sp>
+      <p:pic>
+        <p:nvPicPr>
+          <p:cNvPr id="24" name="Graphic 23" descr="Thumbs Up Sign">
+            <a:extLst>
+              <a:ext uri="{FF2B5EF4-FFF2-40B4-BE49-F238E27FC236}">
+                <a16:creationId xmlns:a16="http://schemas.microsoft.com/office/drawing/2014/main" id="{7FBFCF4E-9533-41E0-AAEF-F7760E7DDE21}"/>
+              </a:ext>
+            </a:extLst>
+          </p:cNvPr>
+          <p:cNvPicPr>
+            <a:picLocks noChangeAspect="1"/>
+          </p:cNvPicPr>
+          <p:nvPr/>
+        </p:nvPicPr>
+        <p:blipFill>
+          <a:blip r:embed="rId9" cstate="print">
+            <a:extLst>
+              <a:ext uri="{28A0092B-C50C-407E-A947-70E740481C1C}">
+                <a14:useLocalDpi xmlns:a14="http://schemas.microsoft.com/office/drawing/2010/main" val="0"/>
+              </a:ext>
+              <a:ext uri="{96DAC541-7B7A-43D3-8B79-37D633B846F1}">
+                <asvg:svgBlip xmlns:asvg="http://schemas.microsoft.com/office/drawing/2016/SVG/main" r:embed="rId10"/>
+              </a:ext>
+            </a:extLst>
+          </a:blip>
+          <a:stretch>
+            <a:fillRect/>
+          </a:stretch>
+        </p:blipFill>
+        <p:spPr>
+          <a:xfrm>
+            <a:off x="4090403" y="1538835"/>
+            <a:ext cx="235737" cy="235737"/>
+          </a:xfrm>
+          <a:prstGeom prst="rect">
+            <a:avLst/>
+          </a:prstGeom>
+        </p:spPr>
+      </p:pic>
+      <p:pic>
+        <p:nvPicPr>
+          <p:cNvPr id="27" name="Graphic 26" descr="Group">
+            <a:extLst>
+              <a:ext uri="{FF2B5EF4-FFF2-40B4-BE49-F238E27FC236}">
+                <a16:creationId xmlns:a16="http://schemas.microsoft.com/office/drawing/2014/main" id="{8DE0C4A2-D2B1-435B-88C7-5AAED036D5B9}"/>
+              </a:ext>
+            </a:extLst>
+          </p:cNvPr>
+          <p:cNvPicPr>
+            <a:picLocks noChangeAspect="1"/>
+          </p:cNvPicPr>
+          <p:nvPr/>
+        </p:nvPicPr>
+        <p:blipFill>
+          <a:blip r:embed="rId7" cstate="print">
+            <a:extLst>
+              <a:ext uri="{28A0092B-C50C-407E-A947-70E740481C1C}">
+                <a14:useLocalDpi xmlns:a14="http://schemas.microsoft.com/office/drawing/2010/main" val="0"/>
+              </a:ext>
+              <a:ext uri="{96DAC541-7B7A-43D3-8B79-37D633B846F1}">
+                <asvg:svgBlip xmlns:asvg="http://schemas.microsoft.com/office/drawing/2016/SVG/main" r:embed="rId8"/>
+              </a:ext>
+            </a:extLst>
+          </a:blip>
+          <a:stretch>
+            <a:fillRect/>
+          </a:stretch>
+        </p:blipFill>
+        <p:spPr>
+          <a:xfrm>
+            <a:off x="4353188" y="2453786"/>
+            <a:ext cx="379521" cy="281025"/>
+          </a:xfrm>
+          <a:prstGeom prst="rect">
+            <a:avLst/>
+          </a:prstGeom>
+        </p:spPr>
+      </p:pic>
+      <p:sp>
+        <p:nvSpPr>
+          <p:cNvPr id="28" name="TextBox 27">
+            <a:extLst>
+              <a:ext uri="{FF2B5EF4-FFF2-40B4-BE49-F238E27FC236}">
+                <a16:creationId xmlns:a16="http://schemas.microsoft.com/office/drawing/2014/main" id="{E849C48B-0777-4483-A64F-7BBA7C6E0B9C}"/>
+              </a:ext>
+            </a:extLst>
+          </p:cNvPr>
+          <p:cNvSpPr txBox="1"/>
+          <p:nvPr/>
+        </p:nvSpPr>
+        <p:spPr>
+          <a:xfrm>
+            <a:off x="3819687" y="2146919"/>
+            <a:ext cx="583814" cy="646331"/>
+          </a:xfrm>
+          <a:prstGeom prst="rect">
+            <a:avLst/>
+          </a:prstGeom>
+          <a:noFill/>
+        </p:spPr>
+        <p:txBody>
+          <a:bodyPr wrap="none" rtlCol="0">
+            <a:spAutoFit/>
+          </a:bodyPr>
+          <a:lstStyle/>
+          <a:p>
+            <a:r>
+              <a:rPr lang="en-US" dirty="0">
+                <a:solidFill>
+                  <a:schemeClr val="bg1">
+                    <a:lumMod val="65000"/>
+                  </a:schemeClr>
+                </a:solidFill>
+              </a:rPr>
+              <a:t>B</a:t>
+            </a:r>
+          </a:p>
+          <a:p>
+            <a:r>
+              <a:rPr lang="en-US" dirty="0">
+                <a:solidFill>
+                  <a:schemeClr val="bg1">
+                    <a:lumMod val="65000"/>
+                  </a:schemeClr>
+                </a:solidFill>
+              </a:rPr>
+              <a:t>33%</a:t>
+            </a:r>
+            <a:endParaRPr lang="en-CA" dirty="0">
+              <a:solidFill>
+                <a:schemeClr val="bg1">
+                  <a:lumMod val="65000"/>
+                </a:schemeClr>
+              </a:solidFill>
+            </a:endParaRPr>
+          </a:p>
+        </p:txBody>
+      </p:sp>
+      <p:sp>
+        <p:nvSpPr>
+          <p:cNvPr id="32" name="TextBox 31">
+            <a:extLst>
+              <a:ext uri="{FF2B5EF4-FFF2-40B4-BE49-F238E27FC236}">
+                <a16:creationId xmlns:a16="http://schemas.microsoft.com/office/drawing/2014/main" id="{60AE2231-84E1-4D13-A029-349D4118A4C7}"/>
+              </a:ext>
+            </a:extLst>
+          </p:cNvPr>
+          <p:cNvSpPr txBox="1"/>
+          <p:nvPr/>
+        </p:nvSpPr>
+        <p:spPr>
+          <a:xfrm>
+            <a:off x="3562789" y="1228928"/>
+            <a:ext cx="2724150" cy="276999"/>
+          </a:xfrm>
+          <a:prstGeom prst="rect">
+            <a:avLst/>
+          </a:prstGeom>
+          <a:noFill/>
+        </p:spPr>
+        <p:txBody>
+          <a:bodyPr wrap="square" rtlCol="0">
+            <a:spAutoFit/>
+          </a:bodyPr>
+          <a:lstStyle/>
+          <a:p>
+            <a:r>
+              <a:rPr lang="en-US" sz="1200" dirty="0">
+                <a:solidFill>
+                  <a:srgbClr val="0070C0"/>
+                </a:solidFill>
+              </a:rPr>
+              <a:t>hypothesis</a:t>
+            </a:r>
+            <a:endParaRPr lang="en-CA" sz="1200" dirty="0">
+              <a:solidFill>
+                <a:srgbClr val="0070C0"/>
+              </a:solidFill>
+            </a:endParaRPr>
+          </a:p>
+        </p:txBody>
+      </p:sp>
+    </p:spTree>
+    <p:extLst>
+      <p:ext uri="{BB962C8B-B14F-4D97-AF65-F5344CB8AC3E}">
+        <p14:creationId xmlns:p14="http://schemas.microsoft.com/office/powerpoint/2010/main" val="3420665678"/>
+      </p:ext>
+    </p:extLst>
+  </p:cSld>
+  <p:clrMapOvr>
+    <a:masterClrMapping/>
+  </p:clrMapOvr>
+</p:sld>
+</file>
+
+<file path=ppt/slides/slide15.xml><?xml version="1.0" encoding="utf-8"?>
+<p:sld xmlns:a="http://schemas.openxmlformats.org/drawingml/2006/main" xmlns:r="http://schemas.openxmlformats.org/officeDocument/2006/relationships" xmlns:p="http://schemas.openxmlformats.org/presentationml/2006/main">
+  <p:cSld>
+    <p:spTree>
+      <p:nvGrpSpPr>
+        <p:cNvPr id="1" name=""/>
+        <p:cNvGrpSpPr/>
+        <p:nvPr/>
+      </p:nvGrpSpPr>
+      <p:grpSpPr>
+        <a:xfrm>
+          <a:off x="0" y="0"/>
+          <a:ext cx="0" cy="0"/>
+          <a:chOff x="0" y="0"/>
+          <a:chExt cx="0" cy="0"/>
+        </a:xfrm>
+      </p:grpSpPr>
+      <p:sp>
+        <p:nvSpPr>
+          <p:cNvPr id="2" name="Title 1">
+            <a:extLst>
+              <a:ext uri="{FF2B5EF4-FFF2-40B4-BE49-F238E27FC236}">
+                <a16:creationId xmlns:a16="http://schemas.microsoft.com/office/drawing/2014/main" id="{0D80E7C8-A6B0-4E78-BFC4-AF1E3046BFEA}"/>
+              </a:ext>
+            </a:extLst>
+          </p:cNvPr>
+          <p:cNvSpPr>
+            <a:spLocks noGrp="1"/>
+          </p:cNvSpPr>
+          <p:nvPr>
+            <p:ph type="title"/>
+          </p:nvPr>
+        </p:nvSpPr>
+        <p:spPr/>
+        <p:txBody>
+          <a:bodyPr/>
+          <a:lstStyle/>
+          <a:p>
+            <a:r>
+              <a:rPr lang="en-US" dirty="0"/>
+              <a:t>Extension | FF architecture</a:t>
+            </a:r>
+            <a:endParaRPr lang="en-CA" dirty="0"/>
+          </a:p>
+        </p:txBody>
+      </p:sp>
+      <p:sp>
+        <p:nvSpPr>
+          <p:cNvPr id="4" name="TextBox 3">
+            <a:extLst>
+              <a:ext uri="{FF2B5EF4-FFF2-40B4-BE49-F238E27FC236}">
+                <a16:creationId xmlns:a16="http://schemas.microsoft.com/office/drawing/2014/main" id="{F01D53D5-C1F1-4C92-93CB-F81D6095B7A5}"/>
+              </a:ext>
+            </a:extLst>
+          </p:cNvPr>
+          <p:cNvSpPr txBox="1"/>
+          <p:nvPr/>
+        </p:nvSpPr>
+        <p:spPr>
+          <a:xfrm>
+            <a:off x="6071498" y="2147256"/>
+            <a:ext cx="1060890" cy="646331"/>
+          </a:xfrm>
+          <a:prstGeom prst="rect">
+            <a:avLst/>
+          </a:prstGeom>
+          <a:noFill/>
+        </p:spPr>
+        <p:txBody>
+          <a:bodyPr wrap="square" rtlCol="0">
+            <a:spAutoFit/>
+          </a:bodyPr>
+          <a:lstStyle/>
+          <a:p>
+            <a:r>
+              <a:rPr lang="en-US" dirty="0"/>
+              <a:t>if ( </a:t>
+            </a:r>
+            <a:r>
+              <a:rPr lang="en-US" dirty="0">
+                <a:solidFill>
+                  <a:srgbClr val="0070C0"/>
+                </a:solidFill>
+              </a:rPr>
+              <a:t>flag</a:t>
+            </a:r>
+            <a:r>
+              <a:rPr lang="en-US" dirty="0"/>
+              <a:t> )</a:t>
+            </a:r>
+          </a:p>
+          <a:p>
+            <a:r>
+              <a:rPr lang="en-US" dirty="0"/>
+              <a:t>e</a:t>
+            </a:r>
+            <a:r>
+              <a:rPr lang="en-CA" dirty="0" err="1"/>
+              <a:t>lse</a:t>
+            </a:r>
+            <a:endParaRPr lang="en-CA" dirty="0"/>
+          </a:p>
+        </p:txBody>
+      </p:sp>
+      <p:cxnSp>
+        <p:nvCxnSpPr>
+          <p:cNvPr id="9" name="Connector: Elbow 8">
+            <a:extLst>
+              <a:ext uri="{FF2B5EF4-FFF2-40B4-BE49-F238E27FC236}">
+                <a16:creationId xmlns:a16="http://schemas.microsoft.com/office/drawing/2014/main" id="{3E9E290E-DEA5-471A-A744-621B439BC9F0}"/>
+              </a:ext>
+            </a:extLst>
+          </p:cNvPr>
+          <p:cNvCxnSpPr>
+            <a:cxnSpLocks/>
+            <a:stCxn id="4" idx="0"/>
+            <a:endCxn id="16" idx="3"/>
+          </p:cNvCxnSpPr>
+          <p:nvPr/>
+        </p:nvCxnSpPr>
+        <p:spPr>
+          <a:xfrm rot="16200000" flipV="1">
+            <a:off x="5535207" y="1080519"/>
+            <a:ext cx="139728" cy="1993745"/>
+          </a:xfrm>
+          <a:prstGeom prst="bentConnector2">
+            <a:avLst/>
+          </a:prstGeom>
+          <a:ln>
+            <a:tailEnd type="triangle"/>
+          </a:ln>
+        </p:spPr>
+        <p:style>
+          <a:lnRef idx="1">
+            <a:schemeClr val="accent1"/>
+          </a:lnRef>
+          <a:fillRef idx="0">
+            <a:schemeClr val="accent1"/>
+          </a:fillRef>
+          <a:effectRef idx="0">
+            <a:schemeClr val="accent1"/>
+          </a:effectRef>
+          <a:fontRef idx="minor">
+            <a:schemeClr val="tx1"/>
+          </a:fontRef>
+        </p:style>
+      </p:cxnSp>
+      <p:pic>
+        <p:nvPicPr>
+          <p:cNvPr id="11" name="Graphic 10" descr="Printer">
+            <a:extLst>
+              <a:ext uri="{FF2B5EF4-FFF2-40B4-BE49-F238E27FC236}">
+                <a16:creationId xmlns:a16="http://schemas.microsoft.com/office/drawing/2014/main" id="{23BE1571-C96B-4963-80DC-0B596FE77511}"/>
+              </a:ext>
+            </a:extLst>
+          </p:cNvPr>
+          <p:cNvPicPr>
+            <a:picLocks noChangeAspect="1"/>
+          </p:cNvPicPr>
+          <p:nvPr/>
+        </p:nvPicPr>
+        <p:blipFill>
+          <a:blip r:embed="rId3">
+            <a:extLst>
+              <a:ext uri="{28A0092B-C50C-407E-A947-70E740481C1C}">
+                <a14:useLocalDpi xmlns:a14="http://schemas.microsoft.com/office/drawing/2010/main" val="0"/>
+              </a:ext>
+              <a:ext uri="{96DAC541-7B7A-43D3-8B79-37D633B846F1}">
+                <asvg:svgBlip xmlns:asvg="http://schemas.microsoft.com/office/drawing/2016/SVG/main" r:embed="rId4"/>
+              </a:ext>
+            </a:extLst>
+          </a:blip>
+          <a:stretch>
+            <a:fillRect/>
+          </a:stretch>
+        </p:blipFill>
+        <p:spPr>
+          <a:xfrm>
+            <a:off x="7512557" y="2434684"/>
+            <a:ext cx="689587" cy="689587"/>
+          </a:xfrm>
+          <a:prstGeom prst="rect">
+            <a:avLst/>
+          </a:prstGeom>
+        </p:spPr>
+      </p:pic>
+      <p:pic>
+        <p:nvPicPr>
+          <p:cNvPr id="12" name="Graphic 11" descr="Open envelope">
+            <a:extLst>
+              <a:ext uri="{FF2B5EF4-FFF2-40B4-BE49-F238E27FC236}">
+                <a16:creationId xmlns:a16="http://schemas.microsoft.com/office/drawing/2014/main" id="{5B9C413E-E51F-4FE0-9407-CD0A67CEFC77}"/>
+              </a:ext>
+            </a:extLst>
+          </p:cNvPr>
+          <p:cNvPicPr>
+            <a:picLocks noChangeAspect="1"/>
+          </p:cNvPicPr>
+          <p:nvPr/>
+        </p:nvPicPr>
+        <p:blipFill>
+          <a:blip r:embed="rId5">
+            <a:extLst>
+              <a:ext uri="{28A0092B-C50C-407E-A947-70E740481C1C}">
+                <a14:useLocalDpi xmlns:a14="http://schemas.microsoft.com/office/drawing/2010/main" val="0"/>
+              </a:ext>
+              <a:ext uri="{96DAC541-7B7A-43D3-8B79-37D633B846F1}">
+                <asvg:svgBlip xmlns:asvg="http://schemas.microsoft.com/office/drawing/2016/SVG/main" r:embed="rId6"/>
+              </a:ext>
+            </a:extLst>
+          </a:blip>
+          <a:stretch>
+            <a:fillRect/>
+          </a:stretch>
+        </p:blipFill>
+        <p:spPr>
+          <a:xfrm>
+            <a:off x="7512557" y="1827484"/>
+            <a:ext cx="607200" cy="607200"/>
+          </a:xfrm>
+          <a:prstGeom prst="rect">
+            <a:avLst/>
+          </a:prstGeom>
+        </p:spPr>
+      </p:pic>
+      <p:cxnSp>
+        <p:nvCxnSpPr>
+          <p:cNvPr id="13" name="Straight Arrow Connector 12">
+            <a:extLst>
+              <a:ext uri="{FF2B5EF4-FFF2-40B4-BE49-F238E27FC236}">
+                <a16:creationId xmlns:a16="http://schemas.microsoft.com/office/drawing/2014/main" id="{D1047270-9005-4D8D-B404-1464050B0C3D}"/>
+              </a:ext>
+            </a:extLst>
+          </p:cNvPr>
+          <p:cNvCxnSpPr>
+            <a:endCxn id="12" idx="1"/>
+          </p:cNvCxnSpPr>
+          <p:nvPr/>
+        </p:nvCxnSpPr>
+        <p:spPr>
+          <a:xfrm flipV="1">
+            <a:off x="6983162" y="2131084"/>
+            <a:ext cx="529395" cy="181445"/>
+          </a:xfrm>
+          <a:prstGeom prst="straightConnector1">
+            <a:avLst/>
+          </a:prstGeom>
+          <a:ln>
+            <a:tailEnd type="triangle"/>
+          </a:ln>
+        </p:spPr>
+        <p:style>
+          <a:lnRef idx="1">
+            <a:schemeClr val="accent1"/>
+          </a:lnRef>
+          <a:fillRef idx="0">
+            <a:schemeClr val="accent1"/>
+          </a:fillRef>
+          <a:effectRef idx="0">
+            <a:schemeClr val="accent1"/>
+          </a:effectRef>
+          <a:fontRef idx="minor">
+            <a:schemeClr val="tx1"/>
+          </a:fontRef>
+        </p:style>
+      </p:cxnSp>
+      <p:cxnSp>
+        <p:nvCxnSpPr>
+          <p:cNvPr id="14" name="Straight Arrow Connector 13">
+            <a:extLst>
+              <a:ext uri="{FF2B5EF4-FFF2-40B4-BE49-F238E27FC236}">
+                <a16:creationId xmlns:a16="http://schemas.microsoft.com/office/drawing/2014/main" id="{85D79AD0-5109-4927-B628-2396E197A1C4}"/>
+              </a:ext>
+            </a:extLst>
+          </p:cNvPr>
+          <p:cNvCxnSpPr>
+            <a:cxnSpLocks/>
+          </p:cNvCxnSpPr>
+          <p:nvPr/>
+        </p:nvCxnSpPr>
+        <p:spPr>
+          <a:xfrm>
+            <a:off x="6583844" y="2629586"/>
+            <a:ext cx="910614" cy="149891"/>
+          </a:xfrm>
+          <a:prstGeom prst="straightConnector1">
+            <a:avLst/>
+          </a:prstGeom>
+          <a:ln>
+            <a:tailEnd type="triangle"/>
+          </a:ln>
+        </p:spPr>
+        <p:style>
+          <a:lnRef idx="1">
+            <a:schemeClr val="accent1"/>
+          </a:lnRef>
+          <a:fillRef idx="0">
+            <a:schemeClr val="accent1"/>
+          </a:fillRef>
+          <a:effectRef idx="0">
+            <a:schemeClr val="accent1"/>
+          </a:effectRef>
+          <a:fontRef idx="minor">
+            <a:schemeClr val="tx1"/>
+          </a:fontRef>
+        </p:style>
+      </p:cxnSp>
+      <p:sp>
+        <p:nvSpPr>
+          <p:cNvPr id="16" name="Rectangle: Rounded Corners 15">
+            <a:extLst>
+              <a:ext uri="{FF2B5EF4-FFF2-40B4-BE49-F238E27FC236}">
+                <a16:creationId xmlns:a16="http://schemas.microsoft.com/office/drawing/2014/main" id="{F839554D-16C6-4F0B-BFD8-B675B09E8385}"/>
+              </a:ext>
+            </a:extLst>
+          </p:cNvPr>
+          <p:cNvSpPr/>
+          <p:nvPr/>
+        </p:nvSpPr>
+        <p:spPr>
+          <a:xfrm>
+            <a:off x="2984519" y="1290236"/>
+            <a:ext cx="1623679" cy="1434584"/>
+          </a:xfrm>
+          <a:prstGeom prst="roundRect">
+            <a:avLst/>
+          </a:prstGeom>
+          <a:solidFill>
+            <a:schemeClr val="accent5"/>
+          </a:solidFill>
+        </p:spPr>
+        <p:style>
+          <a:lnRef idx="3">
+            <a:schemeClr val="lt1"/>
+          </a:lnRef>
+          <a:fillRef idx="1">
+            <a:schemeClr val="accent5"/>
+          </a:fillRef>
+          <a:effectRef idx="1">
+            <a:schemeClr val="accent5"/>
+          </a:effectRef>
+          <a:fontRef idx="minor">
+            <a:schemeClr val="lt1"/>
+          </a:fontRef>
+        </p:style>
+        <p:txBody>
+          <a:bodyPr rtlCol="0" anchor="ctr"/>
+          <a:lstStyle/>
+          <a:p>
+            <a:pPr algn="ctr"/>
+            <a:r>
+              <a:rPr lang="en-US" dirty="0" err="1"/>
+              <a:t>LaunchDarkly</a:t>
+            </a:r>
+            <a:r>
+              <a:rPr lang="en-US" dirty="0"/>
+              <a:t> VSTS Service </a:t>
+            </a:r>
+            <a:r>
+              <a:rPr lang="en-US" dirty="0" err="1"/>
+              <a:t>EndPoint</a:t>
+            </a:r>
+            <a:endParaRPr lang="en-CA" dirty="0"/>
+          </a:p>
+        </p:txBody>
+      </p:sp>
+      <p:cxnSp>
+        <p:nvCxnSpPr>
+          <p:cNvPr id="36" name="Straight Arrow Connector 35">
+            <a:extLst>
+              <a:ext uri="{FF2B5EF4-FFF2-40B4-BE49-F238E27FC236}">
+                <a16:creationId xmlns:a16="http://schemas.microsoft.com/office/drawing/2014/main" id="{B35B7E35-D576-4A67-BE19-90D886EAF5FF}"/>
+              </a:ext>
+            </a:extLst>
+          </p:cNvPr>
+          <p:cNvCxnSpPr>
+            <a:cxnSpLocks/>
+            <a:stCxn id="16" idx="1"/>
+            <a:endCxn id="39" idx="3"/>
+          </p:cNvCxnSpPr>
+          <p:nvPr/>
+        </p:nvCxnSpPr>
+        <p:spPr>
+          <a:xfrm flipH="1">
+            <a:off x="2159638" y="2007528"/>
+            <a:ext cx="824881" cy="0"/>
+          </a:xfrm>
+          <a:prstGeom prst="straightConnector1">
+            <a:avLst/>
+          </a:prstGeom>
+          <a:ln>
+            <a:tailEnd type="triangle"/>
+          </a:ln>
+        </p:spPr>
+        <p:style>
+          <a:lnRef idx="1">
+            <a:schemeClr val="accent1"/>
+          </a:lnRef>
+          <a:fillRef idx="0">
+            <a:schemeClr val="accent1"/>
+          </a:fillRef>
+          <a:effectRef idx="0">
+            <a:schemeClr val="accent1"/>
+          </a:effectRef>
+          <a:fontRef idx="minor">
+            <a:schemeClr val="tx1"/>
+          </a:fontRef>
+        </p:style>
+      </p:cxnSp>
+      <p:sp>
+        <p:nvSpPr>
+          <p:cNvPr id="39" name="Rectangle: Rounded Corners 38">
+            <a:extLst>
+              <a:ext uri="{FF2B5EF4-FFF2-40B4-BE49-F238E27FC236}">
+                <a16:creationId xmlns:a16="http://schemas.microsoft.com/office/drawing/2014/main" id="{7A096178-C403-4A9B-A602-23014D6F6BF9}"/>
+              </a:ext>
+            </a:extLst>
+          </p:cNvPr>
+          <p:cNvSpPr/>
+          <p:nvPr/>
+        </p:nvSpPr>
+        <p:spPr>
+          <a:xfrm>
+            <a:off x="99229" y="1290236"/>
+            <a:ext cx="2060409" cy="1434584"/>
+          </a:xfrm>
+          <a:prstGeom prst="roundRect">
+            <a:avLst/>
+          </a:prstGeom>
+          <a:noFill/>
+          <a:ln>
+            <a:solidFill>
+              <a:schemeClr val="accent5"/>
+            </a:solidFill>
+          </a:ln>
+        </p:spPr>
+        <p:style>
+          <a:lnRef idx="3">
+            <a:schemeClr val="lt1"/>
+          </a:lnRef>
+          <a:fillRef idx="1">
+            <a:schemeClr val="accent5"/>
+          </a:fillRef>
+          <a:effectRef idx="1">
+            <a:schemeClr val="accent5"/>
+          </a:effectRef>
+          <a:fontRef idx="minor">
+            <a:schemeClr val="lt1"/>
+          </a:fontRef>
+        </p:style>
+        <p:txBody>
+          <a:bodyPr rtlCol="0" anchor="ctr"/>
+          <a:lstStyle/>
+          <a:p>
+            <a:pPr algn="ctr"/>
+            <a:endParaRPr lang="en-CA" dirty="0"/>
+          </a:p>
+        </p:txBody>
+      </p:sp>
+      <p:sp>
+        <p:nvSpPr>
+          <p:cNvPr id="46" name="Rectangle: Rounded Corners 45">
+            <a:extLst>
+              <a:ext uri="{FF2B5EF4-FFF2-40B4-BE49-F238E27FC236}">
+                <a16:creationId xmlns:a16="http://schemas.microsoft.com/office/drawing/2014/main" id="{2E5E8458-E76D-493D-9054-A63B624669A6}"/>
+              </a:ext>
+            </a:extLst>
+          </p:cNvPr>
+          <p:cNvSpPr/>
+          <p:nvPr/>
+        </p:nvSpPr>
+        <p:spPr>
+          <a:xfrm>
+            <a:off x="5021031" y="1314163"/>
+            <a:ext cx="3459812" cy="1902319"/>
+          </a:xfrm>
+          <a:prstGeom prst="roundRect">
+            <a:avLst>
+              <a:gd name="adj" fmla="val 6295"/>
+            </a:avLst>
+          </a:prstGeom>
+          <a:noFill/>
+          <a:ln>
+            <a:solidFill>
+              <a:schemeClr val="accent5"/>
+            </a:solidFill>
+          </a:ln>
+        </p:spPr>
+        <p:style>
+          <a:lnRef idx="3">
+            <a:schemeClr val="lt1"/>
+          </a:lnRef>
+          <a:fillRef idx="1">
+            <a:schemeClr val="accent5"/>
+          </a:fillRef>
+          <a:effectRef idx="1">
+            <a:schemeClr val="accent5"/>
+          </a:effectRef>
+          <a:fontRef idx="minor">
+            <a:schemeClr val="lt1"/>
+          </a:fontRef>
+        </p:style>
+        <p:txBody>
+          <a:bodyPr rtlCol="0" anchor="ctr"/>
+          <a:lstStyle/>
+          <a:p>
+            <a:pPr algn="ctr"/>
+            <a:endParaRPr lang="en-CA" dirty="0"/>
+          </a:p>
+        </p:txBody>
+      </p:sp>
+      <p:sp>
+        <p:nvSpPr>
+          <p:cNvPr id="53" name="TextBox 52">
+            <a:extLst>
+              <a:ext uri="{FF2B5EF4-FFF2-40B4-BE49-F238E27FC236}">
+                <a16:creationId xmlns:a16="http://schemas.microsoft.com/office/drawing/2014/main" id="{CB254A90-F293-4DB8-9EE2-1245729064D6}"/>
+              </a:ext>
+            </a:extLst>
+          </p:cNvPr>
+          <p:cNvSpPr txBox="1"/>
+          <p:nvPr/>
+        </p:nvSpPr>
+        <p:spPr>
+          <a:xfrm>
+            <a:off x="6097646" y="1304807"/>
+            <a:ext cx="2104498" cy="338554"/>
+          </a:xfrm>
+          <a:prstGeom prst="rect">
+            <a:avLst/>
+          </a:prstGeom>
+          <a:noFill/>
+        </p:spPr>
+        <p:txBody>
+          <a:bodyPr wrap="square" rtlCol="0">
+            <a:spAutoFit/>
+          </a:bodyPr>
+          <a:lstStyle/>
+          <a:p>
+            <a:r>
+              <a:rPr lang="en-US" sz="1600" dirty="0">
+                <a:solidFill>
+                  <a:srgbClr val="0070C0"/>
+                </a:solidFill>
+              </a:rPr>
+              <a:t>VSTS Extension</a:t>
+            </a:r>
+            <a:endParaRPr lang="en-CA" sz="1600" dirty="0">
+              <a:solidFill>
+                <a:srgbClr val="0070C0"/>
+              </a:solidFill>
+            </a:endParaRPr>
+          </a:p>
+        </p:txBody>
+      </p:sp>
+      <p:sp>
+        <p:nvSpPr>
+          <p:cNvPr id="54" name="TextBox 53">
+            <a:extLst>
+              <a:ext uri="{FF2B5EF4-FFF2-40B4-BE49-F238E27FC236}">
+                <a16:creationId xmlns:a16="http://schemas.microsoft.com/office/drawing/2014/main" id="{C758FBBE-ABA3-442A-A216-D1F29E10C02F}"/>
+              </a:ext>
+            </a:extLst>
+          </p:cNvPr>
+          <p:cNvSpPr txBox="1"/>
+          <p:nvPr/>
+        </p:nvSpPr>
+        <p:spPr>
+          <a:xfrm>
+            <a:off x="5110706" y="1756809"/>
+            <a:ext cx="2104498" cy="276999"/>
+          </a:xfrm>
+          <a:prstGeom prst="rect">
+            <a:avLst/>
+          </a:prstGeom>
+          <a:noFill/>
+        </p:spPr>
+        <p:txBody>
+          <a:bodyPr wrap="square" rtlCol="0">
+            <a:spAutoFit/>
+          </a:bodyPr>
+          <a:lstStyle/>
+          <a:p>
+            <a:r>
+              <a:rPr lang="en-US" sz="1200" dirty="0">
+                <a:solidFill>
+                  <a:srgbClr val="0070C0"/>
+                </a:solidFill>
+              </a:rPr>
+              <a:t>get flag</a:t>
+            </a:r>
+            <a:endParaRPr lang="en-CA" sz="1200" dirty="0">
+              <a:solidFill>
+                <a:srgbClr val="0070C0"/>
+              </a:solidFill>
+            </a:endParaRPr>
+          </a:p>
+        </p:txBody>
+      </p:sp>
+      <p:sp>
+        <p:nvSpPr>
+          <p:cNvPr id="56" name="Rectangle: Rounded Corners 55">
+            <a:extLst>
+              <a:ext uri="{FF2B5EF4-FFF2-40B4-BE49-F238E27FC236}">
+                <a16:creationId xmlns:a16="http://schemas.microsoft.com/office/drawing/2014/main" id="{1963BB0D-02ED-49E2-AD02-5CDB0C72DD51}"/>
+              </a:ext>
+            </a:extLst>
+          </p:cNvPr>
+          <p:cNvSpPr/>
+          <p:nvPr/>
+        </p:nvSpPr>
+        <p:spPr>
+          <a:xfrm>
+            <a:off x="639794" y="3932257"/>
+            <a:ext cx="909176" cy="1035725"/>
+          </a:xfrm>
+          <a:prstGeom prst="roundRect">
+            <a:avLst/>
+          </a:prstGeom>
+          <a:solidFill>
+            <a:schemeClr val="accent5"/>
+          </a:solidFill>
+        </p:spPr>
+        <p:style>
+          <a:lnRef idx="3">
+            <a:schemeClr val="lt1"/>
+          </a:lnRef>
+          <a:fillRef idx="1">
+            <a:schemeClr val="accent5"/>
+          </a:fillRef>
+          <a:effectRef idx="1">
+            <a:schemeClr val="accent5"/>
+          </a:effectRef>
+          <a:fontRef idx="minor">
+            <a:schemeClr val="lt1"/>
+          </a:fontRef>
+        </p:style>
+        <p:txBody>
+          <a:bodyPr rtlCol="0" anchor="ctr"/>
+          <a:lstStyle/>
+          <a:p>
+            <a:pPr algn="ctr"/>
+            <a:endParaRPr lang="en-CA"/>
+          </a:p>
+        </p:txBody>
+      </p:sp>
+      <p:sp>
+        <p:nvSpPr>
+          <p:cNvPr id="57" name="TextBox 56">
+            <a:extLst>
+              <a:ext uri="{FF2B5EF4-FFF2-40B4-BE49-F238E27FC236}">
+                <a16:creationId xmlns:a16="http://schemas.microsoft.com/office/drawing/2014/main" id="{0D27E0AB-F74E-4A2F-9DF7-C067D64278B0}"/>
+              </a:ext>
+            </a:extLst>
+          </p:cNvPr>
+          <p:cNvSpPr txBox="1"/>
+          <p:nvPr/>
+        </p:nvSpPr>
+        <p:spPr>
+          <a:xfrm>
+            <a:off x="6071498" y="4439694"/>
+            <a:ext cx="1060890" cy="646331"/>
+          </a:xfrm>
+          <a:prstGeom prst="rect">
+            <a:avLst/>
+          </a:prstGeom>
+          <a:noFill/>
+        </p:spPr>
+        <p:txBody>
+          <a:bodyPr wrap="square" rtlCol="0">
+            <a:spAutoFit/>
+          </a:bodyPr>
+          <a:lstStyle/>
+          <a:p>
+            <a:r>
+              <a:rPr lang="en-US" dirty="0"/>
+              <a:t>if ( </a:t>
+            </a:r>
+            <a:r>
+              <a:rPr lang="en-US" dirty="0">
+                <a:solidFill>
+                  <a:srgbClr val="0070C0"/>
+                </a:solidFill>
+              </a:rPr>
+              <a:t>flag</a:t>
+            </a:r>
+            <a:r>
+              <a:rPr lang="en-US" dirty="0"/>
+              <a:t> )</a:t>
+            </a:r>
+          </a:p>
+          <a:p>
+            <a:r>
+              <a:rPr lang="en-US" dirty="0"/>
+              <a:t>e</a:t>
+            </a:r>
+            <a:r>
+              <a:rPr lang="en-CA" dirty="0" err="1"/>
+              <a:t>lse</a:t>
+            </a:r>
+            <a:endParaRPr lang="en-CA" dirty="0"/>
+          </a:p>
+        </p:txBody>
+      </p:sp>
+      <p:sp>
+        <p:nvSpPr>
+          <p:cNvPr id="58" name="TextBox 57">
+            <a:extLst>
+              <a:ext uri="{FF2B5EF4-FFF2-40B4-BE49-F238E27FC236}">
+                <a16:creationId xmlns:a16="http://schemas.microsoft.com/office/drawing/2014/main" id="{0BEF492A-D0CE-40CF-9054-225AF63BC6BD}"/>
+              </a:ext>
+            </a:extLst>
+          </p:cNvPr>
+          <p:cNvSpPr txBox="1"/>
+          <p:nvPr/>
+        </p:nvSpPr>
+        <p:spPr>
+          <a:xfrm>
+            <a:off x="673957" y="4032661"/>
+            <a:ext cx="533823" cy="307777"/>
+          </a:xfrm>
+          <a:prstGeom prst="rect">
+            <a:avLst/>
+          </a:prstGeom>
+          <a:noFill/>
+        </p:spPr>
+        <p:txBody>
+          <a:bodyPr wrap="square" rtlCol="0">
+            <a:spAutoFit/>
+          </a:bodyPr>
+          <a:lstStyle/>
+          <a:p>
+            <a:r>
+              <a:rPr lang="en-CA" sz="1400" dirty="0">
+                <a:solidFill>
+                  <a:schemeClr val="bg1"/>
+                </a:solidFill>
+                <a:sym typeface="Webdings" panose="05030102010509060703" pitchFamily="18" charset="2"/>
+              </a:rPr>
+              <a:t>ON</a:t>
+            </a:r>
+            <a:endParaRPr lang="en-CA" sz="1400" dirty="0">
+              <a:solidFill>
+                <a:schemeClr val="bg1"/>
+              </a:solidFill>
+            </a:endParaRPr>
+          </a:p>
+        </p:txBody>
+      </p:sp>
+      <p:sp>
+        <p:nvSpPr>
+          <p:cNvPr id="59" name="TextBox 58">
+            <a:extLst>
+              <a:ext uri="{FF2B5EF4-FFF2-40B4-BE49-F238E27FC236}">
+                <a16:creationId xmlns:a16="http://schemas.microsoft.com/office/drawing/2014/main" id="{6BFE014D-77B5-4B6E-B23E-81F1B469AFEE}"/>
+              </a:ext>
+            </a:extLst>
+          </p:cNvPr>
+          <p:cNvSpPr txBox="1"/>
+          <p:nvPr/>
+        </p:nvSpPr>
+        <p:spPr>
+          <a:xfrm>
+            <a:off x="639794" y="4499599"/>
+            <a:ext cx="621586" cy="307777"/>
+          </a:xfrm>
+          <a:prstGeom prst="rect">
+            <a:avLst/>
+          </a:prstGeom>
+          <a:noFill/>
+        </p:spPr>
+        <p:txBody>
+          <a:bodyPr wrap="square" rtlCol="0">
+            <a:spAutoFit/>
+          </a:bodyPr>
+          <a:lstStyle/>
+          <a:p>
+            <a:r>
+              <a:rPr lang="en-CA" sz="1400" dirty="0">
+                <a:solidFill>
+                  <a:schemeClr val="bg1"/>
+                </a:solidFill>
+                <a:sym typeface="Webdings" panose="05030102010509060703" pitchFamily="18" charset="2"/>
+              </a:rPr>
+              <a:t>OFF</a:t>
+            </a:r>
+            <a:endParaRPr lang="en-CA" sz="1400" dirty="0">
+              <a:solidFill>
+                <a:schemeClr val="bg1"/>
+              </a:solidFill>
+            </a:endParaRPr>
+          </a:p>
+        </p:txBody>
+      </p:sp>
+      <p:sp>
+        <p:nvSpPr>
+          <p:cNvPr id="60" name="Flowchart: Alternate Process 59">
+            <a:extLst>
+              <a:ext uri="{FF2B5EF4-FFF2-40B4-BE49-F238E27FC236}">
+                <a16:creationId xmlns:a16="http://schemas.microsoft.com/office/drawing/2014/main" id="{96D9DCB3-01EA-42D7-A032-573C4941E7D4}"/>
+              </a:ext>
+            </a:extLst>
+          </p:cNvPr>
+          <p:cNvSpPr/>
+          <p:nvPr/>
+        </p:nvSpPr>
+        <p:spPr>
+          <a:xfrm>
+            <a:off x="1207781" y="4148220"/>
+            <a:ext cx="134495" cy="539749"/>
+          </a:xfrm>
+          <a:prstGeom prst="flowChartAlternateProcess">
+            <a:avLst/>
+          </a:prstGeom>
+        </p:spPr>
+        <p:style>
+          <a:lnRef idx="2">
+            <a:schemeClr val="dk1"/>
+          </a:lnRef>
+          <a:fillRef idx="1">
+            <a:schemeClr val="lt1"/>
+          </a:fillRef>
+          <a:effectRef idx="0">
+            <a:schemeClr val="dk1"/>
+          </a:effectRef>
+          <a:fontRef idx="minor">
+            <a:schemeClr val="dk1"/>
+          </a:fontRef>
+        </p:style>
+        <p:txBody>
+          <a:bodyPr rtlCol="0" anchor="ctr"/>
+          <a:lstStyle/>
+          <a:p>
+            <a:pPr algn="ctr"/>
+            <a:endParaRPr lang="en-CA"/>
+          </a:p>
+        </p:txBody>
+      </p:sp>
+      <p:sp>
+        <p:nvSpPr>
+          <p:cNvPr id="61" name="Flowchart: Connector 60">
+            <a:extLst>
+              <a:ext uri="{FF2B5EF4-FFF2-40B4-BE49-F238E27FC236}">
+                <a16:creationId xmlns:a16="http://schemas.microsoft.com/office/drawing/2014/main" id="{1C794D14-2E3E-49F7-9A05-573E178506BA}"/>
+              </a:ext>
+            </a:extLst>
+          </p:cNvPr>
+          <p:cNvSpPr/>
+          <p:nvPr/>
+        </p:nvSpPr>
+        <p:spPr>
+          <a:xfrm>
+            <a:off x="1156713" y="4066461"/>
+            <a:ext cx="257761" cy="279336"/>
+          </a:xfrm>
+          <a:prstGeom prst="flowChartConnector">
+            <a:avLst/>
+          </a:prstGeom>
+        </p:spPr>
+        <p:style>
+          <a:lnRef idx="0">
+            <a:schemeClr val="accent6"/>
+          </a:lnRef>
+          <a:fillRef idx="3">
+            <a:schemeClr val="accent6"/>
+          </a:fillRef>
+          <a:effectRef idx="3">
+            <a:schemeClr val="accent6"/>
+          </a:effectRef>
+          <a:fontRef idx="minor">
+            <a:schemeClr val="lt1"/>
+          </a:fontRef>
+        </p:style>
+        <p:txBody>
+          <a:bodyPr rtlCol="0" anchor="ctr"/>
+          <a:lstStyle/>
+          <a:p>
+            <a:pPr algn="ctr"/>
+            <a:endParaRPr lang="en-CA"/>
+          </a:p>
+        </p:txBody>
+      </p:sp>
+      <p:cxnSp>
+        <p:nvCxnSpPr>
+          <p:cNvPr id="62" name="Connector: Elbow 61">
+            <a:extLst>
+              <a:ext uri="{FF2B5EF4-FFF2-40B4-BE49-F238E27FC236}">
+                <a16:creationId xmlns:a16="http://schemas.microsoft.com/office/drawing/2014/main" id="{CCC0E429-3C2B-4091-8737-5DA9573FF6A7}"/>
+              </a:ext>
+            </a:extLst>
+          </p:cNvPr>
+          <p:cNvCxnSpPr>
+            <a:cxnSpLocks/>
+            <a:stCxn id="57" idx="0"/>
+            <a:endCxn id="68" idx="3"/>
+          </p:cNvCxnSpPr>
+          <p:nvPr/>
+        </p:nvCxnSpPr>
+        <p:spPr>
+          <a:xfrm rot="16200000" flipV="1">
+            <a:off x="5535207" y="3372957"/>
+            <a:ext cx="139728" cy="1993745"/>
+          </a:xfrm>
+          <a:prstGeom prst="bentConnector2">
+            <a:avLst/>
+          </a:prstGeom>
+          <a:ln>
+            <a:tailEnd type="triangle"/>
+          </a:ln>
+        </p:spPr>
+        <p:style>
+          <a:lnRef idx="1">
+            <a:schemeClr val="accent1"/>
+          </a:lnRef>
+          <a:fillRef idx="0">
+            <a:schemeClr val="accent1"/>
+          </a:fillRef>
+          <a:effectRef idx="0">
+            <a:schemeClr val="accent1"/>
+          </a:effectRef>
+          <a:fontRef idx="minor">
+            <a:schemeClr val="tx1"/>
+          </a:fontRef>
+        </p:style>
+      </p:cxnSp>
+      <p:sp>
+        <p:nvSpPr>
+          <p:cNvPr id="63" name="TextBox 62">
+            <a:extLst>
+              <a:ext uri="{FF2B5EF4-FFF2-40B4-BE49-F238E27FC236}">
+                <a16:creationId xmlns:a16="http://schemas.microsoft.com/office/drawing/2014/main" id="{6485A5EC-B923-44A4-9833-24B99E46F0E5}"/>
+              </a:ext>
+            </a:extLst>
+          </p:cNvPr>
+          <p:cNvSpPr txBox="1"/>
+          <p:nvPr/>
+        </p:nvSpPr>
+        <p:spPr>
+          <a:xfrm>
+            <a:off x="283118" y="3633122"/>
+            <a:ext cx="1739289" cy="338554"/>
+          </a:xfrm>
+          <a:prstGeom prst="rect">
+            <a:avLst/>
+          </a:prstGeom>
+          <a:noFill/>
+        </p:spPr>
+        <p:txBody>
+          <a:bodyPr wrap="square" rtlCol="0">
+            <a:spAutoFit/>
+          </a:bodyPr>
+          <a:lstStyle/>
+          <a:p>
+            <a:r>
+              <a:rPr lang="en-US" sz="1600" dirty="0">
+                <a:solidFill>
+                  <a:srgbClr val="0070C0"/>
+                </a:solidFill>
+              </a:rPr>
+              <a:t>SaaS Management</a:t>
+            </a:r>
+            <a:endParaRPr lang="en-CA" sz="1600" dirty="0">
+              <a:solidFill>
+                <a:srgbClr val="0070C0"/>
+              </a:solidFill>
+            </a:endParaRPr>
+          </a:p>
+        </p:txBody>
+      </p:sp>
+      <p:pic>
+        <p:nvPicPr>
+          <p:cNvPr id="64" name="Graphic 63" descr="Printer">
+            <a:extLst>
+              <a:ext uri="{FF2B5EF4-FFF2-40B4-BE49-F238E27FC236}">
+                <a16:creationId xmlns:a16="http://schemas.microsoft.com/office/drawing/2014/main" id="{ED6F0FF5-9468-4B06-8149-150998E825C4}"/>
+              </a:ext>
+            </a:extLst>
+          </p:cNvPr>
+          <p:cNvPicPr>
+            <a:picLocks noChangeAspect="1"/>
+          </p:cNvPicPr>
+          <p:nvPr/>
+        </p:nvPicPr>
+        <p:blipFill>
+          <a:blip r:embed="rId3">
+            <a:extLst>
+              <a:ext uri="{28A0092B-C50C-407E-A947-70E740481C1C}">
+                <a14:useLocalDpi xmlns:a14="http://schemas.microsoft.com/office/drawing/2010/main" val="0"/>
+              </a:ext>
+              <a:ext uri="{96DAC541-7B7A-43D3-8B79-37D633B846F1}">
+                <asvg:svgBlip xmlns:asvg="http://schemas.microsoft.com/office/drawing/2016/SVG/main" r:embed="rId4"/>
+              </a:ext>
+            </a:extLst>
+          </a:blip>
+          <a:stretch>
+            <a:fillRect/>
+          </a:stretch>
+        </p:blipFill>
+        <p:spPr>
+          <a:xfrm>
+            <a:off x="7512557" y="4727122"/>
+            <a:ext cx="689587" cy="689587"/>
+          </a:xfrm>
+          <a:prstGeom prst="rect">
+            <a:avLst/>
+          </a:prstGeom>
+        </p:spPr>
+      </p:pic>
+      <p:pic>
+        <p:nvPicPr>
+          <p:cNvPr id="65" name="Graphic 64" descr="Open envelope">
+            <a:extLst>
+              <a:ext uri="{FF2B5EF4-FFF2-40B4-BE49-F238E27FC236}">
+                <a16:creationId xmlns:a16="http://schemas.microsoft.com/office/drawing/2014/main" id="{08197797-BE92-4496-A5B5-CF28F8EC9394}"/>
+              </a:ext>
+            </a:extLst>
+          </p:cNvPr>
+          <p:cNvPicPr>
+            <a:picLocks noChangeAspect="1"/>
+          </p:cNvPicPr>
+          <p:nvPr/>
+        </p:nvPicPr>
+        <p:blipFill>
+          <a:blip r:embed="rId5">
+            <a:extLst>
+              <a:ext uri="{28A0092B-C50C-407E-A947-70E740481C1C}">
+                <a14:useLocalDpi xmlns:a14="http://schemas.microsoft.com/office/drawing/2010/main" val="0"/>
+              </a:ext>
+              <a:ext uri="{96DAC541-7B7A-43D3-8B79-37D633B846F1}">
+                <asvg:svgBlip xmlns:asvg="http://schemas.microsoft.com/office/drawing/2016/SVG/main" r:embed="rId6"/>
+              </a:ext>
+            </a:extLst>
+          </a:blip>
+          <a:stretch>
+            <a:fillRect/>
+          </a:stretch>
+        </p:blipFill>
+        <p:spPr>
+          <a:xfrm>
+            <a:off x="7512557" y="4119922"/>
+            <a:ext cx="607200" cy="607200"/>
+          </a:xfrm>
+          <a:prstGeom prst="rect">
+            <a:avLst/>
+          </a:prstGeom>
+        </p:spPr>
+      </p:pic>
+      <p:cxnSp>
+        <p:nvCxnSpPr>
+          <p:cNvPr id="66" name="Straight Arrow Connector 65">
+            <a:extLst>
+              <a:ext uri="{FF2B5EF4-FFF2-40B4-BE49-F238E27FC236}">
+                <a16:creationId xmlns:a16="http://schemas.microsoft.com/office/drawing/2014/main" id="{63EC0E1C-1880-4AD8-B902-781F735D209F}"/>
+              </a:ext>
+            </a:extLst>
+          </p:cNvPr>
+          <p:cNvCxnSpPr>
+            <a:endCxn id="65" idx="1"/>
+          </p:cNvCxnSpPr>
+          <p:nvPr/>
+        </p:nvCxnSpPr>
+        <p:spPr>
+          <a:xfrm flipV="1">
+            <a:off x="6983162" y="4423522"/>
+            <a:ext cx="529395" cy="181445"/>
+          </a:xfrm>
+          <a:prstGeom prst="straightConnector1">
+            <a:avLst/>
+          </a:prstGeom>
+          <a:ln>
+            <a:tailEnd type="triangle"/>
+          </a:ln>
+        </p:spPr>
+        <p:style>
+          <a:lnRef idx="1">
+            <a:schemeClr val="accent1"/>
+          </a:lnRef>
+          <a:fillRef idx="0">
+            <a:schemeClr val="accent1"/>
+          </a:fillRef>
+          <a:effectRef idx="0">
+            <a:schemeClr val="accent1"/>
+          </a:effectRef>
+          <a:fontRef idx="minor">
+            <a:schemeClr val="tx1"/>
+          </a:fontRef>
+        </p:style>
+      </p:cxnSp>
+      <p:cxnSp>
+        <p:nvCxnSpPr>
+          <p:cNvPr id="67" name="Straight Arrow Connector 66">
+            <a:extLst>
+              <a:ext uri="{FF2B5EF4-FFF2-40B4-BE49-F238E27FC236}">
+                <a16:creationId xmlns:a16="http://schemas.microsoft.com/office/drawing/2014/main" id="{FC159981-DB4E-4B8F-8864-16D50901F424}"/>
+              </a:ext>
+            </a:extLst>
+          </p:cNvPr>
+          <p:cNvCxnSpPr>
+            <a:cxnSpLocks/>
+          </p:cNvCxnSpPr>
+          <p:nvPr/>
+        </p:nvCxnSpPr>
+        <p:spPr>
+          <a:xfrm>
+            <a:off x="6583844" y="4922024"/>
+            <a:ext cx="910614" cy="149891"/>
+          </a:xfrm>
+          <a:prstGeom prst="straightConnector1">
+            <a:avLst/>
+          </a:prstGeom>
+          <a:ln>
+            <a:tailEnd type="triangle"/>
+          </a:ln>
+        </p:spPr>
+        <p:style>
+          <a:lnRef idx="1">
+            <a:schemeClr val="accent1"/>
+          </a:lnRef>
+          <a:fillRef idx="0">
+            <a:schemeClr val="accent1"/>
+          </a:fillRef>
+          <a:effectRef idx="0">
+            <a:schemeClr val="accent1"/>
+          </a:effectRef>
+          <a:fontRef idx="minor">
+            <a:schemeClr val="tx1"/>
+          </a:fontRef>
+        </p:style>
+      </p:cxnSp>
+      <p:sp>
+        <p:nvSpPr>
+          <p:cNvPr id="68" name="Rectangle: Rounded Corners 67">
+            <a:extLst>
+              <a:ext uri="{FF2B5EF4-FFF2-40B4-BE49-F238E27FC236}">
+                <a16:creationId xmlns:a16="http://schemas.microsoft.com/office/drawing/2014/main" id="{2D1D6110-5E57-41BC-83B0-B95A3C29265D}"/>
+              </a:ext>
+            </a:extLst>
+          </p:cNvPr>
+          <p:cNvSpPr/>
+          <p:nvPr/>
+        </p:nvSpPr>
+        <p:spPr>
+          <a:xfrm>
+            <a:off x="2984519" y="3582674"/>
+            <a:ext cx="1623679" cy="1434584"/>
+          </a:xfrm>
+          <a:prstGeom prst="roundRect">
+            <a:avLst/>
+          </a:prstGeom>
+          <a:solidFill>
+            <a:schemeClr val="accent5"/>
+          </a:solidFill>
+        </p:spPr>
+        <p:style>
+          <a:lnRef idx="3">
+            <a:schemeClr val="lt1"/>
+          </a:lnRef>
+          <a:fillRef idx="1">
+            <a:schemeClr val="accent5"/>
+          </a:fillRef>
+          <a:effectRef idx="1">
+            <a:schemeClr val="accent5"/>
+          </a:effectRef>
+          <a:fontRef idx="minor">
+            <a:schemeClr val="lt1"/>
+          </a:fontRef>
+        </p:style>
+        <p:txBody>
+          <a:bodyPr rtlCol="0" anchor="ctr"/>
+          <a:lstStyle/>
+          <a:p>
+            <a:pPr algn="ctr"/>
+            <a:r>
+              <a:rPr lang="en-US" dirty="0" err="1"/>
+              <a:t>LaunchDarkly</a:t>
+            </a:r>
+            <a:r>
+              <a:rPr lang="en-US" dirty="0"/>
+              <a:t> VSTS Service </a:t>
+            </a:r>
+            <a:r>
+              <a:rPr lang="en-US" dirty="0" err="1"/>
+              <a:t>EndPoint</a:t>
+            </a:r>
+            <a:endParaRPr lang="en-CA" dirty="0"/>
+          </a:p>
+        </p:txBody>
+      </p:sp>
+      <p:cxnSp>
+        <p:nvCxnSpPr>
+          <p:cNvPr id="69" name="Straight Arrow Connector 68">
+            <a:extLst>
+              <a:ext uri="{FF2B5EF4-FFF2-40B4-BE49-F238E27FC236}">
+                <a16:creationId xmlns:a16="http://schemas.microsoft.com/office/drawing/2014/main" id="{6374258B-A813-4557-BC7C-F940CFAE120E}"/>
+              </a:ext>
+            </a:extLst>
+          </p:cNvPr>
+          <p:cNvCxnSpPr>
+            <a:cxnSpLocks/>
+            <a:stCxn id="68" idx="1"/>
+            <a:endCxn id="70" idx="3"/>
+          </p:cNvCxnSpPr>
+          <p:nvPr/>
+        </p:nvCxnSpPr>
+        <p:spPr>
+          <a:xfrm flipH="1">
+            <a:off x="2159638" y="4299966"/>
+            <a:ext cx="824881" cy="0"/>
+          </a:xfrm>
+          <a:prstGeom prst="straightConnector1">
+            <a:avLst/>
+          </a:prstGeom>
+          <a:ln>
+            <a:tailEnd type="triangle"/>
+          </a:ln>
+        </p:spPr>
+        <p:style>
+          <a:lnRef idx="1">
+            <a:schemeClr val="accent1"/>
+          </a:lnRef>
+          <a:fillRef idx="0">
+            <a:schemeClr val="accent1"/>
+          </a:fillRef>
+          <a:effectRef idx="0">
+            <a:schemeClr val="accent1"/>
+          </a:effectRef>
+          <a:fontRef idx="minor">
+            <a:schemeClr val="tx1"/>
+          </a:fontRef>
+        </p:style>
+      </p:cxnSp>
+      <p:sp>
+        <p:nvSpPr>
+          <p:cNvPr id="70" name="Rectangle: Rounded Corners 69">
+            <a:extLst>
+              <a:ext uri="{FF2B5EF4-FFF2-40B4-BE49-F238E27FC236}">
+                <a16:creationId xmlns:a16="http://schemas.microsoft.com/office/drawing/2014/main" id="{6595C005-3925-4BB1-BE48-B49B94320F7D}"/>
+              </a:ext>
+            </a:extLst>
+          </p:cNvPr>
+          <p:cNvSpPr/>
+          <p:nvPr/>
+        </p:nvSpPr>
+        <p:spPr>
+          <a:xfrm>
+            <a:off x="99229" y="3582674"/>
+            <a:ext cx="2060409" cy="1434584"/>
+          </a:xfrm>
+          <a:prstGeom prst="roundRect">
+            <a:avLst/>
+          </a:prstGeom>
+          <a:noFill/>
+          <a:ln>
+            <a:solidFill>
+              <a:schemeClr val="accent5"/>
+            </a:solidFill>
+          </a:ln>
+        </p:spPr>
+        <p:style>
+          <a:lnRef idx="3">
+            <a:schemeClr val="lt1"/>
+          </a:lnRef>
+          <a:fillRef idx="1">
+            <a:schemeClr val="accent5"/>
+          </a:fillRef>
+          <a:effectRef idx="1">
+            <a:schemeClr val="accent5"/>
+          </a:effectRef>
+          <a:fontRef idx="minor">
+            <a:schemeClr val="lt1"/>
+          </a:fontRef>
+        </p:style>
+        <p:txBody>
+          <a:bodyPr rtlCol="0" anchor="ctr"/>
+          <a:lstStyle/>
+          <a:p>
+            <a:pPr algn="ctr"/>
+            <a:endParaRPr lang="en-CA" dirty="0"/>
+          </a:p>
+        </p:txBody>
+      </p:sp>
+      <p:sp>
+        <p:nvSpPr>
+          <p:cNvPr id="71" name="Rectangle: Rounded Corners 70">
+            <a:extLst>
+              <a:ext uri="{FF2B5EF4-FFF2-40B4-BE49-F238E27FC236}">
+                <a16:creationId xmlns:a16="http://schemas.microsoft.com/office/drawing/2014/main" id="{693F68A8-4E1B-4F22-8A4E-24F3694A5044}"/>
+              </a:ext>
+            </a:extLst>
+          </p:cNvPr>
+          <p:cNvSpPr/>
+          <p:nvPr/>
+        </p:nvSpPr>
+        <p:spPr>
+          <a:xfrm>
+            <a:off x="5021031" y="3606601"/>
+            <a:ext cx="3459812" cy="1902319"/>
+          </a:xfrm>
+          <a:prstGeom prst="roundRect">
+            <a:avLst>
+              <a:gd name="adj" fmla="val 6295"/>
+            </a:avLst>
+          </a:prstGeom>
+          <a:noFill/>
+          <a:ln>
+            <a:solidFill>
+              <a:schemeClr val="accent5"/>
+            </a:solidFill>
+          </a:ln>
+        </p:spPr>
+        <p:style>
+          <a:lnRef idx="3">
+            <a:schemeClr val="lt1"/>
+          </a:lnRef>
+          <a:fillRef idx="1">
+            <a:schemeClr val="accent5"/>
+          </a:fillRef>
+          <a:effectRef idx="1">
+            <a:schemeClr val="accent5"/>
+          </a:effectRef>
+          <a:fontRef idx="minor">
+            <a:schemeClr val="lt1"/>
+          </a:fontRef>
+        </p:style>
+        <p:txBody>
+          <a:bodyPr rtlCol="0" anchor="ctr"/>
+          <a:lstStyle/>
+          <a:p>
+            <a:pPr algn="ctr"/>
+            <a:endParaRPr lang="en-CA" dirty="0"/>
+          </a:p>
+        </p:txBody>
+      </p:sp>
+      <p:sp>
+        <p:nvSpPr>
+          <p:cNvPr id="72" name="TextBox 71">
+            <a:extLst>
+              <a:ext uri="{FF2B5EF4-FFF2-40B4-BE49-F238E27FC236}">
+                <a16:creationId xmlns:a16="http://schemas.microsoft.com/office/drawing/2014/main" id="{EC501165-A19A-4CFB-B866-0E78CB820551}"/>
+              </a:ext>
+            </a:extLst>
+          </p:cNvPr>
+          <p:cNvSpPr txBox="1"/>
+          <p:nvPr/>
+        </p:nvSpPr>
+        <p:spPr>
+          <a:xfrm>
+            <a:off x="6097646" y="3597245"/>
+            <a:ext cx="2104498" cy="338554"/>
+          </a:xfrm>
+          <a:prstGeom prst="rect">
+            <a:avLst/>
+          </a:prstGeom>
+          <a:noFill/>
+        </p:spPr>
+        <p:txBody>
+          <a:bodyPr wrap="square" rtlCol="0">
+            <a:spAutoFit/>
+          </a:bodyPr>
+          <a:lstStyle/>
+          <a:p>
+            <a:r>
+              <a:rPr lang="en-US" sz="1600" dirty="0">
+                <a:solidFill>
+                  <a:srgbClr val="0070C0"/>
+                </a:solidFill>
+              </a:rPr>
+              <a:t>VSTS Extension</a:t>
+            </a:r>
+            <a:endParaRPr lang="en-CA" sz="1600" dirty="0">
+              <a:solidFill>
+                <a:srgbClr val="0070C0"/>
+              </a:solidFill>
+            </a:endParaRPr>
+          </a:p>
+        </p:txBody>
+      </p:sp>
+      <p:sp>
+        <p:nvSpPr>
+          <p:cNvPr id="73" name="TextBox 72">
+            <a:extLst>
+              <a:ext uri="{FF2B5EF4-FFF2-40B4-BE49-F238E27FC236}">
+                <a16:creationId xmlns:a16="http://schemas.microsoft.com/office/drawing/2014/main" id="{0451CCAE-CE93-4524-AB66-72588A4E2AD9}"/>
+              </a:ext>
+            </a:extLst>
+          </p:cNvPr>
+          <p:cNvSpPr txBox="1"/>
+          <p:nvPr/>
+        </p:nvSpPr>
+        <p:spPr>
+          <a:xfrm>
+            <a:off x="5110706" y="4049247"/>
+            <a:ext cx="2104498" cy="276999"/>
+          </a:xfrm>
+          <a:prstGeom prst="rect">
+            <a:avLst/>
+          </a:prstGeom>
+          <a:noFill/>
+        </p:spPr>
+        <p:txBody>
+          <a:bodyPr wrap="square" rtlCol="0">
+            <a:spAutoFit/>
+          </a:bodyPr>
+          <a:lstStyle/>
+          <a:p>
+            <a:r>
+              <a:rPr lang="en-US" sz="1200" dirty="0">
+                <a:solidFill>
+                  <a:srgbClr val="0070C0"/>
+                </a:solidFill>
+              </a:rPr>
+              <a:t>get flag</a:t>
+            </a:r>
+            <a:endParaRPr lang="en-CA" sz="1200" dirty="0">
+              <a:solidFill>
+                <a:srgbClr val="0070C0"/>
+              </a:solidFill>
+            </a:endParaRPr>
+          </a:p>
+        </p:txBody>
+      </p:sp>
+      <p:sp>
+        <p:nvSpPr>
+          <p:cNvPr id="74" name="Rectangle: Rounded Corners 73">
+            <a:extLst>
+              <a:ext uri="{FF2B5EF4-FFF2-40B4-BE49-F238E27FC236}">
+                <a16:creationId xmlns:a16="http://schemas.microsoft.com/office/drawing/2014/main" id="{2F973F2A-8A49-4127-9A8B-4C1C1B87E8A0}"/>
+              </a:ext>
+            </a:extLst>
+          </p:cNvPr>
+          <p:cNvSpPr/>
+          <p:nvPr/>
+        </p:nvSpPr>
+        <p:spPr>
+          <a:xfrm>
+            <a:off x="3010790" y="5297547"/>
+            <a:ext cx="1623679" cy="1434584"/>
+          </a:xfrm>
+          <a:prstGeom prst="roundRect">
+            <a:avLst/>
+          </a:prstGeom>
+          <a:solidFill>
+            <a:schemeClr val="accent5"/>
+          </a:solidFill>
+        </p:spPr>
+        <p:style>
+          <a:lnRef idx="3">
+            <a:schemeClr val="lt1"/>
+          </a:lnRef>
+          <a:fillRef idx="1">
+            <a:schemeClr val="accent5"/>
+          </a:fillRef>
+          <a:effectRef idx="1">
+            <a:schemeClr val="accent5"/>
+          </a:effectRef>
+          <a:fontRef idx="minor">
+            <a:schemeClr val="lt1"/>
+          </a:fontRef>
+        </p:style>
+        <p:txBody>
+          <a:bodyPr rtlCol="0" anchor="ctr"/>
+          <a:lstStyle/>
+          <a:p>
+            <a:pPr algn="ctr"/>
+            <a:r>
+              <a:rPr lang="en-US" dirty="0"/>
+              <a:t>Azure Function</a:t>
+            </a:r>
+            <a:endParaRPr lang="en-CA" dirty="0"/>
+          </a:p>
+        </p:txBody>
+      </p:sp>
+      <p:sp>
+        <p:nvSpPr>
+          <p:cNvPr id="75" name="TextBox 74">
+            <a:extLst>
+              <a:ext uri="{FF2B5EF4-FFF2-40B4-BE49-F238E27FC236}">
+                <a16:creationId xmlns:a16="http://schemas.microsoft.com/office/drawing/2014/main" id="{32E7DD3B-CF5F-4B23-9808-FC8BC53CFDDE}"/>
+              </a:ext>
+            </a:extLst>
+          </p:cNvPr>
+          <p:cNvSpPr txBox="1"/>
+          <p:nvPr/>
+        </p:nvSpPr>
+        <p:spPr>
+          <a:xfrm>
+            <a:off x="5205899" y="5718246"/>
+            <a:ext cx="2104498" cy="276999"/>
+          </a:xfrm>
+          <a:prstGeom prst="rect">
+            <a:avLst/>
+          </a:prstGeom>
+          <a:noFill/>
+        </p:spPr>
+        <p:txBody>
+          <a:bodyPr wrap="square" rtlCol="0">
+            <a:spAutoFit/>
+          </a:bodyPr>
+          <a:lstStyle/>
+          <a:p>
+            <a:r>
+              <a:rPr lang="en-US" sz="1200" dirty="0">
+                <a:solidFill>
+                  <a:srgbClr val="0070C0"/>
+                </a:solidFill>
+              </a:rPr>
+              <a:t>set flag</a:t>
+            </a:r>
+            <a:endParaRPr lang="en-CA" sz="1200" dirty="0">
+              <a:solidFill>
+                <a:srgbClr val="0070C0"/>
+              </a:solidFill>
+            </a:endParaRPr>
+          </a:p>
+        </p:txBody>
+      </p:sp>
+      <p:cxnSp>
+        <p:nvCxnSpPr>
+          <p:cNvPr id="76" name="Connector: Elbow 75">
+            <a:extLst>
+              <a:ext uri="{FF2B5EF4-FFF2-40B4-BE49-F238E27FC236}">
+                <a16:creationId xmlns:a16="http://schemas.microsoft.com/office/drawing/2014/main" id="{034F0C7A-C1F2-4CCD-AF75-5084FC792612}"/>
+              </a:ext>
+            </a:extLst>
+          </p:cNvPr>
+          <p:cNvCxnSpPr>
+            <a:cxnSpLocks/>
+            <a:stCxn id="57" idx="2"/>
+            <a:endCxn id="15" idx="3"/>
+          </p:cNvCxnSpPr>
+          <p:nvPr/>
+        </p:nvCxnSpPr>
+        <p:spPr>
+          <a:xfrm rot="5400000">
+            <a:off x="5350917" y="4744219"/>
+            <a:ext cx="909220" cy="1592832"/>
+          </a:xfrm>
+          <a:prstGeom prst="bentConnector2">
+            <a:avLst/>
+          </a:prstGeom>
+          <a:ln>
+            <a:tailEnd type="triangle"/>
+          </a:ln>
+        </p:spPr>
+        <p:style>
+          <a:lnRef idx="1">
+            <a:schemeClr val="accent1"/>
+          </a:lnRef>
+          <a:fillRef idx="0">
+            <a:schemeClr val="accent1"/>
+          </a:fillRef>
+          <a:effectRef idx="0">
+            <a:schemeClr val="accent1"/>
+          </a:effectRef>
+          <a:fontRef idx="minor">
+            <a:schemeClr val="tx1"/>
+          </a:fontRef>
+        </p:style>
+      </p:cxnSp>
+      <p:sp>
+        <p:nvSpPr>
+          <p:cNvPr id="79" name="TextBox 78">
+            <a:extLst>
+              <a:ext uri="{FF2B5EF4-FFF2-40B4-BE49-F238E27FC236}">
+                <a16:creationId xmlns:a16="http://schemas.microsoft.com/office/drawing/2014/main" id="{CD831109-C50B-4445-BE94-34C2761EB0A2}"/>
+              </a:ext>
+            </a:extLst>
+          </p:cNvPr>
+          <p:cNvSpPr txBox="1"/>
+          <p:nvPr/>
+        </p:nvSpPr>
+        <p:spPr>
+          <a:xfrm>
+            <a:off x="2193801" y="1721232"/>
+            <a:ext cx="2104498" cy="276999"/>
+          </a:xfrm>
+          <a:prstGeom prst="rect">
+            <a:avLst/>
+          </a:prstGeom>
+          <a:noFill/>
+        </p:spPr>
+        <p:txBody>
+          <a:bodyPr wrap="square" rtlCol="0">
+            <a:spAutoFit/>
+          </a:bodyPr>
+          <a:lstStyle/>
+          <a:p>
+            <a:r>
+              <a:rPr lang="en-US" sz="1200" dirty="0">
+                <a:solidFill>
+                  <a:srgbClr val="0070C0"/>
+                </a:solidFill>
+              </a:rPr>
+              <a:t>query flag</a:t>
+            </a:r>
+            <a:endParaRPr lang="en-CA" sz="1200" dirty="0">
+              <a:solidFill>
+                <a:srgbClr val="0070C0"/>
+              </a:solidFill>
+            </a:endParaRPr>
+          </a:p>
+        </p:txBody>
+      </p:sp>
+      <p:sp>
+        <p:nvSpPr>
+          <p:cNvPr id="80" name="TextBox 79">
+            <a:extLst>
+              <a:ext uri="{FF2B5EF4-FFF2-40B4-BE49-F238E27FC236}">
+                <a16:creationId xmlns:a16="http://schemas.microsoft.com/office/drawing/2014/main" id="{EEB825E1-FD33-4C78-BC98-6246BE4C3709}"/>
+              </a:ext>
+            </a:extLst>
+          </p:cNvPr>
+          <p:cNvSpPr txBox="1"/>
+          <p:nvPr/>
+        </p:nvSpPr>
+        <p:spPr>
+          <a:xfrm>
+            <a:off x="2211543" y="4041068"/>
+            <a:ext cx="2104498" cy="276999"/>
+          </a:xfrm>
+          <a:prstGeom prst="rect">
+            <a:avLst/>
+          </a:prstGeom>
+          <a:noFill/>
+        </p:spPr>
+        <p:txBody>
+          <a:bodyPr wrap="square" rtlCol="0">
+            <a:spAutoFit/>
+          </a:bodyPr>
+          <a:lstStyle/>
+          <a:p>
+            <a:r>
+              <a:rPr lang="en-US" sz="1200" dirty="0">
+                <a:solidFill>
+                  <a:srgbClr val="0070C0"/>
+                </a:solidFill>
+              </a:rPr>
+              <a:t>query flag</a:t>
+            </a:r>
+            <a:endParaRPr lang="en-CA" sz="1200" dirty="0">
+              <a:solidFill>
+                <a:srgbClr val="0070C0"/>
+              </a:solidFill>
+            </a:endParaRPr>
+          </a:p>
+        </p:txBody>
+      </p:sp>
+      <p:cxnSp>
+        <p:nvCxnSpPr>
+          <p:cNvPr id="81" name="Connector: Elbow 80">
+            <a:extLst>
+              <a:ext uri="{FF2B5EF4-FFF2-40B4-BE49-F238E27FC236}">
+                <a16:creationId xmlns:a16="http://schemas.microsoft.com/office/drawing/2014/main" id="{F451A3F5-27F7-41C0-BCEF-E71D992E0D75}"/>
+              </a:ext>
+            </a:extLst>
+          </p:cNvPr>
+          <p:cNvCxnSpPr>
+            <a:cxnSpLocks/>
+            <a:stCxn id="74" idx="1"/>
+            <a:endCxn id="70" idx="2"/>
+          </p:cNvCxnSpPr>
+          <p:nvPr/>
+        </p:nvCxnSpPr>
+        <p:spPr>
+          <a:xfrm rot="10800000">
+            <a:off x="1129434" y="5017259"/>
+            <a:ext cx="1881356" cy="997581"/>
+          </a:xfrm>
+          <a:prstGeom prst="bentConnector2">
+            <a:avLst/>
+          </a:prstGeom>
+          <a:ln>
+            <a:tailEnd type="triangle"/>
+          </a:ln>
+        </p:spPr>
+        <p:style>
+          <a:lnRef idx="1">
+            <a:schemeClr val="accent1"/>
+          </a:lnRef>
+          <a:fillRef idx="0">
+            <a:schemeClr val="accent1"/>
+          </a:fillRef>
+          <a:effectRef idx="0">
+            <a:schemeClr val="accent1"/>
+          </a:effectRef>
+          <a:fontRef idx="minor">
+            <a:schemeClr val="tx1"/>
+          </a:fontRef>
+        </p:style>
+      </p:cxnSp>
+      <p:sp>
+        <p:nvSpPr>
+          <p:cNvPr id="84" name="TextBox 83">
+            <a:extLst>
+              <a:ext uri="{FF2B5EF4-FFF2-40B4-BE49-F238E27FC236}">
+                <a16:creationId xmlns:a16="http://schemas.microsoft.com/office/drawing/2014/main" id="{73814AB5-4F1B-476D-A589-8A419D9C113C}"/>
+              </a:ext>
+            </a:extLst>
+          </p:cNvPr>
+          <p:cNvSpPr txBox="1"/>
+          <p:nvPr/>
+        </p:nvSpPr>
+        <p:spPr>
+          <a:xfrm>
+            <a:off x="1460251" y="5688564"/>
+            <a:ext cx="2104498" cy="276999"/>
+          </a:xfrm>
+          <a:prstGeom prst="rect">
+            <a:avLst/>
+          </a:prstGeom>
+          <a:noFill/>
+        </p:spPr>
+        <p:txBody>
+          <a:bodyPr wrap="square" rtlCol="0">
+            <a:spAutoFit/>
+          </a:bodyPr>
+          <a:lstStyle/>
+          <a:p>
+            <a:r>
+              <a:rPr lang="en-US" sz="1200" dirty="0">
+                <a:solidFill>
+                  <a:srgbClr val="0070C0"/>
+                </a:solidFill>
+              </a:rPr>
+              <a:t>REST API calls</a:t>
+            </a:r>
+            <a:endParaRPr lang="en-CA" sz="1200" dirty="0">
+              <a:solidFill>
+                <a:srgbClr val="0070C0"/>
+              </a:solidFill>
+            </a:endParaRPr>
+          </a:p>
+        </p:txBody>
+      </p:sp>
+      <p:pic>
+        <p:nvPicPr>
+          <p:cNvPr id="15" name="Picture 14">
+            <a:extLst>
+              <a:ext uri="{FF2B5EF4-FFF2-40B4-BE49-F238E27FC236}">
+                <a16:creationId xmlns:a16="http://schemas.microsoft.com/office/drawing/2014/main" id="{B0106EAD-A2E0-418C-A49E-75484CC14C97}"/>
+              </a:ext>
+            </a:extLst>
+          </p:cNvPr>
+          <p:cNvPicPr>
+            <a:picLocks noChangeAspect="1"/>
+          </p:cNvPicPr>
+          <p:nvPr/>
+        </p:nvPicPr>
+        <p:blipFill>
+          <a:blip r:embed="rId7">
+            <a:clrChange>
+              <a:clrFrom>
+                <a:srgbClr val="FFFFFF"/>
+              </a:clrFrom>
+              <a:clrTo>
+                <a:srgbClr val="FFFFFF">
+                  <a:alpha val="0"/>
+                </a:srgbClr>
+              </a:clrTo>
+            </a:clrChange>
+          </a:blip>
+          <a:stretch>
+            <a:fillRect/>
+          </a:stretch>
+        </p:blipFill>
+        <p:spPr>
+          <a:xfrm>
+            <a:off x="4259826" y="5655029"/>
+            <a:ext cx="749285" cy="680432"/>
+          </a:xfrm>
+          <a:prstGeom prst="rect">
+            <a:avLst/>
+          </a:prstGeom>
+        </p:spPr>
+      </p:pic>
+      <p:pic>
+        <p:nvPicPr>
+          <p:cNvPr id="20" name="Picture 19">
+            <a:extLst>
+              <a:ext uri="{FF2B5EF4-FFF2-40B4-BE49-F238E27FC236}">
+                <a16:creationId xmlns:a16="http://schemas.microsoft.com/office/drawing/2014/main" id="{32B602FF-E8E1-4200-A0F7-6FACBA44C3EE}"/>
+              </a:ext>
+            </a:extLst>
+          </p:cNvPr>
+          <p:cNvPicPr>
+            <a:picLocks noChangeAspect="1"/>
+          </p:cNvPicPr>
+          <p:nvPr/>
+        </p:nvPicPr>
+        <p:blipFill>
+          <a:blip r:embed="rId8"/>
+          <a:stretch>
+            <a:fillRect/>
+          </a:stretch>
+        </p:blipFill>
+        <p:spPr>
+          <a:xfrm>
+            <a:off x="655078" y="1140236"/>
+            <a:ext cx="995370" cy="261939"/>
+          </a:xfrm>
+          <a:prstGeom prst="rect">
+            <a:avLst/>
+          </a:prstGeom>
+        </p:spPr>
+      </p:pic>
+      <p:pic>
+        <p:nvPicPr>
+          <p:cNvPr id="51" name="Picture 50">
+            <a:extLst>
+              <a:ext uri="{FF2B5EF4-FFF2-40B4-BE49-F238E27FC236}">
+                <a16:creationId xmlns:a16="http://schemas.microsoft.com/office/drawing/2014/main" id="{F3D0A7BB-EBB6-40CC-A28C-7265965F215B}"/>
+              </a:ext>
+            </a:extLst>
+          </p:cNvPr>
+          <p:cNvPicPr>
+            <a:picLocks noChangeAspect="1"/>
+          </p:cNvPicPr>
+          <p:nvPr/>
+        </p:nvPicPr>
+        <p:blipFill>
+          <a:blip r:embed="rId8"/>
+          <a:stretch>
+            <a:fillRect/>
+          </a:stretch>
+        </p:blipFill>
+        <p:spPr>
+          <a:xfrm>
+            <a:off x="601478" y="3405552"/>
+            <a:ext cx="995370" cy="261939"/>
+          </a:xfrm>
+          <a:prstGeom prst="rect">
+            <a:avLst/>
+          </a:prstGeom>
+        </p:spPr>
+      </p:pic>
+      <p:sp>
+        <p:nvSpPr>
+          <p:cNvPr id="52" name="Rectangle: Rounded Corners 51">
+            <a:extLst>
+              <a:ext uri="{FF2B5EF4-FFF2-40B4-BE49-F238E27FC236}">
+                <a16:creationId xmlns:a16="http://schemas.microsoft.com/office/drawing/2014/main" id="{B65971F0-0F56-432D-A2F7-32DF2ED9A76B}"/>
+              </a:ext>
+            </a:extLst>
+          </p:cNvPr>
+          <p:cNvSpPr/>
+          <p:nvPr/>
+        </p:nvSpPr>
+        <p:spPr>
+          <a:xfrm>
+            <a:off x="618059" y="1651942"/>
+            <a:ext cx="909176" cy="1035725"/>
+          </a:xfrm>
+          <a:prstGeom prst="roundRect">
+            <a:avLst/>
+          </a:prstGeom>
+          <a:solidFill>
+            <a:schemeClr val="accent5"/>
+          </a:solidFill>
+        </p:spPr>
+        <p:style>
+          <a:lnRef idx="3">
+            <a:schemeClr val="lt1"/>
+          </a:lnRef>
+          <a:fillRef idx="1">
+            <a:schemeClr val="accent5"/>
+          </a:fillRef>
+          <a:effectRef idx="1">
+            <a:schemeClr val="accent5"/>
+          </a:effectRef>
+          <a:fontRef idx="minor">
+            <a:schemeClr val="lt1"/>
+          </a:fontRef>
+        </p:style>
+        <p:txBody>
+          <a:bodyPr rtlCol="0" anchor="ctr"/>
+          <a:lstStyle/>
+          <a:p>
+            <a:pPr algn="ctr"/>
+            <a:endParaRPr lang="en-CA"/>
+          </a:p>
+        </p:txBody>
+      </p:sp>
+      <p:sp>
+        <p:nvSpPr>
+          <p:cNvPr id="55" name="TextBox 54">
+            <a:extLst>
+              <a:ext uri="{FF2B5EF4-FFF2-40B4-BE49-F238E27FC236}">
+                <a16:creationId xmlns:a16="http://schemas.microsoft.com/office/drawing/2014/main" id="{DB51C03D-B98B-4A2C-86A6-30DFEFAA9EA7}"/>
+              </a:ext>
+            </a:extLst>
+          </p:cNvPr>
+          <p:cNvSpPr txBox="1"/>
+          <p:nvPr/>
+        </p:nvSpPr>
+        <p:spPr>
+          <a:xfrm>
+            <a:off x="652222" y="1752346"/>
+            <a:ext cx="533823" cy="307777"/>
+          </a:xfrm>
+          <a:prstGeom prst="rect">
+            <a:avLst/>
+          </a:prstGeom>
+          <a:noFill/>
+        </p:spPr>
+        <p:txBody>
+          <a:bodyPr wrap="square" rtlCol="0">
+            <a:spAutoFit/>
+          </a:bodyPr>
+          <a:lstStyle/>
+          <a:p>
+            <a:r>
+              <a:rPr lang="en-CA" sz="1400" dirty="0">
+                <a:solidFill>
+                  <a:schemeClr val="bg1"/>
+                </a:solidFill>
+                <a:sym typeface="Webdings" panose="05030102010509060703" pitchFamily="18" charset="2"/>
+              </a:rPr>
+              <a:t>ON</a:t>
+            </a:r>
+            <a:endParaRPr lang="en-CA" sz="1400" dirty="0">
+              <a:solidFill>
+                <a:schemeClr val="bg1"/>
+              </a:solidFill>
+            </a:endParaRPr>
+          </a:p>
+        </p:txBody>
+      </p:sp>
+      <p:sp>
+        <p:nvSpPr>
+          <p:cNvPr id="77" name="TextBox 76">
+            <a:extLst>
+              <a:ext uri="{FF2B5EF4-FFF2-40B4-BE49-F238E27FC236}">
+                <a16:creationId xmlns:a16="http://schemas.microsoft.com/office/drawing/2014/main" id="{F48A2C32-D670-4245-8497-FFAA09739631}"/>
+              </a:ext>
+            </a:extLst>
+          </p:cNvPr>
+          <p:cNvSpPr txBox="1"/>
+          <p:nvPr/>
+        </p:nvSpPr>
+        <p:spPr>
+          <a:xfrm>
+            <a:off x="618059" y="2219284"/>
+            <a:ext cx="621586" cy="307777"/>
+          </a:xfrm>
+          <a:prstGeom prst="rect">
+            <a:avLst/>
+          </a:prstGeom>
+          <a:noFill/>
+        </p:spPr>
+        <p:txBody>
+          <a:bodyPr wrap="square" rtlCol="0">
+            <a:spAutoFit/>
+          </a:bodyPr>
+          <a:lstStyle/>
+          <a:p>
+            <a:r>
+              <a:rPr lang="en-CA" sz="1400" dirty="0">
+                <a:solidFill>
+                  <a:schemeClr val="bg1"/>
+                </a:solidFill>
+                <a:sym typeface="Webdings" panose="05030102010509060703" pitchFamily="18" charset="2"/>
+              </a:rPr>
+              <a:t>OFF</a:t>
+            </a:r>
+            <a:endParaRPr lang="en-CA" sz="1400" dirty="0">
+              <a:solidFill>
+                <a:schemeClr val="bg1"/>
+              </a:solidFill>
+            </a:endParaRPr>
+          </a:p>
+        </p:txBody>
+      </p:sp>
+      <p:sp>
+        <p:nvSpPr>
+          <p:cNvPr id="78" name="Flowchart: Alternate Process 77">
+            <a:extLst>
+              <a:ext uri="{FF2B5EF4-FFF2-40B4-BE49-F238E27FC236}">
+                <a16:creationId xmlns:a16="http://schemas.microsoft.com/office/drawing/2014/main" id="{A130C6CD-1AD5-4693-B4DA-A1F758CF34E8}"/>
+              </a:ext>
+            </a:extLst>
+          </p:cNvPr>
+          <p:cNvSpPr/>
+          <p:nvPr/>
+        </p:nvSpPr>
+        <p:spPr>
+          <a:xfrm>
+            <a:off x="1186046" y="1867905"/>
+            <a:ext cx="134495" cy="539749"/>
+          </a:xfrm>
+          <a:prstGeom prst="flowChartAlternateProcess">
+            <a:avLst/>
+          </a:prstGeom>
+        </p:spPr>
+        <p:style>
+          <a:lnRef idx="2">
+            <a:schemeClr val="dk1"/>
+          </a:lnRef>
+          <a:fillRef idx="1">
+            <a:schemeClr val="lt1"/>
+          </a:fillRef>
+          <a:effectRef idx="0">
+            <a:schemeClr val="dk1"/>
+          </a:effectRef>
+          <a:fontRef idx="minor">
+            <a:schemeClr val="dk1"/>
+          </a:fontRef>
+        </p:style>
+        <p:txBody>
+          <a:bodyPr rtlCol="0" anchor="ctr"/>
+          <a:lstStyle/>
+          <a:p>
+            <a:pPr algn="ctr"/>
+            <a:endParaRPr lang="en-CA"/>
+          </a:p>
+        </p:txBody>
+      </p:sp>
+      <p:sp>
+        <p:nvSpPr>
+          <p:cNvPr id="82" name="Flowchart: Connector 81">
+            <a:extLst>
+              <a:ext uri="{FF2B5EF4-FFF2-40B4-BE49-F238E27FC236}">
+                <a16:creationId xmlns:a16="http://schemas.microsoft.com/office/drawing/2014/main" id="{B6FE0621-4BCA-4963-85EB-64666F2221F3}"/>
+              </a:ext>
+            </a:extLst>
+          </p:cNvPr>
+          <p:cNvSpPr/>
+          <p:nvPr/>
+        </p:nvSpPr>
+        <p:spPr>
+          <a:xfrm>
+            <a:off x="1134978" y="1786146"/>
+            <a:ext cx="257761" cy="279336"/>
+          </a:xfrm>
+          <a:prstGeom prst="flowChartConnector">
+            <a:avLst/>
+          </a:prstGeom>
+        </p:spPr>
+        <p:style>
+          <a:lnRef idx="0">
+            <a:schemeClr val="accent6"/>
+          </a:lnRef>
+          <a:fillRef idx="3">
+            <a:schemeClr val="accent6"/>
+          </a:fillRef>
+          <a:effectRef idx="3">
+            <a:schemeClr val="accent6"/>
+          </a:effectRef>
+          <a:fontRef idx="minor">
+            <a:schemeClr val="lt1"/>
+          </a:fontRef>
+        </p:style>
+        <p:txBody>
+          <a:bodyPr rtlCol="0" anchor="ctr"/>
+          <a:lstStyle/>
+          <a:p>
+            <a:pPr algn="ctr"/>
+            <a:endParaRPr lang="en-CA"/>
+          </a:p>
+        </p:txBody>
+      </p:sp>
+      <p:sp>
+        <p:nvSpPr>
+          <p:cNvPr id="83" name="TextBox 82">
+            <a:extLst>
+              <a:ext uri="{FF2B5EF4-FFF2-40B4-BE49-F238E27FC236}">
+                <a16:creationId xmlns:a16="http://schemas.microsoft.com/office/drawing/2014/main" id="{669A78A9-475C-4A74-A129-3F8C28F369F4}"/>
+              </a:ext>
+            </a:extLst>
+          </p:cNvPr>
+          <p:cNvSpPr txBox="1"/>
+          <p:nvPr/>
+        </p:nvSpPr>
+        <p:spPr>
+          <a:xfrm>
+            <a:off x="261383" y="1352807"/>
+            <a:ext cx="1739289" cy="338554"/>
+          </a:xfrm>
+          <a:prstGeom prst="rect">
+            <a:avLst/>
+          </a:prstGeom>
+          <a:noFill/>
+        </p:spPr>
+        <p:txBody>
+          <a:bodyPr wrap="square" rtlCol="0">
+            <a:spAutoFit/>
+          </a:bodyPr>
+          <a:lstStyle/>
+          <a:p>
+            <a:r>
+              <a:rPr lang="en-US" sz="1600" dirty="0">
+                <a:solidFill>
+                  <a:srgbClr val="0070C0"/>
+                </a:solidFill>
+              </a:rPr>
+              <a:t>SaaS Management</a:t>
+            </a:r>
+            <a:endParaRPr lang="en-CA" sz="1600" dirty="0">
+              <a:solidFill>
+                <a:srgbClr val="0070C0"/>
+              </a:solidFill>
+            </a:endParaRPr>
+          </a:p>
+        </p:txBody>
+      </p:sp>
+    </p:spTree>
+    <p:extLst>
+      <p:ext uri="{BB962C8B-B14F-4D97-AF65-F5344CB8AC3E}">
+        <p14:creationId xmlns:p14="http://schemas.microsoft.com/office/powerpoint/2010/main" val="1546671014"/>
+      </p:ext>
+    </p:extLst>
+  </p:cSld>
+  <p:clrMapOvr>
+    <a:masterClrMapping/>
+  </p:clrMapOvr>
+</p:sld>
+</file>
+
 <file path=ppt/slides/slide2.xml><?xml version="1.0" encoding="utf-8"?>
 <p:sld xmlns:a="http://schemas.openxmlformats.org/drawingml/2006/main" xmlns:r="http://schemas.openxmlformats.org/officeDocument/2006/relationships" xmlns:p="http://schemas.openxmlformats.org/presentationml/2006/main">
   <p:cSld>
@@ -9940,7 +14780,7 @@
         </p:nvCxnSpPr>
         <p:spPr>
           <a:xfrm>
-            <a:off x="5418766" y="1640032"/>
+            <a:off x="6721854" y="2917435"/>
             <a:ext cx="0" cy="4217542"/>
           </a:xfrm>
           <a:prstGeom prst="line">

</xml_diff>